<commit_message>
Changed to new icon
</commit_message>
<xml_diff>
--- a/www/Hero_on_homePage.pptx
+++ b/www/Hero_on_homePage.pptx
@@ -104,6 +104,11 @@
       </a:defRPr>
     </a:lvl9pPr>
   </p:defaultTextStyle>
+  <p:extLst>
+    <p:ext uri="{EFAFB233-063F-42B5-8137-9DF3F51BA10A}">
+      <p15:sldGuideLst xmlns:p15="http://schemas.microsoft.com/office/powerpoint/2012/main"/>
+    </p:ext>
+  </p:extLst>
 </p:presentation>
 </file>
 
@@ -254,7 +259,7 @@
           <a:p>
             <a:fld id="{0B66EB57-E4FC-4CEF-AEF8-36005745810B}" type="datetimeFigureOut">
               <a:rPr lang="en-US" smtClean="0"/>
-              <a:t>6/4/2019</a:t>
+              <a:t>9/23/2019</a:t>
             </a:fld>
             <a:endParaRPr lang="en-US"/>
           </a:p>
@@ -452,7 +457,7 @@
           <a:p>
             <a:fld id="{0B66EB57-E4FC-4CEF-AEF8-36005745810B}" type="datetimeFigureOut">
               <a:rPr lang="en-US" smtClean="0"/>
-              <a:t>6/4/2019</a:t>
+              <a:t>9/23/2019</a:t>
             </a:fld>
             <a:endParaRPr lang="en-US"/>
           </a:p>
@@ -660,7 +665,7 @@
           <a:p>
             <a:fld id="{0B66EB57-E4FC-4CEF-AEF8-36005745810B}" type="datetimeFigureOut">
               <a:rPr lang="en-US" smtClean="0"/>
-              <a:t>6/4/2019</a:t>
+              <a:t>9/23/2019</a:t>
             </a:fld>
             <a:endParaRPr lang="en-US"/>
           </a:p>
@@ -858,7 +863,7 @@
           <a:p>
             <a:fld id="{0B66EB57-E4FC-4CEF-AEF8-36005745810B}" type="datetimeFigureOut">
               <a:rPr lang="en-US" smtClean="0"/>
-              <a:t>6/4/2019</a:t>
+              <a:t>9/23/2019</a:t>
             </a:fld>
             <a:endParaRPr lang="en-US"/>
           </a:p>
@@ -1133,7 +1138,7 @@
           <a:p>
             <a:fld id="{0B66EB57-E4FC-4CEF-AEF8-36005745810B}" type="datetimeFigureOut">
               <a:rPr lang="en-US" smtClean="0"/>
-              <a:t>6/4/2019</a:t>
+              <a:t>9/23/2019</a:t>
             </a:fld>
             <a:endParaRPr lang="en-US"/>
           </a:p>
@@ -1398,7 +1403,7 @@
           <a:p>
             <a:fld id="{0B66EB57-E4FC-4CEF-AEF8-36005745810B}" type="datetimeFigureOut">
               <a:rPr lang="en-US" smtClean="0"/>
-              <a:t>6/4/2019</a:t>
+              <a:t>9/23/2019</a:t>
             </a:fld>
             <a:endParaRPr lang="en-US"/>
           </a:p>
@@ -1810,7 +1815,7 @@
           <a:p>
             <a:fld id="{0B66EB57-E4FC-4CEF-AEF8-36005745810B}" type="datetimeFigureOut">
               <a:rPr lang="en-US" smtClean="0"/>
-              <a:t>6/4/2019</a:t>
+              <a:t>9/23/2019</a:t>
             </a:fld>
             <a:endParaRPr lang="en-US"/>
           </a:p>
@@ -1951,7 +1956,7 @@
           <a:p>
             <a:fld id="{0B66EB57-E4FC-4CEF-AEF8-36005745810B}" type="datetimeFigureOut">
               <a:rPr lang="en-US" smtClean="0"/>
-              <a:t>6/4/2019</a:t>
+              <a:t>9/23/2019</a:t>
             </a:fld>
             <a:endParaRPr lang="en-US"/>
           </a:p>
@@ -2064,7 +2069,7 @@
           <a:p>
             <a:fld id="{0B66EB57-E4FC-4CEF-AEF8-36005745810B}" type="datetimeFigureOut">
               <a:rPr lang="en-US" smtClean="0"/>
-              <a:t>6/4/2019</a:t>
+              <a:t>9/23/2019</a:t>
             </a:fld>
             <a:endParaRPr lang="en-US"/>
           </a:p>
@@ -2375,7 +2380,7 @@
           <a:p>
             <a:fld id="{0B66EB57-E4FC-4CEF-AEF8-36005745810B}" type="datetimeFigureOut">
               <a:rPr lang="en-US" smtClean="0"/>
-              <a:t>6/4/2019</a:t>
+              <a:t>9/23/2019</a:t>
             </a:fld>
             <a:endParaRPr lang="en-US"/>
           </a:p>
@@ -2663,7 +2668,7 @@
           <a:p>
             <a:fld id="{0B66EB57-E4FC-4CEF-AEF8-36005745810B}" type="datetimeFigureOut">
               <a:rPr lang="en-US" smtClean="0"/>
-              <a:t>6/4/2019</a:t>
+              <a:t>9/23/2019</a:t>
             </a:fld>
             <a:endParaRPr lang="en-US"/>
           </a:p>
@@ -2904,7 +2909,7 @@
           <a:p>
             <a:fld id="{0B66EB57-E4FC-4CEF-AEF8-36005745810B}" type="datetimeFigureOut">
               <a:rPr lang="en-US" smtClean="0"/>
-              <a:t>6/4/2019</a:t>
+              <a:t>9/23/2019</a:t>
             </a:fld>
             <a:endParaRPr lang="en-US"/>
           </a:p>
@@ -3321,12 +3326,732 @@
           <a:chExt cx="0" cy="0"/>
         </a:xfrm>
       </p:grpSpPr>
+      <p:cxnSp>
+        <p:nvCxnSpPr>
+          <p:cNvPr id="8" name="Straight Arrow Connector 7">
+            <a:extLst>
+              <a:ext uri="{FF2B5EF4-FFF2-40B4-BE49-F238E27FC236}">
+                <a16:creationId xmlns:a16="http://schemas.microsoft.com/office/drawing/2014/main" id="{41C29615-13E1-45F2-9E33-5A8651D4AB19}"/>
+              </a:ext>
+            </a:extLst>
+          </p:cNvPr>
+          <p:cNvCxnSpPr>
+            <a:cxnSpLocks/>
+            <a:stCxn id="4" idx="2"/>
+            <a:endCxn id="10" idx="0"/>
+          </p:cNvCxnSpPr>
+          <p:nvPr/>
+        </p:nvCxnSpPr>
+        <p:spPr>
+          <a:xfrm>
+            <a:off x="6099487" y="609512"/>
+            <a:ext cx="0" cy="495513"/>
+          </a:xfrm>
+          <a:prstGeom prst="straightConnector1">
+            <a:avLst/>
+          </a:prstGeom>
+          <a:ln w="28575">
+            <a:tailEnd type="triangle"/>
+          </a:ln>
+        </p:spPr>
+        <p:style>
+          <a:lnRef idx="1">
+            <a:schemeClr val="dk1"/>
+          </a:lnRef>
+          <a:fillRef idx="0">
+            <a:schemeClr val="dk1"/>
+          </a:fillRef>
+          <a:effectRef idx="0">
+            <a:schemeClr val="dk1"/>
+          </a:effectRef>
+          <a:fontRef idx="minor">
+            <a:schemeClr val="tx1"/>
+          </a:fontRef>
+        </p:style>
+      </p:cxnSp>
+      <p:sp>
+        <p:nvSpPr>
+          <p:cNvPr id="10" name="Rectangle: Rounded Corners 9">
+            <a:extLst>
+              <a:ext uri="{FF2B5EF4-FFF2-40B4-BE49-F238E27FC236}">
+                <a16:creationId xmlns:a16="http://schemas.microsoft.com/office/drawing/2014/main" id="{097F538F-5F11-40F0-BE65-BA32CACB977D}"/>
+              </a:ext>
+            </a:extLst>
+          </p:cNvPr>
+          <p:cNvSpPr/>
+          <p:nvPr/>
+        </p:nvSpPr>
+        <p:spPr>
+          <a:xfrm>
+            <a:off x="5142838" y="1105025"/>
+            <a:ext cx="1913298" cy="736847"/>
+          </a:xfrm>
+          <a:prstGeom prst="roundRect">
+            <a:avLst/>
+          </a:prstGeom>
+          <a:noFill/>
+          <a:ln w="28575">
+            <a:solidFill>
+              <a:schemeClr val="tx1"/>
+            </a:solidFill>
+          </a:ln>
+        </p:spPr>
+        <p:style>
+          <a:lnRef idx="2">
+            <a:schemeClr val="accent1">
+              <a:shade val="50000"/>
+            </a:schemeClr>
+          </a:lnRef>
+          <a:fillRef idx="1">
+            <a:schemeClr val="accent1"/>
+          </a:fillRef>
+          <a:effectRef idx="0">
+            <a:schemeClr val="accent1"/>
+          </a:effectRef>
+          <a:fontRef idx="minor">
+            <a:schemeClr val="lt1"/>
+          </a:fontRef>
+        </p:style>
+        <p:txBody>
+          <a:bodyPr rtlCol="0" anchor="ctr"/>
+          <a:lstStyle/>
+          <a:p>
+            <a:pPr algn="ctr"/>
+            <a:r>
+              <a:rPr lang="en-US" dirty="0">
+                <a:solidFill>
+                  <a:schemeClr val="tx1"/>
+                </a:solidFill>
+              </a:rPr>
+              <a:t>Gene expression correlations</a:t>
+            </a:r>
+          </a:p>
+        </p:txBody>
+      </p:sp>
+      <p:cxnSp>
+        <p:nvCxnSpPr>
+          <p:cNvPr id="15" name="Straight Arrow Connector 14">
+            <a:extLst>
+              <a:ext uri="{FF2B5EF4-FFF2-40B4-BE49-F238E27FC236}">
+                <a16:creationId xmlns:a16="http://schemas.microsoft.com/office/drawing/2014/main" id="{77530A88-D50C-41F3-9643-1E5AE60BE674}"/>
+              </a:ext>
+            </a:extLst>
+          </p:cNvPr>
+          <p:cNvCxnSpPr>
+            <a:cxnSpLocks/>
+            <a:stCxn id="10" idx="2"/>
+          </p:cNvCxnSpPr>
+          <p:nvPr/>
+        </p:nvCxnSpPr>
+        <p:spPr>
+          <a:xfrm flipH="1">
+            <a:off x="6093926" y="1841872"/>
+            <a:ext cx="5561" cy="594920"/>
+          </a:xfrm>
+          <a:prstGeom prst="straightConnector1">
+            <a:avLst/>
+          </a:prstGeom>
+          <a:ln w="28575">
+            <a:tailEnd type="triangle"/>
+          </a:ln>
+        </p:spPr>
+        <p:style>
+          <a:lnRef idx="1">
+            <a:schemeClr val="dk1"/>
+          </a:lnRef>
+          <a:fillRef idx="0">
+            <a:schemeClr val="dk1"/>
+          </a:fillRef>
+          <a:effectRef idx="0">
+            <a:schemeClr val="dk1"/>
+          </a:effectRef>
+          <a:fontRef idx="minor">
+            <a:schemeClr val="tx1"/>
+          </a:fontRef>
+        </p:style>
+      </p:cxnSp>
+      <p:cxnSp>
+        <p:nvCxnSpPr>
+          <p:cNvPr id="23" name="Straight Arrow Connector 22">
+            <a:extLst>
+              <a:ext uri="{FF2B5EF4-FFF2-40B4-BE49-F238E27FC236}">
+                <a16:creationId xmlns:a16="http://schemas.microsoft.com/office/drawing/2014/main" id="{AFEA8FD7-C58C-4CCD-81ED-CA12DF5BFECE}"/>
+              </a:ext>
+            </a:extLst>
+          </p:cNvPr>
+          <p:cNvCxnSpPr>
+            <a:cxnSpLocks/>
+            <a:endCxn id="119" idx="0"/>
+          </p:cNvCxnSpPr>
+          <p:nvPr/>
+        </p:nvCxnSpPr>
+        <p:spPr>
+          <a:xfrm>
+            <a:off x="6093926" y="5179992"/>
+            <a:ext cx="2073" cy="532732"/>
+          </a:xfrm>
+          <a:prstGeom prst="straightConnector1">
+            <a:avLst/>
+          </a:prstGeom>
+          <a:ln w="28575">
+            <a:tailEnd type="triangle"/>
+          </a:ln>
+        </p:spPr>
+        <p:style>
+          <a:lnRef idx="1">
+            <a:schemeClr val="dk1"/>
+          </a:lnRef>
+          <a:fillRef idx="0">
+            <a:schemeClr val="dk1"/>
+          </a:fillRef>
+          <a:effectRef idx="0">
+            <a:schemeClr val="dk1"/>
+          </a:effectRef>
+          <a:fontRef idx="minor">
+            <a:schemeClr val="tx1"/>
+          </a:fontRef>
+        </p:style>
+      </p:cxnSp>
+      <p:sp>
+        <p:nvSpPr>
+          <p:cNvPr id="28" name="Rectangle: Rounded Corners 27">
+            <a:extLst>
+              <a:ext uri="{FF2B5EF4-FFF2-40B4-BE49-F238E27FC236}">
+                <a16:creationId xmlns:a16="http://schemas.microsoft.com/office/drawing/2014/main" id="{07354014-32DB-4978-872F-6CDEEBFF7A60}"/>
+              </a:ext>
+            </a:extLst>
+          </p:cNvPr>
+          <p:cNvSpPr/>
+          <p:nvPr/>
+        </p:nvSpPr>
+        <p:spPr>
+          <a:xfrm>
+            <a:off x="-1184180" y="1725768"/>
+            <a:ext cx="3339312" cy="4165247"/>
+          </a:xfrm>
+          <a:prstGeom prst="roundRect">
+            <a:avLst/>
+          </a:prstGeom>
+          <a:noFill/>
+          <a:ln w="28575">
+            <a:solidFill>
+              <a:schemeClr val="tx1"/>
+            </a:solidFill>
+          </a:ln>
+        </p:spPr>
+        <p:style>
+          <a:lnRef idx="2">
+            <a:schemeClr val="accent1">
+              <a:shade val="50000"/>
+            </a:schemeClr>
+          </a:lnRef>
+          <a:fillRef idx="1">
+            <a:schemeClr val="accent1"/>
+          </a:fillRef>
+          <a:effectRef idx="0">
+            <a:schemeClr val="accent1"/>
+          </a:effectRef>
+          <a:fontRef idx="minor">
+            <a:schemeClr val="lt1"/>
+          </a:fontRef>
+        </p:style>
+        <p:txBody>
+          <a:bodyPr rtlCol="0" anchor="ctr"/>
+          <a:lstStyle/>
+          <a:p>
+            <a:pPr algn="ctr"/>
+            <a:endParaRPr lang="en-US"/>
+          </a:p>
+        </p:txBody>
+      </p:sp>
+      <p:sp>
+        <p:nvSpPr>
+          <p:cNvPr id="32" name="Rectangle: Rounded Corners 31">
+            <a:extLst>
+              <a:ext uri="{FF2B5EF4-FFF2-40B4-BE49-F238E27FC236}">
+                <a16:creationId xmlns:a16="http://schemas.microsoft.com/office/drawing/2014/main" id="{52530A37-D41A-4114-BE72-6B2AFD3136B4}"/>
+              </a:ext>
+            </a:extLst>
+          </p:cNvPr>
+          <p:cNvSpPr/>
+          <p:nvPr/>
+        </p:nvSpPr>
+        <p:spPr>
+          <a:xfrm>
+            <a:off x="10036867" y="1720807"/>
+            <a:ext cx="3339312" cy="4165241"/>
+          </a:xfrm>
+          <a:prstGeom prst="roundRect">
+            <a:avLst/>
+          </a:prstGeom>
+          <a:noFill/>
+          <a:ln w="28575">
+            <a:solidFill>
+              <a:schemeClr val="tx1"/>
+            </a:solidFill>
+          </a:ln>
+        </p:spPr>
+        <p:style>
+          <a:lnRef idx="2">
+            <a:schemeClr val="accent1">
+              <a:shade val="50000"/>
+            </a:schemeClr>
+          </a:lnRef>
+          <a:fillRef idx="1">
+            <a:schemeClr val="accent1"/>
+          </a:fillRef>
+          <a:effectRef idx="0">
+            <a:schemeClr val="accent1"/>
+          </a:effectRef>
+          <a:fontRef idx="minor">
+            <a:schemeClr val="lt1"/>
+          </a:fontRef>
+        </p:style>
+        <p:txBody>
+          <a:bodyPr rtlCol="0" anchor="ctr"/>
+          <a:lstStyle/>
+          <a:p>
+            <a:pPr algn="ctr"/>
+            <a:endParaRPr lang="en-US"/>
+          </a:p>
+        </p:txBody>
+      </p:sp>
+      <p:cxnSp>
+        <p:nvCxnSpPr>
+          <p:cNvPr id="43" name="Straight Connector 42">
+            <a:extLst>
+              <a:ext uri="{FF2B5EF4-FFF2-40B4-BE49-F238E27FC236}">
+                <a16:creationId xmlns:a16="http://schemas.microsoft.com/office/drawing/2014/main" id="{96296160-98C9-4054-8003-D859487DBB78}"/>
+              </a:ext>
+            </a:extLst>
+          </p:cNvPr>
+          <p:cNvCxnSpPr/>
+          <p:nvPr/>
+        </p:nvCxnSpPr>
+        <p:spPr>
+          <a:xfrm>
+            <a:off x="-1184180" y="2213142"/>
+            <a:ext cx="3339312" cy="0"/>
+          </a:xfrm>
+          <a:prstGeom prst="line">
+            <a:avLst/>
+          </a:prstGeom>
+          <a:ln w="12700"/>
+        </p:spPr>
+        <p:style>
+          <a:lnRef idx="1">
+            <a:schemeClr val="dk1"/>
+          </a:lnRef>
+          <a:fillRef idx="0">
+            <a:schemeClr val="dk1"/>
+          </a:fillRef>
+          <a:effectRef idx="0">
+            <a:schemeClr val="dk1"/>
+          </a:effectRef>
+          <a:fontRef idx="minor">
+            <a:schemeClr val="tx1"/>
+          </a:fontRef>
+        </p:style>
+      </p:cxnSp>
+      <p:cxnSp>
+        <p:nvCxnSpPr>
+          <p:cNvPr id="44" name="Straight Connector 43">
+            <a:extLst>
+              <a:ext uri="{FF2B5EF4-FFF2-40B4-BE49-F238E27FC236}">
+                <a16:creationId xmlns:a16="http://schemas.microsoft.com/office/drawing/2014/main" id="{DAC4CAA4-BA1C-407F-A99F-8925455C3224}"/>
+              </a:ext>
+            </a:extLst>
+          </p:cNvPr>
+          <p:cNvCxnSpPr/>
+          <p:nvPr/>
+        </p:nvCxnSpPr>
+        <p:spPr>
+          <a:xfrm>
+            <a:off x="10035229" y="2212504"/>
+            <a:ext cx="3339312" cy="0"/>
+          </a:xfrm>
+          <a:prstGeom prst="line">
+            <a:avLst/>
+          </a:prstGeom>
+          <a:ln w="12700"/>
+        </p:spPr>
+        <p:style>
+          <a:lnRef idx="1">
+            <a:schemeClr val="dk1"/>
+          </a:lnRef>
+          <a:fillRef idx="0">
+            <a:schemeClr val="dk1"/>
+          </a:fillRef>
+          <a:effectRef idx="0">
+            <a:schemeClr val="dk1"/>
+          </a:effectRef>
+          <a:fontRef idx="minor">
+            <a:schemeClr val="tx1"/>
+          </a:fontRef>
+        </p:style>
+      </p:cxnSp>
+      <p:sp>
+        <p:nvSpPr>
+          <p:cNvPr id="48" name="TextBox 47">
+            <a:extLst>
+              <a:ext uri="{FF2B5EF4-FFF2-40B4-BE49-F238E27FC236}">
+                <a16:creationId xmlns:a16="http://schemas.microsoft.com/office/drawing/2014/main" id="{4007DBBC-9244-4FF3-BE56-B1429424E3F9}"/>
+              </a:ext>
+            </a:extLst>
+          </p:cNvPr>
+          <p:cNvSpPr txBox="1"/>
+          <p:nvPr/>
+        </p:nvSpPr>
+        <p:spPr>
+          <a:xfrm>
+            <a:off x="-760891" y="1792787"/>
+            <a:ext cx="2480940" cy="369332"/>
+          </a:xfrm>
+          <a:prstGeom prst="rect">
+            <a:avLst/>
+          </a:prstGeom>
+          <a:noFill/>
+        </p:spPr>
+        <p:txBody>
+          <a:bodyPr wrap="square" rtlCol="0">
+            <a:spAutoFit/>
+          </a:bodyPr>
+          <a:lstStyle/>
+          <a:p>
+            <a:r>
+              <a:rPr lang="en-US" dirty="0"/>
+              <a:t>Single-analysis Mode</a:t>
+            </a:r>
+          </a:p>
+        </p:txBody>
+      </p:sp>
+      <p:sp>
+        <p:nvSpPr>
+          <p:cNvPr id="49" name="TextBox 48">
+            <a:extLst>
+              <a:ext uri="{FF2B5EF4-FFF2-40B4-BE49-F238E27FC236}">
+                <a16:creationId xmlns:a16="http://schemas.microsoft.com/office/drawing/2014/main" id="{1F58AE3C-8878-49CB-B0F7-9481EA11FF2F}"/>
+              </a:ext>
+            </a:extLst>
+          </p:cNvPr>
+          <p:cNvSpPr txBox="1"/>
+          <p:nvPr/>
+        </p:nvSpPr>
+        <p:spPr>
+          <a:xfrm>
+            <a:off x="10446893" y="1792787"/>
+            <a:ext cx="2472954" cy="369332"/>
+          </a:xfrm>
+          <a:prstGeom prst="rect">
+            <a:avLst/>
+          </a:prstGeom>
+          <a:noFill/>
+        </p:spPr>
+        <p:txBody>
+          <a:bodyPr wrap="square" rtlCol="0">
+            <a:spAutoFit/>
+          </a:bodyPr>
+          <a:lstStyle/>
+          <a:p>
+            <a:r>
+              <a:rPr lang="en-US" dirty="0"/>
+              <a:t>Paired-analysis Mode</a:t>
+            </a:r>
+          </a:p>
+        </p:txBody>
+      </p:sp>
+      <p:sp>
+        <p:nvSpPr>
+          <p:cNvPr id="51" name="TextBox 50">
+            <a:extLst>
+              <a:ext uri="{FF2B5EF4-FFF2-40B4-BE49-F238E27FC236}">
+                <a16:creationId xmlns:a16="http://schemas.microsoft.com/office/drawing/2014/main" id="{EA3F0FF7-CE32-46C4-98B0-D96DC18DB9EB}"/>
+              </a:ext>
+            </a:extLst>
+          </p:cNvPr>
+          <p:cNvSpPr txBox="1"/>
+          <p:nvPr/>
+        </p:nvSpPr>
+        <p:spPr>
+          <a:xfrm>
+            <a:off x="-1064325" y="2216145"/>
+            <a:ext cx="782074" cy="369332"/>
+          </a:xfrm>
+          <a:prstGeom prst="rect">
+            <a:avLst/>
+          </a:prstGeom>
+          <a:noFill/>
+        </p:spPr>
+        <p:txBody>
+          <a:bodyPr wrap="none" rtlCol="0">
+            <a:spAutoFit/>
+          </a:bodyPr>
+          <a:lstStyle/>
+          <a:p>
+            <a:r>
+              <a:rPr lang="en-US" dirty="0"/>
+              <a:t>“ATM”</a:t>
+            </a:r>
+          </a:p>
+        </p:txBody>
+      </p:sp>
+      <p:sp>
+        <p:nvSpPr>
+          <p:cNvPr id="53" name="TextBox 52">
+            <a:extLst>
+              <a:ext uri="{FF2B5EF4-FFF2-40B4-BE49-F238E27FC236}">
+                <a16:creationId xmlns:a16="http://schemas.microsoft.com/office/drawing/2014/main" id="{67B27EC5-3306-4370-AB52-0DD37A5328F2}"/>
+              </a:ext>
+            </a:extLst>
+          </p:cNvPr>
+          <p:cNvSpPr txBox="1"/>
+          <p:nvPr/>
+        </p:nvSpPr>
+        <p:spPr>
+          <a:xfrm>
+            <a:off x="10219425" y="2212504"/>
+            <a:ext cx="2645340" cy="369332"/>
+          </a:xfrm>
+          <a:prstGeom prst="rect">
+            <a:avLst/>
+          </a:prstGeom>
+          <a:noFill/>
+        </p:spPr>
+        <p:txBody>
+          <a:bodyPr wrap="none" rtlCol="0">
+            <a:spAutoFit/>
+          </a:bodyPr>
+          <a:lstStyle/>
+          <a:p>
+            <a:r>
+              <a:rPr lang="en-US" dirty="0"/>
+              <a:t>“ATM vs (BRCA1, EZH2 …)”</a:t>
+            </a:r>
+          </a:p>
+        </p:txBody>
+      </p:sp>
+      <p:cxnSp>
+        <p:nvCxnSpPr>
+          <p:cNvPr id="55" name="Straight Connector 54">
+            <a:extLst>
+              <a:ext uri="{FF2B5EF4-FFF2-40B4-BE49-F238E27FC236}">
+                <a16:creationId xmlns:a16="http://schemas.microsoft.com/office/drawing/2014/main" id="{1772C2ED-8084-4D96-8A9F-05E1323D9C60}"/>
+              </a:ext>
+            </a:extLst>
+          </p:cNvPr>
+          <p:cNvCxnSpPr/>
+          <p:nvPr/>
+        </p:nvCxnSpPr>
+        <p:spPr>
+          <a:xfrm>
+            <a:off x="-1184180" y="2581836"/>
+            <a:ext cx="3339312" cy="0"/>
+          </a:xfrm>
+          <a:prstGeom prst="line">
+            <a:avLst/>
+          </a:prstGeom>
+          <a:ln w="12700"/>
+        </p:spPr>
+        <p:style>
+          <a:lnRef idx="1">
+            <a:schemeClr val="dk1"/>
+          </a:lnRef>
+          <a:fillRef idx="0">
+            <a:schemeClr val="dk1"/>
+          </a:fillRef>
+          <a:effectRef idx="0">
+            <a:schemeClr val="dk1"/>
+          </a:effectRef>
+          <a:fontRef idx="minor">
+            <a:schemeClr val="tx1"/>
+          </a:fontRef>
+        </p:style>
+      </p:cxnSp>
+      <p:cxnSp>
+        <p:nvCxnSpPr>
+          <p:cNvPr id="56" name="Straight Connector 55">
+            <a:extLst>
+              <a:ext uri="{FF2B5EF4-FFF2-40B4-BE49-F238E27FC236}">
+                <a16:creationId xmlns:a16="http://schemas.microsoft.com/office/drawing/2014/main" id="{9FDA19AA-F31F-4E5E-97E2-A0B418F800EB}"/>
+              </a:ext>
+            </a:extLst>
+          </p:cNvPr>
+          <p:cNvCxnSpPr/>
+          <p:nvPr/>
+        </p:nvCxnSpPr>
+        <p:spPr>
+          <a:xfrm>
+            <a:off x="10013714" y="2581836"/>
+            <a:ext cx="3339312" cy="0"/>
+          </a:xfrm>
+          <a:prstGeom prst="line">
+            <a:avLst/>
+          </a:prstGeom>
+          <a:ln w="12700"/>
+        </p:spPr>
+        <p:style>
+          <a:lnRef idx="1">
+            <a:schemeClr val="dk1"/>
+          </a:lnRef>
+          <a:fillRef idx="0">
+            <a:schemeClr val="dk1"/>
+          </a:fillRef>
+          <a:effectRef idx="0">
+            <a:schemeClr val="dk1"/>
+          </a:effectRef>
+          <a:fontRef idx="minor">
+            <a:schemeClr val="tx1"/>
+          </a:fontRef>
+        </p:style>
+      </p:cxnSp>
+      <p:pic>
+        <p:nvPicPr>
+          <p:cNvPr id="68" name="Picture 67" descr="A screenshot of a cell phone&#10;&#10;Description automatically generated">
+            <a:extLst>
+              <a:ext uri="{FF2B5EF4-FFF2-40B4-BE49-F238E27FC236}">
+                <a16:creationId xmlns:a16="http://schemas.microsoft.com/office/drawing/2014/main" id="{DE1E1F68-FA16-4936-BDD3-CD02071F1F4A}"/>
+              </a:ext>
+            </a:extLst>
+          </p:cNvPr>
+          <p:cNvPicPr>
+            <a:picLocks noChangeAspect="1"/>
+          </p:cNvPicPr>
+          <p:nvPr/>
+        </p:nvPicPr>
+        <p:blipFill rotWithShape="1">
+          <a:blip r:embed="rId2">
+            <a:extLst>
+              <a:ext uri="{28A0092B-C50C-407E-A947-70E740481C1C}">
+                <a14:useLocalDpi xmlns:a14="http://schemas.microsoft.com/office/drawing/2010/main" val="0"/>
+              </a:ext>
+            </a:extLst>
+          </a:blip>
+          <a:srcRect l="198" t="11598" b="5657"/>
+          <a:stretch/>
+        </p:blipFill>
+        <p:spPr>
+          <a:xfrm>
+            <a:off x="-667872" y="2759995"/>
+            <a:ext cx="2292442" cy="1221839"/>
+          </a:xfrm>
+          <a:prstGeom prst="rect">
+            <a:avLst/>
+          </a:prstGeom>
+        </p:spPr>
+      </p:pic>
+      <p:pic>
+        <p:nvPicPr>
+          <p:cNvPr id="70" name="Picture 69" descr="A close up of a map&#10;&#10;Description automatically generated">
+            <a:extLst>
+              <a:ext uri="{FF2B5EF4-FFF2-40B4-BE49-F238E27FC236}">
+                <a16:creationId xmlns:a16="http://schemas.microsoft.com/office/drawing/2014/main" id="{B978C344-8383-4747-8CDD-60C5C1780435}"/>
+              </a:ext>
+            </a:extLst>
+          </p:cNvPr>
+          <p:cNvPicPr>
+            <a:picLocks noChangeAspect="1"/>
+          </p:cNvPicPr>
+          <p:nvPr/>
+        </p:nvPicPr>
+        <p:blipFill>
+          <a:blip r:embed="rId3">
+            <a:extLst>
+              <a:ext uri="{28A0092B-C50C-407E-A947-70E740481C1C}">
+                <a14:useLocalDpi xmlns:a14="http://schemas.microsoft.com/office/drawing/2010/main" val="0"/>
+              </a:ext>
+            </a:extLst>
+          </a:blip>
+          <a:stretch>
+            <a:fillRect/>
+          </a:stretch>
+        </p:blipFill>
+        <p:spPr>
+          <a:xfrm>
+            <a:off x="-676397" y="4123434"/>
+            <a:ext cx="2300967" cy="1660519"/>
+          </a:xfrm>
+          <a:prstGeom prst="rect">
+            <a:avLst/>
+          </a:prstGeom>
+        </p:spPr>
+      </p:pic>
+      <p:pic>
+        <p:nvPicPr>
+          <p:cNvPr id="72" name="Picture 71" descr="A close up of a map&#10;&#10;Description automatically generated">
+            <a:extLst>
+              <a:ext uri="{FF2B5EF4-FFF2-40B4-BE49-F238E27FC236}">
+                <a16:creationId xmlns:a16="http://schemas.microsoft.com/office/drawing/2014/main" id="{5318A1B7-4683-4AAC-BF89-5398519E9A8E}"/>
+              </a:ext>
+            </a:extLst>
+          </p:cNvPr>
+          <p:cNvPicPr>
+            <a:picLocks noChangeAspect="1"/>
+          </p:cNvPicPr>
+          <p:nvPr/>
+        </p:nvPicPr>
+        <p:blipFill>
+          <a:blip r:embed="rId4">
+            <a:extLst>
+              <a:ext uri="{28A0092B-C50C-407E-A947-70E740481C1C}">
+                <a14:useLocalDpi xmlns:a14="http://schemas.microsoft.com/office/drawing/2010/main" val="0"/>
+              </a:ext>
+            </a:extLst>
+          </a:blip>
+          <a:stretch>
+            <a:fillRect/>
+          </a:stretch>
+        </p:blipFill>
+        <p:spPr>
+          <a:xfrm>
+            <a:off x="10493199" y="2789634"/>
+            <a:ext cx="2426648" cy="1192200"/>
+          </a:xfrm>
+          <a:prstGeom prst="rect">
+            <a:avLst/>
+          </a:prstGeom>
+        </p:spPr>
+      </p:pic>
+      <p:pic>
+        <p:nvPicPr>
+          <p:cNvPr id="79" name="Picture 78">
+            <a:extLst>
+              <a:ext uri="{FF2B5EF4-FFF2-40B4-BE49-F238E27FC236}">
+                <a16:creationId xmlns:a16="http://schemas.microsoft.com/office/drawing/2014/main" id="{9ED66A87-70CA-4B25-90D4-CDCA557F69DC}"/>
+              </a:ext>
+            </a:extLst>
+          </p:cNvPr>
+          <p:cNvPicPr>
+            <a:picLocks noChangeAspect="1"/>
+          </p:cNvPicPr>
+          <p:nvPr/>
+        </p:nvPicPr>
+        <p:blipFill rotWithShape="1">
+          <a:blip r:embed="rId5">
+            <a:extLst>
+              <a:ext uri="{28A0092B-C50C-407E-A947-70E740481C1C}">
+                <a14:useLocalDpi xmlns:a14="http://schemas.microsoft.com/office/drawing/2010/main" val="0"/>
+              </a:ext>
+            </a:extLst>
+          </a:blip>
+          <a:srcRect l="59287" t="6769" r="-85" b="10603"/>
+          <a:stretch/>
+        </p:blipFill>
+        <p:spPr>
+          <a:xfrm>
+            <a:off x="10493199" y="4189631"/>
+            <a:ext cx="2426648" cy="1469597"/>
+          </a:xfrm>
+          <a:prstGeom prst="rect">
+            <a:avLst/>
+          </a:prstGeom>
+        </p:spPr>
+      </p:pic>
       <p:grpSp>
         <p:nvGrpSpPr>
-          <p:cNvPr id="155" name="Group 154">
-            <a:extLst>
-              <a:ext uri="{FF2B5EF4-FFF2-40B4-BE49-F238E27FC236}">
-                <a16:creationId xmlns:a16="http://schemas.microsoft.com/office/drawing/2014/main" id="{16B68F07-D2EB-4AFC-9FE1-E04F157AF26E}"/>
+          <p:cNvPr id="104" name="Group 103">
+            <a:extLst>
+              <a:ext uri="{FF2B5EF4-FFF2-40B4-BE49-F238E27FC236}">
+                <a16:creationId xmlns:a16="http://schemas.microsoft.com/office/drawing/2014/main" id="{9949F315-15CA-46FD-AAEE-C873D909F870}"/>
               </a:ext>
             </a:extLst>
           </p:cNvPr>
@@ -3335,104 +4060,18 @@
         </p:nvGrpSpPr>
         <p:grpSpPr>
           <a:xfrm>
-            <a:off x="-1184180" y="-1130902"/>
-            <a:ext cx="14560359" cy="9731923"/>
-            <a:chOff x="-1182108" y="-1130902"/>
-            <a:chExt cx="14560359" cy="9731923"/>
+            <a:off x="3333353" y="-1130902"/>
+            <a:ext cx="5532268" cy="1740414"/>
+            <a:chOff x="3328226" y="-1628537"/>
+            <a:chExt cx="5532268" cy="1740414"/>
           </a:xfrm>
         </p:grpSpPr>
-        <p:pic>
-          <p:nvPicPr>
-            <p:cNvPr id="6" name="Picture 5" descr="A close up of a sign&#10;&#10;Description automatically generated">
+        <p:sp>
+          <p:nvSpPr>
+            <p:cNvPr id="4" name="Rectangle: Rounded Corners 3">
               <a:extLst>
                 <a:ext uri="{FF2B5EF4-FFF2-40B4-BE49-F238E27FC236}">
-                  <a16:creationId xmlns:a16="http://schemas.microsoft.com/office/drawing/2014/main" id="{12217DF4-F1C5-41CD-AB9A-A2530A5E198C}"/>
-                </a:ext>
-              </a:extLst>
-            </p:cNvPr>
-            <p:cNvPicPr>
-              <a:picLocks noChangeAspect="1"/>
-            </p:cNvPicPr>
-            <p:nvPr/>
-          </p:nvPicPr>
-          <p:blipFill rotWithShape="1">
-            <a:blip r:embed="rId2">
-              <a:extLst>
-                <a:ext uri="{28A0092B-C50C-407E-A947-70E740481C1C}">
-                  <a14:useLocalDpi xmlns:a14="http://schemas.microsoft.com/office/drawing/2010/main" val="0"/>
-                </a:ext>
-              </a:extLst>
-            </a:blip>
-            <a:srcRect t="10875" b="13275"/>
-            <a:stretch/>
-          </p:blipFill>
-          <p:spPr>
-            <a:xfrm>
-              <a:off x="3852992" y="2436792"/>
-              <a:ext cx="4486011" cy="2743200"/>
-            </a:xfrm>
-            <a:prstGeom prst="rect">
-              <a:avLst/>
-            </a:prstGeom>
-            <a:effectLst>
-              <a:glow rad="101600">
-                <a:schemeClr val="accent2">
-                  <a:satMod val="175000"/>
-                  <a:alpha val="40000"/>
-                </a:schemeClr>
-              </a:glow>
-            </a:effectLst>
-          </p:spPr>
-        </p:pic>
-        <p:cxnSp>
-          <p:nvCxnSpPr>
-            <p:cNvPr id="8" name="Straight Arrow Connector 7">
-              <a:extLst>
-                <a:ext uri="{FF2B5EF4-FFF2-40B4-BE49-F238E27FC236}">
-                  <a16:creationId xmlns:a16="http://schemas.microsoft.com/office/drawing/2014/main" id="{41C29615-13E1-45F2-9E33-5A8651D4AB19}"/>
-                </a:ext>
-              </a:extLst>
-            </p:cNvPr>
-            <p:cNvCxnSpPr>
-              <a:cxnSpLocks/>
-              <a:stCxn id="4" idx="2"/>
-              <a:endCxn id="10" idx="0"/>
-            </p:cNvCxnSpPr>
-            <p:nvPr/>
-          </p:nvCxnSpPr>
-          <p:spPr>
-            <a:xfrm>
-              <a:off x="6101559" y="609512"/>
-              <a:ext cx="0" cy="495513"/>
-            </a:xfrm>
-            <a:prstGeom prst="straightConnector1">
-              <a:avLst/>
-            </a:prstGeom>
-            <a:ln w="28575">
-              <a:tailEnd type="triangle"/>
-            </a:ln>
-          </p:spPr>
-          <p:style>
-            <a:lnRef idx="1">
-              <a:schemeClr val="dk1"/>
-            </a:lnRef>
-            <a:fillRef idx="0">
-              <a:schemeClr val="dk1"/>
-            </a:fillRef>
-            <a:effectRef idx="0">
-              <a:schemeClr val="dk1"/>
-            </a:effectRef>
-            <a:fontRef idx="minor">
-              <a:schemeClr val="tx1"/>
-            </a:fontRef>
-          </p:style>
-        </p:cxnSp>
-        <p:sp>
-          <p:nvSpPr>
-            <p:cNvPr id="10" name="Rectangle: Rounded Corners 9">
-              <a:extLst>
-                <a:ext uri="{FF2B5EF4-FFF2-40B4-BE49-F238E27FC236}">
-                  <a16:creationId xmlns:a16="http://schemas.microsoft.com/office/drawing/2014/main" id="{097F538F-5F11-40F0-BE65-BA32CACB977D}"/>
+                  <a16:creationId xmlns:a16="http://schemas.microsoft.com/office/drawing/2014/main" id="{DB205338-6232-4C0B-A3A1-980D260FF05A}"/>
                 </a:ext>
               </a:extLst>
             </p:cNvPr>
@@ -3441,8 +4080,8 @@
           </p:nvSpPr>
           <p:spPr>
             <a:xfrm>
-              <a:off x="5144910" y="1105025"/>
-              <a:ext cx="1913298" cy="736847"/>
+              <a:off x="3328226" y="-1259205"/>
+              <a:ext cx="5532268" cy="1371082"/>
             </a:xfrm>
             <a:prstGeom prst="roundRect">
               <a:avLst/>
@@ -3475,109 +4114,16 @@
             <a:lstStyle/>
             <a:p>
               <a:pPr algn="ctr"/>
-              <a:r>
-                <a:rPr lang="en-US" dirty="0">
-                  <a:solidFill>
-                    <a:schemeClr val="tx1"/>
-                  </a:solidFill>
-                </a:rPr>
-                <a:t>Gene expression correlations</a:t>
-              </a:r>
+              <a:endParaRPr lang="en-US" dirty="0"/>
             </a:p>
           </p:txBody>
         </p:sp>
-        <p:cxnSp>
-          <p:nvCxnSpPr>
-            <p:cNvPr id="15" name="Straight Arrow Connector 14">
+        <p:sp>
+          <p:nvSpPr>
+            <p:cNvPr id="91" name="Rectangle 90">
               <a:extLst>
                 <a:ext uri="{FF2B5EF4-FFF2-40B4-BE49-F238E27FC236}">
-                  <a16:creationId xmlns:a16="http://schemas.microsoft.com/office/drawing/2014/main" id="{77530A88-D50C-41F3-9643-1E5AE60BE674}"/>
-                </a:ext>
-              </a:extLst>
-            </p:cNvPr>
-            <p:cNvCxnSpPr>
-              <a:cxnSpLocks/>
-              <a:stCxn id="10" idx="2"/>
-              <a:endCxn id="6" idx="0"/>
-            </p:cNvCxnSpPr>
-            <p:nvPr/>
-          </p:nvCxnSpPr>
-          <p:spPr>
-            <a:xfrm flipH="1">
-              <a:off x="6095998" y="1841872"/>
-              <a:ext cx="5561" cy="594920"/>
-            </a:xfrm>
-            <a:prstGeom prst="straightConnector1">
-              <a:avLst/>
-            </a:prstGeom>
-            <a:ln w="28575">
-              <a:tailEnd type="triangle"/>
-            </a:ln>
-          </p:spPr>
-          <p:style>
-            <a:lnRef idx="1">
-              <a:schemeClr val="dk1"/>
-            </a:lnRef>
-            <a:fillRef idx="0">
-              <a:schemeClr val="dk1"/>
-            </a:fillRef>
-            <a:effectRef idx="0">
-              <a:schemeClr val="dk1"/>
-            </a:effectRef>
-            <a:fontRef idx="minor">
-              <a:schemeClr val="tx1"/>
-            </a:fontRef>
-          </p:style>
-        </p:cxnSp>
-        <p:cxnSp>
-          <p:nvCxnSpPr>
-            <p:cNvPr id="23" name="Straight Arrow Connector 22">
-              <a:extLst>
-                <a:ext uri="{FF2B5EF4-FFF2-40B4-BE49-F238E27FC236}">
-                  <a16:creationId xmlns:a16="http://schemas.microsoft.com/office/drawing/2014/main" id="{AFEA8FD7-C58C-4CCD-81ED-CA12DF5BFECE}"/>
-                </a:ext>
-              </a:extLst>
-            </p:cNvPr>
-            <p:cNvCxnSpPr>
-              <a:cxnSpLocks/>
-              <a:stCxn id="6" idx="2"/>
-              <a:endCxn id="119" idx="0"/>
-            </p:cNvCxnSpPr>
-            <p:nvPr/>
-          </p:nvCxnSpPr>
-          <p:spPr>
-            <a:xfrm>
-              <a:off x="6095998" y="5179992"/>
-              <a:ext cx="2073" cy="532732"/>
-            </a:xfrm>
-            <a:prstGeom prst="straightConnector1">
-              <a:avLst/>
-            </a:prstGeom>
-            <a:ln w="28575">
-              <a:tailEnd type="triangle"/>
-            </a:ln>
-          </p:spPr>
-          <p:style>
-            <a:lnRef idx="1">
-              <a:schemeClr val="dk1"/>
-            </a:lnRef>
-            <a:fillRef idx="0">
-              <a:schemeClr val="dk1"/>
-            </a:fillRef>
-            <a:effectRef idx="0">
-              <a:schemeClr val="dk1"/>
-            </a:effectRef>
-            <a:fontRef idx="minor">
-              <a:schemeClr val="tx1"/>
-            </a:fontRef>
-          </p:style>
-        </p:cxnSp>
-        <p:sp>
-          <p:nvSpPr>
-            <p:cNvPr id="28" name="Rectangle: Rounded Corners 27">
-              <a:extLst>
-                <a:ext uri="{FF2B5EF4-FFF2-40B4-BE49-F238E27FC236}">
-                  <a16:creationId xmlns:a16="http://schemas.microsoft.com/office/drawing/2014/main" id="{07354014-32DB-4978-872F-6CDEEBFF7A60}"/>
+                  <a16:creationId xmlns:a16="http://schemas.microsoft.com/office/drawing/2014/main" id="{17FBC41E-418B-4CD8-AB99-8BF000518BE0}"/>
                 </a:ext>
               </a:extLst>
             </p:cNvPr>
@@ -3586,50 +4132,283 @@
           </p:nvSpPr>
           <p:spPr>
             <a:xfrm>
-              <a:off x="-1182108" y="1725768"/>
-              <a:ext cx="3339312" cy="4165247"/>
+              <a:off x="3457402" y="-1628537"/>
+              <a:ext cx="3286605" cy="369332"/>
             </a:xfrm>
-            <a:prstGeom prst="roundRect">
+            <a:prstGeom prst="rect">
               <a:avLst/>
             </a:prstGeom>
-            <a:noFill/>
-            <a:ln w="28575">
-              <a:solidFill>
-                <a:schemeClr val="tx1"/>
-              </a:solidFill>
-            </a:ln>
           </p:spPr>
-          <p:style>
-            <a:lnRef idx="2">
-              <a:schemeClr val="accent1">
-                <a:shade val="50000"/>
-              </a:schemeClr>
-            </a:lnRef>
-            <a:fillRef idx="1">
-              <a:schemeClr val="accent1"/>
-            </a:fillRef>
-            <a:effectRef idx="0">
-              <a:schemeClr val="accent1"/>
-            </a:effectRef>
-            <a:fontRef idx="minor">
-              <a:schemeClr val="lt1"/>
-            </a:fontRef>
-          </p:style>
           <p:txBody>
-            <a:bodyPr rtlCol="0" anchor="ctr"/>
+            <a:bodyPr wrap="none">
+              <a:spAutoFit/>
+            </a:bodyPr>
             <a:lstStyle/>
             <a:p>
               <a:pPr algn="ctr"/>
-              <a:endParaRPr lang="en-US"/>
+              <a:r>
+                <a:rPr lang="en-US" dirty="0"/>
+                <a:t>ARCHS4 RNA-Seq data repository</a:t>
+              </a:r>
             </a:p>
           </p:txBody>
         </p:sp>
+        <p:grpSp>
+          <p:nvGrpSpPr>
+            <p:cNvPr id="103" name="Group 102">
+              <a:extLst>
+                <a:ext uri="{FF2B5EF4-FFF2-40B4-BE49-F238E27FC236}">
+                  <a16:creationId xmlns:a16="http://schemas.microsoft.com/office/drawing/2014/main" id="{43155AE9-F1CA-4C75-837C-A10A2D29BCA1}"/>
+                </a:ext>
+              </a:extLst>
+            </p:cNvPr>
+            <p:cNvGrpSpPr/>
+            <p:nvPr/>
+          </p:nvGrpSpPr>
+          <p:grpSpPr>
+            <a:xfrm>
+              <a:off x="3763980" y="-1056258"/>
+              <a:ext cx="4641251" cy="981237"/>
+              <a:chOff x="3763980" y="-1342251"/>
+              <a:chExt cx="4641251" cy="981237"/>
+            </a:xfrm>
+          </p:grpSpPr>
+          <p:sp>
+            <p:nvSpPr>
+              <p:cNvPr id="93" name="Rectangle: Rounded Corners 92">
+                <a:extLst>
+                  <a:ext uri="{FF2B5EF4-FFF2-40B4-BE49-F238E27FC236}">
+                    <a16:creationId xmlns:a16="http://schemas.microsoft.com/office/drawing/2014/main" id="{69B8FCE5-CFD8-4942-8A0D-90AD21BFCD5E}"/>
+                  </a:ext>
+                </a:extLst>
+              </p:cNvPr>
+              <p:cNvSpPr/>
+              <p:nvPr/>
+            </p:nvSpPr>
+            <p:spPr>
+              <a:xfrm>
+                <a:off x="3763980" y="-1341945"/>
+                <a:ext cx="2024680" cy="369332"/>
+              </a:xfrm>
+              <a:prstGeom prst="roundRect">
+                <a:avLst/>
+              </a:prstGeom>
+              <a:solidFill>
+                <a:srgbClr val="1C0444"/>
+              </a:solidFill>
+            </p:spPr>
+            <p:style>
+              <a:lnRef idx="2">
+                <a:schemeClr val="accent1">
+                  <a:shade val="50000"/>
+                </a:schemeClr>
+              </a:lnRef>
+              <a:fillRef idx="1">
+                <a:schemeClr val="accent1"/>
+              </a:fillRef>
+              <a:effectRef idx="0">
+                <a:schemeClr val="accent1"/>
+              </a:effectRef>
+              <a:fontRef idx="minor">
+                <a:schemeClr val="lt1"/>
+              </a:fontRef>
+            </p:style>
+            <p:txBody>
+              <a:bodyPr rtlCol="0" anchor="ctr"/>
+              <a:lstStyle/>
+              <a:p>
+                <a:pPr algn="ctr"/>
+                <a:r>
+                  <a:rPr lang="en-US" dirty="0"/>
+                  <a:t>Human tissues</a:t>
+                </a:r>
+              </a:p>
+            </p:txBody>
+          </p:sp>
+          <p:sp>
+            <p:nvSpPr>
+              <p:cNvPr id="94" name="Rectangle: Rounded Corners 93">
+                <a:extLst>
+                  <a:ext uri="{FF2B5EF4-FFF2-40B4-BE49-F238E27FC236}">
+                    <a16:creationId xmlns:a16="http://schemas.microsoft.com/office/drawing/2014/main" id="{AA83B7F6-A80A-4B77-9349-F42634D4B08C}"/>
+                  </a:ext>
+                </a:extLst>
+              </p:cNvPr>
+              <p:cNvSpPr/>
+              <p:nvPr/>
+            </p:nvSpPr>
+            <p:spPr>
+              <a:xfrm>
+                <a:off x="3786771" y="-730346"/>
+                <a:ext cx="2024680" cy="369332"/>
+              </a:xfrm>
+              <a:prstGeom prst="roundRect">
+                <a:avLst/>
+              </a:prstGeom>
+              <a:solidFill>
+                <a:srgbClr val="1C0444"/>
+              </a:solidFill>
+            </p:spPr>
+            <p:style>
+              <a:lnRef idx="2">
+                <a:schemeClr val="accent1">
+                  <a:shade val="50000"/>
+                </a:schemeClr>
+              </a:lnRef>
+              <a:fillRef idx="1">
+                <a:schemeClr val="accent1"/>
+              </a:fillRef>
+              <a:effectRef idx="0">
+                <a:schemeClr val="accent1"/>
+              </a:effectRef>
+              <a:fontRef idx="minor">
+                <a:schemeClr val="lt1"/>
+              </a:fontRef>
+            </p:style>
+            <p:txBody>
+              <a:bodyPr rtlCol="0" anchor="ctr"/>
+              <a:lstStyle/>
+              <a:p>
+                <a:pPr algn="ctr"/>
+                <a:r>
+                  <a:rPr lang="en-US" dirty="0"/>
+                  <a:t>Human tumors</a:t>
+                </a:r>
+              </a:p>
+            </p:txBody>
+          </p:sp>
+          <p:sp>
+            <p:nvSpPr>
+              <p:cNvPr id="95" name="Rectangle: Rounded Corners 94">
+                <a:extLst>
+                  <a:ext uri="{FF2B5EF4-FFF2-40B4-BE49-F238E27FC236}">
+                    <a16:creationId xmlns:a16="http://schemas.microsoft.com/office/drawing/2014/main" id="{474A99D8-F02F-4A28-B324-45373A5C165F}"/>
+                  </a:ext>
+                </a:extLst>
+              </p:cNvPr>
+              <p:cNvSpPr/>
+              <p:nvPr/>
+            </p:nvSpPr>
+            <p:spPr>
+              <a:xfrm>
+                <a:off x="6380551" y="-1342251"/>
+                <a:ext cx="2024680" cy="369332"/>
+              </a:xfrm>
+              <a:prstGeom prst="roundRect">
+                <a:avLst/>
+              </a:prstGeom>
+              <a:solidFill>
+                <a:srgbClr val="1C0444"/>
+              </a:solidFill>
+            </p:spPr>
+            <p:style>
+              <a:lnRef idx="2">
+                <a:schemeClr val="accent1">
+                  <a:shade val="50000"/>
+                </a:schemeClr>
+              </a:lnRef>
+              <a:fillRef idx="1">
+                <a:schemeClr val="accent1"/>
+              </a:fillRef>
+              <a:effectRef idx="0">
+                <a:schemeClr val="accent1"/>
+              </a:effectRef>
+              <a:fontRef idx="minor">
+                <a:schemeClr val="lt1"/>
+              </a:fontRef>
+            </p:style>
+            <p:txBody>
+              <a:bodyPr rtlCol="0" anchor="ctr"/>
+              <a:lstStyle/>
+              <a:p>
+                <a:pPr algn="ctr"/>
+                <a:r>
+                  <a:rPr lang="en-US" dirty="0"/>
+                  <a:t>Mouse tissues</a:t>
+                </a:r>
+              </a:p>
+            </p:txBody>
+          </p:sp>
+          <p:sp>
+            <p:nvSpPr>
+              <p:cNvPr id="96" name="Rectangle: Rounded Corners 95">
+                <a:extLst>
+                  <a:ext uri="{FF2B5EF4-FFF2-40B4-BE49-F238E27FC236}">
+                    <a16:creationId xmlns:a16="http://schemas.microsoft.com/office/drawing/2014/main" id="{E85043F1-A240-4217-BA13-B7E4AD1771F5}"/>
+                  </a:ext>
+                </a:extLst>
+              </p:cNvPr>
+              <p:cNvSpPr/>
+              <p:nvPr/>
+            </p:nvSpPr>
+            <p:spPr>
+              <a:xfrm>
+                <a:off x="6380551" y="-730346"/>
+                <a:ext cx="2024680" cy="369332"/>
+              </a:xfrm>
+              <a:prstGeom prst="roundRect">
+                <a:avLst/>
+              </a:prstGeom>
+              <a:solidFill>
+                <a:srgbClr val="1C0444"/>
+              </a:solidFill>
+            </p:spPr>
+            <p:style>
+              <a:lnRef idx="2">
+                <a:schemeClr val="accent1">
+                  <a:shade val="50000"/>
+                </a:schemeClr>
+              </a:lnRef>
+              <a:fillRef idx="1">
+                <a:schemeClr val="accent1"/>
+              </a:fillRef>
+              <a:effectRef idx="0">
+                <a:schemeClr val="accent1"/>
+              </a:effectRef>
+              <a:fontRef idx="minor">
+                <a:schemeClr val="lt1"/>
+              </a:fontRef>
+            </p:style>
+            <p:txBody>
+              <a:bodyPr rtlCol="0" anchor="ctr"/>
+              <a:lstStyle/>
+              <a:p>
+                <a:pPr algn="ctr"/>
+                <a:r>
+                  <a:rPr lang="en-US" dirty="0"/>
+                  <a:t>Mouse tumors</a:t>
+                </a:r>
+              </a:p>
+            </p:txBody>
+          </p:sp>
+        </p:grpSp>
+      </p:grpSp>
+      <p:grpSp>
+        <p:nvGrpSpPr>
+          <p:cNvPr id="136" name="Group 135">
+            <a:extLst>
+              <a:ext uri="{FF2B5EF4-FFF2-40B4-BE49-F238E27FC236}">
+                <a16:creationId xmlns:a16="http://schemas.microsoft.com/office/drawing/2014/main" id="{C751E94B-65D8-4062-ABE7-74D6069CEDE7}"/>
+              </a:ext>
+            </a:extLst>
+          </p:cNvPr>
+          <p:cNvGrpSpPr/>
+          <p:nvPr/>
+        </p:nvGrpSpPr>
+        <p:grpSpPr>
+          <a:xfrm>
+            <a:off x="2943914" y="5712724"/>
+            <a:ext cx="6304170" cy="2888297"/>
+            <a:chOff x="2999721" y="6003842"/>
+            <a:chExt cx="6304170" cy="2888297"/>
+          </a:xfrm>
+        </p:grpSpPr>
         <p:sp>
           <p:nvSpPr>
-            <p:cNvPr id="32" name="Rectangle: Rounded Corners 31">
+            <p:cNvPr id="119" name="Rectangle: Rounded Corners 118">
               <a:extLst>
                 <a:ext uri="{FF2B5EF4-FFF2-40B4-BE49-F238E27FC236}">
-                  <a16:creationId xmlns:a16="http://schemas.microsoft.com/office/drawing/2014/main" id="{52530A37-D41A-4114-BE72-6B2AFD3136B4}"/>
+                  <a16:creationId xmlns:a16="http://schemas.microsoft.com/office/drawing/2014/main" id="{C24ADC0B-44D9-4738-8B52-E1E118D69121}"/>
                 </a:ext>
               </a:extLst>
             </p:cNvPr>
@@ -3638,8 +4417,8 @@
           </p:nvSpPr>
           <p:spPr>
             <a:xfrm>
-              <a:off x="10038939" y="1720807"/>
-              <a:ext cx="3339312" cy="4165241"/>
+              <a:off x="2999721" y="6003842"/>
+              <a:ext cx="6304170" cy="2888297"/>
             </a:xfrm>
             <a:prstGeom prst="roundRect">
               <a:avLst/>
@@ -3678,57 +4457,22 @@
         </p:sp>
         <p:cxnSp>
           <p:nvCxnSpPr>
-            <p:cNvPr id="43" name="Straight Connector 42">
+            <p:cNvPr id="120" name="Straight Connector 119">
               <a:extLst>
                 <a:ext uri="{FF2B5EF4-FFF2-40B4-BE49-F238E27FC236}">
-                  <a16:creationId xmlns:a16="http://schemas.microsoft.com/office/drawing/2014/main" id="{96296160-98C9-4054-8003-D859487DBB78}"/>
+                  <a16:creationId xmlns:a16="http://schemas.microsoft.com/office/drawing/2014/main" id="{2A4A01EF-ED53-414E-82D9-4A5D0C70AEE8}"/>
                 </a:ext>
               </a:extLst>
             </p:cNvPr>
-            <p:cNvCxnSpPr/>
+            <p:cNvCxnSpPr>
+              <a:cxnSpLocks/>
+            </p:cNvCxnSpPr>
             <p:nvPr/>
           </p:nvCxnSpPr>
           <p:spPr>
-            <a:xfrm>
-              <a:off x="-1182108" y="2213142"/>
-              <a:ext cx="3339312" cy="0"/>
-            </a:xfrm>
-            <a:prstGeom prst="line">
-              <a:avLst/>
-            </a:prstGeom>
-            <a:ln w="12700"/>
-          </p:spPr>
-          <p:style>
-            <a:lnRef idx="1">
-              <a:schemeClr val="dk1"/>
-            </a:lnRef>
-            <a:fillRef idx="0">
-              <a:schemeClr val="dk1"/>
-            </a:fillRef>
-            <a:effectRef idx="0">
-              <a:schemeClr val="dk1"/>
-            </a:effectRef>
-            <a:fontRef idx="minor">
-              <a:schemeClr val="tx1"/>
-            </a:fontRef>
-          </p:style>
-        </p:cxnSp>
-        <p:cxnSp>
-          <p:nvCxnSpPr>
-            <p:cNvPr id="44" name="Straight Connector 43">
-              <a:extLst>
-                <a:ext uri="{FF2B5EF4-FFF2-40B4-BE49-F238E27FC236}">
-                  <a16:creationId xmlns:a16="http://schemas.microsoft.com/office/drawing/2014/main" id="{DAC4CAA4-BA1C-407F-A99F-8925455C3224}"/>
-                </a:ext>
-              </a:extLst>
-            </p:cNvPr>
-            <p:cNvCxnSpPr/>
-            <p:nvPr/>
-          </p:nvCxnSpPr>
-          <p:spPr>
-            <a:xfrm>
-              <a:off x="10037301" y="2212504"/>
-              <a:ext cx="3339312" cy="0"/>
+            <a:xfrm flipV="1">
+              <a:off x="3060681" y="6448543"/>
+              <a:ext cx="6182250" cy="7744"/>
             </a:xfrm>
             <a:prstGeom prst="line">
               <a:avLst/>
@@ -3752,10 +4496,10 @@
         </p:cxnSp>
         <p:sp>
           <p:nvSpPr>
-            <p:cNvPr id="48" name="TextBox 47">
+            <p:cNvPr id="121" name="TextBox 120">
               <a:extLst>
                 <a:ext uri="{FF2B5EF4-FFF2-40B4-BE49-F238E27FC236}">
-                  <a16:creationId xmlns:a16="http://schemas.microsoft.com/office/drawing/2014/main" id="{4007DBBC-9244-4FF3-BE56-B1429424E3F9}"/>
+                  <a16:creationId xmlns:a16="http://schemas.microsoft.com/office/drawing/2014/main" id="{F81A6E6E-B7AA-4E41-B5E7-1BBA774DDA4D}"/>
                 </a:ext>
               </a:extLst>
             </p:cNvPr>
@@ -3764,8 +4508,8 @@
           </p:nvSpPr>
           <p:spPr>
             <a:xfrm>
-              <a:off x="-758819" y="1792787"/>
-              <a:ext cx="2480940" cy="400110"/>
+              <a:off x="4779702" y="6022115"/>
+              <a:ext cx="2736785" cy="369332"/>
             </a:xfrm>
             <a:prstGeom prst="rect">
               <a:avLst/>
@@ -3779,22 +4523,18 @@
             <a:lstStyle/>
             <a:p>
               <a:r>
-                <a:rPr lang="en-US" sz="2000" b="1" dirty="0"/>
-                <a:t>Single-analysis </a:t>
-              </a:r>
-              <a:r>
-                <a:rPr lang="en-US" sz="2000" dirty="0"/>
-                <a:t>Mode</a:t>
+                <a:rPr lang="en-US" dirty="0"/>
+                <a:t>Topology-analysis Mode</a:t>
               </a:r>
             </a:p>
           </p:txBody>
         </p:sp>
         <p:sp>
           <p:nvSpPr>
-            <p:cNvPr id="49" name="TextBox 48">
+            <p:cNvPr id="122" name="TextBox 121">
               <a:extLst>
                 <a:ext uri="{FF2B5EF4-FFF2-40B4-BE49-F238E27FC236}">
-                  <a16:creationId xmlns:a16="http://schemas.microsoft.com/office/drawing/2014/main" id="{1F58AE3C-8878-49CB-B0F7-9481EA11FF2F}"/>
+                  <a16:creationId xmlns:a16="http://schemas.microsoft.com/office/drawing/2014/main" id="{E8052125-96F3-4DD6-9B26-F24C17B21623}"/>
                 </a:ext>
               </a:extLst>
             </p:cNvPr>
@@ -3803,8 +4543,8 @@
           </p:nvSpPr>
           <p:spPr>
             <a:xfrm>
-              <a:off x="10448965" y="1792787"/>
-              <a:ext cx="2472954" cy="400089"/>
+              <a:off x="3060681" y="6585616"/>
+              <a:ext cx="6182250" cy="369332"/>
             </a:xfrm>
             <a:prstGeom prst="rect">
               <a:avLst/>
@@ -3818,139 +4558,30 @@
             <a:lstStyle/>
             <a:p>
               <a:r>
-                <a:rPr lang="en-US" sz="2000" b="1" dirty="0"/>
-                <a:t>Paired-analysis </a:t>
-              </a:r>
-              <a:r>
-                <a:rPr lang="en-US" sz="2000" dirty="0"/>
-                <a:t>Mode</a:t>
-              </a:r>
-            </a:p>
-          </p:txBody>
-        </p:sp>
-        <p:sp>
-          <p:nvSpPr>
-            <p:cNvPr id="51" name="TextBox 50">
-              <a:extLst>
-                <a:ext uri="{FF2B5EF4-FFF2-40B4-BE49-F238E27FC236}">
-                  <a16:creationId xmlns:a16="http://schemas.microsoft.com/office/drawing/2014/main" id="{EA3F0FF7-CE32-46C4-98B0-D96DC18DB9EB}"/>
-                </a:ext>
-              </a:extLst>
-            </p:cNvPr>
-            <p:cNvSpPr txBox="1"/>
-            <p:nvPr/>
-          </p:nvSpPr>
-          <p:spPr>
-            <a:xfrm>
-              <a:off x="-1062253" y="2216145"/>
-              <a:ext cx="782074" cy="369332"/>
-            </a:xfrm>
-            <a:prstGeom prst="rect">
-              <a:avLst/>
-            </a:prstGeom>
-            <a:noFill/>
-          </p:spPr>
-          <p:txBody>
-            <a:bodyPr wrap="none" rtlCol="0">
-              <a:spAutoFit/>
-            </a:bodyPr>
-            <a:lstStyle/>
-            <a:p>
-              <a:r>
                 <a:rPr lang="en-US" dirty="0"/>
-                <a:t>“ATM”</a:t>
-              </a:r>
-            </a:p>
-          </p:txBody>
-        </p:sp>
-        <p:sp>
-          <p:nvSpPr>
-            <p:cNvPr id="53" name="TextBox 52">
-              <a:extLst>
-                <a:ext uri="{FF2B5EF4-FFF2-40B4-BE49-F238E27FC236}">
-                  <a16:creationId xmlns:a16="http://schemas.microsoft.com/office/drawing/2014/main" id="{67B27EC5-3306-4370-AB52-0DD37A5328F2}"/>
-                </a:ext>
-              </a:extLst>
-            </p:cNvPr>
-            <p:cNvSpPr txBox="1"/>
-            <p:nvPr/>
-          </p:nvSpPr>
-          <p:spPr>
-            <a:xfrm>
-              <a:off x="10221497" y="2212504"/>
-              <a:ext cx="2645340" cy="369332"/>
-            </a:xfrm>
-            <a:prstGeom prst="rect">
-              <a:avLst/>
-            </a:prstGeom>
-            <a:noFill/>
-          </p:spPr>
-          <p:txBody>
-            <a:bodyPr wrap="none" rtlCol="0">
-              <a:spAutoFit/>
-            </a:bodyPr>
-            <a:lstStyle/>
-            <a:p>
-              <a:r>
-                <a:rPr lang="en-US" dirty="0"/>
-                <a:t>“ATM vs (BRCA1, EZH2 …)”</a:t>
+                <a:t>“ATM, BRCA1, EZH2 …” or “BIOCARTA_PROTEASOME_PATHWAY” </a:t>
               </a:r>
             </a:p>
           </p:txBody>
         </p:sp>
         <p:cxnSp>
           <p:nvCxnSpPr>
-            <p:cNvPr id="55" name="Straight Connector 54">
+            <p:cNvPr id="123" name="Straight Connector 122">
               <a:extLst>
                 <a:ext uri="{FF2B5EF4-FFF2-40B4-BE49-F238E27FC236}">
-                  <a16:creationId xmlns:a16="http://schemas.microsoft.com/office/drawing/2014/main" id="{1772C2ED-8084-4D96-8A9F-05E1323D9C60}"/>
+                  <a16:creationId xmlns:a16="http://schemas.microsoft.com/office/drawing/2014/main" id="{BE4BC511-5D1F-4FB5-AB83-F4709C1B60CA}"/>
                 </a:ext>
               </a:extLst>
             </p:cNvPr>
-            <p:cNvCxnSpPr/>
+            <p:cNvCxnSpPr>
+              <a:cxnSpLocks/>
+            </p:cNvCxnSpPr>
             <p:nvPr/>
           </p:nvCxnSpPr>
           <p:spPr>
-            <a:xfrm>
-              <a:off x="-1182108" y="2581836"/>
-              <a:ext cx="3339312" cy="0"/>
-            </a:xfrm>
-            <a:prstGeom prst="line">
-              <a:avLst/>
-            </a:prstGeom>
-            <a:ln w="12700"/>
-          </p:spPr>
-          <p:style>
-            <a:lnRef idx="1">
-              <a:schemeClr val="dk1"/>
-            </a:lnRef>
-            <a:fillRef idx="0">
-              <a:schemeClr val="dk1"/>
-            </a:fillRef>
-            <a:effectRef idx="0">
-              <a:schemeClr val="dk1"/>
-            </a:effectRef>
-            <a:fontRef idx="minor">
-              <a:schemeClr val="tx1"/>
-            </a:fontRef>
-          </p:style>
-        </p:cxnSp>
-        <p:cxnSp>
-          <p:nvCxnSpPr>
-            <p:cNvPr id="56" name="Straight Connector 55">
-              <a:extLst>
-                <a:ext uri="{FF2B5EF4-FFF2-40B4-BE49-F238E27FC236}">
-                  <a16:creationId xmlns:a16="http://schemas.microsoft.com/office/drawing/2014/main" id="{9FDA19AA-F31F-4E5E-97E2-A0B418F800EB}"/>
-                </a:ext>
-              </a:extLst>
-            </p:cNvPr>
-            <p:cNvCxnSpPr/>
-            <p:nvPr/>
-          </p:nvCxnSpPr>
-          <p:spPr>
-            <a:xfrm>
-              <a:off x="10015786" y="2581836"/>
-              <a:ext cx="3339312" cy="0"/>
+            <a:xfrm flipV="1">
+              <a:off x="3006697" y="7028838"/>
+              <a:ext cx="6297194" cy="858"/>
             </a:xfrm>
             <a:prstGeom prst="line">
               <a:avLst/>
@@ -3974,117 +4605,10 @@
         </p:cxnSp>
         <p:pic>
           <p:nvPicPr>
-            <p:cNvPr id="68" name="Picture 67" descr="A screenshot of a cell phone&#10;&#10;Description automatically generated">
+            <p:cNvPr id="124" name="Picture 123" descr="A picture containing sky&#10;&#10;Description automatically generated">
               <a:extLst>
                 <a:ext uri="{FF2B5EF4-FFF2-40B4-BE49-F238E27FC236}">
-                  <a16:creationId xmlns:a16="http://schemas.microsoft.com/office/drawing/2014/main" id="{DE1E1F68-FA16-4936-BDD3-CD02071F1F4A}"/>
-                </a:ext>
-              </a:extLst>
-            </p:cNvPr>
-            <p:cNvPicPr>
-              <a:picLocks noChangeAspect="1"/>
-            </p:cNvPicPr>
-            <p:nvPr/>
-          </p:nvPicPr>
-          <p:blipFill rotWithShape="1">
-            <a:blip r:embed="rId3">
-              <a:extLst>
-                <a:ext uri="{28A0092B-C50C-407E-A947-70E740481C1C}">
-                  <a14:useLocalDpi xmlns:a14="http://schemas.microsoft.com/office/drawing/2010/main" val="0"/>
-                </a:ext>
-              </a:extLst>
-            </a:blip>
-            <a:srcRect l="198" t="11598" b="5657"/>
-            <a:stretch/>
-          </p:blipFill>
-          <p:spPr>
-            <a:xfrm>
-              <a:off x="-665800" y="2759995"/>
-              <a:ext cx="2292442" cy="1221839"/>
-            </a:xfrm>
-            <a:prstGeom prst="rect">
-              <a:avLst/>
-            </a:prstGeom>
-          </p:spPr>
-        </p:pic>
-        <p:pic>
-          <p:nvPicPr>
-            <p:cNvPr id="70" name="Picture 69" descr="A close up of a map&#10;&#10;Description automatically generated">
-              <a:extLst>
-                <a:ext uri="{FF2B5EF4-FFF2-40B4-BE49-F238E27FC236}">
-                  <a16:creationId xmlns:a16="http://schemas.microsoft.com/office/drawing/2014/main" id="{B978C344-8383-4747-8CDD-60C5C1780435}"/>
-                </a:ext>
-              </a:extLst>
-            </p:cNvPr>
-            <p:cNvPicPr>
-              <a:picLocks noChangeAspect="1"/>
-            </p:cNvPicPr>
-            <p:nvPr/>
-          </p:nvPicPr>
-          <p:blipFill>
-            <a:blip r:embed="rId4">
-              <a:extLst>
-                <a:ext uri="{28A0092B-C50C-407E-A947-70E740481C1C}">
-                  <a14:useLocalDpi xmlns:a14="http://schemas.microsoft.com/office/drawing/2010/main" val="0"/>
-                </a:ext>
-              </a:extLst>
-            </a:blip>
-            <a:stretch>
-              <a:fillRect/>
-            </a:stretch>
-          </p:blipFill>
-          <p:spPr>
-            <a:xfrm>
-              <a:off x="-674325" y="4123434"/>
-              <a:ext cx="2300967" cy="1660519"/>
-            </a:xfrm>
-            <a:prstGeom prst="rect">
-              <a:avLst/>
-            </a:prstGeom>
-          </p:spPr>
-        </p:pic>
-        <p:pic>
-          <p:nvPicPr>
-            <p:cNvPr id="72" name="Picture 71" descr="A close up of a map&#10;&#10;Description automatically generated">
-              <a:extLst>
-                <a:ext uri="{FF2B5EF4-FFF2-40B4-BE49-F238E27FC236}">
-                  <a16:creationId xmlns:a16="http://schemas.microsoft.com/office/drawing/2014/main" id="{5318A1B7-4683-4AAC-BF89-5398519E9A8E}"/>
-                </a:ext>
-              </a:extLst>
-            </p:cNvPr>
-            <p:cNvPicPr>
-              <a:picLocks noChangeAspect="1"/>
-            </p:cNvPicPr>
-            <p:nvPr/>
-          </p:nvPicPr>
-          <p:blipFill>
-            <a:blip r:embed="rId5">
-              <a:extLst>
-                <a:ext uri="{28A0092B-C50C-407E-A947-70E740481C1C}">
-                  <a14:useLocalDpi xmlns:a14="http://schemas.microsoft.com/office/drawing/2010/main" val="0"/>
-                </a:ext>
-              </a:extLst>
-            </a:blip>
-            <a:stretch>
-              <a:fillRect/>
-            </a:stretch>
-          </p:blipFill>
-          <p:spPr>
-            <a:xfrm>
-              <a:off x="10495271" y="2789634"/>
-              <a:ext cx="2426648" cy="1192200"/>
-            </a:xfrm>
-            <a:prstGeom prst="rect">
-              <a:avLst/>
-            </a:prstGeom>
-          </p:spPr>
-        </p:pic>
-        <p:pic>
-          <p:nvPicPr>
-            <p:cNvPr id="79" name="Picture 78">
-              <a:extLst>
-                <a:ext uri="{FF2B5EF4-FFF2-40B4-BE49-F238E27FC236}">
-                  <a16:creationId xmlns:a16="http://schemas.microsoft.com/office/drawing/2014/main" id="{9ED66A87-70CA-4B25-90D4-CDCA557F69DC}"/>
+                  <a16:creationId xmlns:a16="http://schemas.microsoft.com/office/drawing/2014/main" id="{09734B57-335B-41F2-B559-3FA6B6CA00A7}"/>
                 </a:ext>
               </a:extLst>
             </p:cNvPr>
@@ -4101,788 +4625,308 @@
                 </a:ext>
               </a:extLst>
             </a:blip>
-            <a:srcRect l="59287" t="6769" r="-85" b="10603"/>
+            <a:srcRect t="7780" r="10961"/>
             <a:stretch/>
           </p:blipFill>
           <p:spPr>
             <a:xfrm>
-              <a:off x="10495271" y="4189631"/>
-              <a:ext cx="2426648" cy="1469597"/>
+              <a:off x="3147878" y="7215088"/>
+              <a:ext cx="1631824" cy="1309551"/>
             </a:xfrm>
             <a:prstGeom prst="rect">
               <a:avLst/>
             </a:prstGeom>
           </p:spPr>
         </p:pic>
-        <p:grpSp>
-          <p:nvGrpSpPr>
-            <p:cNvPr id="104" name="Group 103">
+        <p:pic>
+          <p:nvPicPr>
+            <p:cNvPr id="125" name="Picture 124">
               <a:extLst>
                 <a:ext uri="{FF2B5EF4-FFF2-40B4-BE49-F238E27FC236}">
-                  <a16:creationId xmlns:a16="http://schemas.microsoft.com/office/drawing/2014/main" id="{9949F315-15CA-46FD-AAEE-C873D909F870}"/>
+                  <a16:creationId xmlns:a16="http://schemas.microsoft.com/office/drawing/2014/main" id="{6048A5EF-4F18-410A-9C7B-ED37181A9BB4}"/>
                 </a:ext>
               </a:extLst>
             </p:cNvPr>
-            <p:cNvGrpSpPr/>
+            <p:cNvPicPr>
+              <a:picLocks noChangeAspect="1"/>
+            </p:cNvPicPr>
             <p:nvPr/>
-          </p:nvGrpSpPr>
-          <p:grpSpPr>
+          </p:nvPicPr>
+          <p:blipFill rotWithShape="1">
+            <a:blip r:embed="rId7">
+              <a:extLst>
+                <a:ext uri="{28A0092B-C50C-407E-A947-70E740481C1C}">
+                  <a14:useLocalDpi xmlns:a14="http://schemas.microsoft.com/office/drawing/2010/main" val="0"/>
+                </a:ext>
+              </a:extLst>
+            </a:blip>
+            <a:srcRect l="29040" r="9806"/>
+            <a:stretch/>
+          </p:blipFill>
+          <p:spPr>
             <a:xfrm>
-              <a:off x="3335425" y="-1130902"/>
-              <a:ext cx="5532268" cy="1740414"/>
-              <a:chOff x="3328226" y="-1628537"/>
-              <a:chExt cx="5532268" cy="1740414"/>
+              <a:off x="5198645" y="7212514"/>
+              <a:ext cx="1937849" cy="1306977"/>
             </a:xfrm>
-          </p:grpSpPr>
-          <p:sp>
-            <p:nvSpPr>
-              <p:cNvPr id="4" name="Rectangle: Rounded Corners 3">
-                <a:extLst>
-                  <a:ext uri="{FF2B5EF4-FFF2-40B4-BE49-F238E27FC236}">
-                    <a16:creationId xmlns:a16="http://schemas.microsoft.com/office/drawing/2014/main" id="{DB205338-6232-4C0B-A3A1-980D260FF05A}"/>
-                  </a:ext>
-                </a:extLst>
-              </p:cNvPr>
-              <p:cNvSpPr/>
-              <p:nvPr/>
-            </p:nvSpPr>
-            <p:spPr>
-              <a:xfrm>
-                <a:off x="3328226" y="-1259205"/>
-                <a:ext cx="5532268" cy="1371082"/>
-              </a:xfrm>
-              <a:prstGeom prst="roundRect">
-                <a:avLst/>
-              </a:prstGeom>
-              <a:noFill/>
-              <a:ln w="28575">
-                <a:solidFill>
-                  <a:schemeClr val="tx1"/>
-                </a:solidFill>
-              </a:ln>
-            </p:spPr>
-            <p:style>
-              <a:lnRef idx="2">
-                <a:schemeClr val="accent1">
-                  <a:shade val="50000"/>
-                </a:schemeClr>
-              </a:lnRef>
-              <a:fillRef idx="1">
-                <a:schemeClr val="accent1"/>
-              </a:fillRef>
-              <a:effectRef idx="0">
-                <a:schemeClr val="accent1"/>
-              </a:effectRef>
-              <a:fontRef idx="minor">
-                <a:schemeClr val="lt1"/>
-              </a:fontRef>
-            </p:style>
-            <p:txBody>
-              <a:bodyPr rtlCol="0" anchor="ctr"/>
-              <a:lstStyle/>
-              <a:p>
-                <a:pPr algn="ctr"/>
-                <a:endParaRPr lang="en-US" dirty="0">
-                  <a:solidFill>
-                    <a:schemeClr val="tx1"/>
-                  </a:solidFill>
-                </a:endParaRPr>
-              </a:p>
-            </p:txBody>
-          </p:sp>
-          <p:sp>
-            <p:nvSpPr>
-              <p:cNvPr id="91" name="Rectangle 90">
-                <a:extLst>
-                  <a:ext uri="{FF2B5EF4-FFF2-40B4-BE49-F238E27FC236}">
-                    <a16:creationId xmlns:a16="http://schemas.microsoft.com/office/drawing/2014/main" id="{17FBC41E-418B-4CD8-AB99-8BF000518BE0}"/>
-                  </a:ext>
-                </a:extLst>
-              </p:cNvPr>
-              <p:cNvSpPr/>
-              <p:nvPr/>
-            </p:nvSpPr>
-            <p:spPr>
-              <a:xfrm>
-                <a:off x="3457402" y="-1628537"/>
-                <a:ext cx="3286605" cy="369332"/>
-              </a:xfrm>
-              <a:prstGeom prst="rect">
-                <a:avLst/>
-              </a:prstGeom>
-            </p:spPr>
-            <p:txBody>
-              <a:bodyPr wrap="none">
-                <a:spAutoFit/>
-              </a:bodyPr>
-              <a:lstStyle/>
-              <a:p>
-                <a:pPr algn="ctr"/>
-                <a:r>
-                  <a:rPr lang="en-US" b="1" dirty="0">
-                    <a:solidFill>
-                      <a:schemeClr val="tx1"/>
-                    </a:solidFill>
-                  </a:rPr>
-                  <a:t>ARCHS4</a:t>
-                </a:r>
-                <a:r>
-                  <a:rPr lang="en-US" dirty="0">
-                    <a:solidFill>
-                      <a:schemeClr val="tx1"/>
-                    </a:solidFill>
-                  </a:rPr>
-                  <a:t> RNA-Seq data repository</a:t>
-                </a:r>
-              </a:p>
-            </p:txBody>
-          </p:sp>
-          <p:grpSp>
-            <p:nvGrpSpPr>
-              <p:cNvPr id="103" name="Group 102">
-                <a:extLst>
-                  <a:ext uri="{FF2B5EF4-FFF2-40B4-BE49-F238E27FC236}">
-                    <a16:creationId xmlns:a16="http://schemas.microsoft.com/office/drawing/2014/main" id="{43155AE9-F1CA-4C75-837C-A10A2D29BCA1}"/>
-                  </a:ext>
-                </a:extLst>
-              </p:cNvPr>
-              <p:cNvGrpSpPr/>
-              <p:nvPr/>
-            </p:nvGrpSpPr>
-            <p:grpSpPr>
-              <a:xfrm>
-                <a:off x="3763980" y="-1056258"/>
-                <a:ext cx="4641251" cy="981237"/>
-                <a:chOff x="3763980" y="-1342251"/>
-                <a:chExt cx="4641251" cy="981237"/>
-              </a:xfrm>
-            </p:grpSpPr>
-            <p:sp>
-              <p:nvSpPr>
-                <p:cNvPr id="93" name="Rectangle: Rounded Corners 92">
-                  <a:extLst>
-                    <a:ext uri="{FF2B5EF4-FFF2-40B4-BE49-F238E27FC236}">
-                      <a16:creationId xmlns:a16="http://schemas.microsoft.com/office/drawing/2014/main" id="{69B8FCE5-CFD8-4942-8A0D-90AD21BFCD5E}"/>
-                    </a:ext>
-                  </a:extLst>
-                </p:cNvPr>
-                <p:cNvSpPr/>
-                <p:nvPr/>
-              </p:nvSpPr>
-              <p:spPr>
-                <a:xfrm>
-                  <a:off x="3763980" y="-1341945"/>
-                  <a:ext cx="2024680" cy="369332"/>
-                </a:xfrm>
-                <a:prstGeom prst="roundRect">
-                  <a:avLst/>
-                </a:prstGeom>
-                <a:solidFill>
-                  <a:srgbClr val="1C0444"/>
-                </a:solidFill>
-              </p:spPr>
-              <p:style>
-                <a:lnRef idx="2">
-                  <a:schemeClr val="accent1">
-                    <a:shade val="50000"/>
-                  </a:schemeClr>
-                </a:lnRef>
-                <a:fillRef idx="1">
-                  <a:schemeClr val="accent1"/>
-                </a:fillRef>
-                <a:effectRef idx="0">
-                  <a:schemeClr val="accent1"/>
-                </a:effectRef>
-                <a:fontRef idx="minor">
-                  <a:schemeClr val="lt1"/>
-                </a:fontRef>
-              </p:style>
-              <p:txBody>
-                <a:bodyPr rtlCol="0" anchor="ctr"/>
-                <a:lstStyle/>
-                <a:p>
-                  <a:pPr algn="ctr"/>
-                  <a:r>
-                    <a:rPr lang="en-US" dirty="0"/>
-                    <a:t>Human tissues</a:t>
-                  </a:r>
-                </a:p>
-              </p:txBody>
-            </p:sp>
-            <p:sp>
-              <p:nvSpPr>
-                <p:cNvPr id="94" name="Rectangle: Rounded Corners 93">
-                  <a:extLst>
-                    <a:ext uri="{FF2B5EF4-FFF2-40B4-BE49-F238E27FC236}">
-                      <a16:creationId xmlns:a16="http://schemas.microsoft.com/office/drawing/2014/main" id="{AA83B7F6-A80A-4B77-9349-F42634D4B08C}"/>
-                    </a:ext>
-                  </a:extLst>
-                </p:cNvPr>
-                <p:cNvSpPr/>
-                <p:nvPr/>
-              </p:nvSpPr>
-              <p:spPr>
-                <a:xfrm>
-                  <a:off x="3786771" y="-730346"/>
-                  <a:ext cx="2024680" cy="369332"/>
-                </a:xfrm>
-                <a:prstGeom prst="roundRect">
-                  <a:avLst/>
-                </a:prstGeom>
-                <a:solidFill>
-                  <a:srgbClr val="1C0444"/>
-                </a:solidFill>
-              </p:spPr>
-              <p:style>
-                <a:lnRef idx="2">
-                  <a:schemeClr val="accent1">
-                    <a:shade val="50000"/>
-                  </a:schemeClr>
-                </a:lnRef>
-                <a:fillRef idx="1">
-                  <a:schemeClr val="accent1"/>
-                </a:fillRef>
-                <a:effectRef idx="0">
-                  <a:schemeClr val="accent1"/>
-                </a:effectRef>
-                <a:fontRef idx="minor">
-                  <a:schemeClr val="lt1"/>
-                </a:fontRef>
-              </p:style>
-              <p:txBody>
-                <a:bodyPr rtlCol="0" anchor="ctr"/>
-                <a:lstStyle/>
-                <a:p>
-                  <a:pPr algn="ctr"/>
-                  <a:r>
-                    <a:rPr lang="en-US" dirty="0"/>
-                    <a:t>Human tumors</a:t>
-                  </a:r>
-                </a:p>
-              </p:txBody>
-            </p:sp>
-            <p:sp>
-              <p:nvSpPr>
-                <p:cNvPr id="95" name="Rectangle: Rounded Corners 94">
-                  <a:extLst>
-                    <a:ext uri="{FF2B5EF4-FFF2-40B4-BE49-F238E27FC236}">
-                      <a16:creationId xmlns:a16="http://schemas.microsoft.com/office/drawing/2014/main" id="{474A99D8-F02F-4A28-B324-45373A5C165F}"/>
-                    </a:ext>
-                  </a:extLst>
-                </p:cNvPr>
-                <p:cNvSpPr/>
-                <p:nvPr/>
-              </p:nvSpPr>
-              <p:spPr>
-                <a:xfrm>
-                  <a:off x="6380551" y="-1342251"/>
-                  <a:ext cx="2024680" cy="369332"/>
-                </a:xfrm>
-                <a:prstGeom prst="roundRect">
-                  <a:avLst/>
-                </a:prstGeom>
-                <a:solidFill>
-                  <a:srgbClr val="1C0444"/>
-                </a:solidFill>
-              </p:spPr>
-              <p:style>
-                <a:lnRef idx="2">
-                  <a:schemeClr val="accent1">
-                    <a:shade val="50000"/>
-                  </a:schemeClr>
-                </a:lnRef>
-                <a:fillRef idx="1">
-                  <a:schemeClr val="accent1"/>
-                </a:fillRef>
-                <a:effectRef idx="0">
-                  <a:schemeClr val="accent1"/>
-                </a:effectRef>
-                <a:fontRef idx="minor">
-                  <a:schemeClr val="lt1"/>
-                </a:fontRef>
-              </p:style>
-              <p:txBody>
-                <a:bodyPr rtlCol="0" anchor="ctr"/>
-                <a:lstStyle/>
-                <a:p>
-                  <a:pPr algn="ctr"/>
-                  <a:r>
-                    <a:rPr lang="en-US" dirty="0"/>
-                    <a:t>Mouse tissues</a:t>
-                  </a:r>
-                </a:p>
-              </p:txBody>
-            </p:sp>
-            <p:sp>
-              <p:nvSpPr>
-                <p:cNvPr id="96" name="Rectangle: Rounded Corners 95">
-                  <a:extLst>
-                    <a:ext uri="{FF2B5EF4-FFF2-40B4-BE49-F238E27FC236}">
-                      <a16:creationId xmlns:a16="http://schemas.microsoft.com/office/drawing/2014/main" id="{E85043F1-A240-4217-BA13-B7E4AD1771F5}"/>
-                    </a:ext>
-                  </a:extLst>
-                </p:cNvPr>
-                <p:cNvSpPr/>
-                <p:nvPr/>
-              </p:nvSpPr>
-              <p:spPr>
-                <a:xfrm>
-                  <a:off x="6380551" y="-730346"/>
-                  <a:ext cx="2024680" cy="369332"/>
-                </a:xfrm>
-                <a:prstGeom prst="roundRect">
-                  <a:avLst/>
-                </a:prstGeom>
-                <a:solidFill>
-                  <a:srgbClr val="1C0444"/>
-                </a:solidFill>
-              </p:spPr>
-              <p:style>
-                <a:lnRef idx="2">
-                  <a:schemeClr val="accent1">
-                    <a:shade val="50000"/>
-                  </a:schemeClr>
-                </a:lnRef>
-                <a:fillRef idx="1">
-                  <a:schemeClr val="accent1"/>
-                </a:fillRef>
-                <a:effectRef idx="0">
-                  <a:schemeClr val="accent1"/>
-                </a:effectRef>
-                <a:fontRef idx="minor">
-                  <a:schemeClr val="lt1"/>
-                </a:fontRef>
-              </p:style>
-              <p:txBody>
-                <a:bodyPr rtlCol="0" anchor="ctr"/>
-                <a:lstStyle/>
-                <a:p>
-                  <a:pPr algn="ctr"/>
-                  <a:r>
-                    <a:rPr lang="en-US" dirty="0"/>
-                    <a:t>Mouse tumors</a:t>
-                  </a:r>
-                </a:p>
-              </p:txBody>
-            </p:sp>
-          </p:grpSp>
-        </p:grpSp>
-        <p:grpSp>
-          <p:nvGrpSpPr>
-            <p:cNvPr id="136" name="Group 135">
+            <a:prstGeom prst="rect">
+              <a:avLst/>
+            </a:prstGeom>
+          </p:spPr>
+        </p:pic>
+        <p:pic>
+          <p:nvPicPr>
+            <p:cNvPr id="126" name="Picture 125" descr="A screenshot of a cell phone&#10;&#10;Description automatically generated">
               <a:extLst>
                 <a:ext uri="{FF2B5EF4-FFF2-40B4-BE49-F238E27FC236}">
-                  <a16:creationId xmlns:a16="http://schemas.microsoft.com/office/drawing/2014/main" id="{C751E94B-65D8-4062-ABE7-74D6069CEDE7}"/>
+                  <a16:creationId xmlns:a16="http://schemas.microsoft.com/office/drawing/2014/main" id="{8EDA3ABA-2427-466B-AEF6-6AFFAA1A5470}"/>
                 </a:ext>
               </a:extLst>
             </p:cNvPr>
-            <p:cNvGrpSpPr/>
+            <p:cNvPicPr>
+              <a:picLocks noChangeAspect="1"/>
+            </p:cNvPicPr>
             <p:nvPr/>
-          </p:nvGrpSpPr>
-          <p:grpSpPr>
-            <a:xfrm>
-              <a:off x="2945986" y="5712724"/>
-              <a:ext cx="6304170" cy="2888297"/>
-              <a:chOff x="2999721" y="6003842"/>
-              <a:chExt cx="6304170" cy="2888297"/>
-            </a:xfrm>
-          </p:grpSpPr>
-          <p:sp>
-            <p:nvSpPr>
-              <p:cNvPr id="119" name="Rectangle: Rounded Corners 118">
-                <a:extLst>
-                  <a:ext uri="{FF2B5EF4-FFF2-40B4-BE49-F238E27FC236}">
-                    <a16:creationId xmlns:a16="http://schemas.microsoft.com/office/drawing/2014/main" id="{C24ADC0B-44D9-4738-8B52-E1E118D69121}"/>
-                  </a:ext>
-                </a:extLst>
-              </p:cNvPr>
-              <p:cNvSpPr/>
-              <p:nvPr/>
-            </p:nvSpPr>
-            <p:spPr>
-              <a:xfrm>
-                <a:off x="2999721" y="6003842"/>
-                <a:ext cx="6304170" cy="2888297"/>
-              </a:xfrm>
-              <a:prstGeom prst="roundRect">
-                <a:avLst/>
-              </a:prstGeom>
-              <a:noFill/>
-              <a:ln w="28575">
-                <a:solidFill>
-                  <a:schemeClr val="tx1"/>
-                </a:solidFill>
-              </a:ln>
-            </p:spPr>
-            <p:style>
-              <a:lnRef idx="2">
-                <a:schemeClr val="accent1">
-                  <a:shade val="50000"/>
-                </a:schemeClr>
-              </a:lnRef>
-              <a:fillRef idx="1">
-                <a:schemeClr val="accent1"/>
-              </a:fillRef>
-              <a:effectRef idx="0">
-                <a:schemeClr val="accent1"/>
-              </a:effectRef>
-              <a:fontRef idx="minor">
-                <a:schemeClr val="lt1"/>
-              </a:fontRef>
-            </p:style>
-            <p:txBody>
-              <a:bodyPr rtlCol="0" anchor="ctr"/>
-              <a:lstStyle/>
-              <a:p>
-                <a:pPr algn="ctr"/>
-                <a:endParaRPr lang="en-US"/>
-              </a:p>
-            </p:txBody>
-          </p:sp>
-          <p:cxnSp>
-            <p:nvCxnSpPr>
-              <p:cNvPr id="120" name="Straight Connector 119">
-                <a:extLst>
-                  <a:ext uri="{FF2B5EF4-FFF2-40B4-BE49-F238E27FC236}">
-                    <a16:creationId xmlns:a16="http://schemas.microsoft.com/office/drawing/2014/main" id="{2A4A01EF-ED53-414E-82D9-4A5D0C70AEE8}"/>
-                  </a:ext>
-                </a:extLst>
-              </p:cNvPr>
-              <p:cNvCxnSpPr>
-                <a:cxnSpLocks/>
-              </p:cNvCxnSpPr>
-              <p:nvPr/>
-            </p:nvCxnSpPr>
-            <p:spPr>
-              <a:xfrm flipV="1">
-                <a:off x="3060681" y="6448543"/>
-                <a:ext cx="6182250" cy="7744"/>
-              </a:xfrm>
-              <a:prstGeom prst="line">
-                <a:avLst/>
-              </a:prstGeom>
-              <a:ln w="12700"/>
-            </p:spPr>
-            <p:style>
-              <a:lnRef idx="1">
-                <a:schemeClr val="dk1"/>
-              </a:lnRef>
-              <a:fillRef idx="0">
-                <a:schemeClr val="dk1"/>
-              </a:fillRef>
-              <a:effectRef idx="0">
-                <a:schemeClr val="dk1"/>
-              </a:effectRef>
-              <a:fontRef idx="minor">
-                <a:schemeClr val="tx1"/>
-              </a:fontRef>
-            </p:style>
-          </p:cxnSp>
-          <p:sp>
-            <p:nvSpPr>
-              <p:cNvPr id="121" name="TextBox 120">
-                <a:extLst>
-                  <a:ext uri="{FF2B5EF4-FFF2-40B4-BE49-F238E27FC236}">
-                    <a16:creationId xmlns:a16="http://schemas.microsoft.com/office/drawing/2014/main" id="{F81A6E6E-B7AA-4E41-B5E7-1BBA774DDA4D}"/>
-                  </a:ext>
-                </a:extLst>
-              </p:cNvPr>
-              <p:cNvSpPr txBox="1"/>
-              <p:nvPr/>
-            </p:nvSpPr>
-            <p:spPr>
-              <a:xfrm>
-                <a:off x="4779702" y="6022115"/>
-                <a:ext cx="2736785" cy="400110"/>
-              </a:xfrm>
-              <a:prstGeom prst="rect">
-                <a:avLst/>
-              </a:prstGeom>
-              <a:noFill/>
-            </p:spPr>
-            <p:txBody>
-              <a:bodyPr wrap="square" rtlCol="0">
-                <a:spAutoFit/>
-              </a:bodyPr>
-              <a:lstStyle/>
-              <a:p>
-                <a:r>
-                  <a:rPr lang="en-US" sz="2000" b="1" dirty="0"/>
-                  <a:t>Topology-analysis</a:t>
-                </a:r>
-                <a:r>
-                  <a:rPr lang="en-US" sz="2000" dirty="0"/>
-                  <a:t> Mode</a:t>
-                </a:r>
-              </a:p>
-            </p:txBody>
-          </p:sp>
-          <p:sp>
-            <p:nvSpPr>
-              <p:cNvPr id="122" name="TextBox 121">
-                <a:extLst>
-                  <a:ext uri="{FF2B5EF4-FFF2-40B4-BE49-F238E27FC236}">
-                    <a16:creationId xmlns:a16="http://schemas.microsoft.com/office/drawing/2014/main" id="{E8052125-96F3-4DD6-9B26-F24C17B21623}"/>
-                  </a:ext>
-                </a:extLst>
-              </p:cNvPr>
-              <p:cNvSpPr txBox="1"/>
-              <p:nvPr/>
-            </p:nvSpPr>
-            <p:spPr>
-              <a:xfrm>
-                <a:off x="3060681" y="6585616"/>
-                <a:ext cx="6182250" cy="369332"/>
-              </a:xfrm>
-              <a:prstGeom prst="rect">
-                <a:avLst/>
-              </a:prstGeom>
-              <a:noFill/>
-            </p:spPr>
-            <p:txBody>
-              <a:bodyPr wrap="square" rtlCol="0">
-                <a:spAutoFit/>
-              </a:bodyPr>
-              <a:lstStyle/>
-              <a:p>
-                <a:r>
-                  <a:rPr lang="en-US" dirty="0"/>
-                  <a:t>“ATM, BRCA1, EZH2 …” or “BIOCARTA_PROTEASOME_PATHWAY” </a:t>
-                </a:r>
-              </a:p>
-            </p:txBody>
-          </p:sp>
-          <p:cxnSp>
-            <p:nvCxnSpPr>
-              <p:cNvPr id="123" name="Straight Connector 122">
-                <a:extLst>
-                  <a:ext uri="{FF2B5EF4-FFF2-40B4-BE49-F238E27FC236}">
-                    <a16:creationId xmlns:a16="http://schemas.microsoft.com/office/drawing/2014/main" id="{BE4BC511-5D1F-4FB5-AB83-F4709C1B60CA}"/>
-                  </a:ext>
-                </a:extLst>
-              </p:cNvPr>
-              <p:cNvCxnSpPr>
-                <a:cxnSpLocks/>
-              </p:cNvCxnSpPr>
-              <p:nvPr/>
-            </p:nvCxnSpPr>
-            <p:spPr>
-              <a:xfrm flipV="1">
-                <a:off x="3006697" y="7028838"/>
-                <a:ext cx="6297194" cy="858"/>
-              </a:xfrm>
-              <a:prstGeom prst="line">
-                <a:avLst/>
-              </a:prstGeom>
-              <a:ln w="12700"/>
-            </p:spPr>
-            <p:style>
-              <a:lnRef idx="1">
-                <a:schemeClr val="dk1"/>
-              </a:lnRef>
-              <a:fillRef idx="0">
-                <a:schemeClr val="dk1"/>
-              </a:fillRef>
-              <a:effectRef idx="0">
-                <a:schemeClr val="dk1"/>
-              </a:effectRef>
-              <a:fontRef idx="minor">
-                <a:schemeClr val="tx1"/>
-              </a:fontRef>
-            </p:style>
-          </p:cxnSp>
-          <p:pic>
-            <p:nvPicPr>
-              <p:cNvPr id="124" name="Picture 123" descr="A picture containing sky&#10;&#10;Description automatically generated">
-                <a:extLst>
-                  <a:ext uri="{FF2B5EF4-FFF2-40B4-BE49-F238E27FC236}">
-                    <a16:creationId xmlns:a16="http://schemas.microsoft.com/office/drawing/2014/main" id="{09734B57-335B-41F2-B559-3FA6B6CA00A7}"/>
-                  </a:ext>
-                </a:extLst>
-              </p:cNvPr>
-              <p:cNvPicPr>
-                <a:picLocks noChangeAspect="1"/>
-              </p:cNvPicPr>
-              <p:nvPr/>
-            </p:nvPicPr>
-            <p:blipFill rotWithShape="1">
-              <a:blip r:embed="rId7">
-                <a:extLst>
-                  <a:ext uri="{28A0092B-C50C-407E-A947-70E740481C1C}">
-                    <a14:useLocalDpi xmlns:a14="http://schemas.microsoft.com/office/drawing/2010/main" val="0"/>
-                  </a:ext>
-                </a:extLst>
-              </a:blip>
-              <a:srcRect t="7780" r="10961"/>
-              <a:stretch/>
-            </p:blipFill>
-            <p:spPr>
-              <a:xfrm>
-                <a:off x="3147878" y="7215088"/>
-                <a:ext cx="1631824" cy="1309551"/>
-              </a:xfrm>
-              <a:prstGeom prst="rect">
-                <a:avLst/>
-              </a:prstGeom>
-            </p:spPr>
-          </p:pic>
-          <p:pic>
-            <p:nvPicPr>
-              <p:cNvPr id="125" name="Picture 124">
-                <a:extLst>
-                  <a:ext uri="{FF2B5EF4-FFF2-40B4-BE49-F238E27FC236}">
-                    <a16:creationId xmlns:a16="http://schemas.microsoft.com/office/drawing/2014/main" id="{6048A5EF-4F18-410A-9C7B-ED37181A9BB4}"/>
-                  </a:ext>
-                </a:extLst>
-              </p:cNvPr>
-              <p:cNvPicPr>
-                <a:picLocks noChangeAspect="1"/>
-              </p:cNvPicPr>
-              <p:nvPr/>
-            </p:nvPicPr>
-            <p:blipFill rotWithShape="1">
-              <a:blip r:embed="rId8">
-                <a:extLst>
-                  <a:ext uri="{28A0092B-C50C-407E-A947-70E740481C1C}">
-                    <a14:useLocalDpi xmlns:a14="http://schemas.microsoft.com/office/drawing/2010/main" val="0"/>
-                  </a:ext>
-                </a:extLst>
-              </a:blip>
-              <a:srcRect l="29040" r="9806"/>
-              <a:stretch/>
-            </p:blipFill>
-            <p:spPr>
-              <a:xfrm>
-                <a:off x="5198645" y="7212514"/>
-                <a:ext cx="1937849" cy="1306977"/>
-              </a:xfrm>
-              <a:prstGeom prst="rect">
-                <a:avLst/>
-              </a:prstGeom>
-            </p:spPr>
-          </p:pic>
-          <p:pic>
-            <p:nvPicPr>
-              <p:cNvPr id="126" name="Picture 125" descr="A screenshot of a cell phone&#10;&#10;Description automatically generated">
-                <a:extLst>
-                  <a:ext uri="{FF2B5EF4-FFF2-40B4-BE49-F238E27FC236}">
-                    <a16:creationId xmlns:a16="http://schemas.microsoft.com/office/drawing/2014/main" id="{8EDA3ABA-2427-466B-AEF6-6AFFAA1A5470}"/>
-                  </a:ext>
-                </a:extLst>
-              </p:cNvPr>
-              <p:cNvPicPr>
-                <a:picLocks noChangeAspect="1"/>
-              </p:cNvPicPr>
-              <p:nvPr/>
-            </p:nvPicPr>
-            <p:blipFill rotWithShape="1">
-              <a:blip r:embed="rId9">
-                <a:extLst>
-                  <a:ext uri="{28A0092B-C50C-407E-A947-70E740481C1C}">
-                    <a14:useLocalDpi xmlns:a14="http://schemas.microsoft.com/office/drawing/2010/main" val="0"/>
-                  </a:ext>
-                </a:extLst>
-              </a:blip>
-              <a:srcRect l="19237" t="4418" r="8189"/>
-              <a:stretch/>
-            </p:blipFill>
-            <p:spPr>
-              <a:xfrm>
-                <a:off x="7516487" y="7215088"/>
-                <a:ext cx="1654612" cy="1304403"/>
-              </a:xfrm>
-              <a:prstGeom prst="rect">
-                <a:avLst/>
-              </a:prstGeom>
-            </p:spPr>
-          </p:pic>
-        </p:grpSp>
-        <p:cxnSp>
-          <p:nvCxnSpPr>
-            <p:cNvPr id="141" name="Straight Arrow Connector 140">
+          </p:nvPicPr>
+          <p:blipFill rotWithShape="1">
+            <a:blip r:embed="rId8">
               <a:extLst>
-                <a:ext uri="{FF2B5EF4-FFF2-40B4-BE49-F238E27FC236}">
-                  <a16:creationId xmlns:a16="http://schemas.microsoft.com/office/drawing/2014/main" id="{4C7FDA43-B6EB-4D4D-9921-76DC5B0C73BA}"/>
+                <a:ext uri="{28A0092B-C50C-407E-A947-70E740481C1C}">
+                  <a14:useLocalDpi xmlns:a14="http://schemas.microsoft.com/office/drawing/2010/main" val="0"/>
                 </a:ext>
               </a:extLst>
-            </p:cNvPr>
-            <p:cNvCxnSpPr>
-              <a:stCxn id="6" idx="1"/>
-              <a:endCxn id="28" idx="3"/>
-            </p:cNvCxnSpPr>
-            <p:nvPr/>
-          </p:nvCxnSpPr>
+            </a:blip>
+            <a:srcRect l="19237" t="4418" r="8189"/>
+            <a:stretch/>
+          </p:blipFill>
           <p:spPr>
-            <a:xfrm flipH="1">
-              <a:off x="2157204" y="3808392"/>
-              <a:ext cx="1695788" cy="0"/>
+            <a:xfrm>
+              <a:off x="7516487" y="7215088"/>
+              <a:ext cx="1654612" cy="1304403"/>
             </a:xfrm>
-            <a:prstGeom prst="straightConnector1">
+            <a:prstGeom prst="rect">
               <a:avLst/>
             </a:prstGeom>
-            <a:ln w="28575">
-              <a:tailEnd type="triangle"/>
-            </a:ln>
           </p:spPr>
-          <p:style>
-            <a:lnRef idx="1">
-              <a:schemeClr val="dk1"/>
-            </a:lnRef>
-            <a:fillRef idx="0">
-              <a:schemeClr val="dk1"/>
-            </a:fillRef>
-            <a:effectRef idx="0">
-              <a:schemeClr val="dk1"/>
-            </a:effectRef>
-            <a:fontRef idx="minor">
-              <a:schemeClr val="tx1"/>
-            </a:fontRef>
-          </p:style>
-        </p:cxnSp>
-        <p:cxnSp>
-          <p:nvCxnSpPr>
-            <p:cNvPr id="143" name="Straight Arrow Connector 142">
-              <a:extLst>
-                <a:ext uri="{FF2B5EF4-FFF2-40B4-BE49-F238E27FC236}">
-                  <a16:creationId xmlns:a16="http://schemas.microsoft.com/office/drawing/2014/main" id="{10E7F4BB-579A-4C04-AD87-DEF0C7B39B76}"/>
-                </a:ext>
-              </a:extLst>
-            </p:cNvPr>
-            <p:cNvCxnSpPr>
-              <a:cxnSpLocks/>
-              <a:stCxn id="6" idx="3"/>
-              <a:endCxn id="32" idx="1"/>
-            </p:cNvCxnSpPr>
-            <p:nvPr/>
-          </p:nvCxnSpPr>
-          <p:spPr>
-            <a:xfrm flipV="1">
-              <a:off x="8339003" y="3803428"/>
-              <a:ext cx="1699936" cy="4964"/>
-            </a:xfrm>
-            <a:prstGeom prst="straightConnector1">
-              <a:avLst/>
-            </a:prstGeom>
-            <a:ln w="28575">
-              <a:tailEnd type="triangle"/>
-            </a:ln>
-          </p:spPr>
-          <p:style>
-            <a:lnRef idx="1">
-              <a:schemeClr val="dk1"/>
-            </a:lnRef>
-            <a:fillRef idx="0">
-              <a:schemeClr val="dk1"/>
-            </a:fillRef>
-            <a:effectRef idx="0">
-              <a:schemeClr val="dk1"/>
-            </a:effectRef>
-            <a:fontRef idx="minor">
-              <a:schemeClr val="tx1"/>
-            </a:fontRef>
-          </p:style>
-        </p:cxnSp>
+        </p:pic>
       </p:grpSp>
+      <p:cxnSp>
+        <p:nvCxnSpPr>
+          <p:cNvPr id="141" name="Straight Arrow Connector 140">
+            <a:extLst>
+              <a:ext uri="{FF2B5EF4-FFF2-40B4-BE49-F238E27FC236}">
+                <a16:creationId xmlns:a16="http://schemas.microsoft.com/office/drawing/2014/main" id="{4C7FDA43-B6EB-4D4D-9921-76DC5B0C73BA}"/>
+              </a:ext>
+            </a:extLst>
+          </p:cNvPr>
+          <p:cNvCxnSpPr>
+            <a:cxnSpLocks/>
+            <a:endCxn id="28" idx="3"/>
+          </p:cNvCxnSpPr>
+          <p:nvPr/>
+        </p:nvCxnSpPr>
+        <p:spPr>
+          <a:xfrm flipH="1">
+            <a:off x="2155132" y="3808392"/>
+            <a:ext cx="1695788" cy="0"/>
+          </a:xfrm>
+          <a:prstGeom prst="straightConnector1">
+            <a:avLst/>
+          </a:prstGeom>
+          <a:ln w="28575">
+            <a:tailEnd type="triangle"/>
+          </a:ln>
+        </p:spPr>
+        <p:style>
+          <a:lnRef idx="1">
+            <a:schemeClr val="dk1"/>
+          </a:lnRef>
+          <a:fillRef idx="0">
+            <a:schemeClr val="dk1"/>
+          </a:fillRef>
+          <a:effectRef idx="0">
+            <a:schemeClr val="dk1"/>
+          </a:effectRef>
+          <a:fontRef idx="minor">
+            <a:schemeClr val="tx1"/>
+          </a:fontRef>
+        </p:style>
+      </p:cxnSp>
+      <p:cxnSp>
+        <p:nvCxnSpPr>
+          <p:cNvPr id="143" name="Straight Arrow Connector 142">
+            <a:extLst>
+              <a:ext uri="{FF2B5EF4-FFF2-40B4-BE49-F238E27FC236}">
+                <a16:creationId xmlns:a16="http://schemas.microsoft.com/office/drawing/2014/main" id="{10E7F4BB-579A-4C04-AD87-DEF0C7B39B76}"/>
+              </a:ext>
+            </a:extLst>
+          </p:cNvPr>
+          <p:cNvCxnSpPr>
+            <a:cxnSpLocks/>
+            <a:endCxn id="32" idx="1"/>
+          </p:cNvCxnSpPr>
+          <p:nvPr/>
+        </p:nvCxnSpPr>
+        <p:spPr>
+          <a:xfrm flipV="1">
+            <a:off x="8336931" y="3803428"/>
+            <a:ext cx="1699936" cy="4964"/>
+          </a:xfrm>
+          <a:prstGeom prst="straightConnector1">
+            <a:avLst/>
+          </a:prstGeom>
+          <a:ln w="28575">
+            <a:tailEnd type="triangle"/>
+          </a:ln>
+        </p:spPr>
+        <p:style>
+          <a:lnRef idx="1">
+            <a:schemeClr val="dk1"/>
+          </a:lnRef>
+          <a:fillRef idx="0">
+            <a:schemeClr val="dk1"/>
+          </a:fillRef>
+          <a:effectRef idx="0">
+            <a:schemeClr val="dk1"/>
+          </a:effectRef>
+          <a:fontRef idx="minor">
+            <a:schemeClr val="tx1"/>
+          </a:fontRef>
+        </p:style>
+      </p:cxnSp>
+      <p:sp>
+        <p:nvSpPr>
+          <p:cNvPr id="24" name="Rectangle 23">
+            <a:extLst>
+              <a:ext uri="{FF2B5EF4-FFF2-40B4-BE49-F238E27FC236}">
+                <a16:creationId xmlns:a16="http://schemas.microsoft.com/office/drawing/2014/main" id="{8B8A8503-C7D6-4AB8-BFA4-EC3530DE4535}"/>
+              </a:ext>
+            </a:extLst>
+          </p:cNvPr>
+          <p:cNvSpPr/>
+          <p:nvPr/>
+        </p:nvSpPr>
+        <p:spPr>
+          <a:xfrm>
+            <a:off x="3850921" y="2438838"/>
+            <a:ext cx="4484598" cy="2741154"/>
+          </a:xfrm>
+          <a:prstGeom prst="rect">
+            <a:avLst/>
+          </a:prstGeom>
+          <a:solidFill>
+            <a:srgbClr val="1C0444"/>
+          </a:solidFill>
+          <a:effectLst>
+            <a:glow rad="101600">
+              <a:schemeClr val="accent2">
+                <a:satMod val="175000"/>
+                <a:alpha val="40000"/>
+              </a:schemeClr>
+            </a:glow>
+          </a:effectLst>
+        </p:spPr>
+        <p:style>
+          <a:lnRef idx="2">
+            <a:schemeClr val="accent1">
+              <a:shade val="50000"/>
+            </a:schemeClr>
+          </a:lnRef>
+          <a:fillRef idx="1">
+            <a:schemeClr val="accent1"/>
+          </a:fillRef>
+          <a:effectRef idx="0">
+            <a:schemeClr val="accent1"/>
+          </a:effectRef>
+          <a:fontRef idx="minor">
+            <a:schemeClr val="lt1"/>
+          </a:fontRef>
+        </p:style>
+        <p:txBody>
+          <a:bodyPr rtlCol="0" anchor="ctr"/>
+          <a:lstStyle/>
+          <a:p>
+            <a:pPr algn="ctr"/>
+            <a:endParaRPr lang="en-US" dirty="0"/>
+          </a:p>
+        </p:txBody>
+      </p:sp>
+      <p:sp>
+        <p:nvSpPr>
+          <p:cNvPr id="25" name="TextBox 24">
+            <a:extLst>
+              <a:ext uri="{FF2B5EF4-FFF2-40B4-BE49-F238E27FC236}">
+                <a16:creationId xmlns:a16="http://schemas.microsoft.com/office/drawing/2014/main" id="{FFAC7B7B-BBD1-454B-9E91-6B69B410BB4F}"/>
+              </a:ext>
+            </a:extLst>
+          </p:cNvPr>
+          <p:cNvSpPr txBox="1"/>
+          <p:nvPr/>
+        </p:nvSpPr>
+        <p:spPr>
+          <a:xfrm>
+            <a:off x="4056412" y="4601174"/>
+            <a:ext cx="4112389" cy="584775"/>
+          </a:xfrm>
+          <a:prstGeom prst="rect">
+            <a:avLst/>
+          </a:prstGeom>
+          <a:noFill/>
+        </p:spPr>
+        <p:txBody>
+          <a:bodyPr wrap="square" rtlCol="0">
+            <a:spAutoFit/>
+          </a:bodyPr>
+          <a:lstStyle/>
+          <a:p>
+            <a:r>
+              <a:rPr lang="en-US" sz="3200" dirty="0">
+                <a:solidFill>
+                  <a:schemeClr val="bg1"/>
+                </a:solidFill>
+                <a:latin typeface="Aharoni" panose="02010803020104030203" pitchFamily="2" charset="-79"/>
+                <a:cs typeface="Aharoni" panose="02010803020104030203" pitchFamily="2" charset="-79"/>
+              </a:rPr>
+              <a:t>correlationAnalyzeR</a:t>
+            </a:r>
+          </a:p>
+        </p:txBody>
+      </p:sp>
+      <p:pic>
+        <p:nvPicPr>
+          <p:cNvPr id="27" name="Picture 26">
+            <a:extLst>
+              <a:ext uri="{FF2B5EF4-FFF2-40B4-BE49-F238E27FC236}">
+                <a16:creationId xmlns:a16="http://schemas.microsoft.com/office/drawing/2014/main" id="{7FD2366A-2C5E-4AF2-9ABC-9D19026E60C1}"/>
+              </a:ext>
+            </a:extLst>
+          </p:cNvPr>
+          <p:cNvPicPr>
+            <a:picLocks noChangeAspect="1"/>
+          </p:cNvPicPr>
+          <p:nvPr/>
+        </p:nvPicPr>
+        <p:blipFill>
+          <a:blip r:embed="rId9">
+            <a:extLst>
+              <a:ext uri="{28A0092B-C50C-407E-A947-70E740481C1C}">
+                <a14:useLocalDpi xmlns:a14="http://schemas.microsoft.com/office/drawing/2010/main" val="0"/>
+              </a:ext>
+            </a:extLst>
+          </a:blip>
+          <a:stretch>
+            <a:fillRect/>
+          </a:stretch>
+        </p:blipFill>
+        <p:spPr>
+          <a:xfrm>
+            <a:off x="5051596" y="2531195"/>
+            <a:ext cx="2081382" cy="2081382"/>
+          </a:xfrm>
+          <a:prstGeom prst="rect">
+            <a:avLst/>
+          </a:prstGeom>
+        </p:spPr>
+      </p:pic>
     </p:spTree>
     <p:extLst>
       <p:ext uri="{BB962C8B-B14F-4D97-AF65-F5344CB8AC3E}">

</xml_diff>

<commit_message>
Added new analysis mode, tissue types -- updated documentation
Added a new Gene vs gene analysis mode and also re-calculated correlations by tissue type. Updated documentation to reflect these changes.
</commit_message>
<xml_diff>
--- a/www/Hero_on_homePage.pptx
+++ b/www/Hero_on_homePage.pptx
@@ -259,7 +259,7 @@
           <a:p>
             <a:fld id="{0B66EB57-E4FC-4CEF-AEF8-36005745810B}" type="datetimeFigureOut">
               <a:rPr lang="en-US" smtClean="0"/>
-              <a:t>9/23/2019</a:t>
+              <a:t>10/7/2019</a:t>
             </a:fld>
             <a:endParaRPr lang="en-US"/>
           </a:p>
@@ -457,7 +457,7 @@
           <a:p>
             <a:fld id="{0B66EB57-E4FC-4CEF-AEF8-36005745810B}" type="datetimeFigureOut">
               <a:rPr lang="en-US" smtClean="0"/>
-              <a:t>9/23/2019</a:t>
+              <a:t>10/7/2019</a:t>
             </a:fld>
             <a:endParaRPr lang="en-US"/>
           </a:p>
@@ -665,7 +665,7 @@
           <a:p>
             <a:fld id="{0B66EB57-E4FC-4CEF-AEF8-36005745810B}" type="datetimeFigureOut">
               <a:rPr lang="en-US" smtClean="0"/>
-              <a:t>9/23/2019</a:t>
+              <a:t>10/7/2019</a:t>
             </a:fld>
             <a:endParaRPr lang="en-US"/>
           </a:p>
@@ -863,7 +863,7 @@
           <a:p>
             <a:fld id="{0B66EB57-E4FC-4CEF-AEF8-36005745810B}" type="datetimeFigureOut">
               <a:rPr lang="en-US" smtClean="0"/>
-              <a:t>9/23/2019</a:t>
+              <a:t>10/7/2019</a:t>
             </a:fld>
             <a:endParaRPr lang="en-US"/>
           </a:p>
@@ -1138,7 +1138,7 @@
           <a:p>
             <a:fld id="{0B66EB57-E4FC-4CEF-AEF8-36005745810B}" type="datetimeFigureOut">
               <a:rPr lang="en-US" smtClean="0"/>
-              <a:t>9/23/2019</a:t>
+              <a:t>10/7/2019</a:t>
             </a:fld>
             <a:endParaRPr lang="en-US"/>
           </a:p>
@@ -1403,7 +1403,7 @@
           <a:p>
             <a:fld id="{0B66EB57-E4FC-4CEF-AEF8-36005745810B}" type="datetimeFigureOut">
               <a:rPr lang="en-US" smtClean="0"/>
-              <a:t>9/23/2019</a:t>
+              <a:t>10/7/2019</a:t>
             </a:fld>
             <a:endParaRPr lang="en-US"/>
           </a:p>
@@ -1815,7 +1815,7 @@
           <a:p>
             <a:fld id="{0B66EB57-E4FC-4CEF-AEF8-36005745810B}" type="datetimeFigureOut">
               <a:rPr lang="en-US" smtClean="0"/>
-              <a:t>9/23/2019</a:t>
+              <a:t>10/7/2019</a:t>
             </a:fld>
             <a:endParaRPr lang="en-US"/>
           </a:p>
@@ -1956,7 +1956,7 @@
           <a:p>
             <a:fld id="{0B66EB57-E4FC-4CEF-AEF8-36005745810B}" type="datetimeFigureOut">
               <a:rPr lang="en-US" smtClean="0"/>
-              <a:t>9/23/2019</a:t>
+              <a:t>10/7/2019</a:t>
             </a:fld>
             <a:endParaRPr lang="en-US"/>
           </a:p>
@@ -2069,7 +2069,7 @@
           <a:p>
             <a:fld id="{0B66EB57-E4FC-4CEF-AEF8-36005745810B}" type="datetimeFigureOut">
               <a:rPr lang="en-US" smtClean="0"/>
-              <a:t>9/23/2019</a:t>
+              <a:t>10/7/2019</a:t>
             </a:fld>
             <a:endParaRPr lang="en-US"/>
           </a:p>
@@ -2380,7 +2380,7 @@
           <a:p>
             <a:fld id="{0B66EB57-E4FC-4CEF-AEF8-36005745810B}" type="datetimeFigureOut">
               <a:rPr lang="en-US" smtClean="0"/>
-              <a:t>9/23/2019</a:t>
+              <a:t>10/7/2019</a:t>
             </a:fld>
             <a:endParaRPr lang="en-US"/>
           </a:p>
@@ -2668,7 +2668,7 @@
           <a:p>
             <a:fld id="{0B66EB57-E4FC-4CEF-AEF8-36005745810B}" type="datetimeFigureOut">
               <a:rPr lang="en-US" smtClean="0"/>
-              <a:t>9/23/2019</a:t>
+              <a:t>10/7/2019</a:t>
             </a:fld>
             <a:endParaRPr lang="en-US"/>
           </a:p>
@@ -2909,7 +2909,7 @@
           <a:p>
             <a:fld id="{0B66EB57-E4FC-4CEF-AEF8-36005745810B}" type="datetimeFigureOut">
               <a:rPr lang="en-US" smtClean="0"/>
-              <a:t>9/23/2019</a:t>
+              <a:t>10/7/2019</a:t>
             </a:fld>
             <a:endParaRPr lang="en-US"/>
           </a:p>
@@ -3326,732 +3326,12 @@
           <a:chExt cx="0" cy="0"/>
         </a:xfrm>
       </p:grpSpPr>
-      <p:cxnSp>
-        <p:nvCxnSpPr>
-          <p:cNvPr id="8" name="Straight Arrow Connector 7">
-            <a:extLst>
-              <a:ext uri="{FF2B5EF4-FFF2-40B4-BE49-F238E27FC236}">
-                <a16:creationId xmlns:a16="http://schemas.microsoft.com/office/drawing/2014/main" id="{41C29615-13E1-45F2-9E33-5A8651D4AB19}"/>
-              </a:ext>
-            </a:extLst>
-          </p:cNvPr>
-          <p:cNvCxnSpPr>
-            <a:cxnSpLocks/>
-            <a:stCxn id="4" idx="2"/>
-            <a:endCxn id="10" idx="0"/>
-          </p:cNvCxnSpPr>
-          <p:nvPr/>
-        </p:nvCxnSpPr>
-        <p:spPr>
-          <a:xfrm>
-            <a:off x="6099487" y="609512"/>
-            <a:ext cx="0" cy="495513"/>
-          </a:xfrm>
-          <a:prstGeom prst="straightConnector1">
-            <a:avLst/>
-          </a:prstGeom>
-          <a:ln w="28575">
-            <a:tailEnd type="triangle"/>
-          </a:ln>
-        </p:spPr>
-        <p:style>
-          <a:lnRef idx="1">
-            <a:schemeClr val="dk1"/>
-          </a:lnRef>
-          <a:fillRef idx="0">
-            <a:schemeClr val="dk1"/>
-          </a:fillRef>
-          <a:effectRef idx="0">
-            <a:schemeClr val="dk1"/>
-          </a:effectRef>
-          <a:fontRef idx="minor">
-            <a:schemeClr val="tx1"/>
-          </a:fontRef>
-        </p:style>
-      </p:cxnSp>
-      <p:sp>
-        <p:nvSpPr>
-          <p:cNvPr id="10" name="Rectangle: Rounded Corners 9">
-            <a:extLst>
-              <a:ext uri="{FF2B5EF4-FFF2-40B4-BE49-F238E27FC236}">
-                <a16:creationId xmlns:a16="http://schemas.microsoft.com/office/drawing/2014/main" id="{097F538F-5F11-40F0-BE65-BA32CACB977D}"/>
-              </a:ext>
-            </a:extLst>
-          </p:cNvPr>
-          <p:cNvSpPr/>
-          <p:nvPr/>
-        </p:nvSpPr>
-        <p:spPr>
-          <a:xfrm>
-            <a:off x="5142838" y="1105025"/>
-            <a:ext cx="1913298" cy="736847"/>
-          </a:xfrm>
-          <a:prstGeom prst="roundRect">
-            <a:avLst/>
-          </a:prstGeom>
-          <a:noFill/>
-          <a:ln w="28575">
-            <a:solidFill>
-              <a:schemeClr val="tx1"/>
-            </a:solidFill>
-          </a:ln>
-        </p:spPr>
-        <p:style>
-          <a:lnRef idx="2">
-            <a:schemeClr val="accent1">
-              <a:shade val="50000"/>
-            </a:schemeClr>
-          </a:lnRef>
-          <a:fillRef idx="1">
-            <a:schemeClr val="accent1"/>
-          </a:fillRef>
-          <a:effectRef idx="0">
-            <a:schemeClr val="accent1"/>
-          </a:effectRef>
-          <a:fontRef idx="minor">
-            <a:schemeClr val="lt1"/>
-          </a:fontRef>
-        </p:style>
-        <p:txBody>
-          <a:bodyPr rtlCol="0" anchor="ctr"/>
-          <a:lstStyle/>
-          <a:p>
-            <a:pPr algn="ctr"/>
-            <a:r>
-              <a:rPr lang="en-US" dirty="0">
-                <a:solidFill>
-                  <a:schemeClr val="tx1"/>
-                </a:solidFill>
-              </a:rPr>
-              <a:t>Gene expression correlations</a:t>
-            </a:r>
-          </a:p>
-        </p:txBody>
-      </p:sp>
-      <p:cxnSp>
-        <p:nvCxnSpPr>
-          <p:cNvPr id="15" name="Straight Arrow Connector 14">
-            <a:extLst>
-              <a:ext uri="{FF2B5EF4-FFF2-40B4-BE49-F238E27FC236}">
-                <a16:creationId xmlns:a16="http://schemas.microsoft.com/office/drawing/2014/main" id="{77530A88-D50C-41F3-9643-1E5AE60BE674}"/>
-              </a:ext>
-            </a:extLst>
-          </p:cNvPr>
-          <p:cNvCxnSpPr>
-            <a:cxnSpLocks/>
-            <a:stCxn id="10" idx="2"/>
-          </p:cNvCxnSpPr>
-          <p:nvPr/>
-        </p:nvCxnSpPr>
-        <p:spPr>
-          <a:xfrm flipH="1">
-            <a:off x="6093926" y="1841872"/>
-            <a:ext cx="5561" cy="594920"/>
-          </a:xfrm>
-          <a:prstGeom prst="straightConnector1">
-            <a:avLst/>
-          </a:prstGeom>
-          <a:ln w="28575">
-            <a:tailEnd type="triangle"/>
-          </a:ln>
-        </p:spPr>
-        <p:style>
-          <a:lnRef idx="1">
-            <a:schemeClr val="dk1"/>
-          </a:lnRef>
-          <a:fillRef idx="0">
-            <a:schemeClr val="dk1"/>
-          </a:fillRef>
-          <a:effectRef idx="0">
-            <a:schemeClr val="dk1"/>
-          </a:effectRef>
-          <a:fontRef idx="minor">
-            <a:schemeClr val="tx1"/>
-          </a:fontRef>
-        </p:style>
-      </p:cxnSp>
-      <p:cxnSp>
-        <p:nvCxnSpPr>
-          <p:cNvPr id="23" name="Straight Arrow Connector 22">
-            <a:extLst>
-              <a:ext uri="{FF2B5EF4-FFF2-40B4-BE49-F238E27FC236}">
-                <a16:creationId xmlns:a16="http://schemas.microsoft.com/office/drawing/2014/main" id="{AFEA8FD7-C58C-4CCD-81ED-CA12DF5BFECE}"/>
-              </a:ext>
-            </a:extLst>
-          </p:cNvPr>
-          <p:cNvCxnSpPr>
-            <a:cxnSpLocks/>
-            <a:endCxn id="119" idx="0"/>
-          </p:cNvCxnSpPr>
-          <p:nvPr/>
-        </p:nvCxnSpPr>
-        <p:spPr>
-          <a:xfrm>
-            <a:off x="6093926" y="5179992"/>
-            <a:ext cx="2073" cy="532732"/>
-          </a:xfrm>
-          <a:prstGeom prst="straightConnector1">
-            <a:avLst/>
-          </a:prstGeom>
-          <a:ln w="28575">
-            <a:tailEnd type="triangle"/>
-          </a:ln>
-        </p:spPr>
-        <p:style>
-          <a:lnRef idx="1">
-            <a:schemeClr val="dk1"/>
-          </a:lnRef>
-          <a:fillRef idx="0">
-            <a:schemeClr val="dk1"/>
-          </a:fillRef>
-          <a:effectRef idx="0">
-            <a:schemeClr val="dk1"/>
-          </a:effectRef>
-          <a:fontRef idx="minor">
-            <a:schemeClr val="tx1"/>
-          </a:fontRef>
-        </p:style>
-      </p:cxnSp>
-      <p:sp>
-        <p:nvSpPr>
-          <p:cNvPr id="28" name="Rectangle: Rounded Corners 27">
-            <a:extLst>
-              <a:ext uri="{FF2B5EF4-FFF2-40B4-BE49-F238E27FC236}">
-                <a16:creationId xmlns:a16="http://schemas.microsoft.com/office/drawing/2014/main" id="{07354014-32DB-4978-872F-6CDEEBFF7A60}"/>
-              </a:ext>
-            </a:extLst>
-          </p:cNvPr>
-          <p:cNvSpPr/>
-          <p:nvPr/>
-        </p:nvSpPr>
-        <p:spPr>
-          <a:xfrm>
-            <a:off x="-1184180" y="1725768"/>
-            <a:ext cx="3339312" cy="4165247"/>
-          </a:xfrm>
-          <a:prstGeom prst="roundRect">
-            <a:avLst/>
-          </a:prstGeom>
-          <a:noFill/>
-          <a:ln w="28575">
-            <a:solidFill>
-              <a:schemeClr val="tx1"/>
-            </a:solidFill>
-          </a:ln>
-        </p:spPr>
-        <p:style>
-          <a:lnRef idx="2">
-            <a:schemeClr val="accent1">
-              <a:shade val="50000"/>
-            </a:schemeClr>
-          </a:lnRef>
-          <a:fillRef idx="1">
-            <a:schemeClr val="accent1"/>
-          </a:fillRef>
-          <a:effectRef idx="0">
-            <a:schemeClr val="accent1"/>
-          </a:effectRef>
-          <a:fontRef idx="minor">
-            <a:schemeClr val="lt1"/>
-          </a:fontRef>
-        </p:style>
-        <p:txBody>
-          <a:bodyPr rtlCol="0" anchor="ctr"/>
-          <a:lstStyle/>
-          <a:p>
-            <a:pPr algn="ctr"/>
-            <a:endParaRPr lang="en-US"/>
-          </a:p>
-        </p:txBody>
-      </p:sp>
-      <p:sp>
-        <p:nvSpPr>
-          <p:cNvPr id="32" name="Rectangle: Rounded Corners 31">
-            <a:extLst>
-              <a:ext uri="{FF2B5EF4-FFF2-40B4-BE49-F238E27FC236}">
-                <a16:creationId xmlns:a16="http://schemas.microsoft.com/office/drawing/2014/main" id="{52530A37-D41A-4114-BE72-6B2AFD3136B4}"/>
-              </a:ext>
-            </a:extLst>
-          </p:cNvPr>
-          <p:cNvSpPr/>
-          <p:nvPr/>
-        </p:nvSpPr>
-        <p:spPr>
-          <a:xfrm>
-            <a:off x="10036867" y="1720807"/>
-            <a:ext cx="3339312" cy="4165241"/>
-          </a:xfrm>
-          <a:prstGeom prst="roundRect">
-            <a:avLst/>
-          </a:prstGeom>
-          <a:noFill/>
-          <a:ln w="28575">
-            <a:solidFill>
-              <a:schemeClr val="tx1"/>
-            </a:solidFill>
-          </a:ln>
-        </p:spPr>
-        <p:style>
-          <a:lnRef idx="2">
-            <a:schemeClr val="accent1">
-              <a:shade val="50000"/>
-            </a:schemeClr>
-          </a:lnRef>
-          <a:fillRef idx="1">
-            <a:schemeClr val="accent1"/>
-          </a:fillRef>
-          <a:effectRef idx="0">
-            <a:schemeClr val="accent1"/>
-          </a:effectRef>
-          <a:fontRef idx="minor">
-            <a:schemeClr val="lt1"/>
-          </a:fontRef>
-        </p:style>
-        <p:txBody>
-          <a:bodyPr rtlCol="0" anchor="ctr"/>
-          <a:lstStyle/>
-          <a:p>
-            <a:pPr algn="ctr"/>
-            <a:endParaRPr lang="en-US"/>
-          </a:p>
-        </p:txBody>
-      </p:sp>
-      <p:cxnSp>
-        <p:nvCxnSpPr>
-          <p:cNvPr id="43" name="Straight Connector 42">
-            <a:extLst>
-              <a:ext uri="{FF2B5EF4-FFF2-40B4-BE49-F238E27FC236}">
-                <a16:creationId xmlns:a16="http://schemas.microsoft.com/office/drawing/2014/main" id="{96296160-98C9-4054-8003-D859487DBB78}"/>
-              </a:ext>
-            </a:extLst>
-          </p:cNvPr>
-          <p:cNvCxnSpPr/>
-          <p:nvPr/>
-        </p:nvCxnSpPr>
-        <p:spPr>
-          <a:xfrm>
-            <a:off x="-1184180" y="2213142"/>
-            <a:ext cx="3339312" cy="0"/>
-          </a:xfrm>
-          <a:prstGeom prst="line">
-            <a:avLst/>
-          </a:prstGeom>
-          <a:ln w="12700"/>
-        </p:spPr>
-        <p:style>
-          <a:lnRef idx="1">
-            <a:schemeClr val="dk1"/>
-          </a:lnRef>
-          <a:fillRef idx="0">
-            <a:schemeClr val="dk1"/>
-          </a:fillRef>
-          <a:effectRef idx="0">
-            <a:schemeClr val="dk1"/>
-          </a:effectRef>
-          <a:fontRef idx="minor">
-            <a:schemeClr val="tx1"/>
-          </a:fontRef>
-        </p:style>
-      </p:cxnSp>
-      <p:cxnSp>
-        <p:nvCxnSpPr>
-          <p:cNvPr id="44" name="Straight Connector 43">
-            <a:extLst>
-              <a:ext uri="{FF2B5EF4-FFF2-40B4-BE49-F238E27FC236}">
-                <a16:creationId xmlns:a16="http://schemas.microsoft.com/office/drawing/2014/main" id="{DAC4CAA4-BA1C-407F-A99F-8925455C3224}"/>
-              </a:ext>
-            </a:extLst>
-          </p:cNvPr>
-          <p:cNvCxnSpPr/>
-          <p:nvPr/>
-        </p:nvCxnSpPr>
-        <p:spPr>
-          <a:xfrm>
-            <a:off x="10035229" y="2212504"/>
-            <a:ext cx="3339312" cy="0"/>
-          </a:xfrm>
-          <a:prstGeom prst="line">
-            <a:avLst/>
-          </a:prstGeom>
-          <a:ln w="12700"/>
-        </p:spPr>
-        <p:style>
-          <a:lnRef idx="1">
-            <a:schemeClr val="dk1"/>
-          </a:lnRef>
-          <a:fillRef idx="0">
-            <a:schemeClr val="dk1"/>
-          </a:fillRef>
-          <a:effectRef idx="0">
-            <a:schemeClr val="dk1"/>
-          </a:effectRef>
-          <a:fontRef idx="minor">
-            <a:schemeClr val="tx1"/>
-          </a:fontRef>
-        </p:style>
-      </p:cxnSp>
-      <p:sp>
-        <p:nvSpPr>
-          <p:cNvPr id="48" name="TextBox 47">
-            <a:extLst>
-              <a:ext uri="{FF2B5EF4-FFF2-40B4-BE49-F238E27FC236}">
-                <a16:creationId xmlns:a16="http://schemas.microsoft.com/office/drawing/2014/main" id="{4007DBBC-9244-4FF3-BE56-B1429424E3F9}"/>
-              </a:ext>
-            </a:extLst>
-          </p:cNvPr>
-          <p:cNvSpPr txBox="1"/>
-          <p:nvPr/>
-        </p:nvSpPr>
-        <p:spPr>
-          <a:xfrm>
-            <a:off x="-760891" y="1792787"/>
-            <a:ext cx="2480940" cy="369332"/>
-          </a:xfrm>
-          <a:prstGeom prst="rect">
-            <a:avLst/>
-          </a:prstGeom>
-          <a:noFill/>
-        </p:spPr>
-        <p:txBody>
-          <a:bodyPr wrap="square" rtlCol="0">
-            <a:spAutoFit/>
-          </a:bodyPr>
-          <a:lstStyle/>
-          <a:p>
-            <a:r>
-              <a:rPr lang="en-US" dirty="0"/>
-              <a:t>Single-analysis Mode</a:t>
-            </a:r>
-          </a:p>
-        </p:txBody>
-      </p:sp>
-      <p:sp>
-        <p:nvSpPr>
-          <p:cNvPr id="49" name="TextBox 48">
-            <a:extLst>
-              <a:ext uri="{FF2B5EF4-FFF2-40B4-BE49-F238E27FC236}">
-                <a16:creationId xmlns:a16="http://schemas.microsoft.com/office/drawing/2014/main" id="{1F58AE3C-8878-49CB-B0F7-9481EA11FF2F}"/>
-              </a:ext>
-            </a:extLst>
-          </p:cNvPr>
-          <p:cNvSpPr txBox="1"/>
-          <p:nvPr/>
-        </p:nvSpPr>
-        <p:spPr>
-          <a:xfrm>
-            <a:off x="10446893" y="1792787"/>
-            <a:ext cx="2472954" cy="369332"/>
-          </a:xfrm>
-          <a:prstGeom prst="rect">
-            <a:avLst/>
-          </a:prstGeom>
-          <a:noFill/>
-        </p:spPr>
-        <p:txBody>
-          <a:bodyPr wrap="square" rtlCol="0">
-            <a:spAutoFit/>
-          </a:bodyPr>
-          <a:lstStyle/>
-          <a:p>
-            <a:r>
-              <a:rPr lang="en-US" dirty="0"/>
-              <a:t>Paired-analysis Mode</a:t>
-            </a:r>
-          </a:p>
-        </p:txBody>
-      </p:sp>
-      <p:sp>
-        <p:nvSpPr>
-          <p:cNvPr id="51" name="TextBox 50">
-            <a:extLst>
-              <a:ext uri="{FF2B5EF4-FFF2-40B4-BE49-F238E27FC236}">
-                <a16:creationId xmlns:a16="http://schemas.microsoft.com/office/drawing/2014/main" id="{EA3F0FF7-CE32-46C4-98B0-D96DC18DB9EB}"/>
-              </a:ext>
-            </a:extLst>
-          </p:cNvPr>
-          <p:cNvSpPr txBox="1"/>
-          <p:nvPr/>
-        </p:nvSpPr>
-        <p:spPr>
-          <a:xfrm>
-            <a:off x="-1064325" y="2216145"/>
-            <a:ext cx="782074" cy="369332"/>
-          </a:xfrm>
-          <a:prstGeom prst="rect">
-            <a:avLst/>
-          </a:prstGeom>
-          <a:noFill/>
-        </p:spPr>
-        <p:txBody>
-          <a:bodyPr wrap="none" rtlCol="0">
-            <a:spAutoFit/>
-          </a:bodyPr>
-          <a:lstStyle/>
-          <a:p>
-            <a:r>
-              <a:rPr lang="en-US" dirty="0"/>
-              <a:t>“ATM”</a:t>
-            </a:r>
-          </a:p>
-        </p:txBody>
-      </p:sp>
-      <p:sp>
-        <p:nvSpPr>
-          <p:cNvPr id="53" name="TextBox 52">
-            <a:extLst>
-              <a:ext uri="{FF2B5EF4-FFF2-40B4-BE49-F238E27FC236}">
-                <a16:creationId xmlns:a16="http://schemas.microsoft.com/office/drawing/2014/main" id="{67B27EC5-3306-4370-AB52-0DD37A5328F2}"/>
-              </a:ext>
-            </a:extLst>
-          </p:cNvPr>
-          <p:cNvSpPr txBox="1"/>
-          <p:nvPr/>
-        </p:nvSpPr>
-        <p:spPr>
-          <a:xfrm>
-            <a:off x="10219425" y="2212504"/>
-            <a:ext cx="2645340" cy="369332"/>
-          </a:xfrm>
-          <a:prstGeom prst="rect">
-            <a:avLst/>
-          </a:prstGeom>
-          <a:noFill/>
-        </p:spPr>
-        <p:txBody>
-          <a:bodyPr wrap="none" rtlCol="0">
-            <a:spAutoFit/>
-          </a:bodyPr>
-          <a:lstStyle/>
-          <a:p>
-            <a:r>
-              <a:rPr lang="en-US" dirty="0"/>
-              <a:t>“ATM vs (BRCA1, EZH2 …)”</a:t>
-            </a:r>
-          </a:p>
-        </p:txBody>
-      </p:sp>
-      <p:cxnSp>
-        <p:nvCxnSpPr>
-          <p:cNvPr id="55" name="Straight Connector 54">
-            <a:extLst>
-              <a:ext uri="{FF2B5EF4-FFF2-40B4-BE49-F238E27FC236}">
-                <a16:creationId xmlns:a16="http://schemas.microsoft.com/office/drawing/2014/main" id="{1772C2ED-8084-4D96-8A9F-05E1323D9C60}"/>
-              </a:ext>
-            </a:extLst>
-          </p:cNvPr>
-          <p:cNvCxnSpPr/>
-          <p:nvPr/>
-        </p:nvCxnSpPr>
-        <p:spPr>
-          <a:xfrm>
-            <a:off x="-1184180" y="2581836"/>
-            <a:ext cx="3339312" cy="0"/>
-          </a:xfrm>
-          <a:prstGeom prst="line">
-            <a:avLst/>
-          </a:prstGeom>
-          <a:ln w="12700"/>
-        </p:spPr>
-        <p:style>
-          <a:lnRef idx="1">
-            <a:schemeClr val="dk1"/>
-          </a:lnRef>
-          <a:fillRef idx="0">
-            <a:schemeClr val="dk1"/>
-          </a:fillRef>
-          <a:effectRef idx="0">
-            <a:schemeClr val="dk1"/>
-          </a:effectRef>
-          <a:fontRef idx="minor">
-            <a:schemeClr val="tx1"/>
-          </a:fontRef>
-        </p:style>
-      </p:cxnSp>
-      <p:cxnSp>
-        <p:nvCxnSpPr>
-          <p:cNvPr id="56" name="Straight Connector 55">
-            <a:extLst>
-              <a:ext uri="{FF2B5EF4-FFF2-40B4-BE49-F238E27FC236}">
-                <a16:creationId xmlns:a16="http://schemas.microsoft.com/office/drawing/2014/main" id="{9FDA19AA-F31F-4E5E-97E2-A0B418F800EB}"/>
-              </a:ext>
-            </a:extLst>
-          </p:cNvPr>
-          <p:cNvCxnSpPr/>
-          <p:nvPr/>
-        </p:nvCxnSpPr>
-        <p:spPr>
-          <a:xfrm>
-            <a:off x="10013714" y="2581836"/>
-            <a:ext cx="3339312" cy="0"/>
-          </a:xfrm>
-          <a:prstGeom prst="line">
-            <a:avLst/>
-          </a:prstGeom>
-          <a:ln w="12700"/>
-        </p:spPr>
-        <p:style>
-          <a:lnRef idx="1">
-            <a:schemeClr val="dk1"/>
-          </a:lnRef>
-          <a:fillRef idx="0">
-            <a:schemeClr val="dk1"/>
-          </a:fillRef>
-          <a:effectRef idx="0">
-            <a:schemeClr val="dk1"/>
-          </a:effectRef>
-          <a:fontRef idx="minor">
-            <a:schemeClr val="tx1"/>
-          </a:fontRef>
-        </p:style>
-      </p:cxnSp>
-      <p:pic>
-        <p:nvPicPr>
-          <p:cNvPr id="68" name="Picture 67" descr="A screenshot of a cell phone&#10;&#10;Description automatically generated">
-            <a:extLst>
-              <a:ext uri="{FF2B5EF4-FFF2-40B4-BE49-F238E27FC236}">
-                <a16:creationId xmlns:a16="http://schemas.microsoft.com/office/drawing/2014/main" id="{DE1E1F68-FA16-4936-BDD3-CD02071F1F4A}"/>
-              </a:ext>
-            </a:extLst>
-          </p:cNvPr>
-          <p:cNvPicPr>
-            <a:picLocks noChangeAspect="1"/>
-          </p:cNvPicPr>
-          <p:nvPr/>
-        </p:nvPicPr>
-        <p:blipFill rotWithShape="1">
-          <a:blip r:embed="rId2">
-            <a:extLst>
-              <a:ext uri="{28A0092B-C50C-407E-A947-70E740481C1C}">
-                <a14:useLocalDpi xmlns:a14="http://schemas.microsoft.com/office/drawing/2010/main" val="0"/>
-              </a:ext>
-            </a:extLst>
-          </a:blip>
-          <a:srcRect l="198" t="11598" b="5657"/>
-          <a:stretch/>
-        </p:blipFill>
-        <p:spPr>
-          <a:xfrm>
-            <a:off x="-667872" y="2759995"/>
-            <a:ext cx="2292442" cy="1221839"/>
-          </a:xfrm>
-          <a:prstGeom prst="rect">
-            <a:avLst/>
-          </a:prstGeom>
-        </p:spPr>
-      </p:pic>
-      <p:pic>
-        <p:nvPicPr>
-          <p:cNvPr id="70" name="Picture 69" descr="A close up of a map&#10;&#10;Description automatically generated">
-            <a:extLst>
-              <a:ext uri="{FF2B5EF4-FFF2-40B4-BE49-F238E27FC236}">
-                <a16:creationId xmlns:a16="http://schemas.microsoft.com/office/drawing/2014/main" id="{B978C344-8383-4747-8CDD-60C5C1780435}"/>
-              </a:ext>
-            </a:extLst>
-          </p:cNvPr>
-          <p:cNvPicPr>
-            <a:picLocks noChangeAspect="1"/>
-          </p:cNvPicPr>
-          <p:nvPr/>
-        </p:nvPicPr>
-        <p:blipFill>
-          <a:blip r:embed="rId3">
-            <a:extLst>
-              <a:ext uri="{28A0092B-C50C-407E-A947-70E740481C1C}">
-                <a14:useLocalDpi xmlns:a14="http://schemas.microsoft.com/office/drawing/2010/main" val="0"/>
-              </a:ext>
-            </a:extLst>
-          </a:blip>
-          <a:stretch>
-            <a:fillRect/>
-          </a:stretch>
-        </p:blipFill>
-        <p:spPr>
-          <a:xfrm>
-            <a:off x="-676397" y="4123434"/>
-            <a:ext cx="2300967" cy="1660519"/>
-          </a:xfrm>
-          <a:prstGeom prst="rect">
-            <a:avLst/>
-          </a:prstGeom>
-        </p:spPr>
-      </p:pic>
-      <p:pic>
-        <p:nvPicPr>
-          <p:cNvPr id="72" name="Picture 71" descr="A close up of a map&#10;&#10;Description automatically generated">
-            <a:extLst>
-              <a:ext uri="{FF2B5EF4-FFF2-40B4-BE49-F238E27FC236}">
-                <a16:creationId xmlns:a16="http://schemas.microsoft.com/office/drawing/2014/main" id="{5318A1B7-4683-4AAC-BF89-5398519E9A8E}"/>
-              </a:ext>
-            </a:extLst>
-          </p:cNvPr>
-          <p:cNvPicPr>
-            <a:picLocks noChangeAspect="1"/>
-          </p:cNvPicPr>
-          <p:nvPr/>
-        </p:nvPicPr>
-        <p:blipFill>
-          <a:blip r:embed="rId4">
-            <a:extLst>
-              <a:ext uri="{28A0092B-C50C-407E-A947-70E740481C1C}">
-                <a14:useLocalDpi xmlns:a14="http://schemas.microsoft.com/office/drawing/2010/main" val="0"/>
-              </a:ext>
-            </a:extLst>
-          </a:blip>
-          <a:stretch>
-            <a:fillRect/>
-          </a:stretch>
-        </p:blipFill>
-        <p:spPr>
-          <a:xfrm>
-            <a:off x="10493199" y="2789634"/>
-            <a:ext cx="2426648" cy="1192200"/>
-          </a:xfrm>
-          <a:prstGeom prst="rect">
-            <a:avLst/>
-          </a:prstGeom>
-        </p:spPr>
-      </p:pic>
-      <p:pic>
-        <p:nvPicPr>
-          <p:cNvPr id="79" name="Picture 78">
-            <a:extLst>
-              <a:ext uri="{FF2B5EF4-FFF2-40B4-BE49-F238E27FC236}">
-                <a16:creationId xmlns:a16="http://schemas.microsoft.com/office/drawing/2014/main" id="{9ED66A87-70CA-4B25-90D4-CDCA557F69DC}"/>
-              </a:ext>
-            </a:extLst>
-          </p:cNvPr>
-          <p:cNvPicPr>
-            <a:picLocks noChangeAspect="1"/>
-          </p:cNvPicPr>
-          <p:nvPr/>
-        </p:nvPicPr>
-        <p:blipFill rotWithShape="1">
-          <a:blip r:embed="rId5">
-            <a:extLst>
-              <a:ext uri="{28A0092B-C50C-407E-A947-70E740481C1C}">
-                <a14:useLocalDpi xmlns:a14="http://schemas.microsoft.com/office/drawing/2010/main" val="0"/>
-              </a:ext>
-            </a:extLst>
-          </a:blip>
-          <a:srcRect l="59287" t="6769" r="-85" b="10603"/>
-          <a:stretch/>
-        </p:blipFill>
-        <p:spPr>
-          <a:xfrm>
-            <a:off x="10493199" y="4189631"/>
-            <a:ext cx="2426648" cy="1469597"/>
-          </a:xfrm>
-          <a:prstGeom prst="rect">
-            <a:avLst/>
-          </a:prstGeom>
-        </p:spPr>
-      </p:pic>
       <p:grpSp>
         <p:nvGrpSpPr>
-          <p:cNvPr id="104" name="Group 103">
-            <a:extLst>
-              <a:ext uri="{FF2B5EF4-FFF2-40B4-BE49-F238E27FC236}">
-                <a16:creationId xmlns:a16="http://schemas.microsoft.com/office/drawing/2014/main" id="{9949F315-15CA-46FD-AAEE-C873D909F870}"/>
+          <p:cNvPr id="18" name="Group 17">
+            <a:extLst>
+              <a:ext uri="{FF2B5EF4-FFF2-40B4-BE49-F238E27FC236}">
+                <a16:creationId xmlns:a16="http://schemas.microsoft.com/office/drawing/2014/main" id="{365D089D-F20B-4962-8726-38BAE067B57F}"/>
               </a:ext>
             </a:extLst>
           </p:cNvPr>
@@ -4060,18 +3340,61 @@
         </p:nvGrpSpPr>
         <p:grpSpPr>
           <a:xfrm>
-            <a:off x="3333353" y="-1130902"/>
-            <a:ext cx="5532268" cy="1740414"/>
-            <a:chOff x="3328226" y="-1628537"/>
-            <a:chExt cx="5532268" cy="1740414"/>
+            <a:off x="-1633110" y="-1130902"/>
+            <a:ext cx="15478876" cy="10533540"/>
+            <a:chOff x="-1633110" y="-1130902"/>
+            <a:chExt cx="15478876" cy="10533540"/>
           </a:xfrm>
         </p:grpSpPr>
+        <p:cxnSp>
+          <p:nvCxnSpPr>
+            <p:cNvPr id="8" name="Straight Arrow Connector 7">
+              <a:extLst>
+                <a:ext uri="{FF2B5EF4-FFF2-40B4-BE49-F238E27FC236}">
+                  <a16:creationId xmlns:a16="http://schemas.microsoft.com/office/drawing/2014/main" id="{41C29615-13E1-45F2-9E33-5A8651D4AB19}"/>
+                </a:ext>
+              </a:extLst>
+            </p:cNvPr>
+            <p:cNvCxnSpPr>
+              <a:cxnSpLocks/>
+              <a:stCxn id="4" idx="2"/>
+              <a:endCxn id="10" idx="0"/>
+            </p:cNvCxnSpPr>
+            <p:nvPr/>
+          </p:nvCxnSpPr>
+          <p:spPr>
+            <a:xfrm>
+              <a:off x="6099487" y="609512"/>
+              <a:ext cx="0" cy="495513"/>
+            </a:xfrm>
+            <a:prstGeom prst="straightConnector1">
+              <a:avLst/>
+            </a:prstGeom>
+            <a:ln w="28575">
+              <a:tailEnd type="triangle"/>
+            </a:ln>
+          </p:spPr>
+          <p:style>
+            <a:lnRef idx="1">
+              <a:schemeClr val="dk1"/>
+            </a:lnRef>
+            <a:fillRef idx="0">
+              <a:schemeClr val="dk1"/>
+            </a:fillRef>
+            <a:effectRef idx="0">
+              <a:schemeClr val="dk1"/>
+            </a:effectRef>
+            <a:fontRef idx="minor">
+              <a:schemeClr val="tx1"/>
+            </a:fontRef>
+          </p:style>
+        </p:cxnSp>
         <p:sp>
           <p:nvSpPr>
-            <p:cNvPr id="4" name="Rectangle: Rounded Corners 3">
+            <p:cNvPr id="10" name="Rectangle: Rounded Corners 9">
               <a:extLst>
                 <a:ext uri="{FF2B5EF4-FFF2-40B4-BE49-F238E27FC236}">
-                  <a16:creationId xmlns:a16="http://schemas.microsoft.com/office/drawing/2014/main" id="{DB205338-6232-4C0B-A3A1-980D260FF05A}"/>
+                  <a16:creationId xmlns:a16="http://schemas.microsoft.com/office/drawing/2014/main" id="{097F538F-5F11-40F0-BE65-BA32CACB977D}"/>
                 </a:ext>
               </a:extLst>
             </p:cNvPr>
@@ -4080,8 +3403,8 @@
           </p:nvSpPr>
           <p:spPr>
             <a:xfrm>
-              <a:off x="3328226" y="-1259205"/>
-              <a:ext cx="5532268" cy="1371082"/>
+              <a:off x="5142838" y="1105025"/>
+              <a:ext cx="1913298" cy="736847"/>
             </a:xfrm>
             <a:prstGeom prst="roundRect">
               <a:avLst/>
@@ -4114,16 +3437,65 @@
             <a:lstStyle/>
             <a:p>
               <a:pPr algn="ctr"/>
-              <a:endParaRPr lang="en-US" dirty="0"/>
+              <a:r>
+                <a:rPr lang="en-US" dirty="0">
+                  <a:solidFill>
+                    <a:schemeClr val="tx1"/>
+                  </a:solidFill>
+                </a:rPr>
+                <a:t>Gene expression correlations</a:t>
+              </a:r>
             </a:p>
           </p:txBody>
         </p:sp>
+        <p:cxnSp>
+          <p:nvCxnSpPr>
+            <p:cNvPr id="15" name="Straight Arrow Connector 14">
+              <a:extLst>
+                <a:ext uri="{FF2B5EF4-FFF2-40B4-BE49-F238E27FC236}">
+                  <a16:creationId xmlns:a16="http://schemas.microsoft.com/office/drawing/2014/main" id="{77530A88-D50C-41F3-9643-1E5AE60BE674}"/>
+                </a:ext>
+              </a:extLst>
+            </p:cNvPr>
+            <p:cNvCxnSpPr>
+              <a:cxnSpLocks/>
+              <a:stCxn id="10" idx="2"/>
+            </p:cNvCxnSpPr>
+            <p:nvPr/>
+          </p:nvCxnSpPr>
+          <p:spPr>
+            <a:xfrm flipH="1">
+              <a:off x="6093926" y="1841872"/>
+              <a:ext cx="5561" cy="594920"/>
+            </a:xfrm>
+            <a:prstGeom prst="straightConnector1">
+              <a:avLst/>
+            </a:prstGeom>
+            <a:ln w="28575">
+              <a:tailEnd type="triangle"/>
+            </a:ln>
+          </p:spPr>
+          <p:style>
+            <a:lnRef idx="1">
+              <a:schemeClr val="dk1"/>
+            </a:lnRef>
+            <a:fillRef idx="0">
+              <a:schemeClr val="dk1"/>
+            </a:fillRef>
+            <a:effectRef idx="0">
+              <a:schemeClr val="dk1"/>
+            </a:effectRef>
+            <a:fontRef idx="minor">
+              <a:schemeClr val="tx1"/>
+            </a:fontRef>
+          </p:style>
+        </p:cxnSp>
         <p:sp>
           <p:nvSpPr>
-            <p:cNvPr id="91" name="Rectangle 90">
+            <p:cNvPr id="28" name="Rectangle: Rounded Corners 27">
               <a:extLst>
                 <a:ext uri="{FF2B5EF4-FFF2-40B4-BE49-F238E27FC236}">
-                  <a16:creationId xmlns:a16="http://schemas.microsoft.com/office/drawing/2014/main" id="{17FBC41E-418B-4CD8-AB99-8BF000518BE0}"/>
+                  <a16:creationId xmlns:a16="http://schemas.microsoft.com/office/drawing/2014/main" id="{07354014-32DB-4978-872F-6CDEEBFF7A60}"/>
                 </a:ext>
               </a:extLst>
             </p:cNvPr>
@@ -4132,283 +3504,50 @@
           </p:nvSpPr>
           <p:spPr>
             <a:xfrm>
-              <a:off x="3457402" y="-1628537"/>
-              <a:ext cx="3286605" cy="369332"/>
+              <a:off x="-1184180" y="1725768"/>
+              <a:ext cx="3339312" cy="4165247"/>
             </a:xfrm>
-            <a:prstGeom prst="rect">
+            <a:prstGeom prst="roundRect">
               <a:avLst/>
             </a:prstGeom>
+            <a:noFill/>
+            <a:ln w="28575">
+              <a:solidFill>
+                <a:schemeClr val="tx1"/>
+              </a:solidFill>
+            </a:ln>
           </p:spPr>
+          <p:style>
+            <a:lnRef idx="2">
+              <a:schemeClr val="accent1">
+                <a:shade val="50000"/>
+              </a:schemeClr>
+            </a:lnRef>
+            <a:fillRef idx="1">
+              <a:schemeClr val="accent1"/>
+            </a:fillRef>
+            <a:effectRef idx="0">
+              <a:schemeClr val="accent1"/>
+            </a:effectRef>
+            <a:fontRef idx="minor">
+              <a:schemeClr val="lt1"/>
+            </a:fontRef>
+          </p:style>
           <p:txBody>
-            <a:bodyPr wrap="none">
-              <a:spAutoFit/>
-            </a:bodyPr>
+            <a:bodyPr rtlCol="0" anchor="ctr"/>
             <a:lstStyle/>
             <a:p>
               <a:pPr algn="ctr"/>
-              <a:r>
-                <a:rPr lang="en-US" dirty="0"/>
-                <a:t>ARCHS4 RNA-Seq data repository</a:t>
-              </a:r>
+              <a:endParaRPr lang="en-US"/>
             </a:p>
           </p:txBody>
         </p:sp>
-        <p:grpSp>
-          <p:nvGrpSpPr>
-            <p:cNvPr id="103" name="Group 102">
+        <p:sp>
+          <p:nvSpPr>
+            <p:cNvPr id="32" name="Rectangle: Rounded Corners 31">
               <a:extLst>
                 <a:ext uri="{FF2B5EF4-FFF2-40B4-BE49-F238E27FC236}">
-                  <a16:creationId xmlns:a16="http://schemas.microsoft.com/office/drawing/2014/main" id="{43155AE9-F1CA-4C75-837C-A10A2D29BCA1}"/>
-                </a:ext>
-              </a:extLst>
-            </p:cNvPr>
-            <p:cNvGrpSpPr/>
-            <p:nvPr/>
-          </p:nvGrpSpPr>
-          <p:grpSpPr>
-            <a:xfrm>
-              <a:off x="3763980" y="-1056258"/>
-              <a:ext cx="4641251" cy="981237"/>
-              <a:chOff x="3763980" y="-1342251"/>
-              <a:chExt cx="4641251" cy="981237"/>
-            </a:xfrm>
-          </p:grpSpPr>
-          <p:sp>
-            <p:nvSpPr>
-              <p:cNvPr id="93" name="Rectangle: Rounded Corners 92">
-                <a:extLst>
-                  <a:ext uri="{FF2B5EF4-FFF2-40B4-BE49-F238E27FC236}">
-                    <a16:creationId xmlns:a16="http://schemas.microsoft.com/office/drawing/2014/main" id="{69B8FCE5-CFD8-4942-8A0D-90AD21BFCD5E}"/>
-                  </a:ext>
-                </a:extLst>
-              </p:cNvPr>
-              <p:cNvSpPr/>
-              <p:nvPr/>
-            </p:nvSpPr>
-            <p:spPr>
-              <a:xfrm>
-                <a:off x="3763980" y="-1341945"/>
-                <a:ext cx="2024680" cy="369332"/>
-              </a:xfrm>
-              <a:prstGeom prst="roundRect">
-                <a:avLst/>
-              </a:prstGeom>
-              <a:solidFill>
-                <a:srgbClr val="1C0444"/>
-              </a:solidFill>
-            </p:spPr>
-            <p:style>
-              <a:lnRef idx="2">
-                <a:schemeClr val="accent1">
-                  <a:shade val="50000"/>
-                </a:schemeClr>
-              </a:lnRef>
-              <a:fillRef idx="1">
-                <a:schemeClr val="accent1"/>
-              </a:fillRef>
-              <a:effectRef idx="0">
-                <a:schemeClr val="accent1"/>
-              </a:effectRef>
-              <a:fontRef idx="minor">
-                <a:schemeClr val="lt1"/>
-              </a:fontRef>
-            </p:style>
-            <p:txBody>
-              <a:bodyPr rtlCol="0" anchor="ctr"/>
-              <a:lstStyle/>
-              <a:p>
-                <a:pPr algn="ctr"/>
-                <a:r>
-                  <a:rPr lang="en-US" dirty="0"/>
-                  <a:t>Human tissues</a:t>
-                </a:r>
-              </a:p>
-            </p:txBody>
-          </p:sp>
-          <p:sp>
-            <p:nvSpPr>
-              <p:cNvPr id="94" name="Rectangle: Rounded Corners 93">
-                <a:extLst>
-                  <a:ext uri="{FF2B5EF4-FFF2-40B4-BE49-F238E27FC236}">
-                    <a16:creationId xmlns:a16="http://schemas.microsoft.com/office/drawing/2014/main" id="{AA83B7F6-A80A-4B77-9349-F42634D4B08C}"/>
-                  </a:ext>
-                </a:extLst>
-              </p:cNvPr>
-              <p:cNvSpPr/>
-              <p:nvPr/>
-            </p:nvSpPr>
-            <p:spPr>
-              <a:xfrm>
-                <a:off x="3786771" y="-730346"/>
-                <a:ext cx="2024680" cy="369332"/>
-              </a:xfrm>
-              <a:prstGeom prst="roundRect">
-                <a:avLst/>
-              </a:prstGeom>
-              <a:solidFill>
-                <a:srgbClr val="1C0444"/>
-              </a:solidFill>
-            </p:spPr>
-            <p:style>
-              <a:lnRef idx="2">
-                <a:schemeClr val="accent1">
-                  <a:shade val="50000"/>
-                </a:schemeClr>
-              </a:lnRef>
-              <a:fillRef idx="1">
-                <a:schemeClr val="accent1"/>
-              </a:fillRef>
-              <a:effectRef idx="0">
-                <a:schemeClr val="accent1"/>
-              </a:effectRef>
-              <a:fontRef idx="minor">
-                <a:schemeClr val="lt1"/>
-              </a:fontRef>
-            </p:style>
-            <p:txBody>
-              <a:bodyPr rtlCol="0" anchor="ctr"/>
-              <a:lstStyle/>
-              <a:p>
-                <a:pPr algn="ctr"/>
-                <a:r>
-                  <a:rPr lang="en-US" dirty="0"/>
-                  <a:t>Human tumors</a:t>
-                </a:r>
-              </a:p>
-            </p:txBody>
-          </p:sp>
-          <p:sp>
-            <p:nvSpPr>
-              <p:cNvPr id="95" name="Rectangle: Rounded Corners 94">
-                <a:extLst>
-                  <a:ext uri="{FF2B5EF4-FFF2-40B4-BE49-F238E27FC236}">
-                    <a16:creationId xmlns:a16="http://schemas.microsoft.com/office/drawing/2014/main" id="{474A99D8-F02F-4A28-B324-45373A5C165F}"/>
-                  </a:ext>
-                </a:extLst>
-              </p:cNvPr>
-              <p:cNvSpPr/>
-              <p:nvPr/>
-            </p:nvSpPr>
-            <p:spPr>
-              <a:xfrm>
-                <a:off x="6380551" y="-1342251"/>
-                <a:ext cx="2024680" cy="369332"/>
-              </a:xfrm>
-              <a:prstGeom prst="roundRect">
-                <a:avLst/>
-              </a:prstGeom>
-              <a:solidFill>
-                <a:srgbClr val="1C0444"/>
-              </a:solidFill>
-            </p:spPr>
-            <p:style>
-              <a:lnRef idx="2">
-                <a:schemeClr val="accent1">
-                  <a:shade val="50000"/>
-                </a:schemeClr>
-              </a:lnRef>
-              <a:fillRef idx="1">
-                <a:schemeClr val="accent1"/>
-              </a:fillRef>
-              <a:effectRef idx="0">
-                <a:schemeClr val="accent1"/>
-              </a:effectRef>
-              <a:fontRef idx="minor">
-                <a:schemeClr val="lt1"/>
-              </a:fontRef>
-            </p:style>
-            <p:txBody>
-              <a:bodyPr rtlCol="0" anchor="ctr"/>
-              <a:lstStyle/>
-              <a:p>
-                <a:pPr algn="ctr"/>
-                <a:r>
-                  <a:rPr lang="en-US" dirty="0"/>
-                  <a:t>Mouse tissues</a:t>
-                </a:r>
-              </a:p>
-            </p:txBody>
-          </p:sp>
-          <p:sp>
-            <p:nvSpPr>
-              <p:cNvPr id="96" name="Rectangle: Rounded Corners 95">
-                <a:extLst>
-                  <a:ext uri="{FF2B5EF4-FFF2-40B4-BE49-F238E27FC236}">
-                    <a16:creationId xmlns:a16="http://schemas.microsoft.com/office/drawing/2014/main" id="{E85043F1-A240-4217-BA13-B7E4AD1771F5}"/>
-                  </a:ext>
-                </a:extLst>
-              </p:cNvPr>
-              <p:cNvSpPr/>
-              <p:nvPr/>
-            </p:nvSpPr>
-            <p:spPr>
-              <a:xfrm>
-                <a:off x="6380551" y="-730346"/>
-                <a:ext cx="2024680" cy="369332"/>
-              </a:xfrm>
-              <a:prstGeom prst="roundRect">
-                <a:avLst/>
-              </a:prstGeom>
-              <a:solidFill>
-                <a:srgbClr val="1C0444"/>
-              </a:solidFill>
-            </p:spPr>
-            <p:style>
-              <a:lnRef idx="2">
-                <a:schemeClr val="accent1">
-                  <a:shade val="50000"/>
-                </a:schemeClr>
-              </a:lnRef>
-              <a:fillRef idx="1">
-                <a:schemeClr val="accent1"/>
-              </a:fillRef>
-              <a:effectRef idx="0">
-                <a:schemeClr val="accent1"/>
-              </a:effectRef>
-              <a:fontRef idx="minor">
-                <a:schemeClr val="lt1"/>
-              </a:fontRef>
-            </p:style>
-            <p:txBody>
-              <a:bodyPr rtlCol="0" anchor="ctr"/>
-              <a:lstStyle/>
-              <a:p>
-                <a:pPr algn="ctr"/>
-                <a:r>
-                  <a:rPr lang="en-US" dirty="0"/>
-                  <a:t>Mouse tumors</a:t>
-                </a:r>
-              </a:p>
-            </p:txBody>
-          </p:sp>
-        </p:grpSp>
-      </p:grpSp>
-      <p:grpSp>
-        <p:nvGrpSpPr>
-          <p:cNvPr id="136" name="Group 135">
-            <a:extLst>
-              <a:ext uri="{FF2B5EF4-FFF2-40B4-BE49-F238E27FC236}">
-                <a16:creationId xmlns:a16="http://schemas.microsoft.com/office/drawing/2014/main" id="{C751E94B-65D8-4062-ABE7-74D6069CEDE7}"/>
-              </a:ext>
-            </a:extLst>
-          </p:cNvPr>
-          <p:cNvGrpSpPr/>
-          <p:nvPr/>
-        </p:nvGrpSpPr>
-        <p:grpSpPr>
-          <a:xfrm>
-            <a:off x="2943914" y="5712724"/>
-            <a:ext cx="6304170" cy="2888297"/>
-            <a:chOff x="2999721" y="6003842"/>
-            <a:chExt cx="6304170" cy="2888297"/>
-          </a:xfrm>
-        </p:grpSpPr>
-        <p:sp>
-          <p:nvSpPr>
-            <p:cNvPr id="119" name="Rectangle: Rounded Corners 118">
-              <a:extLst>
-                <a:ext uri="{FF2B5EF4-FFF2-40B4-BE49-F238E27FC236}">
-                  <a16:creationId xmlns:a16="http://schemas.microsoft.com/office/drawing/2014/main" id="{C24ADC0B-44D9-4738-8B52-E1E118D69121}"/>
+                  <a16:creationId xmlns:a16="http://schemas.microsoft.com/office/drawing/2014/main" id="{52530A37-D41A-4114-BE72-6B2AFD3136B4}"/>
                 </a:ext>
               </a:extLst>
             </p:cNvPr>
@@ -4417,8 +3556,8 @@
           </p:nvSpPr>
           <p:spPr>
             <a:xfrm>
-              <a:off x="2999721" y="6003842"/>
-              <a:ext cx="6304170" cy="2888297"/>
+              <a:off x="10036867" y="1720807"/>
+              <a:ext cx="3339312" cy="4165241"/>
             </a:xfrm>
             <a:prstGeom prst="roundRect">
               <a:avLst/>
@@ -4457,22 +3596,57 @@
         </p:sp>
         <p:cxnSp>
           <p:nvCxnSpPr>
-            <p:cNvPr id="120" name="Straight Connector 119">
+            <p:cNvPr id="43" name="Straight Connector 42">
               <a:extLst>
                 <a:ext uri="{FF2B5EF4-FFF2-40B4-BE49-F238E27FC236}">
-                  <a16:creationId xmlns:a16="http://schemas.microsoft.com/office/drawing/2014/main" id="{2A4A01EF-ED53-414E-82D9-4A5D0C70AEE8}"/>
+                  <a16:creationId xmlns:a16="http://schemas.microsoft.com/office/drawing/2014/main" id="{96296160-98C9-4054-8003-D859487DBB78}"/>
                 </a:ext>
               </a:extLst>
             </p:cNvPr>
-            <p:cNvCxnSpPr>
-              <a:cxnSpLocks/>
-            </p:cNvCxnSpPr>
+            <p:cNvCxnSpPr/>
             <p:nvPr/>
           </p:nvCxnSpPr>
           <p:spPr>
-            <a:xfrm flipV="1">
-              <a:off x="3060681" y="6448543"/>
-              <a:ext cx="6182250" cy="7744"/>
+            <a:xfrm>
+              <a:off x="-1184180" y="2213142"/>
+              <a:ext cx="3339312" cy="0"/>
+            </a:xfrm>
+            <a:prstGeom prst="line">
+              <a:avLst/>
+            </a:prstGeom>
+            <a:ln w="12700"/>
+          </p:spPr>
+          <p:style>
+            <a:lnRef idx="1">
+              <a:schemeClr val="dk1"/>
+            </a:lnRef>
+            <a:fillRef idx="0">
+              <a:schemeClr val="dk1"/>
+            </a:fillRef>
+            <a:effectRef idx="0">
+              <a:schemeClr val="dk1"/>
+            </a:effectRef>
+            <a:fontRef idx="minor">
+              <a:schemeClr val="tx1"/>
+            </a:fontRef>
+          </p:style>
+        </p:cxnSp>
+        <p:cxnSp>
+          <p:nvCxnSpPr>
+            <p:cNvPr id="44" name="Straight Connector 43">
+              <a:extLst>
+                <a:ext uri="{FF2B5EF4-FFF2-40B4-BE49-F238E27FC236}">
+                  <a16:creationId xmlns:a16="http://schemas.microsoft.com/office/drawing/2014/main" id="{DAC4CAA4-BA1C-407F-A99F-8925455C3224}"/>
+                </a:ext>
+              </a:extLst>
+            </p:cNvPr>
+            <p:cNvCxnSpPr/>
+            <p:nvPr/>
+          </p:nvCxnSpPr>
+          <p:spPr>
+            <a:xfrm>
+              <a:off x="10035229" y="2212504"/>
+              <a:ext cx="3339312" cy="0"/>
             </a:xfrm>
             <a:prstGeom prst="line">
               <a:avLst/>
@@ -4496,10 +3670,10 @@
         </p:cxnSp>
         <p:sp>
           <p:nvSpPr>
-            <p:cNvPr id="121" name="TextBox 120">
+            <p:cNvPr id="48" name="TextBox 47">
               <a:extLst>
                 <a:ext uri="{FF2B5EF4-FFF2-40B4-BE49-F238E27FC236}">
-                  <a16:creationId xmlns:a16="http://schemas.microsoft.com/office/drawing/2014/main" id="{F81A6E6E-B7AA-4E41-B5E7-1BBA774DDA4D}"/>
+                  <a16:creationId xmlns:a16="http://schemas.microsoft.com/office/drawing/2014/main" id="{4007DBBC-9244-4FF3-BE56-B1429424E3F9}"/>
                 </a:ext>
               </a:extLst>
             </p:cNvPr>
@@ -4508,8 +3682,8 @@
           </p:nvSpPr>
           <p:spPr>
             <a:xfrm>
-              <a:off x="4779702" y="6022115"/>
-              <a:ext cx="2736785" cy="369332"/>
+              <a:off x="-760891" y="1792787"/>
+              <a:ext cx="2480940" cy="369332"/>
             </a:xfrm>
             <a:prstGeom prst="rect">
               <a:avLst/>
@@ -4524,17 +3698,17 @@
             <a:p>
               <a:r>
                 <a:rPr lang="en-US" dirty="0"/>
-                <a:t>Topology-analysis Mode</a:t>
+                <a:t>Single Gene Mode</a:t>
               </a:r>
             </a:p>
           </p:txBody>
         </p:sp>
         <p:sp>
           <p:nvSpPr>
-            <p:cNvPr id="122" name="TextBox 121">
+            <p:cNvPr id="49" name="TextBox 48">
               <a:extLst>
                 <a:ext uri="{FF2B5EF4-FFF2-40B4-BE49-F238E27FC236}">
-                  <a16:creationId xmlns:a16="http://schemas.microsoft.com/office/drawing/2014/main" id="{E8052125-96F3-4DD6-9B26-F24C17B21623}"/>
+                  <a16:creationId xmlns:a16="http://schemas.microsoft.com/office/drawing/2014/main" id="{1F58AE3C-8878-49CB-B0F7-9481EA11FF2F}"/>
                 </a:ext>
               </a:extLst>
             </p:cNvPr>
@@ -4543,8 +3717,8 @@
           </p:nvSpPr>
           <p:spPr>
             <a:xfrm>
-              <a:off x="3060681" y="6585616"/>
-              <a:ext cx="6182250" cy="369332"/>
+              <a:off x="10446893" y="1792787"/>
+              <a:ext cx="2472954" cy="369332"/>
             </a:xfrm>
             <a:prstGeom prst="rect">
               <a:avLst/>
@@ -4559,29 +3733,134 @@
             <a:p>
               <a:r>
                 <a:rPr lang="en-US" dirty="0"/>
-                <a:t>“ATM, BRCA1, EZH2 …” or “BIOCARTA_PROTEASOME_PATHWAY” </a:t>
+                <a:t>Gene vs Gene List Mode</a:t>
+              </a:r>
+            </a:p>
+          </p:txBody>
+        </p:sp>
+        <p:sp>
+          <p:nvSpPr>
+            <p:cNvPr id="51" name="TextBox 50">
+              <a:extLst>
+                <a:ext uri="{FF2B5EF4-FFF2-40B4-BE49-F238E27FC236}">
+                  <a16:creationId xmlns:a16="http://schemas.microsoft.com/office/drawing/2014/main" id="{EA3F0FF7-CE32-46C4-98B0-D96DC18DB9EB}"/>
+                </a:ext>
+              </a:extLst>
+            </p:cNvPr>
+            <p:cNvSpPr txBox="1"/>
+            <p:nvPr/>
+          </p:nvSpPr>
+          <p:spPr>
+            <a:xfrm>
+              <a:off x="-1064325" y="2216145"/>
+              <a:ext cx="2563202" cy="369332"/>
+            </a:xfrm>
+            <a:prstGeom prst="rect">
+              <a:avLst/>
+            </a:prstGeom>
+            <a:noFill/>
+          </p:spPr>
+          <p:txBody>
+            <a:bodyPr wrap="none" rtlCol="0">
+              <a:spAutoFit/>
+            </a:bodyPr>
+            <a:lstStyle/>
+            <a:p>
+              <a:r>
+                <a:rPr lang="en-US" dirty="0"/>
+                <a:t>“ATM (pancreas-normal)”</a:t>
+              </a:r>
+            </a:p>
+          </p:txBody>
+        </p:sp>
+        <p:sp>
+          <p:nvSpPr>
+            <p:cNvPr id="53" name="TextBox 52">
+              <a:extLst>
+                <a:ext uri="{FF2B5EF4-FFF2-40B4-BE49-F238E27FC236}">
+                  <a16:creationId xmlns:a16="http://schemas.microsoft.com/office/drawing/2014/main" id="{67B27EC5-3306-4370-AB52-0DD37A5328F2}"/>
+                </a:ext>
+              </a:extLst>
+            </p:cNvPr>
+            <p:cNvSpPr txBox="1"/>
+            <p:nvPr/>
+          </p:nvSpPr>
+          <p:spPr>
+            <a:xfrm>
+              <a:off x="10219425" y="2212504"/>
+              <a:ext cx="2645340" cy="369332"/>
+            </a:xfrm>
+            <a:prstGeom prst="rect">
+              <a:avLst/>
+            </a:prstGeom>
+            <a:noFill/>
+          </p:spPr>
+          <p:txBody>
+            <a:bodyPr wrap="none" rtlCol="0">
+              <a:spAutoFit/>
+            </a:bodyPr>
+            <a:lstStyle/>
+            <a:p>
+              <a:r>
+                <a:rPr lang="en-US" dirty="0"/>
+                <a:t>“ATM vs (BRCA1, EZH2 …)”</a:t>
               </a:r>
             </a:p>
           </p:txBody>
         </p:sp>
         <p:cxnSp>
           <p:nvCxnSpPr>
-            <p:cNvPr id="123" name="Straight Connector 122">
+            <p:cNvPr id="55" name="Straight Connector 54">
               <a:extLst>
                 <a:ext uri="{FF2B5EF4-FFF2-40B4-BE49-F238E27FC236}">
-                  <a16:creationId xmlns:a16="http://schemas.microsoft.com/office/drawing/2014/main" id="{BE4BC511-5D1F-4FB5-AB83-F4709C1B60CA}"/>
+                  <a16:creationId xmlns:a16="http://schemas.microsoft.com/office/drawing/2014/main" id="{1772C2ED-8084-4D96-8A9F-05E1323D9C60}"/>
                 </a:ext>
               </a:extLst>
             </p:cNvPr>
-            <p:cNvCxnSpPr>
-              <a:cxnSpLocks/>
-            </p:cNvCxnSpPr>
+            <p:cNvCxnSpPr/>
             <p:nvPr/>
           </p:nvCxnSpPr>
           <p:spPr>
-            <a:xfrm flipV="1">
-              <a:off x="3006697" y="7028838"/>
-              <a:ext cx="6297194" cy="858"/>
+            <a:xfrm>
+              <a:off x="-1184180" y="2581836"/>
+              <a:ext cx="3339312" cy="0"/>
+            </a:xfrm>
+            <a:prstGeom prst="line">
+              <a:avLst/>
+            </a:prstGeom>
+            <a:ln w="12700"/>
+          </p:spPr>
+          <p:style>
+            <a:lnRef idx="1">
+              <a:schemeClr val="dk1"/>
+            </a:lnRef>
+            <a:fillRef idx="0">
+              <a:schemeClr val="dk1"/>
+            </a:fillRef>
+            <a:effectRef idx="0">
+              <a:schemeClr val="dk1"/>
+            </a:effectRef>
+            <a:fontRef idx="minor">
+              <a:schemeClr val="tx1"/>
+            </a:fontRef>
+          </p:style>
+        </p:cxnSp>
+        <p:cxnSp>
+          <p:nvCxnSpPr>
+            <p:cNvPr id="56" name="Straight Connector 55">
+              <a:extLst>
+                <a:ext uri="{FF2B5EF4-FFF2-40B4-BE49-F238E27FC236}">
+                  <a16:creationId xmlns:a16="http://schemas.microsoft.com/office/drawing/2014/main" id="{9FDA19AA-F31F-4E5E-97E2-A0B418F800EB}"/>
+                </a:ext>
+              </a:extLst>
+            </p:cNvPr>
+            <p:cNvCxnSpPr/>
+            <p:nvPr/>
+          </p:nvCxnSpPr>
+          <p:spPr>
+            <a:xfrm>
+              <a:off x="10013714" y="2581836"/>
+              <a:ext cx="3339312" cy="0"/>
             </a:xfrm>
             <a:prstGeom prst="line">
               <a:avLst/>
@@ -4605,10 +3884,10 @@
         </p:cxnSp>
         <p:pic>
           <p:nvPicPr>
-            <p:cNvPr id="124" name="Picture 123" descr="A picture containing sky&#10;&#10;Description automatically generated">
+            <p:cNvPr id="68" name="Picture 67" descr="A screenshot of a cell phone&#10;&#10;Description automatically generated">
               <a:extLst>
                 <a:ext uri="{FF2B5EF4-FFF2-40B4-BE49-F238E27FC236}">
-                  <a16:creationId xmlns:a16="http://schemas.microsoft.com/office/drawing/2014/main" id="{09734B57-335B-41F2-B559-3FA6B6CA00A7}"/>
+                  <a16:creationId xmlns:a16="http://schemas.microsoft.com/office/drawing/2014/main" id="{DE1E1F68-FA16-4936-BDD3-CD02071F1F4A}"/>
                 </a:ext>
               </a:extLst>
             </p:cNvPr>
@@ -4618,37 +3897,1267 @@
             <p:nvPr/>
           </p:nvPicPr>
           <p:blipFill rotWithShape="1">
-            <a:blip r:embed="rId6">
+            <a:blip r:embed="rId2">
               <a:extLst>
                 <a:ext uri="{28A0092B-C50C-407E-A947-70E740481C1C}">
                   <a14:useLocalDpi xmlns:a14="http://schemas.microsoft.com/office/drawing/2010/main" val="0"/>
                 </a:ext>
               </a:extLst>
             </a:blip>
-            <a:srcRect t="7780" r="10961"/>
+            <a:srcRect l="198" t="11598" b="5657"/>
             <a:stretch/>
           </p:blipFill>
           <p:spPr>
             <a:xfrm>
-              <a:off x="3147878" y="7215088"/>
-              <a:ext cx="1631824" cy="1309551"/>
+              <a:off x="-667872" y="2759995"/>
+              <a:ext cx="2292442" cy="1221839"/>
             </a:xfrm>
             <a:prstGeom prst="rect">
               <a:avLst/>
             </a:prstGeom>
           </p:spPr>
         </p:pic>
+        <p:grpSp>
+          <p:nvGrpSpPr>
+            <p:cNvPr id="104" name="Group 103">
+              <a:extLst>
+                <a:ext uri="{FF2B5EF4-FFF2-40B4-BE49-F238E27FC236}">
+                  <a16:creationId xmlns:a16="http://schemas.microsoft.com/office/drawing/2014/main" id="{9949F315-15CA-46FD-AAEE-C873D909F870}"/>
+                </a:ext>
+              </a:extLst>
+            </p:cNvPr>
+            <p:cNvGrpSpPr/>
+            <p:nvPr/>
+          </p:nvGrpSpPr>
+          <p:grpSpPr>
+            <a:xfrm>
+              <a:off x="3333353" y="-1130902"/>
+              <a:ext cx="5532268" cy="1740414"/>
+              <a:chOff x="3328226" y="-1628537"/>
+              <a:chExt cx="5532268" cy="1740414"/>
+            </a:xfrm>
+          </p:grpSpPr>
+          <p:sp>
+            <p:nvSpPr>
+              <p:cNvPr id="4" name="Rectangle: Rounded Corners 3">
+                <a:extLst>
+                  <a:ext uri="{FF2B5EF4-FFF2-40B4-BE49-F238E27FC236}">
+                    <a16:creationId xmlns:a16="http://schemas.microsoft.com/office/drawing/2014/main" id="{DB205338-6232-4C0B-A3A1-980D260FF05A}"/>
+                  </a:ext>
+                </a:extLst>
+              </p:cNvPr>
+              <p:cNvSpPr/>
+              <p:nvPr/>
+            </p:nvSpPr>
+            <p:spPr>
+              <a:xfrm>
+                <a:off x="3328226" y="-1259205"/>
+                <a:ext cx="5532268" cy="1371082"/>
+              </a:xfrm>
+              <a:prstGeom prst="roundRect">
+                <a:avLst/>
+              </a:prstGeom>
+              <a:noFill/>
+              <a:ln w="28575">
+                <a:solidFill>
+                  <a:schemeClr val="tx1"/>
+                </a:solidFill>
+              </a:ln>
+            </p:spPr>
+            <p:style>
+              <a:lnRef idx="2">
+                <a:schemeClr val="accent1">
+                  <a:shade val="50000"/>
+                </a:schemeClr>
+              </a:lnRef>
+              <a:fillRef idx="1">
+                <a:schemeClr val="accent1"/>
+              </a:fillRef>
+              <a:effectRef idx="0">
+                <a:schemeClr val="accent1"/>
+              </a:effectRef>
+              <a:fontRef idx="minor">
+                <a:schemeClr val="lt1"/>
+              </a:fontRef>
+            </p:style>
+            <p:txBody>
+              <a:bodyPr rtlCol="0" anchor="ctr"/>
+              <a:lstStyle/>
+              <a:p>
+                <a:pPr algn="ctr"/>
+                <a:endParaRPr lang="en-US" dirty="0"/>
+              </a:p>
+            </p:txBody>
+          </p:sp>
+          <p:sp>
+            <p:nvSpPr>
+              <p:cNvPr id="91" name="Rectangle 90">
+                <a:extLst>
+                  <a:ext uri="{FF2B5EF4-FFF2-40B4-BE49-F238E27FC236}">
+                    <a16:creationId xmlns:a16="http://schemas.microsoft.com/office/drawing/2014/main" id="{17FBC41E-418B-4CD8-AB99-8BF000518BE0}"/>
+                  </a:ext>
+                </a:extLst>
+              </p:cNvPr>
+              <p:cNvSpPr/>
+              <p:nvPr/>
+            </p:nvSpPr>
+            <p:spPr>
+              <a:xfrm>
+                <a:off x="3457402" y="-1628537"/>
+                <a:ext cx="3286605" cy="369332"/>
+              </a:xfrm>
+              <a:prstGeom prst="rect">
+                <a:avLst/>
+              </a:prstGeom>
+            </p:spPr>
+            <p:txBody>
+              <a:bodyPr wrap="none">
+                <a:spAutoFit/>
+              </a:bodyPr>
+              <a:lstStyle/>
+              <a:p>
+                <a:pPr algn="ctr"/>
+                <a:r>
+                  <a:rPr lang="en-US" dirty="0"/>
+                  <a:t>ARCHS4 RNA-Seq data repository</a:t>
+                </a:r>
+              </a:p>
+            </p:txBody>
+          </p:sp>
+          <p:grpSp>
+            <p:nvGrpSpPr>
+              <p:cNvPr id="103" name="Group 102">
+                <a:extLst>
+                  <a:ext uri="{FF2B5EF4-FFF2-40B4-BE49-F238E27FC236}">
+                    <a16:creationId xmlns:a16="http://schemas.microsoft.com/office/drawing/2014/main" id="{43155AE9-F1CA-4C75-837C-A10A2D29BCA1}"/>
+                  </a:ext>
+                </a:extLst>
+              </p:cNvPr>
+              <p:cNvGrpSpPr/>
+              <p:nvPr/>
+            </p:nvGrpSpPr>
+            <p:grpSpPr>
+              <a:xfrm>
+                <a:off x="3763980" y="-1056258"/>
+                <a:ext cx="4641251" cy="981237"/>
+                <a:chOff x="3763980" y="-1342251"/>
+                <a:chExt cx="4641251" cy="981237"/>
+              </a:xfrm>
+            </p:grpSpPr>
+            <p:sp>
+              <p:nvSpPr>
+                <p:cNvPr id="93" name="Rectangle: Rounded Corners 92">
+                  <a:extLst>
+                    <a:ext uri="{FF2B5EF4-FFF2-40B4-BE49-F238E27FC236}">
+                      <a16:creationId xmlns:a16="http://schemas.microsoft.com/office/drawing/2014/main" id="{69B8FCE5-CFD8-4942-8A0D-90AD21BFCD5E}"/>
+                    </a:ext>
+                  </a:extLst>
+                </p:cNvPr>
+                <p:cNvSpPr/>
+                <p:nvPr/>
+              </p:nvSpPr>
+              <p:spPr>
+                <a:xfrm>
+                  <a:off x="3763980" y="-1341945"/>
+                  <a:ext cx="2024680" cy="369332"/>
+                </a:xfrm>
+                <a:prstGeom prst="roundRect">
+                  <a:avLst/>
+                </a:prstGeom>
+                <a:solidFill>
+                  <a:srgbClr val="1C0444"/>
+                </a:solidFill>
+              </p:spPr>
+              <p:style>
+                <a:lnRef idx="2">
+                  <a:schemeClr val="accent1">
+                    <a:shade val="50000"/>
+                  </a:schemeClr>
+                </a:lnRef>
+                <a:fillRef idx="1">
+                  <a:schemeClr val="accent1"/>
+                </a:fillRef>
+                <a:effectRef idx="0">
+                  <a:schemeClr val="accent1"/>
+                </a:effectRef>
+                <a:fontRef idx="minor">
+                  <a:schemeClr val="lt1"/>
+                </a:fontRef>
+              </p:style>
+              <p:txBody>
+                <a:bodyPr rtlCol="0" anchor="ctr"/>
+                <a:lstStyle/>
+                <a:p>
+                  <a:pPr algn="ctr"/>
+                  <a:r>
+                    <a:rPr lang="en-US" dirty="0"/>
+                    <a:t>Human tissues</a:t>
+                  </a:r>
+                </a:p>
+              </p:txBody>
+            </p:sp>
+            <p:sp>
+              <p:nvSpPr>
+                <p:cNvPr id="94" name="Rectangle: Rounded Corners 93">
+                  <a:extLst>
+                    <a:ext uri="{FF2B5EF4-FFF2-40B4-BE49-F238E27FC236}">
+                      <a16:creationId xmlns:a16="http://schemas.microsoft.com/office/drawing/2014/main" id="{AA83B7F6-A80A-4B77-9349-F42634D4B08C}"/>
+                    </a:ext>
+                  </a:extLst>
+                </p:cNvPr>
+                <p:cNvSpPr/>
+                <p:nvPr/>
+              </p:nvSpPr>
+              <p:spPr>
+                <a:xfrm>
+                  <a:off x="3786771" y="-730346"/>
+                  <a:ext cx="2024680" cy="369332"/>
+                </a:xfrm>
+                <a:prstGeom prst="roundRect">
+                  <a:avLst/>
+                </a:prstGeom>
+                <a:solidFill>
+                  <a:srgbClr val="1C0444"/>
+                </a:solidFill>
+              </p:spPr>
+              <p:style>
+                <a:lnRef idx="2">
+                  <a:schemeClr val="accent1">
+                    <a:shade val="50000"/>
+                  </a:schemeClr>
+                </a:lnRef>
+                <a:fillRef idx="1">
+                  <a:schemeClr val="accent1"/>
+                </a:fillRef>
+                <a:effectRef idx="0">
+                  <a:schemeClr val="accent1"/>
+                </a:effectRef>
+                <a:fontRef idx="minor">
+                  <a:schemeClr val="lt1"/>
+                </a:fontRef>
+              </p:style>
+              <p:txBody>
+                <a:bodyPr rtlCol="0" anchor="ctr"/>
+                <a:lstStyle/>
+                <a:p>
+                  <a:pPr algn="ctr"/>
+                  <a:r>
+                    <a:rPr lang="en-US" dirty="0"/>
+                    <a:t>Human tumors</a:t>
+                  </a:r>
+                </a:p>
+              </p:txBody>
+            </p:sp>
+            <p:sp>
+              <p:nvSpPr>
+                <p:cNvPr id="95" name="Rectangle: Rounded Corners 94">
+                  <a:extLst>
+                    <a:ext uri="{FF2B5EF4-FFF2-40B4-BE49-F238E27FC236}">
+                      <a16:creationId xmlns:a16="http://schemas.microsoft.com/office/drawing/2014/main" id="{474A99D8-F02F-4A28-B324-45373A5C165F}"/>
+                    </a:ext>
+                  </a:extLst>
+                </p:cNvPr>
+                <p:cNvSpPr/>
+                <p:nvPr/>
+              </p:nvSpPr>
+              <p:spPr>
+                <a:xfrm>
+                  <a:off x="6380551" y="-1342251"/>
+                  <a:ext cx="2024680" cy="369332"/>
+                </a:xfrm>
+                <a:prstGeom prst="roundRect">
+                  <a:avLst/>
+                </a:prstGeom>
+                <a:solidFill>
+                  <a:srgbClr val="1C0444"/>
+                </a:solidFill>
+              </p:spPr>
+              <p:style>
+                <a:lnRef idx="2">
+                  <a:schemeClr val="accent1">
+                    <a:shade val="50000"/>
+                  </a:schemeClr>
+                </a:lnRef>
+                <a:fillRef idx="1">
+                  <a:schemeClr val="accent1"/>
+                </a:fillRef>
+                <a:effectRef idx="0">
+                  <a:schemeClr val="accent1"/>
+                </a:effectRef>
+                <a:fontRef idx="minor">
+                  <a:schemeClr val="lt1"/>
+                </a:fontRef>
+              </p:style>
+              <p:txBody>
+                <a:bodyPr rtlCol="0" anchor="ctr"/>
+                <a:lstStyle/>
+                <a:p>
+                  <a:pPr algn="ctr"/>
+                  <a:r>
+                    <a:rPr lang="en-US" dirty="0"/>
+                    <a:t>Mouse tissues</a:t>
+                  </a:r>
+                </a:p>
+              </p:txBody>
+            </p:sp>
+            <p:sp>
+              <p:nvSpPr>
+                <p:cNvPr id="96" name="Rectangle: Rounded Corners 95">
+                  <a:extLst>
+                    <a:ext uri="{FF2B5EF4-FFF2-40B4-BE49-F238E27FC236}">
+                      <a16:creationId xmlns:a16="http://schemas.microsoft.com/office/drawing/2014/main" id="{E85043F1-A240-4217-BA13-B7E4AD1771F5}"/>
+                    </a:ext>
+                  </a:extLst>
+                </p:cNvPr>
+                <p:cNvSpPr/>
+                <p:nvPr/>
+              </p:nvSpPr>
+              <p:spPr>
+                <a:xfrm>
+                  <a:off x="6380551" y="-730346"/>
+                  <a:ext cx="2024680" cy="369332"/>
+                </a:xfrm>
+                <a:prstGeom prst="roundRect">
+                  <a:avLst/>
+                </a:prstGeom>
+                <a:solidFill>
+                  <a:srgbClr val="1C0444"/>
+                </a:solidFill>
+              </p:spPr>
+              <p:style>
+                <a:lnRef idx="2">
+                  <a:schemeClr val="accent1">
+                    <a:shade val="50000"/>
+                  </a:schemeClr>
+                </a:lnRef>
+                <a:fillRef idx="1">
+                  <a:schemeClr val="accent1"/>
+                </a:fillRef>
+                <a:effectRef idx="0">
+                  <a:schemeClr val="accent1"/>
+                </a:effectRef>
+                <a:fontRef idx="minor">
+                  <a:schemeClr val="lt1"/>
+                </a:fontRef>
+              </p:style>
+              <p:txBody>
+                <a:bodyPr rtlCol="0" anchor="ctr"/>
+                <a:lstStyle/>
+                <a:p>
+                  <a:pPr algn="ctr"/>
+                  <a:r>
+                    <a:rPr lang="en-US" dirty="0"/>
+                    <a:t>Mouse tumors</a:t>
+                  </a:r>
+                </a:p>
+              </p:txBody>
+            </p:sp>
+          </p:grpSp>
+        </p:grpSp>
+        <p:grpSp>
+          <p:nvGrpSpPr>
+            <p:cNvPr id="3" name="Group 2">
+              <a:extLst>
+                <a:ext uri="{FF2B5EF4-FFF2-40B4-BE49-F238E27FC236}">
+                  <a16:creationId xmlns:a16="http://schemas.microsoft.com/office/drawing/2014/main" id="{5476D928-E768-41FC-97C9-3E6549ECAC7B}"/>
+                </a:ext>
+              </a:extLst>
+            </p:cNvPr>
+            <p:cNvGrpSpPr/>
+            <p:nvPr/>
+          </p:nvGrpSpPr>
+          <p:grpSpPr>
+            <a:xfrm>
+              <a:off x="6112607" y="5185949"/>
+              <a:ext cx="7733159" cy="4205387"/>
+              <a:chOff x="6356447" y="5612669"/>
+              <a:chExt cx="7733159" cy="4205387"/>
+            </a:xfrm>
+          </p:grpSpPr>
+          <p:cxnSp>
+            <p:nvCxnSpPr>
+              <p:cNvPr id="23" name="Straight Arrow Connector 22">
+                <a:extLst>
+                  <a:ext uri="{FF2B5EF4-FFF2-40B4-BE49-F238E27FC236}">
+                    <a16:creationId xmlns:a16="http://schemas.microsoft.com/office/drawing/2014/main" id="{AFEA8FD7-C58C-4CCD-81ED-CA12DF5BFECE}"/>
+                  </a:ext>
+                </a:extLst>
+              </p:cNvPr>
+              <p:cNvCxnSpPr>
+                <a:cxnSpLocks/>
+                <a:stCxn id="25" idx="2"/>
+                <a:endCxn id="119" idx="0"/>
+              </p:cNvCxnSpPr>
+              <p:nvPr/>
+            </p:nvCxnSpPr>
+            <p:spPr>
+              <a:xfrm>
+                <a:off x="6356447" y="5612669"/>
+                <a:ext cx="4581074" cy="1317090"/>
+              </a:xfrm>
+              <a:prstGeom prst="straightConnector1">
+                <a:avLst/>
+              </a:prstGeom>
+              <a:ln w="28575">
+                <a:tailEnd type="triangle"/>
+              </a:ln>
+            </p:spPr>
+            <p:style>
+              <a:lnRef idx="1">
+                <a:schemeClr val="dk1"/>
+              </a:lnRef>
+              <a:fillRef idx="0">
+                <a:schemeClr val="dk1"/>
+              </a:fillRef>
+              <a:effectRef idx="0">
+                <a:schemeClr val="dk1"/>
+              </a:effectRef>
+              <a:fontRef idx="minor">
+                <a:schemeClr val="tx1"/>
+              </a:fontRef>
+            </p:style>
+          </p:cxnSp>
+          <p:grpSp>
+            <p:nvGrpSpPr>
+              <p:cNvPr id="136" name="Group 135">
+                <a:extLst>
+                  <a:ext uri="{FF2B5EF4-FFF2-40B4-BE49-F238E27FC236}">
+                    <a16:creationId xmlns:a16="http://schemas.microsoft.com/office/drawing/2014/main" id="{C751E94B-65D8-4062-ABE7-74D6069CEDE7}"/>
+                  </a:ext>
+                </a:extLst>
+              </p:cNvPr>
+              <p:cNvGrpSpPr/>
+              <p:nvPr/>
+            </p:nvGrpSpPr>
+            <p:grpSpPr>
+              <a:xfrm>
+                <a:off x="7785436" y="6929759"/>
+                <a:ext cx="6304170" cy="2888297"/>
+                <a:chOff x="2999721" y="6003842"/>
+                <a:chExt cx="6304170" cy="2888297"/>
+              </a:xfrm>
+            </p:grpSpPr>
+            <p:sp>
+              <p:nvSpPr>
+                <p:cNvPr id="119" name="Rectangle: Rounded Corners 118">
+                  <a:extLst>
+                    <a:ext uri="{FF2B5EF4-FFF2-40B4-BE49-F238E27FC236}">
+                      <a16:creationId xmlns:a16="http://schemas.microsoft.com/office/drawing/2014/main" id="{C24ADC0B-44D9-4738-8B52-E1E118D69121}"/>
+                    </a:ext>
+                  </a:extLst>
+                </p:cNvPr>
+                <p:cNvSpPr/>
+                <p:nvPr/>
+              </p:nvSpPr>
+              <p:spPr>
+                <a:xfrm>
+                  <a:off x="2999721" y="6003842"/>
+                  <a:ext cx="6304170" cy="2888297"/>
+                </a:xfrm>
+                <a:prstGeom prst="roundRect">
+                  <a:avLst/>
+                </a:prstGeom>
+                <a:noFill/>
+                <a:ln w="28575">
+                  <a:solidFill>
+                    <a:schemeClr val="tx1"/>
+                  </a:solidFill>
+                </a:ln>
+              </p:spPr>
+              <p:style>
+                <a:lnRef idx="2">
+                  <a:schemeClr val="accent1">
+                    <a:shade val="50000"/>
+                  </a:schemeClr>
+                </a:lnRef>
+                <a:fillRef idx="1">
+                  <a:schemeClr val="accent1"/>
+                </a:fillRef>
+                <a:effectRef idx="0">
+                  <a:schemeClr val="accent1"/>
+                </a:effectRef>
+                <a:fontRef idx="minor">
+                  <a:schemeClr val="lt1"/>
+                </a:fontRef>
+              </p:style>
+              <p:txBody>
+                <a:bodyPr rtlCol="0" anchor="ctr"/>
+                <a:lstStyle/>
+                <a:p>
+                  <a:pPr algn="ctr"/>
+                  <a:endParaRPr lang="en-US"/>
+                </a:p>
+              </p:txBody>
+            </p:sp>
+            <p:cxnSp>
+              <p:nvCxnSpPr>
+                <p:cNvPr id="120" name="Straight Connector 119">
+                  <a:extLst>
+                    <a:ext uri="{FF2B5EF4-FFF2-40B4-BE49-F238E27FC236}">
+                      <a16:creationId xmlns:a16="http://schemas.microsoft.com/office/drawing/2014/main" id="{2A4A01EF-ED53-414E-82D9-4A5D0C70AEE8}"/>
+                    </a:ext>
+                  </a:extLst>
+                </p:cNvPr>
+                <p:cNvCxnSpPr>
+                  <a:cxnSpLocks/>
+                </p:cNvCxnSpPr>
+                <p:nvPr/>
+              </p:nvCxnSpPr>
+              <p:spPr>
+                <a:xfrm flipV="1">
+                  <a:off x="3060681" y="6448543"/>
+                  <a:ext cx="6182250" cy="7744"/>
+                </a:xfrm>
+                <a:prstGeom prst="line">
+                  <a:avLst/>
+                </a:prstGeom>
+                <a:ln w="12700"/>
+              </p:spPr>
+              <p:style>
+                <a:lnRef idx="1">
+                  <a:schemeClr val="dk1"/>
+                </a:lnRef>
+                <a:fillRef idx="0">
+                  <a:schemeClr val="dk1"/>
+                </a:fillRef>
+                <a:effectRef idx="0">
+                  <a:schemeClr val="dk1"/>
+                </a:effectRef>
+                <a:fontRef idx="minor">
+                  <a:schemeClr val="tx1"/>
+                </a:fontRef>
+              </p:style>
+            </p:cxnSp>
+            <p:sp>
+              <p:nvSpPr>
+                <p:cNvPr id="121" name="TextBox 120">
+                  <a:extLst>
+                    <a:ext uri="{FF2B5EF4-FFF2-40B4-BE49-F238E27FC236}">
+                      <a16:creationId xmlns:a16="http://schemas.microsoft.com/office/drawing/2014/main" id="{F81A6E6E-B7AA-4E41-B5E7-1BBA774DDA4D}"/>
+                    </a:ext>
+                  </a:extLst>
+                </p:cNvPr>
+                <p:cNvSpPr txBox="1"/>
+                <p:nvPr/>
+              </p:nvSpPr>
+              <p:spPr>
+                <a:xfrm>
+                  <a:off x="5061498" y="6056535"/>
+                  <a:ext cx="2180615" cy="369332"/>
+                </a:xfrm>
+                <a:prstGeom prst="rect">
+                  <a:avLst/>
+                </a:prstGeom>
+                <a:noFill/>
+              </p:spPr>
+              <p:txBody>
+                <a:bodyPr wrap="square" rtlCol="0">
+                  <a:spAutoFit/>
+                </a:bodyPr>
+                <a:lstStyle/>
+                <a:p>
+                  <a:r>
+                    <a:rPr lang="en-US" dirty="0"/>
+                    <a:t>Gene vs. Gene Mode</a:t>
+                  </a:r>
+                </a:p>
+              </p:txBody>
+            </p:sp>
+            <p:sp>
+              <p:nvSpPr>
+                <p:cNvPr id="122" name="TextBox 121">
+                  <a:extLst>
+                    <a:ext uri="{FF2B5EF4-FFF2-40B4-BE49-F238E27FC236}">
+                      <a16:creationId xmlns:a16="http://schemas.microsoft.com/office/drawing/2014/main" id="{E8052125-96F3-4DD6-9B26-F24C17B21623}"/>
+                    </a:ext>
+                  </a:extLst>
+                </p:cNvPr>
+                <p:cNvSpPr txBox="1"/>
+                <p:nvPr/>
+              </p:nvSpPr>
+              <p:spPr>
+                <a:xfrm>
+                  <a:off x="3060681" y="6585616"/>
+                  <a:ext cx="6182250" cy="369332"/>
+                </a:xfrm>
+                <a:prstGeom prst="rect">
+                  <a:avLst/>
+                </a:prstGeom>
+                <a:noFill/>
+              </p:spPr>
+              <p:txBody>
+                <a:bodyPr wrap="square" rtlCol="0">
+                  <a:spAutoFit/>
+                </a:bodyPr>
+                <a:lstStyle/>
+                <a:p>
+                  <a:r>
+                    <a:rPr lang="en-US" dirty="0"/>
+                    <a:t>“ATM vs HMOX1”, “ATM (brain-normal vs. brain-cancer)” …</a:t>
+                  </a:r>
+                </a:p>
+              </p:txBody>
+            </p:sp>
+            <p:cxnSp>
+              <p:nvCxnSpPr>
+                <p:cNvPr id="123" name="Straight Connector 122">
+                  <a:extLst>
+                    <a:ext uri="{FF2B5EF4-FFF2-40B4-BE49-F238E27FC236}">
+                      <a16:creationId xmlns:a16="http://schemas.microsoft.com/office/drawing/2014/main" id="{BE4BC511-5D1F-4FB5-AB83-F4709C1B60CA}"/>
+                    </a:ext>
+                  </a:extLst>
+                </p:cNvPr>
+                <p:cNvCxnSpPr>
+                  <a:cxnSpLocks/>
+                </p:cNvCxnSpPr>
+                <p:nvPr/>
+              </p:nvCxnSpPr>
+              <p:spPr>
+                <a:xfrm flipV="1">
+                  <a:off x="3006697" y="7028838"/>
+                  <a:ext cx="6297194" cy="858"/>
+                </a:xfrm>
+                <a:prstGeom prst="line">
+                  <a:avLst/>
+                </a:prstGeom>
+                <a:ln w="12700"/>
+              </p:spPr>
+              <p:style>
+                <a:lnRef idx="1">
+                  <a:schemeClr val="dk1"/>
+                </a:lnRef>
+                <a:fillRef idx="0">
+                  <a:schemeClr val="dk1"/>
+                </a:fillRef>
+                <a:effectRef idx="0">
+                  <a:schemeClr val="dk1"/>
+                </a:effectRef>
+                <a:fontRef idx="minor">
+                  <a:schemeClr val="tx1"/>
+                </a:fontRef>
+              </p:style>
+            </p:cxnSp>
+          </p:grpSp>
+        </p:grpSp>
+        <p:cxnSp>
+          <p:nvCxnSpPr>
+            <p:cNvPr id="141" name="Straight Arrow Connector 140">
+              <a:extLst>
+                <a:ext uri="{FF2B5EF4-FFF2-40B4-BE49-F238E27FC236}">
+                  <a16:creationId xmlns:a16="http://schemas.microsoft.com/office/drawing/2014/main" id="{4C7FDA43-B6EB-4D4D-9921-76DC5B0C73BA}"/>
+                </a:ext>
+              </a:extLst>
+            </p:cNvPr>
+            <p:cNvCxnSpPr>
+              <a:cxnSpLocks/>
+              <a:endCxn id="28" idx="3"/>
+            </p:cNvCxnSpPr>
+            <p:nvPr/>
+          </p:nvCxnSpPr>
+          <p:spPr>
+            <a:xfrm flipH="1">
+              <a:off x="2155132" y="3808392"/>
+              <a:ext cx="1695788" cy="0"/>
+            </a:xfrm>
+            <a:prstGeom prst="straightConnector1">
+              <a:avLst/>
+            </a:prstGeom>
+            <a:ln w="28575">
+              <a:tailEnd type="triangle"/>
+            </a:ln>
+          </p:spPr>
+          <p:style>
+            <a:lnRef idx="1">
+              <a:schemeClr val="dk1"/>
+            </a:lnRef>
+            <a:fillRef idx="0">
+              <a:schemeClr val="dk1"/>
+            </a:fillRef>
+            <a:effectRef idx="0">
+              <a:schemeClr val="dk1"/>
+            </a:effectRef>
+            <a:fontRef idx="minor">
+              <a:schemeClr val="tx1"/>
+            </a:fontRef>
+          </p:style>
+        </p:cxnSp>
+        <p:cxnSp>
+          <p:nvCxnSpPr>
+            <p:cNvPr id="143" name="Straight Arrow Connector 142">
+              <a:extLst>
+                <a:ext uri="{FF2B5EF4-FFF2-40B4-BE49-F238E27FC236}">
+                  <a16:creationId xmlns:a16="http://schemas.microsoft.com/office/drawing/2014/main" id="{10E7F4BB-579A-4C04-AD87-DEF0C7B39B76}"/>
+                </a:ext>
+              </a:extLst>
+            </p:cNvPr>
+            <p:cNvCxnSpPr>
+              <a:cxnSpLocks/>
+              <a:endCxn id="32" idx="1"/>
+            </p:cNvCxnSpPr>
+            <p:nvPr/>
+          </p:nvCxnSpPr>
+          <p:spPr>
+            <a:xfrm flipV="1">
+              <a:off x="8336931" y="3803428"/>
+              <a:ext cx="1699936" cy="4964"/>
+            </a:xfrm>
+            <a:prstGeom prst="straightConnector1">
+              <a:avLst/>
+            </a:prstGeom>
+            <a:ln w="28575">
+              <a:tailEnd type="triangle"/>
+            </a:ln>
+          </p:spPr>
+          <p:style>
+            <a:lnRef idx="1">
+              <a:schemeClr val="dk1"/>
+            </a:lnRef>
+            <a:fillRef idx="0">
+              <a:schemeClr val="dk1"/>
+            </a:fillRef>
+            <a:effectRef idx="0">
+              <a:schemeClr val="dk1"/>
+            </a:effectRef>
+            <a:fontRef idx="minor">
+              <a:schemeClr val="tx1"/>
+            </a:fontRef>
+          </p:style>
+        </p:cxnSp>
+        <p:sp>
+          <p:nvSpPr>
+            <p:cNvPr id="24" name="Rectangle 23">
+              <a:extLst>
+                <a:ext uri="{FF2B5EF4-FFF2-40B4-BE49-F238E27FC236}">
+                  <a16:creationId xmlns:a16="http://schemas.microsoft.com/office/drawing/2014/main" id="{8B8A8503-C7D6-4AB8-BFA4-EC3530DE4535}"/>
+                </a:ext>
+              </a:extLst>
+            </p:cNvPr>
+            <p:cNvSpPr/>
+            <p:nvPr/>
+          </p:nvSpPr>
+          <p:spPr>
+            <a:xfrm>
+              <a:off x="3850921" y="2438838"/>
+              <a:ext cx="4484598" cy="2741154"/>
+            </a:xfrm>
+            <a:prstGeom prst="rect">
+              <a:avLst/>
+            </a:prstGeom>
+            <a:solidFill>
+              <a:srgbClr val="1C0444"/>
+            </a:solidFill>
+            <a:effectLst>
+              <a:glow rad="101600">
+                <a:schemeClr val="accent2">
+                  <a:satMod val="175000"/>
+                  <a:alpha val="40000"/>
+                </a:schemeClr>
+              </a:glow>
+            </a:effectLst>
+          </p:spPr>
+          <p:style>
+            <a:lnRef idx="2">
+              <a:schemeClr val="accent1">
+                <a:shade val="50000"/>
+              </a:schemeClr>
+            </a:lnRef>
+            <a:fillRef idx="1">
+              <a:schemeClr val="accent1"/>
+            </a:fillRef>
+            <a:effectRef idx="0">
+              <a:schemeClr val="accent1"/>
+            </a:effectRef>
+            <a:fontRef idx="minor">
+              <a:schemeClr val="lt1"/>
+            </a:fontRef>
+          </p:style>
+          <p:txBody>
+            <a:bodyPr rtlCol="0" anchor="ctr"/>
+            <a:lstStyle/>
+            <a:p>
+              <a:pPr algn="ctr"/>
+              <a:endParaRPr lang="en-US" dirty="0"/>
+            </a:p>
+          </p:txBody>
+        </p:sp>
+        <p:sp>
+          <p:nvSpPr>
+            <p:cNvPr id="25" name="TextBox 24">
+              <a:extLst>
+                <a:ext uri="{FF2B5EF4-FFF2-40B4-BE49-F238E27FC236}">
+                  <a16:creationId xmlns:a16="http://schemas.microsoft.com/office/drawing/2014/main" id="{FFAC7B7B-BBD1-454B-9E91-6B69B410BB4F}"/>
+                </a:ext>
+              </a:extLst>
+            </p:cNvPr>
+            <p:cNvSpPr txBox="1"/>
+            <p:nvPr/>
+          </p:nvSpPr>
+          <p:spPr>
+            <a:xfrm>
+              <a:off x="4056412" y="4601174"/>
+              <a:ext cx="4112389" cy="584775"/>
+            </a:xfrm>
+            <a:prstGeom prst="rect">
+              <a:avLst/>
+            </a:prstGeom>
+            <a:noFill/>
+          </p:spPr>
+          <p:txBody>
+            <a:bodyPr wrap="square" rtlCol="0">
+              <a:spAutoFit/>
+            </a:bodyPr>
+            <a:lstStyle/>
+            <a:p>
+              <a:r>
+                <a:rPr lang="en-US" sz="3200" dirty="0">
+                  <a:solidFill>
+                    <a:schemeClr val="bg1"/>
+                  </a:solidFill>
+                  <a:latin typeface="Aharoni" panose="02010803020104030203" pitchFamily="2" charset="-79"/>
+                  <a:cs typeface="Aharoni" panose="02010803020104030203" pitchFamily="2" charset="-79"/>
+                </a:rPr>
+                <a:t>correlationAnalyzeR</a:t>
+              </a:r>
+            </a:p>
+          </p:txBody>
+        </p:sp>
         <p:pic>
           <p:nvPicPr>
-            <p:cNvPr id="125" name="Picture 124">
+            <p:cNvPr id="27" name="Picture 26">
               <a:extLst>
                 <a:ext uri="{FF2B5EF4-FFF2-40B4-BE49-F238E27FC236}">
-                  <a16:creationId xmlns:a16="http://schemas.microsoft.com/office/drawing/2014/main" id="{6048A5EF-4F18-410A-9C7B-ED37181A9BB4}"/>
+                  <a16:creationId xmlns:a16="http://schemas.microsoft.com/office/drawing/2014/main" id="{7FD2366A-2C5E-4AF2-9ABC-9D19026E60C1}"/>
                 </a:ext>
               </a:extLst>
             </p:cNvPr>
             <p:cNvPicPr>
               <a:picLocks noChangeAspect="1"/>
+            </p:cNvPicPr>
+            <p:nvPr/>
+          </p:nvPicPr>
+          <p:blipFill>
+            <a:blip r:embed="rId3">
+              <a:extLst>
+                <a:ext uri="{28A0092B-C50C-407E-A947-70E740481C1C}">
+                  <a14:useLocalDpi xmlns:a14="http://schemas.microsoft.com/office/drawing/2010/main" val="0"/>
+                </a:ext>
+              </a:extLst>
+            </a:blip>
+            <a:stretch>
+              <a:fillRect/>
+            </a:stretch>
+          </p:blipFill>
+          <p:spPr>
+            <a:xfrm>
+              <a:off x="5051596" y="2531195"/>
+              <a:ext cx="2081382" cy="2081382"/>
+            </a:xfrm>
+            <a:prstGeom prst="rect">
+              <a:avLst/>
+            </a:prstGeom>
+          </p:spPr>
+        </p:pic>
+        <p:grpSp>
+          <p:nvGrpSpPr>
+            <p:cNvPr id="62" name="Group 61">
+              <a:extLst>
+                <a:ext uri="{FF2B5EF4-FFF2-40B4-BE49-F238E27FC236}">
+                  <a16:creationId xmlns:a16="http://schemas.microsoft.com/office/drawing/2014/main" id="{844190F7-4022-4E5B-A6FB-57F9F3ACFFE4}"/>
+                </a:ext>
+              </a:extLst>
+            </p:cNvPr>
+            <p:cNvGrpSpPr/>
+            <p:nvPr/>
+          </p:nvGrpSpPr>
+          <p:grpSpPr>
+            <a:xfrm flipH="1">
+              <a:off x="-1633110" y="5185949"/>
+              <a:ext cx="7745717" cy="4216689"/>
+              <a:chOff x="6343889" y="5601367"/>
+              <a:chExt cx="7745717" cy="4216689"/>
+            </a:xfrm>
+          </p:grpSpPr>
+          <p:cxnSp>
+            <p:nvCxnSpPr>
+              <p:cNvPr id="63" name="Straight Arrow Connector 62">
+                <a:extLst>
+                  <a:ext uri="{FF2B5EF4-FFF2-40B4-BE49-F238E27FC236}">
+                    <a16:creationId xmlns:a16="http://schemas.microsoft.com/office/drawing/2014/main" id="{C2972362-F502-436C-A4F4-88C048307D06}"/>
+                  </a:ext>
+                </a:extLst>
+              </p:cNvPr>
+              <p:cNvCxnSpPr>
+                <a:cxnSpLocks/>
+                <a:stCxn id="25" idx="2"/>
+                <a:endCxn id="65" idx="0"/>
+              </p:cNvCxnSpPr>
+              <p:nvPr/>
+            </p:nvCxnSpPr>
+            <p:spPr>
+              <a:xfrm>
+                <a:off x="6343889" y="5601367"/>
+                <a:ext cx="4593632" cy="1328392"/>
+              </a:xfrm>
+              <a:prstGeom prst="straightConnector1">
+                <a:avLst/>
+              </a:prstGeom>
+              <a:ln w="28575">
+                <a:tailEnd type="triangle"/>
+              </a:ln>
+            </p:spPr>
+            <p:style>
+              <a:lnRef idx="1">
+                <a:schemeClr val="dk1"/>
+              </a:lnRef>
+              <a:fillRef idx="0">
+                <a:schemeClr val="dk1"/>
+              </a:fillRef>
+              <a:effectRef idx="0">
+                <a:schemeClr val="dk1"/>
+              </a:effectRef>
+              <a:fontRef idx="minor">
+                <a:schemeClr val="tx1"/>
+              </a:fontRef>
+            </p:style>
+          </p:cxnSp>
+          <p:grpSp>
+            <p:nvGrpSpPr>
+              <p:cNvPr id="64" name="Group 63">
+                <a:extLst>
+                  <a:ext uri="{FF2B5EF4-FFF2-40B4-BE49-F238E27FC236}">
+                    <a16:creationId xmlns:a16="http://schemas.microsoft.com/office/drawing/2014/main" id="{2557AA46-FFDB-4FCB-B22A-D5CC019E8BB6}"/>
+                  </a:ext>
+                </a:extLst>
+              </p:cNvPr>
+              <p:cNvGrpSpPr/>
+              <p:nvPr/>
+            </p:nvGrpSpPr>
+            <p:grpSpPr>
+              <a:xfrm>
+                <a:off x="7785436" y="6929759"/>
+                <a:ext cx="6304170" cy="2888297"/>
+                <a:chOff x="2999721" y="6003842"/>
+                <a:chExt cx="6304170" cy="2888297"/>
+              </a:xfrm>
+            </p:grpSpPr>
+            <p:sp>
+              <p:nvSpPr>
+                <p:cNvPr id="65" name="Rectangle: Rounded Corners 64">
+                  <a:extLst>
+                    <a:ext uri="{FF2B5EF4-FFF2-40B4-BE49-F238E27FC236}">
+                      <a16:creationId xmlns:a16="http://schemas.microsoft.com/office/drawing/2014/main" id="{6F8D46A7-490D-4FB1-8820-CA69A29D332E}"/>
+                    </a:ext>
+                  </a:extLst>
+                </p:cNvPr>
+                <p:cNvSpPr/>
+                <p:nvPr/>
+              </p:nvSpPr>
+              <p:spPr>
+                <a:xfrm>
+                  <a:off x="2999721" y="6003842"/>
+                  <a:ext cx="6304170" cy="2888297"/>
+                </a:xfrm>
+                <a:prstGeom prst="roundRect">
+                  <a:avLst/>
+                </a:prstGeom>
+                <a:noFill/>
+                <a:ln w="28575">
+                  <a:solidFill>
+                    <a:schemeClr val="tx1"/>
+                  </a:solidFill>
+                </a:ln>
+              </p:spPr>
+              <p:style>
+                <a:lnRef idx="2">
+                  <a:schemeClr val="accent1">
+                    <a:shade val="50000"/>
+                  </a:schemeClr>
+                </a:lnRef>
+                <a:fillRef idx="1">
+                  <a:schemeClr val="accent1"/>
+                </a:fillRef>
+                <a:effectRef idx="0">
+                  <a:schemeClr val="accent1"/>
+                </a:effectRef>
+                <a:fontRef idx="minor">
+                  <a:schemeClr val="lt1"/>
+                </a:fontRef>
+              </p:style>
+              <p:txBody>
+                <a:bodyPr rtlCol="0" anchor="ctr"/>
+                <a:lstStyle/>
+                <a:p>
+                  <a:pPr algn="ctr"/>
+                  <a:endParaRPr lang="en-US"/>
+                </a:p>
+              </p:txBody>
+            </p:sp>
+            <p:cxnSp>
+              <p:nvCxnSpPr>
+                <p:cNvPr id="66" name="Straight Connector 65">
+                  <a:extLst>
+                    <a:ext uri="{FF2B5EF4-FFF2-40B4-BE49-F238E27FC236}">
+                      <a16:creationId xmlns:a16="http://schemas.microsoft.com/office/drawing/2014/main" id="{661D465D-701A-49EB-B4DB-3DF337DD8953}"/>
+                    </a:ext>
+                  </a:extLst>
+                </p:cNvPr>
+                <p:cNvCxnSpPr>
+                  <a:cxnSpLocks/>
+                </p:cNvCxnSpPr>
+                <p:nvPr/>
+              </p:nvCxnSpPr>
+              <p:spPr>
+                <a:xfrm flipV="1">
+                  <a:off x="3060681" y="6448543"/>
+                  <a:ext cx="6182250" cy="7744"/>
+                </a:xfrm>
+                <a:prstGeom prst="line">
+                  <a:avLst/>
+                </a:prstGeom>
+                <a:ln w="12700"/>
+              </p:spPr>
+              <p:style>
+                <a:lnRef idx="1">
+                  <a:schemeClr val="dk1"/>
+                </a:lnRef>
+                <a:fillRef idx="0">
+                  <a:schemeClr val="dk1"/>
+                </a:fillRef>
+                <a:effectRef idx="0">
+                  <a:schemeClr val="dk1"/>
+                </a:effectRef>
+                <a:fontRef idx="minor">
+                  <a:schemeClr val="tx1"/>
+                </a:fontRef>
+              </p:style>
+            </p:cxnSp>
+            <p:sp>
+              <p:nvSpPr>
+                <p:cNvPr id="67" name="TextBox 66">
+                  <a:extLst>
+                    <a:ext uri="{FF2B5EF4-FFF2-40B4-BE49-F238E27FC236}">
+                      <a16:creationId xmlns:a16="http://schemas.microsoft.com/office/drawing/2014/main" id="{B29BEB78-0048-4136-B0F4-98F10F4167E3}"/>
+                    </a:ext>
+                  </a:extLst>
+                </p:cNvPr>
+                <p:cNvSpPr txBox="1"/>
+                <p:nvPr/>
+              </p:nvSpPr>
+              <p:spPr>
+                <a:xfrm>
+                  <a:off x="5329616" y="6045233"/>
+                  <a:ext cx="1651357" cy="369332"/>
+                </a:xfrm>
+                <a:prstGeom prst="rect">
+                  <a:avLst/>
+                </a:prstGeom>
+                <a:noFill/>
+              </p:spPr>
+              <p:txBody>
+                <a:bodyPr wrap="square" rtlCol="0">
+                  <a:spAutoFit/>
+                </a:bodyPr>
+                <a:lstStyle/>
+                <a:p>
+                  <a:r>
+                    <a:rPr lang="en-US" dirty="0"/>
+                    <a:t>Topology Mode</a:t>
+                  </a:r>
+                </a:p>
+              </p:txBody>
+            </p:sp>
+            <p:sp>
+              <p:nvSpPr>
+                <p:cNvPr id="69" name="TextBox 68">
+                  <a:extLst>
+                    <a:ext uri="{FF2B5EF4-FFF2-40B4-BE49-F238E27FC236}">
+                      <a16:creationId xmlns:a16="http://schemas.microsoft.com/office/drawing/2014/main" id="{1744F5A3-9D5A-4E54-A7B6-E135D4077376}"/>
+                    </a:ext>
+                  </a:extLst>
+                </p:cNvPr>
+                <p:cNvSpPr txBox="1"/>
+                <p:nvPr/>
+              </p:nvSpPr>
+              <p:spPr>
+                <a:xfrm>
+                  <a:off x="3060681" y="6585616"/>
+                  <a:ext cx="6182250" cy="369332"/>
+                </a:xfrm>
+                <a:prstGeom prst="rect">
+                  <a:avLst/>
+                </a:prstGeom>
+                <a:noFill/>
+              </p:spPr>
+              <p:txBody>
+                <a:bodyPr wrap="square" rtlCol="0">
+                  <a:spAutoFit/>
+                </a:bodyPr>
+                <a:lstStyle/>
+                <a:p>
+                  <a:r>
+                    <a:rPr lang="en-US" dirty="0"/>
+                    <a:t>“ATM, BRCA1, EZH2 …” or “BIOCARTA_PROTEASOME_PATHWAY” </a:t>
+                  </a:r>
+                </a:p>
+              </p:txBody>
+            </p:sp>
+            <p:cxnSp>
+              <p:nvCxnSpPr>
+                <p:cNvPr id="71" name="Straight Connector 70">
+                  <a:extLst>
+                    <a:ext uri="{FF2B5EF4-FFF2-40B4-BE49-F238E27FC236}">
+                      <a16:creationId xmlns:a16="http://schemas.microsoft.com/office/drawing/2014/main" id="{328F3765-7C2C-41F0-BBD8-A03BC11944DB}"/>
+                    </a:ext>
+                  </a:extLst>
+                </p:cNvPr>
+                <p:cNvCxnSpPr>
+                  <a:cxnSpLocks/>
+                </p:cNvCxnSpPr>
+                <p:nvPr/>
+              </p:nvCxnSpPr>
+              <p:spPr>
+                <a:xfrm flipV="1">
+                  <a:off x="3006697" y="7028838"/>
+                  <a:ext cx="6297194" cy="858"/>
+                </a:xfrm>
+                <a:prstGeom prst="line">
+                  <a:avLst/>
+                </a:prstGeom>
+                <a:ln w="12700"/>
+              </p:spPr>
+              <p:style>
+                <a:lnRef idx="1">
+                  <a:schemeClr val="dk1"/>
+                </a:lnRef>
+                <a:fillRef idx="0">
+                  <a:schemeClr val="dk1"/>
+                </a:fillRef>
+                <a:effectRef idx="0">
+                  <a:schemeClr val="dk1"/>
+                </a:effectRef>
+                <a:fontRef idx="minor">
+                  <a:schemeClr val="tx1"/>
+                </a:fontRef>
+              </p:style>
+            </p:cxnSp>
+            <p:pic>
+              <p:nvPicPr>
+                <p:cNvPr id="73" name="Picture 72" descr="A picture containing sky&#10;&#10;Description automatically generated">
+                  <a:extLst>
+                    <a:ext uri="{FF2B5EF4-FFF2-40B4-BE49-F238E27FC236}">
+                      <a16:creationId xmlns:a16="http://schemas.microsoft.com/office/drawing/2014/main" id="{F569C89F-BECA-453D-9E6B-63FEBC85E444}"/>
+                    </a:ext>
+                  </a:extLst>
+                </p:cNvPr>
+                <p:cNvPicPr>
+                  <a:picLocks noChangeAspect="1"/>
+                </p:cNvPicPr>
+                <p:nvPr/>
+              </p:nvPicPr>
+              <p:blipFill rotWithShape="1">
+                <a:blip r:embed="rId4">
+                  <a:extLst>
+                    <a:ext uri="{28A0092B-C50C-407E-A947-70E740481C1C}">
+                      <a14:useLocalDpi xmlns:a14="http://schemas.microsoft.com/office/drawing/2010/main" val="0"/>
+                    </a:ext>
+                  </a:extLst>
+                </a:blip>
+                <a:srcRect t="7780" r="10961"/>
+                <a:stretch/>
+              </p:blipFill>
+              <p:spPr>
+                <a:xfrm>
+                  <a:off x="3147878" y="7215088"/>
+                  <a:ext cx="1631824" cy="1309551"/>
+                </a:xfrm>
+                <a:prstGeom prst="rect">
+                  <a:avLst/>
+                </a:prstGeom>
+              </p:spPr>
+            </p:pic>
+            <p:pic>
+              <p:nvPicPr>
+                <p:cNvPr id="74" name="Picture 73">
+                  <a:extLst>
+                    <a:ext uri="{FF2B5EF4-FFF2-40B4-BE49-F238E27FC236}">
+                      <a16:creationId xmlns:a16="http://schemas.microsoft.com/office/drawing/2014/main" id="{4D6CA198-D834-4CA0-947B-D07DEB980DD3}"/>
+                    </a:ext>
+                  </a:extLst>
+                </p:cNvPr>
+                <p:cNvPicPr>
+                  <a:picLocks noChangeAspect="1"/>
+                </p:cNvPicPr>
+                <p:nvPr/>
+              </p:nvPicPr>
+              <p:blipFill rotWithShape="1">
+                <a:blip r:embed="rId5">
+                  <a:extLst>
+                    <a:ext uri="{28A0092B-C50C-407E-A947-70E740481C1C}">
+                      <a14:useLocalDpi xmlns:a14="http://schemas.microsoft.com/office/drawing/2010/main" val="0"/>
+                    </a:ext>
+                  </a:extLst>
+                </a:blip>
+                <a:srcRect l="29040" r="9806"/>
+                <a:stretch/>
+              </p:blipFill>
+              <p:spPr>
+                <a:xfrm>
+                  <a:off x="5198645" y="7212514"/>
+                  <a:ext cx="1937849" cy="1306977"/>
+                </a:xfrm>
+                <a:prstGeom prst="rect">
+                  <a:avLst/>
+                </a:prstGeom>
+              </p:spPr>
+            </p:pic>
+            <p:pic>
+              <p:nvPicPr>
+                <p:cNvPr id="75" name="Picture 74" descr="A screenshot of a cell phone&#10;&#10;Description automatically generated">
+                  <a:extLst>
+                    <a:ext uri="{FF2B5EF4-FFF2-40B4-BE49-F238E27FC236}">
+                      <a16:creationId xmlns:a16="http://schemas.microsoft.com/office/drawing/2014/main" id="{BABF96CD-6170-404A-864B-0D653633D8CB}"/>
+                    </a:ext>
+                  </a:extLst>
+                </p:cNvPr>
+                <p:cNvPicPr>
+                  <a:picLocks noChangeAspect="1"/>
+                </p:cNvPicPr>
+                <p:nvPr/>
+              </p:nvPicPr>
+              <p:blipFill rotWithShape="1">
+                <a:blip r:embed="rId6">
+                  <a:extLst>
+                    <a:ext uri="{28A0092B-C50C-407E-A947-70E740481C1C}">
+                      <a14:useLocalDpi xmlns:a14="http://schemas.microsoft.com/office/drawing/2010/main" val="0"/>
+                    </a:ext>
+                  </a:extLst>
+                </a:blip>
+                <a:srcRect l="19237" t="4418" r="8189"/>
+                <a:stretch/>
+              </p:blipFill>
+              <p:spPr>
+                <a:xfrm>
+                  <a:off x="7516487" y="7215088"/>
+                  <a:ext cx="1654612" cy="1304403"/>
+                </a:xfrm>
+                <a:prstGeom prst="rect">
+                  <a:avLst/>
+                </a:prstGeom>
+              </p:spPr>
+            </p:pic>
+          </p:grpSp>
+        </p:grpSp>
+        <p:pic>
+          <p:nvPicPr>
+            <p:cNvPr id="1026" name="Picture 2">
+              <a:extLst>
+                <a:ext uri="{FF2B5EF4-FFF2-40B4-BE49-F238E27FC236}">
+                  <a16:creationId xmlns:a16="http://schemas.microsoft.com/office/drawing/2014/main" id="{32829B9A-DB77-427A-B4E4-7A15532A3BE8}"/>
+                </a:ext>
+              </a:extLst>
+            </p:cNvPr>
+            <p:cNvPicPr>
+              <a:picLocks noChangeAspect="1" noChangeArrowheads="1"/>
             </p:cNvPicPr>
             <p:nvPr/>
           </p:nvPicPr>
@@ -4660,13 +5169,106 @@
                 </a:ext>
               </a:extLst>
             </a:blip>
-            <a:srcRect l="29040" r="9806"/>
+            <a:srcRect t="6899"/>
             <a:stretch/>
+          </p:blipFill>
+          <p:spPr bwMode="auto">
+            <a:xfrm>
+              <a:off x="8063077" y="7723053"/>
+              <a:ext cx="2156348" cy="1386927"/>
+            </a:xfrm>
+            <a:prstGeom prst="rect">
+              <a:avLst/>
+            </a:prstGeom>
+            <a:noFill/>
+            <a:extLst>
+              <a:ext uri="{909E8E84-426E-40DD-AFC4-6F175D3DCCD1}">
+                <a14:hiddenFill xmlns:a14="http://schemas.microsoft.com/office/drawing/2010/main">
+                  <a:solidFill>
+                    <a:srgbClr val="FFFFFF"/>
+                  </a:solidFill>
+                </a14:hiddenFill>
+              </a:ext>
+            </a:extLst>
+          </p:spPr>
+        </p:pic>
+        <p:pic>
+          <p:nvPicPr>
+            <p:cNvPr id="1030" name="Picture 6">
+              <a:extLst>
+                <a:ext uri="{FF2B5EF4-FFF2-40B4-BE49-F238E27FC236}">
+                  <a16:creationId xmlns:a16="http://schemas.microsoft.com/office/drawing/2014/main" id="{BD5F854F-7E36-4E7F-A148-568082D41154}"/>
+                </a:ext>
+              </a:extLst>
+            </p:cNvPr>
+            <p:cNvPicPr>
+              <a:picLocks noChangeAspect="1" noChangeArrowheads="1"/>
+            </p:cNvPicPr>
+            <p:nvPr/>
+          </p:nvPicPr>
+          <p:blipFill>
+            <a:blip r:embed="rId8">
+              <a:extLst>
+                <a:ext uri="{28A0092B-C50C-407E-A947-70E740481C1C}">
+                  <a14:useLocalDpi xmlns:a14="http://schemas.microsoft.com/office/drawing/2010/main" val="0"/>
+                </a:ext>
+              </a:extLst>
+            </a:blip>
+            <a:srcRect/>
+            <a:stretch>
+              <a:fillRect/>
+            </a:stretch>
+          </p:blipFill>
+          <p:spPr bwMode="auto">
+            <a:xfrm>
+              <a:off x="10739156" y="7723053"/>
+              <a:ext cx="2705343" cy="1383807"/>
+            </a:xfrm>
+            <a:prstGeom prst="rect">
+              <a:avLst/>
+            </a:prstGeom>
+            <a:noFill/>
+            <a:extLst>
+              <a:ext uri="{909E8E84-426E-40DD-AFC4-6F175D3DCCD1}">
+                <a14:hiddenFill xmlns:a14="http://schemas.microsoft.com/office/drawing/2010/main">
+                  <a:solidFill>
+                    <a:srgbClr val="FFFFFF"/>
+                  </a:solidFill>
+                </a14:hiddenFill>
+              </a:ext>
+            </a:extLst>
+          </p:spPr>
+        </p:pic>
+        <p:pic>
+          <p:nvPicPr>
+            <p:cNvPr id="14" name="Picture 13" descr="A picture containing bird&#10;&#10;Description automatically generated">
+              <a:extLst>
+                <a:ext uri="{FF2B5EF4-FFF2-40B4-BE49-F238E27FC236}">
+                  <a16:creationId xmlns:a16="http://schemas.microsoft.com/office/drawing/2014/main" id="{BA96E789-F0D3-445C-ADFE-ACCD237D25DE}"/>
+                </a:ext>
+              </a:extLst>
+            </p:cNvPr>
+            <p:cNvPicPr>
+              <a:picLocks noChangeAspect="1"/>
+            </p:cNvPicPr>
+            <p:nvPr/>
+          </p:nvPicPr>
+          <p:blipFill>
+            <a:blip r:embed="rId9">
+              <a:extLst>
+                <a:ext uri="{28A0092B-C50C-407E-A947-70E740481C1C}">
+                  <a14:useLocalDpi xmlns:a14="http://schemas.microsoft.com/office/drawing/2010/main" val="0"/>
+                </a:ext>
+              </a:extLst>
+            </a:blip>
+            <a:stretch>
+              <a:fillRect/>
+            </a:stretch>
           </p:blipFill>
           <p:spPr>
             <a:xfrm>
-              <a:off x="5198645" y="7212514"/>
-              <a:ext cx="1937849" cy="1306977"/>
+              <a:off x="10508439" y="4258138"/>
+              <a:ext cx="2345756" cy="1407454"/>
             </a:xfrm>
             <a:prstGeom prst="rect">
               <a:avLst/>
@@ -4675,10 +5277,10 @@
         </p:pic>
         <p:pic>
           <p:nvPicPr>
-            <p:cNvPr id="126" name="Picture 125" descr="A screenshot of a cell phone&#10;&#10;Description automatically generated">
+            <p:cNvPr id="17" name="Picture 16" descr="A screenshot of a cell phone&#10;&#10;Description automatically generated">
               <a:extLst>
                 <a:ext uri="{FF2B5EF4-FFF2-40B4-BE49-F238E27FC236}">
-                  <a16:creationId xmlns:a16="http://schemas.microsoft.com/office/drawing/2014/main" id="{8EDA3ABA-2427-466B-AEF6-6AFFAA1A5470}"/>
+                  <a16:creationId xmlns:a16="http://schemas.microsoft.com/office/drawing/2014/main" id="{E88FB32E-6E41-4CD6-A384-BF8BA385333A}"/>
                 </a:ext>
               </a:extLst>
             </p:cNvPr>
@@ -4687,246 +5289,76 @@
             </p:cNvPicPr>
             <p:nvPr/>
           </p:nvPicPr>
-          <p:blipFill rotWithShape="1">
-            <a:blip r:embed="rId8">
+          <p:blipFill>
+            <a:blip r:embed="rId10">
               <a:extLst>
                 <a:ext uri="{28A0092B-C50C-407E-A947-70E740481C1C}">
                   <a14:useLocalDpi xmlns:a14="http://schemas.microsoft.com/office/drawing/2010/main" val="0"/>
                 </a:ext>
               </a:extLst>
             </a:blip>
-            <a:srcRect l="19237" t="4418" r="8189"/>
-            <a:stretch/>
+            <a:stretch>
+              <a:fillRect/>
+            </a:stretch>
           </p:blipFill>
           <p:spPr>
             <a:xfrm>
-              <a:off x="7516487" y="7215088"/>
-              <a:ext cx="1654612" cy="1304403"/>
+              <a:off x="10607310" y="2785932"/>
+              <a:ext cx="2246885" cy="1348131"/>
             </a:xfrm>
             <a:prstGeom prst="rect">
               <a:avLst/>
             </a:prstGeom>
           </p:spPr>
         </p:pic>
+        <p:pic>
+          <p:nvPicPr>
+            <p:cNvPr id="1032" name="Picture 8">
+              <a:extLst>
+                <a:ext uri="{FF2B5EF4-FFF2-40B4-BE49-F238E27FC236}">
+                  <a16:creationId xmlns:a16="http://schemas.microsoft.com/office/drawing/2014/main" id="{547314C0-8A07-48D5-9BCF-93ACEF4ED0C2}"/>
+                </a:ext>
+              </a:extLst>
+            </p:cNvPr>
+            <p:cNvPicPr>
+              <a:picLocks noChangeAspect="1" noChangeArrowheads="1"/>
+            </p:cNvPicPr>
+            <p:nvPr/>
+          </p:nvPicPr>
+          <p:blipFill>
+            <a:blip r:embed="rId11">
+              <a:extLst>
+                <a:ext uri="{28A0092B-C50C-407E-A947-70E740481C1C}">
+                  <a14:useLocalDpi xmlns:a14="http://schemas.microsoft.com/office/drawing/2010/main" val="0"/>
+                </a:ext>
+              </a:extLst>
+            </a:blip>
+            <a:srcRect/>
+            <a:stretch>
+              <a:fillRect/>
+            </a:stretch>
+          </p:blipFill>
+          <p:spPr bwMode="auto">
+            <a:xfrm>
+              <a:off x="-662042" y="4179783"/>
+              <a:ext cx="2286612" cy="1411489"/>
+            </a:xfrm>
+            <a:prstGeom prst="rect">
+              <a:avLst/>
+            </a:prstGeom>
+            <a:noFill/>
+            <a:extLst>
+              <a:ext uri="{909E8E84-426E-40DD-AFC4-6F175D3DCCD1}">
+                <a14:hiddenFill xmlns:a14="http://schemas.microsoft.com/office/drawing/2010/main">
+                  <a:solidFill>
+                    <a:srgbClr val="FFFFFF"/>
+                  </a:solidFill>
+                </a14:hiddenFill>
+              </a:ext>
+            </a:extLst>
+          </p:spPr>
+        </p:pic>
       </p:grpSp>
-      <p:cxnSp>
-        <p:nvCxnSpPr>
-          <p:cNvPr id="141" name="Straight Arrow Connector 140">
-            <a:extLst>
-              <a:ext uri="{FF2B5EF4-FFF2-40B4-BE49-F238E27FC236}">
-                <a16:creationId xmlns:a16="http://schemas.microsoft.com/office/drawing/2014/main" id="{4C7FDA43-B6EB-4D4D-9921-76DC5B0C73BA}"/>
-              </a:ext>
-            </a:extLst>
-          </p:cNvPr>
-          <p:cNvCxnSpPr>
-            <a:cxnSpLocks/>
-            <a:endCxn id="28" idx="3"/>
-          </p:cNvCxnSpPr>
-          <p:nvPr/>
-        </p:nvCxnSpPr>
-        <p:spPr>
-          <a:xfrm flipH="1">
-            <a:off x="2155132" y="3808392"/>
-            <a:ext cx="1695788" cy="0"/>
-          </a:xfrm>
-          <a:prstGeom prst="straightConnector1">
-            <a:avLst/>
-          </a:prstGeom>
-          <a:ln w="28575">
-            <a:tailEnd type="triangle"/>
-          </a:ln>
-        </p:spPr>
-        <p:style>
-          <a:lnRef idx="1">
-            <a:schemeClr val="dk1"/>
-          </a:lnRef>
-          <a:fillRef idx="0">
-            <a:schemeClr val="dk1"/>
-          </a:fillRef>
-          <a:effectRef idx="0">
-            <a:schemeClr val="dk1"/>
-          </a:effectRef>
-          <a:fontRef idx="minor">
-            <a:schemeClr val="tx1"/>
-          </a:fontRef>
-        </p:style>
-      </p:cxnSp>
-      <p:cxnSp>
-        <p:nvCxnSpPr>
-          <p:cNvPr id="143" name="Straight Arrow Connector 142">
-            <a:extLst>
-              <a:ext uri="{FF2B5EF4-FFF2-40B4-BE49-F238E27FC236}">
-                <a16:creationId xmlns:a16="http://schemas.microsoft.com/office/drawing/2014/main" id="{10E7F4BB-579A-4C04-AD87-DEF0C7B39B76}"/>
-              </a:ext>
-            </a:extLst>
-          </p:cNvPr>
-          <p:cNvCxnSpPr>
-            <a:cxnSpLocks/>
-            <a:endCxn id="32" idx="1"/>
-          </p:cNvCxnSpPr>
-          <p:nvPr/>
-        </p:nvCxnSpPr>
-        <p:spPr>
-          <a:xfrm flipV="1">
-            <a:off x="8336931" y="3803428"/>
-            <a:ext cx="1699936" cy="4964"/>
-          </a:xfrm>
-          <a:prstGeom prst="straightConnector1">
-            <a:avLst/>
-          </a:prstGeom>
-          <a:ln w="28575">
-            <a:tailEnd type="triangle"/>
-          </a:ln>
-        </p:spPr>
-        <p:style>
-          <a:lnRef idx="1">
-            <a:schemeClr val="dk1"/>
-          </a:lnRef>
-          <a:fillRef idx="0">
-            <a:schemeClr val="dk1"/>
-          </a:fillRef>
-          <a:effectRef idx="0">
-            <a:schemeClr val="dk1"/>
-          </a:effectRef>
-          <a:fontRef idx="minor">
-            <a:schemeClr val="tx1"/>
-          </a:fontRef>
-        </p:style>
-      </p:cxnSp>
-      <p:sp>
-        <p:nvSpPr>
-          <p:cNvPr id="24" name="Rectangle 23">
-            <a:extLst>
-              <a:ext uri="{FF2B5EF4-FFF2-40B4-BE49-F238E27FC236}">
-                <a16:creationId xmlns:a16="http://schemas.microsoft.com/office/drawing/2014/main" id="{8B8A8503-C7D6-4AB8-BFA4-EC3530DE4535}"/>
-              </a:ext>
-            </a:extLst>
-          </p:cNvPr>
-          <p:cNvSpPr/>
-          <p:nvPr/>
-        </p:nvSpPr>
-        <p:spPr>
-          <a:xfrm>
-            <a:off x="3850921" y="2438838"/>
-            <a:ext cx="4484598" cy="2741154"/>
-          </a:xfrm>
-          <a:prstGeom prst="rect">
-            <a:avLst/>
-          </a:prstGeom>
-          <a:solidFill>
-            <a:srgbClr val="1C0444"/>
-          </a:solidFill>
-          <a:effectLst>
-            <a:glow rad="101600">
-              <a:schemeClr val="accent2">
-                <a:satMod val="175000"/>
-                <a:alpha val="40000"/>
-              </a:schemeClr>
-            </a:glow>
-          </a:effectLst>
-        </p:spPr>
-        <p:style>
-          <a:lnRef idx="2">
-            <a:schemeClr val="accent1">
-              <a:shade val="50000"/>
-            </a:schemeClr>
-          </a:lnRef>
-          <a:fillRef idx="1">
-            <a:schemeClr val="accent1"/>
-          </a:fillRef>
-          <a:effectRef idx="0">
-            <a:schemeClr val="accent1"/>
-          </a:effectRef>
-          <a:fontRef idx="minor">
-            <a:schemeClr val="lt1"/>
-          </a:fontRef>
-        </p:style>
-        <p:txBody>
-          <a:bodyPr rtlCol="0" anchor="ctr"/>
-          <a:lstStyle/>
-          <a:p>
-            <a:pPr algn="ctr"/>
-            <a:endParaRPr lang="en-US" dirty="0"/>
-          </a:p>
-        </p:txBody>
-      </p:sp>
-      <p:sp>
-        <p:nvSpPr>
-          <p:cNvPr id="25" name="TextBox 24">
-            <a:extLst>
-              <a:ext uri="{FF2B5EF4-FFF2-40B4-BE49-F238E27FC236}">
-                <a16:creationId xmlns:a16="http://schemas.microsoft.com/office/drawing/2014/main" id="{FFAC7B7B-BBD1-454B-9E91-6B69B410BB4F}"/>
-              </a:ext>
-            </a:extLst>
-          </p:cNvPr>
-          <p:cNvSpPr txBox="1"/>
-          <p:nvPr/>
-        </p:nvSpPr>
-        <p:spPr>
-          <a:xfrm>
-            <a:off x="4056412" y="4601174"/>
-            <a:ext cx="4112389" cy="584775"/>
-          </a:xfrm>
-          <a:prstGeom prst="rect">
-            <a:avLst/>
-          </a:prstGeom>
-          <a:noFill/>
-        </p:spPr>
-        <p:txBody>
-          <a:bodyPr wrap="square" rtlCol="0">
-            <a:spAutoFit/>
-          </a:bodyPr>
-          <a:lstStyle/>
-          <a:p>
-            <a:r>
-              <a:rPr lang="en-US" sz="3200" dirty="0">
-                <a:solidFill>
-                  <a:schemeClr val="bg1"/>
-                </a:solidFill>
-                <a:latin typeface="Aharoni" panose="02010803020104030203" pitchFamily="2" charset="-79"/>
-                <a:cs typeface="Aharoni" panose="02010803020104030203" pitchFamily="2" charset="-79"/>
-              </a:rPr>
-              <a:t>correlationAnalyzeR</a:t>
-            </a:r>
-          </a:p>
-        </p:txBody>
-      </p:sp>
-      <p:pic>
-        <p:nvPicPr>
-          <p:cNvPr id="27" name="Picture 26">
-            <a:extLst>
-              <a:ext uri="{FF2B5EF4-FFF2-40B4-BE49-F238E27FC236}">
-                <a16:creationId xmlns:a16="http://schemas.microsoft.com/office/drawing/2014/main" id="{7FD2366A-2C5E-4AF2-9ABC-9D19026E60C1}"/>
-              </a:ext>
-            </a:extLst>
-          </p:cNvPr>
-          <p:cNvPicPr>
-            <a:picLocks noChangeAspect="1"/>
-          </p:cNvPicPr>
-          <p:nvPr/>
-        </p:nvPicPr>
-        <p:blipFill>
-          <a:blip r:embed="rId9">
-            <a:extLst>
-              <a:ext uri="{28A0092B-C50C-407E-A947-70E740481C1C}">
-                <a14:useLocalDpi xmlns:a14="http://schemas.microsoft.com/office/drawing/2010/main" val="0"/>
-              </a:ext>
-            </a:extLst>
-          </a:blip>
-          <a:stretch>
-            <a:fillRect/>
-          </a:stretch>
-        </p:blipFill>
-        <p:spPr>
-          <a:xfrm>
-            <a:off x="5051596" y="2531195"/>
-            <a:ext cx="2081382" cy="2081382"/>
-          </a:xfrm>
-          <a:prstGeom prst="rect">
-            <a:avLst/>
-          </a:prstGeom>
-        </p:spPr>
-      </p:pic>
     </p:spTree>
     <p:extLst>
       <p:ext uri="{BB962C8B-B14F-4D97-AF65-F5344CB8AC3E}">

</xml_diff>

<commit_message>
Updated app to incorporate reviewer feedback
</commit_message>
<xml_diff>
--- a/www/Hero_on_homePage.pptx
+++ b/www/Hero_on_homePage.pptx
@@ -259,7 +259,7 @@
           <a:p>
             <a:fld id="{0B66EB57-E4FC-4CEF-AEF8-36005745810B}" type="datetimeFigureOut">
               <a:rPr lang="en-US" smtClean="0"/>
-              <a:t>10/7/2019</a:t>
+              <a:t>4/1/2021</a:t>
             </a:fld>
             <a:endParaRPr lang="en-US"/>
           </a:p>
@@ -457,7 +457,7 @@
           <a:p>
             <a:fld id="{0B66EB57-E4FC-4CEF-AEF8-36005745810B}" type="datetimeFigureOut">
               <a:rPr lang="en-US" smtClean="0"/>
-              <a:t>10/7/2019</a:t>
+              <a:t>4/1/2021</a:t>
             </a:fld>
             <a:endParaRPr lang="en-US"/>
           </a:p>
@@ -665,7 +665,7 @@
           <a:p>
             <a:fld id="{0B66EB57-E4FC-4CEF-AEF8-36005745810B}" type="datetimeFigureOut">
               <a:rPr lang="en-US" smtClean="0"/>
-              <a:t>10/7/2019</a:t>
+              <a:t>4/1/2021</a:t>
             </a:fld>
             <a:endParaRPr lang="en-US"/>
           </a:p>
@@ -863,7 +863,7 @@
           <a:p>
             <a:fld id="{0B66EB57-E4FC-4CEF-AEF8-36005745810B}" type="datetimeFigureOut">
               <a:rPr lang="en-US" smtClean="0"/>
-              <a:t>10/7/2019</a:t>
+              <a:t>4/1/2021</a:t>
             </a:fld>
             <a:endParaRPr lang="en-US"/>
           </a:p>
@@ -1138,7 +1138,7 @@
           <a:p>
             <a:fld id="{0B66EB57-E4FC-4CEF-AEF8-36005745810B}" type="datetimeFigureOut">
               <a:rPr lang="en-US" smtClean="0"/>
-              <a:t>10/7/2019</a:t>
+              <a:t>4/1/2021</a:t>
             </a:fld>
             <a:endParaRPr lang="en-US"/>
           </a:p>
@@ -1403,7 +1403,7 @@
           <a:p>
             <a:fld id="{0B66EB57-E4FC-4CEF-AEF8-36005745810B}" type="datetimeFigureOut">
               <a:rPr lang="en-US" smtClean="0"/>
-              <a:t>10/7/2019</a:t>
+              <a:t>4/1/2021</a:t>
             </a:fld>
             <a:endParaRPr lang="en-US"/>
           </a:p>
@@ -1815,7 +1815,7 @@
           <a:p>
             <a:fld id="{0B66EB57-E4FC-4CEF-AEF8-36005745810B}" type="datetimeFigureOut">
               <a:rPr lang="en-US" smtClean="0"/>
-              <a:t>10/7/2019</a:t>
+              <a:t>4/1/2021</a:t>
             </a:fld>
             <a:endParaRPr lang="en-US"/>
           </a:p>
@@ -1956,7 +1956,7 @@
           <a:p>
             <a:fld id="{0B66EB57-E4FC-4CEF-AEF8-36005745810B}" type="datetimeFigureOut">
               <a:rPr lang="en-US" smtClean="0"/>
-              <a:t>10/7/2019</a:t>
+              <a:t>4/1/2021</a:t>
             </a:fld>
             <a:endParaRPr lang="en-US"/>
           </a:p>
@@ -2069,7 +2069,7 @@
           <a:p>
             <a:fld id="{0B66EB57-E4FC-4CEF-AEF8-36005745810B}" type="datetimeFigureOut">
               <a:rPr lang="en-US" smtClean="0"/>
-              <a:t>10/7/2019</a:t>
+              <a:t>4/1/2021</a:t>
             </a:fld>
             <a:endParaRPr lang="en-US"/>
           </a:p>
@@ -2380,7 +2380,7 @@
           <a:p>
             <a:fld id="{0B66EB57-E4FC-4CEF-AEF8-36005745810B}" type="datetimeFigureOut">
               <a:rPr lang="en-US" smtClean="0"/>
-              <a:t>10/7/2019</a:t>
+              <a:t>4/1/2021</a:t>
             </a:fld>
             <a:endParaRPr lang="en-US"/>
           </a:p>
@@ -2668,7 +2668,7 @@
           <a:p>
             <a:fld id="{0B66EB57-E4FC-4CEF-AEF8-36005745810B}" type="datetimeFigureOut">
               <a:rPr lang="en-US" smtClean="0"/>
-              <a:t>10/7/2019</a:t>
+              <a:t>4/1/2021</a:t>
             </a:fld>
             <a:endParaRPr lang="en-US"/>
           </a:p>
@@ -2909,7 +2909,7 @@
           <a:p>
             <a:fld id="{0B66EB57-E4FC-4CEF-AEF8-36005745810B}" type="datetimeFigureOut">
               <a:rPr lang="en-US" smtClean="0"/>
-              <a:t>10/7/2019</a:t>
+              <a:t>4/1/2021</a:t>
             </a:fld>
             <a:endParaRPr lang="en-US"/>
           </a:p>
@@ -3328,10 +3328,10 @@
       </p:grpSpPr>
       <p:grpSp>
         <p:nvGrpSpPr>
-          <p:cNvPr id="18" name="Group 17">
-            <a:extLst>
-              <a:ext uri="{FF2B5EF4-FFF2-40B4-BE49-F238E27FC236}">
-                <a16:creationId xmlns:a16="http://schemas.microsoft.com/office/drawing/2014/main" id="{365D089D-F20B-4962-8726-38BAE067B57F}"/>
+          <p:cNvPr id="62" name="Group 61">
+            <a:extLst>
+              <a:ext uri="{FF2B5EF4-FFF2-40B4-BE49-F238E27FC236}">
+                <a16:creationId xmlns:a16="http://schemas.microsoft.com/office/drawing/2014/main" id="{844190F7-4022-4E5B-A6FB-57F9F3ACFFE4}"/>
               </a:ext>
             </a:extLst>
           </p:cNvPr>
@@ -3339,33 +3339,33 @@
           <p:nvPr/>
         </p:nvGrpSpPr>
         <p:grpSpPr>
-          <a:xfrm>
-            <a:off x="-1633110" y="-1130902"/>
-            <a:ext cx="15478876" cy="10533540"/>
-            <a:chOff x="-1633110" y="-1130902"/>
-            <a:chExt cx="15478876" cy="10533540"/>
+          <a:xfrm flipH="1">
+            <a:off x="-1633110" y="5185949"/>
+            <a:ext cx="7745717" cy="4216689"/>
+            <a:chOff x="6343889" y="5601367"/>
+            <a:chExt cx="7745717" cy="4216689"/>
           </a:xfrm>
         </p:grpSpPr>
         <p:cxnSp>
           <p:nvCxnSpPr>
-            <p:cNvPr id="8" name="Straight Arrow Connector 7">
+            <p:cNvPr id="63" name="Straight Arrow Connector 62">
               <a:extLst>
                 <a:ext uri="{FF2B5EF4-FFF2-40B4-BE49-F238E27FC236}">
-                  <a16:creationId xmlns:a16="http://schemas.microsoft.com/office/drawing/2014/main" id="{41C29615-13E1-45F2-9E33-5A8651D4AB19}"/>
+                  <a16:creationId xmlns:a16="http://schemas.microsoft.com/office/drawing/2014/main" id="{C2972362-F502-436C-A4F4-88C048307D06}"/>
                 </a:ext>
               </a:extLst>
             </p:cNvPr>
             <p:cNvCxnSpPr>
               <a:cxnSpLocks/>
-              <a:stCxn id="4" idx="2"/>
-              <a:endCxn id="10" idx="0"/>
+              <a:stCxn id="25" idx="2"/>
+              <a:endCxn id="65" idx="0"/>
             </p:cNvCxnSpPr>
             <p:nvPr/>
           </p:nvCxnSpPr>
           <p:spPr>
             <a:xfrm>
-              <a:off x="6099487" y="609512"/>
-              <a:ext cx="0" cy="495513"/>
+              <a:off x="6343889" y="5601367"/>
+              <a:ext cx="4593632" cy="1328392"/>
             </a:xfrm>
             <a:prstGeom prst="straightConnector1">
               <a:avLst/>
@@ -3389,12 +3389,930 @@
             </a:fontRef>
           </p:style>
         </p:cxnSp>
+        <p:grpSp>
+          <p:nvGrpSpPr>
+            <p:cNvPr id="64" name="Group 63">
+              <a:extLst>
+                <a:ext uri="{FF2B5EF4-FFF2-40B4-BE49-F238E27FC236}">
+                  <a16:creationId xmlns:a16="http://schemas.microsoft.com/office/drawing/2014/main" id="{2557AA46-FFDB-4FCB-B22A-D5CC019E8BB6}"/>
+                </a:ext>
+              </a:extLst>
+            </p:cNvPr>
+            <p:cNvGrpSpPr/>
+            <p:nvPr/>
+          </p:nvGrpSpPr>
+          <p:grpSpPr>
+            <a:xfrm>
+              <a:off x="7785436" y="6929759"/>
+              <a:ext cx="6304170" cy="2888297"/>
+              <a:chOff x="2999721" y="6003842"/>
+              <a:chExt cx="6304170" cy="2888297"/>
+            </a:xfrm>
+          </p:grpSpPr>
+          <p:sp>
+            <p:nvSpPr>
+              <p:cNvPr id="65" name="Rectangle: Rounded Corners 64">
+                <a:extLst>
+                  <a:ext uri="{FF2B5EF4-FFF2-40B4-BE49-F238E27FC236}">
+                    <a16:creationId xmlns:a16="http://schemas.microsoft.com/office/drawing/2014/main" id="{6F8D46A7-490D-4FB1-8820-CA69A29D332E}"/>
+                  </a:ext>
+                </a:extLst>
+              </p:cNvPr>
+              <p:cNvSpPr/>
+              <p:nvPr/>
+            </p:nvSpPr>
+            <p:spPr>
+              <a:xfrm>
+                <a:off x="2999721" y="6003842"/>
+                <a:ext cx="6304170" cy="2888297"/>
+              </a:xfrm>
+              <a:prstGeom prst="roundRect">
+                <a:avLst/>
+              </a:prstGeom>
+              <a:noFill/>
+              <a:ln w="28575">
+                <a:solidFill>
+                  <a:schemeClr val="tx1"/>
+                </a:solidFill>
+              </a:ln>
+            </p:spPr>
+            <p:style>
+              <a:lnRef idx="2">
+                <a:schemeClr val="accent1">
+                  <a:shade val="50000"/>
+                </a:schemeClr>
+              </a:lnRef>
+              <a:fillRef idx="1">
+                <a:schemeClr val="accent1"/>
+              </a:fillRef>
+              <a:effectRef idx="0">
+                <a:schemeClr val="accent1"/>
+              </a:effectRef>
+              <a:fontRef idx="minor">
+                <a:schemeClr val="lt1"/>
+              </a:fontRef>
+            </p:style>
+            <p:txBody>
+              <a:bodyPr rtlCol="0" anchor="ctr"/>
+              <a:lstStyle/>
+              <a:p>
+                <a:pPr algn="ctr"/>
+                <a:endParaRPr lang="en-US"/>
+              </a:p>
+            </p:txBody>
+          </p:sp>
+          <p:cxnSp>
+            <p:nvCxnSpPr>
+              <p:cNvPr id="66" name="Straight Connector 65">
+                <a:extLst>
+                  <a:ext uri="{FF2B5EF4-FFF2-40B4-BE49-F238E27FC236}">
+                    <a16:creationId xmlns:a16="http://schemas.microsoft.com/office/drawing/2014/main" id="{661D465D-701A-49EB-B4DB-3DF337DD8953}"/>
+                  </a:ext>
+                </a:extLst>
+              </p:cNvPr>
+              <p:cNvCxnSpPr>
+                <a:cxnSpLocks/>
+              </p:cNvCxnSpPr>
+              <p:nvPr/>
+            </p:nvCxnSpPr>
+            <p:spPr>
+              <a:xfrm flipV="1">
+                <a:off x="3060681" y="6448543"/>
+                <a:ext cx="6182250" cy="7744"/>
+              </a:xfrm>
+              <a:prstGeom prst="line">
+                <a:avLst/>
+              </a:prstGeom>
+              <a:ln w="12700"/>
+            </p:spPr>
+            <p:style>
+              <a:lnRef idx="1">
+                <a:schemeClr val="dk1"/>
+              </a:lnRef>
+              <a:fillRef idx="0">
+                <a:schemeClr val="dk1"/>
+              </a:fillRef>
+              <a:effectRef idx="0">
+                <a:schemeClr val="dk1"/>
+              </a:effectRef>
+              <a:fontRef idx="minor">
+                <a:schemeClr val="tx1"/>
+              </a:fontRef>
+            </p:style>
+          </p:cxnSp>
+          <p:sp>
+            <p:nvSpPr>
+              <p:cNvPr id="67" name="TextBox 66">
+                <a:extLst>
+                  <a:ext uri="{FF2B5EF4-FFF2-40B4-BE49-F238E27FC236}">
+                    <a16:creationId xmlns:a16="http://schemas.microsoft.com/office/drawing/2014/main" id="{B29BEB78-0048-4136-B0F4-98F10F4167E3}"/>
+                  </a:ext>
+                </a:extLst>
+              </p:cNvPr>
+              <p:cNvSpPr txBox="1"/>
+              <p:nvPr/>
+            </p:nvSpPr>
+            <p:spPr>
+              <a:xfrm>
+                <a:off x="5329616" y="6045233"/>
+                <a:ext cx="1651357" cy="369332"/>
+              </a:xfrm>
+              <a:prstGeom prst="rect">
+                <a:avLst/>
+              </a:prstGeom>
+              <a:noFill/>
+            </p:spPr>
+            <p:txBody>
+              <a:bodyPr wrap="square" rtlCol="0">
+                <a:spAutoFit/>
+              </a:bodyPr>
+              <a:lstStyle/>
+              <a:p>
+                <a:r>
+                  <a:rPr lang="en-US" dirty="0"/>
+                  <a:t>Topology Mode</a:t>
+                </a:r>
+              </a:p>
+            </p:txBody>
+          </p:sp>
+          <p:sp>
+            <p:nvSpPr>
+              <p:cNvPr id="69" name="TextBox 68">
+                <a:extLst>
+                  <a:ext uri="{FF2B5EF4-FFF2-40B4-BE49-F238E27FC236}">
+                    <a16:creationId xmlns:a16="http://schemas.microsoft.com/office/drawing/2014/main" id="{1744F5A3-9D5A-4E54-A7B6-E135D4077376}"/>
+                  </a:ext>
+                </a:extLst>
+              </p:cNvPr>
+              <p:cNvSpPr txBox="1"/>
+              <p:nvPr/>
+            </p:nvSpPr>
+            <p:spPr>
+              <a:xfrm>
+                <a:off x="3060681" y="6585616"/>
+                <a:ext cx="6182250" cy="369332"/>
+              </a:xfrm>
+              <a:prstGeom prst="rect">
+                <a:avLst/>
+              </a:prstGeom>
+              <a:noFill/>
+            </p:spPr>
+            <p:txBody>
+              <a:bodyPr wrap="square" rtlCol="0">
+                <a:spAutoFit/>
+              </a:bodyPr>
+              <a:lstStyle/>
+              <a:p>
+                <a:r>
+                  <a:rPr lang="en-US" dirty="0"/>
+                  <a:t>“ATM, BRCA1, EZH2 …” or “BIOCARTA_PROTEASOME_PATHWAY” </a:t>
+                </a:r>
+              </a:p>
+            </p:txBody>
+          </p:sp>
+          <p:cxnSp>
+            <p:nvCxnSpPr>
+              <p:cNvPr id="71" name="Straight Connector 70">
+                <a:extLst>
+                  <a:ext uri="{FF2B5EF4-FFF2-40B4-BE49-F238E27FC236}">
+                    <a16:creationId xmlns:a16="http://schemas.microsoft.com/office/drawing/2014/main" id="{328F3765-7C2C-41F0-BBD8-A03BC11944DB}"/>
+                  </a:ext>
+                </a:extLst>
+              </p:cNvPr>
+              <p:cNvCxnSpPr>
+                <a:cxnSpLocks/>
+              </p:cNvCxnSpPr>
+              <p:nvPr/>
+            </p:nvCxnSpPr>
+            <p:spPr>
+              <a:xfrm flipV="1">
+                <a:off x="3006697" y="7028838"/>
+                <a:ext cx="6297194" cy="858"/>
+              </a:xfrm>
+              <a:prstGeom prst="line">
+                <a:avLst/>
+              </a:prstGeom>
+              <a:ln w="12700"/>
+            </p:spPr>
+            <p:style>
+              <a:lnRef idx="1">
+                <a:schemeClr val="dk1"/>
+              </a:lnRef>
+              <a:fillRef idx="0">
+                <a:schemeClr val="dk1"/>
+              </a:fillRef>
+              <a:effectRef idx="0">
+                <a:schemeClr val="dk1"/>
+              </a:effectRef>
+              <a:fontRef idx="minor">
+                <a:schemeClr val="tx1"/>
+              </a:fontRef>
+            </p:style>
+          </p:cxnSp>
+          <p:pic>
+            <p:nvPicPr>
+              <p:cNvPr id="73" name="Picture 72" descr="A picture containing sky&#10;&#10;Description automatically generated">
+                <a:extLst>
+                  <a:ext uri="{FF2B5EF4-FFF2-40B4-BE49-F238E27FC236}">
+                    <a16:creationId xmlns:a16="http://schemas.microsoft.com/office/drawing/2014/main" id="{F569C89F-BECA-453D-9E6B-63FEBC85E444}"/>
+                  </a:ext>
+                </a:extLst>
+              </p:cNvPr>
+              <p:cNvPicPr>
+                <a:picLocks noChangeAspect="1"/>
+              </p:cNvPicPr>
+              <p:nvPr/>
+            </p:nvPicPr>
+            <p:blipFill rotWithShape="1">
+              <a:blip r:embed="rId2">
+                <a:extLst>
+                  <a:ext uri="{28A0092B-C50C-407E-A947-70E740481C1C}">
+                    <a14:useLocalDpi xmlns:a14="http://schemas.microsoft.com/office/drawing/2010/main" val="0"/>
+                  </a:ext>
+                </a:extLst>
+              </a:blip>
+              <a:srcRect t="7780" r="10961"/>
+              <a:stretch/>
+            </p:blipFill>
+            <p:spPr>
+              <a:xfrm>
+                <a:off x="3147878" y="7215088"/>
+                <a:ext cx="1631824" cy="1309551"/>
+              </a:xfrm>
+              <a:prstGeom prst="rect">
+                <a:avLst/>
+              </a:prstGeom>
+            </p:spPr>
+          </p:pic>
+          <p:pic>
+            <p:nvPicPr>
+              <p:cNvPr id="74" name="Picture 73">
+                <a:extLst>
+                  <a:ext uri="{FF2B5EF4-FFF2-40B4-BE49-F238E27FC236}">
+                    <a16:creationId xmlns:a16="http://schemas.microsoft.com/office/drawing/2014/main" id="{4D6CA198-D834-4CA0-947B-D07DEB980DD3}"/>
+                  </a:ext>
+                </a:extLst>
+              </p:cNvPr>
+              <p:cNvPicPr>
+                <a:picLocks noChangeAspect="1"/>
+              </p:cNvPicPr>
+              <p:nvPr/>
+            </p:nvPicPr>
+            <p:blipFill rotWithShape="1">
+              <a:blip r:embed="rId3">
+                <a:extLst>
+                  <a:ext uri="{28A0092B-C50C-407E-A947-70E740481C1C}">
+                    <a14:useLocalDpi xmlns:a14="http://schemas.microsoft.com/office/drawing/2010/main" val="0"/>
+                  </a:ext>
+                </a:extLst>
+              </a:blip>
+              <a:srcRect l="29040" r="9806"/>
+              <a:stretch/>
+            </p:blipFill>
+            <p:spPr>
+              <a:xfrm>
+                <a:off x="5198645" y="7212514"/>
+                <a:ext cx="1937849" cy="1306977"/>
+              </a:xfrm>
+              <a:prstGeom prst="rect">
+                <a:avLst/>
+              </a:prstGeom>
+            </p:spPr>
+          </p:pic>
+          <p:pic>
+            <p:nvPicPr>
+              <p:cNvPr id="75" name="Picture 74" descr="A screenshot of a cell phone&#10;&#10;Description automatically generated">
+                <a:extLst>
+                  <a:ext uri="{FF2B5EF4-FFF2-40B4-BE49-F238E27FC236}">
+                    <a16:creationId xmlns:a16="http://schemas.microsoft.com/office/drawing/2014/main" id="{BABF96CD-6170-404A-864B-0D653633D8CB}"/>
+                  </a:ext>
+                </a:extLst>
+              </p:cNvPr>
+              <p:cNvPicPr>
+                <a:picLocks noChangeAspect="1"/>
+              </p:cNvPicPr>
+              <p:nvPr/>
+            </p:nvPicPr>
+            <p:blipFill rotWithShape="1">
+              <a:blip r:embed="rId4">
+                <a:extLst>
+                  <a:ext uri="{28A0092B-C50C-407E-A947-70E740481C1C}">
+                    <a14:useLocalDpi xmlns:a14="http://schemas.microsoft.com/office/drawing/2010/main" val="0"/>
+                  </a:ext>
+                </a:extLst>
+              </a:blip>
+              <a:srcRect l="19237" t="4418" r="8189"/>
+              <a:stretch/>
+            </p:blipFill>
+            <p:spPr>
+              <a:xfrm>
+                <a:off x="7516487" y="7215088"/>
+                <a:ext cx="1654612" cy="1304403"/>
+              </a:xfrm>
+              <a:prstGeom prst="rect">
+                <a:avLst/>
+              </a:prstGeom>
+            </p:spPr>
+          </p:pic>
+        </p:grpSp>
+      </p:grpSp>
+      <p:cxnSp>
+        <p:nvCxnSpPr>
+          <p:cNvPr id="8" name="Straight Arrow Connector 7">
+            <a:extLst>
+              <a:ext uri="{FF2B5EF4-FFF2-40B4-BE49-F238E27FC236}">
+                <a16:creationId xmlns:a16="http://schemas.microsoft.com/office/drawing/2014/main" id="{41C29615-13E1-45F2-9E33-5A8651D4AB19}"/>
+              </a:ext>
+            </a:extLst>
+          </p:cNvPr>
+          <p:cNvCxnSpPr>
+            <a:cxnSpLocks/>
+            <a:stCxn id="4" idx="2"/>
+            <a:endCxn id="10" idx="0"/>
+          </p:cNvCxnSpPr>
+          <p:nvPr/>
+        </p:nvCxnSpPr>
+        <p:spPr>
+          <a:xfrm>
+            <a:off x="6099487" y="609512"/>
+            <a:ext cx="0" cy="495513"/>
+          </a:xfrm>
+          <a:prstGeom prst="straightConnector1">
+            <a:avLst/>
+          </a:prstGeom>
+          <a:ln w="28575">
+            <a:tailEnd type="triangle"/>
+          </a:ln>
+        </p:spPr>
+        <p:style>
+          <a:lnRef idx="1">
+            <a:schemeClr val="dk1"/>
+          </a:lnRef>
+          <a:fillRef idx="0">
+            <a:schemeClr val="dk1"/>
+          </a:fillRef>
+          <a:effectRef idx="0">
+            <a:schemeClr val="dk1"/>
+          </a:effectRef>
+          <a:fontRef idx="minor">
+            <a:schemeClr val="tx1"/>
+          </a:fontRef>
+        </p:style>
+      </p:cxnSp>
+      <p:sp>
+        <p:nvSpPr>
+          <p:cNvPr id="10" name="Rectangle: Rounded Corners 9">
+            <a:extLst>
+              <a:ext uri="{FF2B5EF4-FFF2-40B4-BE49-F238E27FC236}">
+                <a16:creationId xmlns:a16="http://schemas.microsoft.com/office/drawing/2014/main" id="{097F538F-5F11-40F0-BE65-BA32CACB977D}"/>
+              </a:ext>
+            </a:extLst>
+          </p:cNvPr>
+          <p:cNvSpPr/>
+          <p:nvPr/>
+        </p:nvSpPr>
+        <p:spPr>
+          <a:xfrm>
+            <a:off x="5142838" y="1105025"/>
+            <a:ext cx="1913298" cy="736847"/>
+          </a:xfrm>
+          <a:prstGeom prst="roundRect">
+            <a:avLst/>
+          </a:prstGeom>
+          <a:noFill/>
+          <a:ln w="28575">
+            <a:solidFill>
+              <a:schemeClr val="tx1"/>
+            </a:solidFill>
+          </a:ln>
+        </p:spPr>
+        <p:style>
+          <a:lnRef idx="2">
+            <a:schemeClr val="accent1">
+              <a:shade val="50000"/>
+            </a:schemeClr>
+          </a:lnRef>
+          <a:fillRef idx="1">
+            <a:schemeClr val="accent1"/>
+          </a:fillRef>
+          <a:effectRef idx="0">
+            <a:schemeClr val="accent1"/>
+          </a:effectRef>
+          <a:fontRef idx="minor">
+            <a:schemeClr val="lt1"/>
+          </a:fontRef>
+        </p:style>
+        <p:txBody>
+          <a:bodyPr rtlCol="0" anchor="ctr"/>
+          <a:lstStyle/>
+          <a:p>
+            <a:pPr algn="ctr"/>
+            <a:r>
+              <a:rPr lang="en-US" dirty="0">
+                <a:solidFill>
+                  <a:schemeClr val="tx1"/>
+                </a:solidFill>
+              </a:rPr>
+              <a:t>Gene expression correlations</a:t>
+            </a:r>
+          </a:p>
+        </p:txBody>
+      </p:sp>
+      <p:cxnSp>
+        <p:nvCxnSpPr>
+          <p:cNvPr id="15" name="Straight Arrow Connector 14">
+            <a:extLst>
+              <a:ext uri="{FF2B5EF4-FFF2-40B4-BE49-F238E27FC236}">
+                <a16:creationId xmlns:a16="http://schemas.microsoft.com/office/drawing/2014/main" id="{77530A88-D50C-41F3-9643-1E5AE60BE674}"/>
+              </a:ext>
+            </a:extLst>
+          </p:cNvPr>
+          <p:cNvCxnSpPr>
+            <a:cxnSpLocks/>
+            <a:stCxn id="10" idx="2"/>
+          </p:cNvCxnSpPr>
+          <p:nvPr/>
+        </p:nvCxnSpPr>
+        <p:spPr>
+          <a:xfrm flipH="1">
+            <a:off x="6093926" y="1841872"/>
+            <a:ext cx="5561" cy="594920"/>
+          </a:xfrm>
+          <a:prstGeom prst="straightConnector1">
+            <a:avLst/>
+          </a:prstGeom>
+          <a:ln w="28575">
+            <a:tailEnd type="triangle"/>
+          </a:ln>
+        </p:spPr>
+        <p:style>
+          <a:lnRef idx="1">
+            <a:schemeClr val="dk1"/>
+          </a:lnRef>
+          <a:fillRef idx="0">
+            <a:schemeClr val="dk1"/>
+          </a:fillRef>
+          <a:effectRef idx="0">
+            <a:schemeClr val="dk1"/>
+          </a:effectRef>
+          <a:fontRef idx="minor">
+            <a:schemeClr val="tx1"/>
+          </a:fontRef>
+        </p:style>
+      </p:cxnSp>
+      <p:sp>
+        <p:nvSpPr>
+          <p:cNvPr id="28" name="Rectangle: Rounded Corners 27">
+            <a:extLst>
+              <a:ext uri="{FF2B5EF4-FFF2-40B4-BE49-F238E27FC236}">
+                <a16:creationId xmlns:a16="http://schemas.microsoft.com/office/drawing/2014/main" id="{07354014-32DB-4978-872F-6CDEEBFF7A60}"/>
+              </a:ext>
+            </a:extLst>
+          </p:cNvPr>
+          <p:cNvSpPr/>
+          <p:nvPr/>
+        </p:nvSpPr>
+        <p:spPr>
+          <a:xfrm>
+            <a:off x="-1184180" y="1725768"/>
+            <a:ext cx="3339312" cy="4165247"/>
+          </a:xfrm>
+          <a:prstGeom prst="roundRect">
+            <a:avLst/>
+          </a:prstGeom>
+          <a:noFill/>
+          <a:ln w="28575">
+            <a:solidFill>
+              <a:schemeClr val="tx1"/>
+            </a:solidFill>
+          </a:ln>
+        </p:spPr>
+        <p:style>
+          <a:lnRef idx="2">
+            <a:schemeClr val="accent1">
+              <a:shade val="50000"/>
+            </a:schemeClr>
+          </a:lnRef>
+          <a:fillRef idx="1">
+            <a:schemeClr val="accent1"/>
+          </a:fillRef>
+          <a:effectRef idx="0">
+            <a:schemeClr val="accent1"/>
+          </a:effectRef>
+          <a:fontRef idx="minor">
+            <a:schemeClr val="lt1"/>
+          </a:fontRef>
+        </p:style>
+        <p:txBody>
+          <a:bodyPr rtlCol="0" anchor="ctr"/>
+          <a:lstStyle/>
+          <a:p>
+            <a:pPr algn="ctr"/>
+            <a:endParaRPr lang="en-US"/>
+          </a:p>
+        </p:txBody>
+      </p:sp>
+      <p:sp>
+        <p:nvSpPr>
+          <p:cNvPr id="32" name="Rectangle: Rounded Corners 31">
+            <a:extLst>
+              <a:ext uri="{FF2B5EF4-FFF2-40B4-BE49-F238E27FC236}">
+                <a16:creationId xmlns:a16="http://schemas.microsoft.com/office/drawing/2014/main" id="{52530A37-D41A-4114-BE72-6B2AFD3136B4}"/>
+              </a:ext>
+            </a:extLst>
+          </p:cNvPr>
+          <p:cNvSpPr/>
+          <p:nvPr/>
+        </p:nvSpPr>
+        <p:spPr>
+          <a:xfrm>
+            <a:off x="10036867" y="1720807"/>
+            <a:ext cx="3339312" cy="4165241"/>
+          </a:xfrm>
+          <a:prstGeom prst="roundRect">
+            <a:avLst/>
+          </a:prstGeom>
+          <a:noFill/>
+          <a:ln w="28575">
+            <a:solidFill>
+              <a:schemeClr val="tx1"/>
+            </a:solidFill>
+          </a:ln>
+        </p:spPr>
+        <p:style>
+          <a:lnRef idx="2">
+            <a:schemeClr val="accent1">
+              <a:shade val="50000"/>
+            </a:schemeClr>
+          </a:lnRef>
+          <a:fillRef idx="1">
+            <a:schemeClr val="accent1"/>
+          </a:fillRef>
+          <a:effectRef idx="0">
+            <a:schemeClr val="accent1"/>
+          </a:effectRef>
+          <a:fontRef idx="minor">
+            <a:schemeClr val="lt1"/>
+          </a:fontRef>
+        </p:style>
+        <p:txBody>
+          <a:bodyPr rtlCol="0" anchor="ctr"/>
+          <a:lstStyle/>
+          <a:p>
+            <a:pPr algn="ctr"/>
+            <a:endParaRPr lang="en-US"/>
+          </a:p>
+        </p:txBody>
+      </p:sp>
+      <p:cxnSp>
+        <p:nvCxnSpPr>
+          <p:cNvPr id="43" name="Straight Connector 42">
+            <a:extLst>
+              <a:ext uri="{FF2B5EF4-FFF2-40B4-BE49-F238E27FC236}">
+                <a16:creationId xmlns:a16="http://schemas.microsoft.com/office/drawing/2014/main" id="{96296160-98C9-4054-8003-D859487DBB78}"/>
+              </a:ext>
+            </a:extLst>
+          </p:cNvPr>
+          <p:cNvCxnSpPr/>
+          <p:nvPr/>
+        </p:nvCxnSpPr>
+        <p:spPr>
+          <a:xfrm>
+            <a:off x="-1184180" y="2213142"/>
+            <a:ext cx="3339312" cy="0"/>
+          </a:xfrm>
+          <a:prstGeom prst="line">
+            <a:avLst/>
+          </a:prstGeom>
+          <a:ln w="12700"/>
+        </p:spPr>
+        <p:style>
+          <a:lnRef idx="1">
+            <a:schemeClr val="dk1"/>
+          </a:lnRef>
+          <a:fillRef idx="0">
+            <a:schemeClr val="dk1"/>
+          </a:fillRef>
+          <a:effectRef idx="0">
+            <a:schemeClr val="dk1"/>
+          </a:effectRef>
+          <a:fontRef idx="minor">
+            <a:schemeClr val="tx1"/>
+          </a:fontRef>
+        </p:style>
+      </p:cxnSp>
+      <p:cxnSp>
+        <p:nvCxnSpPr>
+          <p:cNvPr id="44" name="Straight Connector 43">
+            <a:extLst>
+              <a:ext uri="{FF2B5EF4-FFF2-40B4-BE49-F238E27FC236}">
+                <a16:creationId xmlns:a16="http://schemas.microsoft.com/office/drawing/2014/main" id="{DAC4CAA4-BA1C-407F-A99F-8925455C3224}"/>
+              </a:ext>
+            </a:extLst>
+          </p:cNvPr>
+          <p:cNvCxnSpPr/>
+          <p:nvPr/>
+        </p:nvCxnSpPr>
+        <p:spPr>
+          <a:xfrm>
+            <a:off x="10035229" y="2212504"/>
+            <a:ext cx="3339312" cy="0"/>
+          </a:xfrm>
+          <a:prstGeom prst="line">
+            <a:avLst/>
+          </a:prstGeom>
+          <a:ln w="12700"/>
+        </p:spPr>
+        <p:style>
+          <a:lnRef idx="1">
+            <a:schemeClr val="dk1"/>
+          </a:lnRef>
+          <a:fillRef idx="0">
+            <a:schemeClr val="dk1"/>
+          </a:fillRef>
+          <a:effectRef idx="0">
+            <a:schemeClr val="dk1"/>
+          </a:effectRef>
+          <a:fontRef idx="minor">
+            <a:schemeClr val="tx1"/>
+          </a:fontRef>
+        </p:style>
+      </p:cxnSp>
+      <p:sp>
+        <p:nvSpPr>
+          <p:cNvPr id="48" name="TextBox 47">
+            <a:extLst>
+              <a:ext uri="{FF2B5EF4-FFF2-40B4-BE49-F238E27FC236}">
+                <a16:creationId xmlns:a16="http://schemas.microsoft.com/office/drawing/2014/main" id="{4007DBBC-9244-4FF3-BE56-B1429424E3F9}"/>
+              </a:ext>
+            </a:extLst>
+          </p:cNvPr>
+          <p:cNvSpPr txBox="1"/>
+          <p:nvPr/>
+        </p:nvSpPr>
+        <p:spPr>
+          <a:xfrm>
+            <a:off x="-760891" y="1792787"/>
+            <a:ext cx="2480940" cy="369332"/>
+          </a:xfrm>
+          <a:prstGeom prst="rect">
+            <a:avLst/>
+          </a:prstGeom>
+          <a:noFill/>
+        </p:spPr>
+        <p:txBody>
+          <a:bodyPr wrap="square" rtlCol="0">
+            <a:spAutoFit/>
+          </a:bodyPr>
+          <a:lstStyle/>
+          <a:p>
+            <a:r>
+              <a:rPr lang="en-US" dirty="0"/>
+              <a:t>Single Gene Mode</a:t>
+            </a:r>
+          </a:p>
+        </p:txBody>
+      </p:sp>
+      <p:sp>
+        <p:nvSpPr>
+          <p:cNvPr id="49" name="TextBox 48">
+            <a:extLst>
+              <a:ext uri="{FF2B5EF4-FFF2-40B4-BE49-F238E27FC236}">
+                <a16:creationId xmlns:a16="http://schemas.microsoft.com/office/drawing/2014/main" id="{1F58AE3C-8878-49CB-B0F7-9481EA11FF2F}"/>
+              </a:ext>
+            </a:extLst>
+          </p:cNvPr>
+          <p:cNvSpPr txBox="1"/>
+          <p:nvPr/>
+        </p:nvSpPr>
+        <p:spPr>
+          <a:xfrm>
+            <a:off x="10446893" y="1792787"/>
+            <a:ext cx="2472954" cy="369332"/>
+          </a:xfrm>
+          <a:prstGeom prst="rect">
+            <a:avLst/>
+          </a:prstGeom>
+          <a:noFill/>
+        </p:spPr>
+        <p:txBody>
+          <a:bodyPr wrap="square" rtlCol="0">
+            <a:spAutoFit/>
+          </a:bodyPr>
+          <a:lstStyle/>
+          <a:p>
+            <a:r>
+              <a:rPr lang="en-US" dirty="0"/>
+              <a:t>Gene vs Gene List Mode</a:t>
+            </a:r>
+          </a:p>
+        </p:txBody>
+      </p:sp>
+      <p:sp>
+        <p:nvSpPr>
+          <p:cNvPr id="51" name="TextBox 50">
+            <a:extLst>
+              <a:ext uri="{FF2B5EF4-FFF2-40B4-BE49-F238E27FC236}">
+                <a16:creationId xmlns:a16="http://schemas.microsoft.com/office/drawing/2014/main" id="{EA3F0FF7-CE32-46C4-98B0-D96DC18DB9EB}"/>
+              </a:ext>
+            </a:extLst>
+          </p:cNvPr>
+          <p:cNvSpPr txBox="1"/>
+          <p:nvPr/>
+        </p:nvSpPr>
+        <p:spPr>
+          <a:xfrm>
+            <a:off x="-1064325" y="2216145"/>
+            <a:ext cx="2563202" cy="369332"/>
+          </a:xfrm>
+          <a:prstGeom prst="rect">
+            <a:avLst/>
+          </a:prstGeom>
+          <a:noFill/>
+        </p:spPr>
+        <p:txBody>
+          <a:bodyPr wrap="none" rtlCol="0">
+            <a:spAutoFit/>
+          </a:bodyPr>
+          <a:lstStyle/>
+          <a:p>
+            <a:r>
+              <a:rPr lang="en-US" dirty="0"/>
+              <a:t>“ATM (pancreas-normal)”</a:t>
+            </a:r>
+          </a:p>
+        </p:txBody>
+      </p:sp>
+      <p:sp>
+        <p:nvSpPr>
+          <p:cNvPr id="53" name="TextBox 52">
+            <a:extLst>
+              <a:ext uri="{FF2B5EF4-FFF2-40B4-BE49-F238E27FC236}">
+                <a16:creationId xmlns:a16="http://schemas.microsoft.com/office/drawing/2014/main" id="{67B27EC5-3306-4370-AB52-0DD37A5328F2}"/>
+              </a:ext>
+            </a:extLst>
+          </p:cNvPr>
+          <p:cNvSpPr txBox="1"/>
+          <p:nvPr/>
+        </p:nvSpPr>
+        <p:spPr>
+          <a:xfrm>
+            <a:off x="10219425" y="2212504"/>
+            <a:ext cx="2645340" cy="369332"/>
+          </a:xfrm>
+          <a:prstGeom prst="rect">
+            <a:avLst/>
+          </a:prstGeom>
+          <a:noFill/>
+        </p:spPr>
+        <p:txBody>
+          <a:bodyPr wrap="none" rtlCol="0">
+            <a:spAutoFit/>
+          </a:bodyPr>
+          <a:lstStyle/>
+          <a:p>
+            <a:r>
+              <a:rPr lang="en-US" dirty="0"/>
+              <a:t>“ATM vs (BRCA1, EZH2 …)”</a:t>
+            </a:r>
+          </a:p>
+        </p:txBody>
+      </p:sp>
+      <p:cxnSp>
+        <p:nvCxnSpPr>
+          <p:cNvPr id="55" name="Straight Connector 54">
+            <a:extLst>
+              <a:ext uri="{FF2B5EF4-FFF2-40B4-BE49-F238E27FC236}">
+                <a16:creationId xmlns:a16="http://schemas.microsoft.com/office/drawing/2014/main" id="{1772C2ED-8084-4D96-8A9F-05E1323D9C60}"/>
+              </a:ext>
+            </a:extLst>
+          </p:cNvPr>
+          <p:cNvCxnSpPr/>
+          <p:nvPr/>
+        </p:nvCxnSpPr>
+        <p:spPr>
+          <a:xfrm>
+            <a:off x="-1184180" y="2581836"/>
+            <a:ext cx="3339312" cy="0"/>
+          </a:xfrm>
+          <a:prstGeom prst="line">
+            <a:avLst/>
+          </a:prstGeom>
+          <a:ln w="12700"/>
+        </p:spPr>
+        <p:style>
+          <a:lnRef idx="1">
+            <a:schemeClr val="dk1"/>
+          </a:lnRef>
+          <a:fillRef idx="0">
+            <a:schemeClr val="dk1"/>
+          </a:fillRef>
+          <a:effectRef idx="0">
+            <a:schemeClr val="dk1"/>
+          </a:effectRef>
+          <a:fontRef idx="minor">
+            <a:schemeClr val="tx1"/>
+          </a:fontRef>
+        </p:style>
+      </p:cxnSp>
+      <p:cxnSp>
+        <p:nvCxnSpPr>
+          <p:cNvPr id="56" name="Straight Connector 55">
+            <a:extLst>
+              <a:ext uri="{FF2B5EF4-FFF2-40B4-BE49-F238E27FC236}">
+                <a16:creationId xmlns:a16="http://schemas.microsoft.com/office/drawing/2014/main" id="{9FDA19AA-F31F-4E5E-97E2-A0B418F800EB}"/>
+              </a:ext>
+            </a:extLst>
+          </p:cNvPr>
+          <p:cNvCxnSpPr/>
+          <p:nvPr/>
+        </p:nvCxnSpPr>
+        <p:spPr>
+          <a:xfrm>
+            <a:off x="10013714" y="2581836"/>
+            <a:ext cx="3339312" cy="0"/>
+          </a:xfrm>
+          <a:prstGeom prst="line">
+            <a:avLst/>
+          </a:prstGeom>
+          <a:ln w="12700"/>
+        </p:spPr>
+        <p:style>
+          <a:lnRef idx="1">
+            <a:schemeClr val="dk1"/>
+          </a:lnRef>
+          <a:fillRef idx="0">
+            <a:schemeClr val="dk1"/>
+          </a:fillRef>
+          <a:effectRef idx="0">
+            <a:schemeClr val="dk1"/>
+          </a:effectRef>
+          <a:fontRef idx="minor">
+            <a:schemeClr val="tx1"/>
+          </a:fontRef>
+        </p:style>
+      </p:cxnSp>
+      <p:pic>
+        <p:nvPicPr>
+          <p:cNvPr id="68" name="Picture 67" descr="A screenshot of a cell phone&#10;&#10;Description automatically generated">
+            <a:extLst>
+              <a:ext uri="{FF2B5EF4-FFF2-40B4-BE49-F238E27FC236}">
+                <a16:creationId xmlns:a16="http://schemas.microsoft.com/office/drawing/2014/main" id="{DE1E1F68-FA16-4936-BDD3-CD02071F1F4A}"/>
+              </a:ext>
+            </a:extLst>
+          </p:cNvPr>
+          <p:cNvPicPr>
+            <a:picLocks noChangeAspect="1"/>
+          </p:cNvPicPr>
+          <p:nvPr/>
+        </p:nvPicPr>
+        <p:blipFill rotWithShape="1">
+          <a:blip r:embed="rId5">
+            <a:extLst>
+              <a:ext uri="{28A0092B-C50C-407E-A947-70E740481C1C}">
+                <a14:useLocalDpi xmlns:a14="http://schemas.microsoft.com/office/drawing/2010/main" val="0"/>
+              </a:ext>
+            </a:extLst>
+          </a:blip>
+          <a:srcRect l="198" t="11598" b="5657"/>
+          <a:stretch/>
+        </p:blipFill>
+        <p:spPr>
+          <a:xfrm>
+            <a:off x="-667872" y="2759995"/>
+            <a:ext cx="2292442" cy="1221839"/>
+          </a:xfrm>
+          <a:prstGeom prst="rect">
+            <a:avLst/>
+          </a:prstGeom>
+        </p:spPr>
+      </p:pic>
+      <p:grpSp>
+        <p:nvGrpSpPr>
+          <p:cNvPr id="104" name="Group 103">
+            <a:extLst>
+              <a:ext uri="{FF2B5EF4-FFF2-40B4-BE49-F238E27FC236}">
+                <a16:creationId xmlns:a16="http://schemas.microsoft.com/office/drawing/2014/main" id="{9949F315-15CA-46FD-AAEE-C873D909F870}"/>
+              </a:ext>
+            </a:extLst>
+          </p:cNvPr>
+          <p:cNvGrpSpPr/>
+          <p:nvPr/>
+        </p:nvGrpSpPr>
+        <p:grpSpPr>
+          <a:xfrm>
+            <a:off x="3333353" y="-1130902"/>
+            <a:ext cx="5532268" cy="1740414"/>
+            <a:chOff x="3328226" y="-1628537"/>
+            <a:chExt cx="5532268" cy="1740414"/>
+          </a:xfrm>
+        </p:grpSpPr>
         <p:sp>
           <p:nvSpPr>
-            <p:cNvPr id="10" name="Rectangle: Rounded Corners 9">
+            <p:cNvPr id="4" name="Rectangle: Rounded Corners 3">
               <a:extLst>
                 <a:ext uri="{FF2B5EF4-FFF2-40B4-BE49-F238E27FC236}">
-                  <a16:creationId xmlns:a16="http://schemas.microsoft.com/office/drawing/2014/main" id="{097F538F-5F11-40F0-BE65-BA32CACB977D}"/>
+                  <a16:creationId xmlns:a16="http://schemas.microsoft.com/office/drawing/2014/main" id="{DB205338-6232-4C0B-A3A1-980D260FF05A}"/>
                 </a:ext>
               </a:extLst>
             </p:cNvPr>
@@ -3403,8 +4321,8 @@
           </p:nvSpPr>
           <p:spPr>
             <a:xfrm>
-              <a:off x="5142838" y="1105025"/>
-              <a:ext cx="1913298" cy="736847"/>
+              <a:off x="3328226" y="-1259205"/>
+              <a:ext cx="5532268" cy="1371082"/>
             </a:xfrm>
             <a:prstGeom prst="roundRect">
               <a:avLst/>
@@ -3437,36 +4355,315 @@
             <a:lstStyle/>
             <a:p>
               <a:pPr algn="ctr"/>
+              <a:endParaRPr lang="en-US" dirty="0"/>
+            </a:p>
+          </p:txBody>
+        </p:sp>
+        <p:sp>
+          <p:nvSpPr>
+            <p:cNvPr id="91" name="Rectangle 90">
+              <a:extLst>
+                <a:ext uri="{FF2B5EF4-FFF2-40B4-BE49-F238E27FC236}">
+                  <a16:creationId xmlns:a16="http://schemas.microsoft.com/office/drawing/2014/main" id="{17FBC41E-418B-4CD8-AB99-8BF000518BE0}"/>
+                </a:ext>
+              </a:extLst>
+            </p:cNvPr>
+            <p:cNvSpPr/>
+            <p:nvPr/>
+          </p:nvSpPr>
+          <p:spPr>
+            <a:xfrm>
+              <a:off x="3457402" y="-1628537"/>
+              <a:ext cx="3286605" cy="369332"/>
+            </a:xfrm>
+            <a:prstGeom prst="rect">
+              <a:avLst/>
+            </a:prstGeom>
+          </p:spPr>
+          <p:txBody>
+            <a:bodyPr wrap="none">
+              <a:spAutoFit/>
+            </a:bodyPr>
+            <a:lstStyle/>
+            <a:p>
+              <a:pPr algn="ctr"/>
               <a:r>
-                <a:rPr lang="en-US" dirty="0">
-                  <a:solidFill>
-                    <a:schemeClr val="tx1"/>
-                  </a:solidFill>
-                </a:rPr>
-                <a:t>Gene expression correlations</a:t>
+                <a:rPr lang="en-US" dirty="0"/>
+                <a:t>ARCHS4 RNA-Seq data repository</a:t>
               </a:r>
             </a:p>
           </p:txBody>
         </p:sp>
+        <p:grpSp>
+          <p:nvGrpSpPr>
+            <p:cNvPr id="103" name="Group 102">
+              <a:extLst>
+                <a:ext uri="{FF2B5EF4-FFF2-40B4-BE49-F238E27FC236}">
+                  <a16:creationId xmlns:a16="http://schemas.microsoft.com/office/drawing/2014/main" id="{43155AE9-F1CA-4C75-837C-A10A2D29BCA1}"/>
+                </a:ext>
+              </a:extLst>
+            </p:cNvPr>
+            <p:cNvGrpSpPr/>
+            <p:nvPr/>
+          </p:nvGrpSpPr>
+          <p:grpSpPr>
+            <a:xfrm>
+              <a:off x="3763980" y="-1056258"/>
+              <a:ext cx="4641251" cy="981237"/>
+              <a:chOff x="3763980" y="-1342251"/>
+              <a:chExt cx="4641251" cy="981237"/>
+            </a:xfrm>
+          </p:grpSpPr>
+          <p:sp>
+            <p:nvSpPr>
+              <p:cNvPr id="93" name="Rectangle: Rounded Corners 92">
+                <a:extLst>
+                  <a:ext uri="{FF2B5EF4-FFF2-40B4-BE49-F238E27FC236}">
+                    <a16:creationId xmlns:a16="http://schemas.microsoft.com/office/drawing/2014/main" id="{69B8FCE5-CFD8-4942-8A0D-90AD21BFCD5E}"/>
+                  </a:ext>
+                </a:extLst>
+              </p:cNvPr>
+              <p:cNvSpPr/>
+              <p:nvPr/>
+            </p:nvSpPr>
+            <p:spPr>
+              <a:xfrm>
+                <a:off x="3763980" y="-1341945"/>
+                <a:ext cx="2024680" cy="369332"/>
+              </a:xfrm>
+              <a:prstGeom prst="roundRect">
+                <a:avLst/>
+              </a:prstGeom>
+              <a:solidFill>
+                <a:srgbClr val="1C0444"/>
+              </a:solidFill>
+            </p:spPr>
+            <p:style>
+              <a:lnRef idx="2">
+                <a:schemeClr val="accent1">
+                  <a:shade val="50000"/>
+                </a:schemeClr>
+              </a:lnRef>
+              <a:fillRef idx="1">
+                <a:schemeClr val="accent1"/>
+              </a:fillRef>
+              <a:effectRef idx="0">
+                <a:schemeClr val="accent1"/>
+              </a:effectRef>
+              <a:fontRef idx="minor">
+                <a:schemeClr val="lt1"/>
+              </a:fontRef>
+            </p:style>
+            <p:txBody>
+              <a:bodyPr rtlCol="0" anchor="ctr"/>
+              <a:lstStyle/>
+              <a:p>
+                <a:pPr algn="ctr"/>
+                <a:r>
+                  <a:rPr lang="en-US" dirty="0"/>
+                  <a:t>Human tissues</a:t>
+                </a:r>
+              </a:p>
+            </p:txBody>
+          </p:sp>
+          <p:sp>
+            <p:nvSpPr>
+              <p:cNvPr id="94" name="Rectangle: Rounded Corners 93">
+                <a:extLst>
+                  <a:ext uri="{FF2B5EF4-FFF2-40B4-BE49-F238E27FC236}">
+                    <a16:creationId xmlns:a16="http://schemas.microsoft.com/office/drawing/2014/main" id="{AA83B7F6-A80A-4B77-9349-F42634D4B08C}"/>
+                  </a:ext>
+                </a:extLst>
+              </p:cNvPr>
+              <p:cNvSpPr/>
+              <p:nvPr/>
+            </p:nvSpPr>
+            <p:spPr>
+              <a:xfrm>
+                <a:off x="3786771" y="-730346"/>
+                <a:ext cx="2024680" cy="369332"/>
+              </a:xfrm>
+              <a:prstGeom prst="roundRect">
+                <a:avLst/>
+              </a:prstGeom>
+              <a:solidFill>
+                <a:srgbClr val="1C0444"/>
+              </a:solidFill>
+            </p:spPr>
+            <p:style>
+              <a:lnRef idx="2">
+                <a:schemeClr val="accent1">
+                  <a:shade val="50000"/>
+                </a:schemeClr>
+              </a:lnRef>
+              <a:fillRef idx="1">
+                <a:schemeClr val="accent1"/>
+              </a:fillRef>
+              <a:effectRef idx="0">
+                <a:schemeClr val="accent1"/>
+              </a:effectRef>
+              <a:fontRef idx="minor">
+                <a:schemeClr val="lt1"/>
+              </a:fontRef>
+            </p:style>
+            <p:txBody>
+              <a:bodyPr rtlCol="0" anchor="ctr"/>
+              <a:lstStyle/>
+              <a:p>
+                <a:pPr algn="ctr"/>
+                <a:r>
+                  <a:rPr lang="en-US" dirty="0"/>
+                  <a:t>Human tumors</a:t>
+                </a:r>
+              </a:p>
+            </p:txBody>
+          </p:sp>
+          <p:sp>
+            <p:nvSpPr>
+              <p:cNvPr id="95" name="Rectangle: Rounded Corners 94">
+                <a:extLst>
+                  <a:ext uri="{FF2B5EF4-FFF2-40B4-BE49-F238E27FC236}">
+                    <a16:creationId xmlns:a16="http://schemas.microsoft.com/office/drawing/2014/main" id="{474A99D8-F02F-4A28-B324-45373A5C165F}"/>
+                  </a:ext>
+                </a:extLst>
+              </p:cNvPr>
+              <p:cNvSpPr/>
+              <p:nvPr/>
+            </p:nvSpPr>
+            <p:spPr>
+              <a:xfrm>
+                <a:off x="6380551" y="-1342251"/>
+                <a:ext cx="2024680" cy="369332"/>
+              </a:xfrm>
+              <a:prstGeom prst="roundRect">
+                <a:avLst/>
+              </a:prstGeom>
+              <a:solidFill>
+                <a:srgbClr val="1C0444"/>
+              </a:solidFill>
+            </p:spPr>
+            <p:style>
+              <a:lnRef idx="2">
+                <a:schemeClr val="accent1">
+                  <a:shade val="50000"/>
+                </a:schemeClr>
+              </a:lnRef>
+              <a:fillRef idx="1">
+                <a:schemeClr val="accent1"/>
+              </a:fillRef>
+              <a:effectRef idx="0">
+                <a:schemeClr val="accent1"/>
+              </a:effectRef>
+              <a:fontRef idx="minor">
+                <a:schemeClr val="lt1"/>
+              </a:fontRef>
+            </p:style>
+            <p:txBody>
+              <a:bodyPr rtlCol="0" anchor="ctr"/>
+              <a:lstStyle/>
+              <a:p>
+                <a:pPr algn="ctr"/>
+                <a:r>
+                  <a:rPr lang="en-US" dirty="0"/>
+                  <a:t>Mouse tissues</a:t>
+                </a:r>
+              </a:p>
+            </p:txBody>
+          </p:sp>
+          <p:sp>
+            <p:nvSpPr>
+              <p:cNvPr id="96" name="Rectangle: Rounded Corners 95">
+                <a:extLst>
+                  <a:ext uri="{FF2B5EF4-FFF2-40B4-BE49-F238E27FC236}">
+                    <a16:creationId xmlns:a16="http://schemas.microsoft.com/office/drawing/2014/main" id="{E85043F1-A240-4217-BA13-B7E4AD1771F5}"/>
+                  </a:ext>
+                </a:extLst>
+              </p:cNvPr>
+              <p:cNvSpPr/>
+              <p:nvPr/>
+            </p:nvSpPr>
+            <p:spPr>
+              <a:xfrm>
+                <a:off x="6380551" y="-730346"/>
+                <a:ext cx="2024680" cy="369332"/>
+              </a:xfrm>
+              <a:prstGeom prst="roundRect">
+                <a:avLst/>
+              </a:prstGeom>
+              <a:solidFill>
+                <a:srgbClr val="1C0444"/>
+              </a:solidFill>
+            </p:spPr>
+            <p:style>
+              <a:lnRef idx="2">
+                <a:schemeClr val="accent1">
+                  <a:shade val="50000"/>
+                </a:schemeClr>
+              </a:lnRef>
+              <a:fillRef idx="1">
+                <a:schemeClr val="accent1"/>
+              </a:fillRef>
+              <a:effectRef idx="0">
+                <a:schemeClr val="accent1"/>
+              </a:effectRef>
+              <a:fontRef idx="minor">
+                <a:schemeClr val="lt1"/>
+              </a:fontRef>
+            </p:style>
+            <p:txBody>
+              <a:bodyPr rtlCol="0" anchor="ctr"/>
+              <a:lstStyle/>
+              <a:p>
+                <a:pPr algn="ctr"/>
+                <a:r>
+                  <a:rPr lang="en-US" dirty="0"/>
+                  <a:t>Mouse tumors</a:t>
+                </a:r>
+              </a:p>
+            </p:txBody>
+          </p:sp>
+        </p:grpSp>
+      </p:grpSp>
+      <p:grpSp>
+        <p:nvGrpSpPr>
+          <p:cNvPr id="3" name="Group 2">
+            <a:extLst>
+              <a:ext uri="{FF2B5EF4-FFF2-40B4-BE49-F238E27FC236}">
+                <a16:creationId xmlns:a16="http://schemas.microsoft.com/office/drawing/2014/main" id="{5476D928-E768-41FC-97C9-3E6549ECAC7B}"/>
+              </a:ext>
+            </a:extLst>
+          </p:cNvPr>
+          <p:cNvGrpSpPr/>
+          <p:nvPr/>
+        </p:nvGrpSpPr>
+        <p:grpSpPr>
+          <a:xfrm>
+            <a:off x="6112607" y="5185949"/>
+            <a:ext cx="7733159" cy="4205387"/>
+            <a:chOff x="6356447" y="5612669"/>
+            <a:chExt cx="7733159" cy="4205387"/>
+          </a:xfrm>
+        </p:grpSpPr>
         <p:cxnSp>
           <p:nvCxnSpPr>
-            <p:cNvPr id="15" name="Straight Arrow Connector 14">
+            <p:cNvPr id="23" name="Straight Arrow Connector 22">
               <a:extLst>
                 <a:ext uri="{FF2B5EF4-FFF2-40B4-BE49-F238E27FC236}">
-                  <a16:creationId xmlns:a16="http://schemas.microsoft.com/office/drawing/2014/main" id="{77530A88-D50C-41F3-9643-1E5AE60BE674}"/>
+                  <a16:creationId xmlns:a16="http://schemas.microsoft.com/office/drawing/2014/main" id="{AFEA8FD7-C58C-4CCD-81ED-CA12DF5BFECE}"/>
                 </a:ext>
               </a:extLst>
             </p:cNvPr>
             <p:cNvCxnSpPr>
               <a:cxnSpLocks/>
-              <a:stCxn id="10" idx="2"/>
+              <a:stCxn id="25" idx="2"/>
+              <a:endCxn id="119" idx="0"/>
             </p:cNvCxnSpPr>
             <p:nvPr/>
           </p:nvCxnSpPr>
           <p:spPr>
-            <a:xfrm flipH="1">
-              <a:off x="6093926" y="1841872"/>
-              <a:ext cx="5561" cy="594920"/>
+            <a:xfrm>
+              <a:off x="6356447" y="5612669"/>
+              <a:ext cx="4581074" cy="1317090"/>
             </a:xfrm>
             <a:prstGeom prst="straightConnector1">
               <a:avLst/>
@@ -3490,439 +4687,12 @@
             </a:fontRef>
           </p:style>
         </p:cxnSp>
-        <p:sp>
-          <p:nvSpPr>
-            <p:cNvPr id="28" name="Rectangle: Rounded Corners 27">
+        <p:grpSp>
+          <p:nvGrpSpPr>
+            <p:cNvPr id="136" name="Group 135">
               <a:extLst>
                 <a:ext uri="{FF2B5EF4-FFF2-40B4-BE49-F238E27FC236}">
-                  <a16:creationId xmlns:a16="http://schemas.microsoft.com/office/drawing/2014/main" id="{07354014-32DB-4978-872F-6CDEEBFF7A60}"/>
-                </a:ext>
-              </a:extLst>
-            </p:cNvPr>
-            <p:cNvSpPr/>
-            <p:nvPr/>
-          </p:nvSpPr>
-          <p:spPr>
-            <a:xfrm>
-              <a:off x="-1184180" y="1725768"/>
-              <a:ext cx="3339312" cy="4165247"/>
-            </a:xfrm>
-            <a:prstGeom prst="roundRect">
-              <a:avLst/>
-            </a:prstGeom>
-            <a:noFill/>
-            <a:ln w="28575">
-              <a:solidFill>
-                <a:schemeClr val="tx1"/>
-              </a:solidFill>
-            </a:ln>
-          </p:spPr>
-          <p:style>
-            <a:lnRef idx="2">
-              <a:schemeClr val="accent1">
-                <a:shade val="50000"/>
-              </a:schemeClr>
-            </a:lnRef>
-            <a:fillRef idx="1">
-              <a:schemeClr val="accent1"/>
-            </a:fillRef>
-            <a:effectRef idx="0">
-              <a:schemeClr val="accent1"/>
-            </a:effectRef>
-            <a:fontRef idx="minor">
-              <a:schemeClr val="lt1"/>
-            </a:fontRef>
-          </p:style>
-          <p:txBody>
-            <a:bodyPr rtlCol="0" anchor="ctr"/>
-            <a:lstStyle/>
-            <a:p>
-              <a:pPr algn="ctr"/>
-              <a:endParaRPr lang="en-US"/>
-            </a:p>
-          </p:txBody>
-        </p:sp>
-        <p:sp>
-          <p:nvSpPr>
-            <p:cNvPr id="32" name="Rectangle: Rounded Corners 31">
-              <a:extLst>
-                <a:ext uri="{FF2B5EF4-FFF2-40B4-BE49-F238E27FC236}">
-                  <a16:creationId xmlns:a16="http://schemas.microsoft.com/office/drawing/2014/main" id="{52530A37-D41A-4114-BE72-6B2AFD3136B4}"/>
-                </a:ext>
-              </a:extLst>
-            </p:cNvPr>
-            <p:cNvSpPr/>
-            <p:nvPr/>
-          </p:nvSpPr>
-          <p:spPr>
-            <a:xfrm>
-              <a:off x="10036867" y="1720807"/>
-              <a:ext cx="3339312" cy="4165241"/>
-            </a:xfrm>
-            <a:prstGeom prst="roundRect">
-              <a:avLst/>
-            </a:prstGeom>
-            <a:noFill/>
-            <a:ln w="28575">
-              <a:solidFill>
-                <a:schemeClr val="tx1"/>
-              </a:solidFill>
-            </a:ln>
-          </p:spPr>
-          <p:style>
-            <a:lnRef idx="2">
-              <a:schemeClr val="accent1">
-                <a:shade val="50000"/>
-              </a:schemeClr>
-            </a:lnRef>
-            <a:fillRef idx="1">
-              <a:schemeClr val="accent1"/>
-            </a:fillRef>
-            <a:effectRef idx="0">
-              <a:schemeClr val="accent1"/>
-            </a:effectRef>
-            <a:fontRef idx="minor">
-              <a:schemeClr val="lt1"/>
-            </a:fontRef>
-          </p:style>
-          <p:txBody>
-            <a:bodyPr rtlCol="0" anchor="ctr"/>
-            <a:lstStyle/>
-            <a:p>
-              <a:pPr algn="ctr"/>
-              <a:endParaRPr lang="en-US"/>
-            </a:p>
-          </p:txBody>
-        </p:sp>
-        <p:cxnSp>
-          <p:nvCxnSpPr>
-            <p:cNvPr id="43" name="Straight Connector 42">
-              <a:extLst>
-                <a:ext uri="{FF2B5EF4-FFF2-40B4-BE49-F238E27FC236}">
-                  <a16:creationId xmlns:a16="http://schemas.microsoft.com/office/drawing/2014/main" id="{96296160-98C9-4054-8003-D859487DBB78}"/>
-                </a:ext>
-              </a:extLst>
-            </p:cNvPr>
-            <p:cNvCxnSpPr/>
-            <p:nvPr/>
-          </p:nvCxnSpPr>
-          <p:spPr>
-            <a:xfrm>
-              <a:off x="-1184180" y="2213142"/>
-              <a:ext cx="3339312" cy="0"/>
-            </a:xfrm>
-            <a:prstGeom prst="line">
-              <a:avLst/>
-            </a:prstGeom>
-            <a:ln w="12700"/>
-          </p:spPr>
-          <p:style>
-            <a:lnRef idx="1">
-              <a:schemeClr val="dk1"/>
-            </a:lnRef>
-            <a:fillRef idx="0">
-              <a:schemeClr val="dk1"/>
-            </a:fillRef>
-            <a:effectRef idx="0">
-              <a:schemeClr val="dk1"/>
-            </a:effectRef>
-            <a:fontRef idx="minor">
-              <a:schemeClr val="tx1"/>
-            </a:fontRef>
-          </p:style>
-        </p:cxnSp>
-        <p:cxnSp>
-          <p:nvCxnSpPr>
-            <p:cNvPr id="44" name="Straight Connector 43">
-              <a:extLst>
-                <a:ext uri="{FF2B5EF4-FFF2-40B4-BE49-F238E27FC236}">
-                  <a16:creationId xmlns:a16="http://schemas.microsoft.com/office/drawing/2014/main" id="{DAC4CAA4-BA1C-407F-A99F-8925455C3224}"/>
-                </a:ext>
-              </a:extLst>
-            </p:cNvPr>
-            <p:cNvCxnSpPr/>
-            <p:nvPr/>
-          </p:nvCxnSpPr>
-          <p:spPr>
-            <a:xfrm>
-              <a:off x="10035229" y="2212504"/>
-              <a:ext cx="3339312" cy="0"/>
-            </a:xfrm>
-            <a:prstGeom prst="line">
-              <a:avLst/>
-            </a:prstGeom>
-            <a:ln w="12700"/>
-          </p:spPr>
-          <p:style>
-            <a:lnRef idx="1">
-              <a:schemeClr val="dk1"/>
-            </a:lnRef>
-            <a:fillRef idx="0">
-              <a:schemeClr val="dk1"/>
-            </a:fillRef>
-            <a:effectRef idx="0">
-              <a:schemeClr val="dk1"/>
-            </a:effectRef>
-            <a:fontRef idx="minor">
-              <a:schemeClr val="tx1"/>
-            </a:fontRef>
-          </p:style>
-        </p:cxnSp>
-        <p:sp>
-          <p:nvSpPr>
-            <p:cNvPr id="48" name="TextBox 47">
-              <a:extLst>
-                <a:ext uri="{FF2B5EF4-FFF2-40B4-BE49-F238E27FC236}">
-                  <a16:creationId xmlns:a16="http://schemas.microsoft.com/office/drawing/2014/main" id="{4007DBBC-9244-4FF3-BE56-B1429424E3F9}"/>
-                </a:ext>
-              </a:extLst>
-            </p:cNvPr>
-            <p:cNvSpPr txBox="1"/>
-            <p:nvPr/>
-          </p:nvSpPr>
-          <p:spPr>
-            <a:xfrm>
-              <a:off x="-760891" y="1792787"/>
-              <a:ext cx="2480940" cy="369332"/>
-            </a:xfrm>
-            <a:prstGeom prst="rect">
-              <a:avLst/>
-            </a:prstGeom>
-            <a:noFill/>
-          </p:spPr>
-          <p:txBody>
-            <a:bodyPr wrap="square" rtlCol="0">
-              <a:spAutoFit/>
-            </a:bodyPr>
-            <a:lstStyle/>
-            <a:p>
-              <a:r>
-                <a:rPr lang="en-US" dirty="0"/>
-                <a:t>Single Gene Mode</a:t>
-              </a:r>
-            </a:p>
-          </p:txBody>
-        </p:sp>
-        <p:sp>
-          <p:nvSpPr>
-            <p:cNvPr id="49" name="TextBox 48">
-              <a:extLst>
-                <a:ext uri="{FF2B5EF4-FFF2-40B4-BE49-F238E27FC236}">
-                  <a16:creationId xmlns:a16="http://schemas.microsoft.com/office/drawing/2014/main" id="{1F58AE3C-8878-49CB-B0F7-9481EA11FF2F}"/>
-                </a:ext>
-              </a:extLst>
-            </p:cNvPr>
-            <p:cNvSpPr txBox="1"/>
-            <p:nvPr/>
-          </p:nvSpPr>
-          <p:spPr>
-            <a:xfrm>
-              <a:off x="10446893" y="1792787"/>
-              <a:ext cx="2472954" cy="369332"/>
-            </a:xfrm>
-            <a:prstGeom prst="rect">
-              <a:avLst/>
-            </a:prstGeom>
-            <a:noFill/>
-          </p:spPr>
-          <p:txBody>
-            <a:bodyPr wrap="square" rtlCol="0">
-              <a:spAutoFit/>
-            </a:bodyPr>
-            <a:lstStyle/>
-            <a:p>
-              <a:r>
-                <a:rPr lang="en-US" dirty="0"/>
-                <a:t>Gene vs Gene List Mode</a:t>
-              </a:r>
-            </a:p>
-          </p:txBody>
-        </p:sp>
-        <p:sp>
-          <p:nvSpPr>
-            <p:cNvPr id="51" name="TextBox 50">
-              <a:extLst>
-                <a:ext uri="{FF2B5EF4-FFF2-40B4-BE49-F238E27FC236}">
-                  <a16:creationId xmlns:a16="http://schemas.microsoft.com/office/drawing/2014/main" id="{EA3F0FF7-CE32-46C4-98B0-D96DC18DB9EB}"/>
-                </a:ext>
-              </a:extLst>
-            </p:cNvPr>
-            <p:cNvSpPr txBox="1"/>
-            <p:nvPr/>
-          </p:nvSpPr>
-          <p:spPr>
-            <a:xfrm>
-              <a:off x="-1064325" y="2216145"/>
-              <a:ext cx="2563202" cy="369332"/>
-            </a:xfrm>
-            <a:prstGeom prst="rect">
-              <a:avLst/>
-            </a:prstGeom>
-            <a:noFill/>
-          </p:spPr>
-          <p:txBody>
-            <a:bodyPr wrap="none" rtlCol="0">
-              <a:spAutoFit/>
-            </a:bodyPr>
-            <a:lstStyle/>
-            <a:p>
-              <a:r>
-                <a:rPr lang="en-US" dirty="0"/>
-                <a:t>“ATM (pancreas-normal)”</a:t>
-              </a:r>
-            </a:p>
-          </p:txBody>
-        </p:sp>
-        <p:sp>
-          <p:nvSpPr>
-            <p:cNvPr id="53" name="TextBox 52">
-              <a:extLst>
-                <a:ext uri="{FF2B5EF4-FFF2-40B4-BE49-F238E27FC236}">
-                  <a16:creationId xmlns:a16="http://schemas.microsoft.com/office/drawing/2014/main" id="{67B27EC5-3306-4370-AB52-0DD37A5328F2}"/>
-                </a:ext>
-              </a:extLst>
-            </p:cNvPr>
-            <p:cNvSpPr txBox="1"/>
-            <p:nvPr/>
-          </p:nvSpPr>
-          <p:spPr>
-            <a:xfrm>
-              <a:off x="10219425" y="2212504"/>
-              <a:ext cx="2645340" cy="369332"/>
-            </a:xfrm>
-            <a:prstGeom prst="rect">
-              <a:avLst/>
-            </a:prstGeom>
-            <a:noFill/>
-          </p:spPr>
-          <p:txBody>
-            <a:bodyPr wrap="none" rtlCol="0">
-              <a:spAutoFit/>
-            </a:bodyPr>
-            <a:lstStyle/>
-            <a:p>
-              <a:r>
-                <a:rPr lang="en-US" dirty="0"/>
-                <a:t>“ATM vs (BRCA1, EZH2 …)”</a:t>
-              </a:r>
-            </a:p>
-          </p:txBody>
-        </p:sp>
-        <p:cxnSp>
-          <p:nvCxnSpPr>
-            <p:cNvPr id="55" name="Straight Connector 54">
-              <a:extLst>
-                <a:ext uri="{FF2B5EF4-FFF2-40B4-BE49-F238E27FC236}">
-                  <a16:creationId xmlns:a16="http://schemas.microsoft.com/office/drawing/2014/main" id="{1772C2ED-8084-4D96-8A9F-05E1323D9C60}"/>
-                </a:ext>
-              </a:extLst>
-            </p:cNvPr>
-            <p:cNvCxnSpPr/>
-            <p:nvPr/>
-          </p:nvCxnSpPr>
-          <p:spPr>
-            <a:xfrm>
-              <a:off x="-1184180" y="2581836"/>
-              <a:ext cx="3339312" cy="0"/>
-            </a:xfrm>
-            <a:prstGeom prst="line">
-              <a:avLst/>
-            </a:prstGeom>
-            <a:ln w="12700"/>
-          </p:spPr>
-          <p:style>
-            <a:lnRef idx="1">
-              <a:schemeClr val="dk1"/>
-            </a:lnRef>
-            <a:fillRef idx="0">
-              <a:schemeClr val="dk1"/>
-            </a:fillRef>
-            <a:effectRef idx="0">
-              <a:schemeClr val="dk1"/>
-            </a:effectRef>
-            <a:fontRef idx="minor">
-              <a:schemeClr val="tx1"/>
-            </a:fontRef>
-          </p:style>
-        </p:cxnSp>
-        <p:cxnSp>
-          <p:nvCxnSpPr>
-            <p:cNvPr id="56" name="Straight Connector 55">
-              <a:extLst>
-                <a:ext uri="{FF2B5EF4-FFF2-40B4-BE49-F238E27FC236}">
-                  <a16:creationId xmlns:a16="http://schemas.microsoft.com/office/drawing/2014/main" id="{9FDA19AA-F31F-4E5E-97E2-A0B418F800EB}"/>
-                </a:ext>
-              </a:extLst>
-            </p:cNvPr>
-            <p:cNvCxnSpPr/>
-            <p:nvPr/>
-          </p:nvCxnSpPr>
-          <p:spPr>
-            <a:xfrm>
-              <a:off x="10013714" y="2581836"/>
-              <a:ext cx="3339312" cy="0"/>
-            </a:xfrm>
-            <a:prstGeom prst="line">
-              <a:avLst/>
-            </a:prstGeom>
-            <a:ln w="12700"/>
-          </p:spPr>
-          <p:style>
-            <a:lnRef idx="1">
-              <a:schemeClr val="dk1"/>
-            </a:lnRef>
-            <a:fillRef idx="0">
-              <a:schemeClr val="dk1"/>
-            </a:fillRef>
-            <a:effectRef idx="0">
-              <a:schemeClr val="dk1"/>
-            </a:effectRef>
-            <a:fontRef idx="minor">
-              <a:schemeClr val="tx1"/>
-            </a:fontRef>
-          </p:style>
-        </p:cxnSp>
-        <p:pic>
-          <p:nvPicPr>
-            <p:cNvPr id="68" name="Picture 67" descr="A screenshot of a cell phone&#10;&#10;Description automatically generated">
-              <a:extLst>
-                <a:ext uri="{FF2B5EF4-FFF2-40B4-BE49-F238E27FC236}">
-                  <a16:creationId xmlns:a16="http://schemas.microsoft.com/office/drawing/2014/main" id="{DE1E1F68-FA16-4936-BDD3-CD02071F1F4A}"/>
-                </a:ext>
-              </a:extLst>
-            </p:cNvPr>
-            <p:cNvPicPr>
-              <a:picLocks noChangeAspect="1"/>
-            </p:cNvPicPr>
-            <p:nvPr/>
-          </p:nvPicPr>
-          <p:blipFill rotWithShape="1">
-            <a:blip r:embed="rId2">
-              <a:extLst>
-                <a:ext uri="{28A0092B-C50C-407E-A947-70E740481C1C}">
-                  <a14:useLocalDpi xmlns:a14="http://schemas.microsoft.com/office/drawing/2010/main" val="0"/>
-                </a:ext>
-              </a:extLst>
-            </a:blip>
-            <a:srcRect l="198" t="11598" b="5657"/>
-            <a:stretch/>
-          </p:blipFill>
-          <p:spPr>
-            <a:xfrm>
-              <a:off x="-667872" y="2759995"/>
-              <a:ext cx="2292442" cy="1221839"/>
-            </a:xfrm>
-            <a:prstGeom prst="rect">
-              <a:avLst/>
-            </a:prstGeom>
-          </p:spPr>
-        </p:pic>
-        <p:grpSp>
-          <p:nvGrpSpPr>
-            <p:cNvPr id="104" name="Group 103">
-              <a:extLst>
-                <a:ext uri="{FF2B5EF4-FFF2-40B4-BE49-F238E27FC236}">
-                  <a16:creationId xmlns:a16="http://schemas.microsoft.com/office/drawing/2014/main" id="{9949F315-15CA-46FD-AAEE-C873D909F870}"/>
+                  <a16:creationId xmlns:a16="http://schemas.microsoft.com/office/drawing/2014/main" id="{C751E94B-65D8-4062-ABE7-74D6069CEDE7}"/>
                 </a:ext>
               </a:extLst>
             </p:cNvPr>
@@ -3931,18 +4701,18 @@
           </p:nvGrpSpPr>
           <p:grpSpPr>
             <a:xfrm>
-              <a:off x="3333353" y="-1130902"/>
-              <a:ext cx="5532268" cy="1740414"/>
-              <a:chOff x="3328226" y="-1628537"/>
-              <a:chExt cx="5532268" cy="1740414"/>
+              <a:off x="7785436" y="6929759"/>
+              <a:ext cx="6304170" cy="2888297"/>
+              <a:chOff x="2999721" y="6003842"/>
+              <a:chExt cx="6304170" cy="2888297"/>
             </a:xfrm>
           </p:grpSpPr>
           <p:sp>
             <p:nvSpPr>
-              <p:cNvPr id="4" name="Rectangle: Rounded Corners 3">
+              <p:cNvPr id="119" name="Rectangle: Rounded Corners 118">
                 <a:extLst>
                   <a:ext uri="{FF2B5EF4-FFF2-40B4-BE49-F238E27FC236}">
-                    <a16:creationId xmlns:a16="http://schemas.microsoft.com/office/drawing/2014/main" id="{DB205338-6232-4C0B-A3A1-980D260FF05A}"/>
+                    <a16:creationId xmlns:a16="http://schemas.microsoft.com/office/drawing/2014/main" id="{C24ADC0B-44D9-4738-8B52-E1E118D69121}"/>
                   </a:ext>
                 </a:extLst>
               </p:cNvPr>
@@ -3951,8 +4721,8 @@
             </p:nvSpPr>
             <p:spPr>
               <a:xfrm>
-                <a:off x="3328226" y="-1259205"/>
-                <a:ext cx="5532268" cy="1371082"/>
+                <a:off x="2999721" y="6003842"/>
+                <a:ext cx="6304170" cy="2888297"/>
               </a:xfrm>
               <a:prstGeom prst="roundRect">
                 <a:avLst/>
@@ -3985,322 +4755,33 @@
               <a:lstStyle/>
               <a:p>
                 <a:pPr algn="ctr"/>
-                <a:endParaRPr lang="en-US" dirty="0"/>
+                <a:endParaRPr lang="en-US"/>
               </a:p>
             </p:txBody>
           </p:sp>
-          <p:sp>
-            <p:nvSpPr>
-              <p:cNvPr id="91" name="Rectangle 90">
+          <p:cxnSp>
+            <p:nvCxnSpPr>
+              <p:cNvPr id="120" name="Straight Connector 119">
                 <a:extLst>
                   <a:ext uri="{FF2B5EF4-FFF2-40B4-BE49-F238E27FC236}">
-                    <a16:creationId xmlns:a16="http://schemas.microsoft.com/office/drawing/2014/main" id="{17FBC41E-418B-4CD8-AB99-8BF000518BE0}"/>
-                  </a:ext>
-                </a:extLst>
-              </p:cNvPr>
-              <p:cNvSpPr/>
-              <p:nvPr/>
-            </p:nvSpPr>
-            <p:spPr>
-              <a:xfrm>
-                <a:off x="3457402" y="-1628537"/>
-                <a:ext cx="3286605" cy="369332"/>
-              </a:xfrm>
-              <a:prstGeom prst="rect">
-                <a:avLst/>
-              </a:prstGeom>
-            </p:spPr>
-            <p:txBody>
-              <a:bodyPr wrap="none">
-                <a:spAutoFit/>
-              </a:bodyPr>
-              <a:lstStyle/>
-              <a:p>
-                <a:pPr algn="ctr"/>
-                <a:r>
-                  <a:rPr lang="en-US" dirty="0"/>
-                  <a:t>ARCHS4 RNA-Seq data repository</a:t>
-                </a:r>
-              </a:p>
-            </p:txBody>
-          </p:sp>
-          <p:grpSp>
-            <p:nvGrpSpPr>
-              <p:cNvPr id="103" name="Group 102">
-                <a:extLst>
-                  <a:ext uri="{FF2B5EF4-FFF2-40B4-BE49-F238E27FC236}">
-                    <a16:creationId xmlns:a16="http://schemas.microsoft.com/office/drawing/2014/main" id="{43155AE9-F1CA-4C75-837C-A10A2D29BCA1}"/>
-                  </a:ext>
-                </a:extLst>
-              </p:cNvPr>
-              <p:cNvGrpSpPr/>
-              <p:nvPr/>
-            </p:nvGrpSpPr>
-            <p:grpSpPr>
-              <a:xfrm>
-                <a:off x="3763980" y="-1056258"/>
-                <a:ext cx="4641251" cy="981237"/>
-                <a:chOff x="3763980" y="-1342251"/>
-                <a:chExt cx="4641251" cy="981237"/>
-              </a:xfrm>
-            </p:grpSpPr>
-            <p:sp>
-              <p:nvSpPr>
-                <p:cNvPr id="93" name="Rectangle: Rounded Corners 92">
-                  <a:extLst>
-                    <a:ext uri="{FF2B5EF4-FFF2-40B4-BE49-F238E27FC236}">
-                      <a16:creationId xmlns:a16="http://schemas.microsoft.com/office/drawing/2014/main" id="{69B8FCE5-CFD8-4942-8A0D-90AD21BFCD5E}"/>
-                    </a:ext>
-                  </a:extLst>
-                </p:cNvPr>
-                <p:cNvSpPr/>
-                <p:nvPr/>
-              </p:nvSpPr>
-              <p:spPr>
-                <a:xfrm>
-                  <a:off x="3763980" y="-1341945"/>
-                  <a:ext cx="2024680" cy="369332"/>
-                </a:xfrm>
-                <a:prstGeom prst="roundRect">
-                  <a:avLst/>
-                </a:prstGeom>
-                <a:solidFill>
-                  <a:srgbClr val="1C0444"/>
-                </a:solidFill>
-              </p:spPr>
-              <p:style>
-                <a:lnRef idx="2">
-                  <a:schemeClr val="accent1">
-                    <a:shade val="50000"/>
-                  </a:schemeClr>
-                </a:lnRef>
-                <a:fillRef idx="1">
-                  <a:schemeClr val="accent1"/>
-                </a:fillRef>
-                <a:effectRef idx="0">
-                  <a:schemeClr val="accent1"/>
-                </a:effectRef>
-                <a:fontRef idx="minor">
-                  <a:schemeClr val="lt1"/>
-                </a:fontRef>
-              </p:style>
-              <p:txBody>
-                <a:bodyPr rtlCol="0" anchor="ctr"/>
-                <a:lstStyle/>
-                <a:p>
-                  <a:pPr algn="ctr"/>
-                  <a:r>
-                    <a:rPr lang="en-US" dirty="0"/>
-                    <a:t>Human tissues</a:t>
-                  </a:r>
-                </a:p>
-              </p:txBody>
-            </p:sp>
-            <p:sp>
-              <p:nvSpPr>
-                <p:cNvPr id="94" name="Rectangle: Rounded Corners 93">
-                  <a:extLst>
-                    <a:ext uri="{FF2B5EF4-FFF2-40B4-BE49-F238E27FC236}">
-                      <a16:creationId xmlns:a16="http://schemas.microsoft.com/office/drawing/2014/main" id="{AA83B7F6-A80A-4B77-9349-F42634D4B08C}"/>
-                    </a:ext>
-                  </a:extLst>
-                </p:cNvPr>
-                <p:cNvSpPr/>
-                <p:nvPr/>
-              </p:nvSpPr>
-              <p:spPr>
-                <a:xfrm>
-                  <a:off x="3786771" y="-730346"/>
-                  <a:ext cx="2024680" cy="369332"/>
-                </a:xfrm>
-                <a:prstGeom prst="roundRect">
-                  <a:avLst/>
-                </a:prstGeom>
-                <a:solidFill>
-                  <a:srgbClr val="1C0444"/>
-                </a:solidFill>
-              </p:spPr>
-              <p:style>
-                <a:lnRef idx="2">
-                  <a:schemeClr val="accent1">
-                    <a:shade val="50000"/>
-                  </a:schemeClr>
-                </a:lnRef>
-                <a:fillRef idx="1">
-                  <a:schemeClr val="accent1"/>
-                </a:fillRef>
-                <a:effectRef idx="0">
-                  <a:schemeClr val="accent1"/>
-                </a:effectRef>
-                <a:fontRef idx="minor">
-                  <a:schemeClr val="lt1"/>
-                </a:fontRef>
-              </p:style>
-              <p:txBody>
-                <a:bodyPr rtlCol="0" anchor="ctr"/>
-                <a:lstStyle/>
-                <a:p>
-                  <a:pPr algn="ctr"/>
-                  <a:r>
-                    <a:rPr lang="en-US" dirty="0"/>
-                    <a:t>Human tumors</a:t>
-                  </a:r>
-                </a:p>
-              </p:txBody>
-            </p:sp>
-            <p:sp>
-              <p:nvSpPr>
-                <p:cNvPr id="95" name="Rectangle: Rounded Corners 94">
-                  <a:extLst>
-                    <a:ext uri="{FF2B5EF4-FFF2-40B4-BE49-F238E27FC236}">
-                      <a16:creationId xmlns:a16="http://schemas.microsoft.com/office/drawing/2014/main" id="{474A99D8-F02F-4A28-B324-45373A5C165F}"/>
-                    </a:ext>
-                  </a:extLst>
-                </p:cNvPr>
-                <p:cNvSpPr/>
-                <p:nvPr/>
-              </p:nvSpPr>
-              <p:spPr>
-                <a:xfrm>
-                  <a:off x="6380551" y="-1342251"/>
-                  <a:ext cx="2024680" cy="369332"/>
-                </a:xfrm>
-                <a:prstGeom prst="roundRect">
-                  <a:avLst/>
-                </a:prstGeom>
-                <a:solidFill>
-                  <a:srgbClr val="1C0444"/>
-                </a:solidFill>
-              </p:spPr>
-              <p:style>
-                <a:lnRef idx="2">
-                  <a:schemeClr val="accent1">
-                    <a:shade val="50000"/>
-                  </a:schemeClr>
-                </a:lnRef>
-                <a:fillRef idx="1">
-                  <a:schemeClr val="accent1"/>
-                </a:fillRef>
-                <a:effectRef idx="0">
-                  <a:schemeClr val="accent1"/>
-                </a:effectRef>
-                <a:fontRef idx="minor">
-                  <a:schemeClr val="lt1"/>
-                </a:fontRef>
-              </p:style>
-              <p:txBody>
-                <a:bodyPr rtlCol="0" anchor="ctr"/>
-                <a:lstStyle/>
-                <a:p>
-                  <a:pPr algn="ctr"/>
-                  <a:r>
-                    <a:rPr lang="en-US" dirty="0"/>
-                    <a:t>Mouse tissues</a:t>
-                  </a:r>
-                </a:p>
-              </p:txBody>
-            </p:sp>
-            <p:sp>
-              <p:nvSpPr>
-                <p:cNvPr id="96" name="Rectangle: Rounded Corners 95">
-                  <a:extLst>
-                    <a:ext uri="{FF2B5EF4-FFF2-40B4-BE49-F238E27FC236}">
-                      <a16:creationId xmlns:a16="http://schemas.microsoft.com/office/drawing/2014/main" id="{E85043F1-A240-4217-BA13-B7E4AD1771F5}"/>
-                    </a:ext>
-                  </a:extLst>
-                </p:cNvPr>
-                <p:cNvSpPr/>
-                <p:nvPr/>
-              </p:nvSpPr>
-              <p:spPr>
-                <a:xfrm>
-                  <a:off x="6380551" y="-730346"/>
-                  <a:ext cx="2024680" cy="369332"/>
-                </a:xfrm>
-                <a:prstGeom prst="roundRect">
-                  <a:avLst/>
-                </a:prstGeom>
-                <a:solidFill>
-                  <a:srgbClr val="1C0444"/>
-                </a:solidFill>
-              </p:spPr>
-              <p:style>
-                <a:lnRef idx="2">
-                  <a:schemeClr val="accent1">
-                    <a:shade val="50000"/>
-                  </a:schemeClr>
-                </a:lnRef>
-                <a:fillRef idx="1">
-                  <a:schemeClr val="accent1"/>
-                </a:fillRef>
-                <a:effectRef idx="0">
-                  <a:schemeClr val="accent1"/>
-                </a:effectRef>
-                <a:fontRef idx="minor">
-                  <a:schemeClr val="lt1"/>
-                </a:fontRef>
-              </p:style>
-              <p:txBody>
-                <a:bodyPr rtlCol="0" anchor="ctr"/>
-                <a:lstStyle/>
-                <a:p>
-                  <a:pPr algn="ctr"/>
-                  <a:r>
-                    <a:rPr lang="en-US" dirty="0"/>
-                    <a:t>Mouse tumors</a:t>
-                  </a:r>
-                </a:p>
-              </p:txBody>
-            </p:sp>
-          </p:grpSp>
-        </p:grpSp>
-        <p:grpSp>
-          <p:nvGrpSpPr>
-            <p:cNvPr id="3" name="Group 2">
-              <a:extLst>
-                <a:ext uri="{FF2B5EF4-FFF2-40B4-BE49-F238E27FC236}">
-                  <a16:creationId xmlns:a16="http://schemas.microsoft.com/office/drawing/2014/main" id="{5476D928-E768-41FC-97C9-3E6549ECAC7B}"/>
-                </a:ext>
-              </a:extLst>
-            </p:cNvPr>
-            <p:cNvGrpSpPr/>
-            <p:nvPr/>
-          </p:nvGrpSpPr>
-          <p:grpSpPr>
-            <a:xfrm>
-              <a:off x="6112607" y="5185949"/>
-              <a:ext cx="7733159" cy="4205387"/>
-              <a:chOff x="6356447" y="5612669"/>
-              <a:chExt cx="7733159" cy="4205387"/>
-            </a:xfrm>
-          </p:grpSpPr>
-          <p:cxnSp>
-            <p:nvCxnSpPr>
-              <p:cNvPr id="23" name="Straight Arrow Connector 22">
-                <a:extLst>
-                  <a:ext uri="{FF2B5EF4-FFF2-40B4-BE49-F238E27FC236}">
-                    <a16:creationId xmlns:a16="http://schemas.microsoft.com/office/drawing/2014/main" id="{AFEA8FD7-C58C-4CCD-81ED-CA12DF5BFECE}"/>
+                    <a16:creationId xmlns:a16="http://schemas.microsoft.com/office/drawing/2014/main" id="{2A4A01EF-ED53-414E-82D9-4A5D0C70AEE8}"/>
                   </a:ext>
                 </a:extLst>
               </p:cNvPr>
               <p:cNvCxnSpPr>
                 <a:cxnSpLocks/>
-                <a:stCxn id="25" idx="2"/>
-                <a:endCxn id="119" idx="0"/>
               </p:cNvCxnSpPr>
               <p:nvPr/>
             </p:nvCxnSpPr>
             <p:spPr>
-              <a:xfrm>
-                <a:off x="6356447" y="5612669"/>
-                <a:ext cx="4581074" cy="1317090"/>
+              <a:xfrm flipV="1">
+                <a:off x="3060681" y="6448543"/>
+                <a:ext cx="6182250" cy="7744"/>
               </a:xfrm>
-              <a:prstGeom prst="straightConnector1">
+              <a:prstGeom prst="line">
                 <a:avLst/>
               </a:prstGeom>
-              <a:ln w="28575">
-                <a:tailEnd type="triangle"/>
-              </a:ln>
+              <a:ln w="12700"/>
             </p:spPr>
             <p:style>
               <a:lnRef idx="1">
@@ -4317,493 +4798,99 @@
               </a:fontRef>
             </p:style>
           </p:cxnSp>
-          <p:grpSp>
-            <p:nvGrpSpPr>
-              <p:cNvPr id="136" name="Group 135">
+          <p:sp>
+            <p:nvSpPr>
+              <p:cNvPr id="121" name="TextBox 120">
                 <a:extLst>
                   <a:ext uri="{FF2B5EF4-FFF2-40B4-BE49-F238E27FC236}">
-                    <a16:creationId xmlns:a16="http://schemas.microsoft.com/office/drawing/2014/main" id="{C751E94B-65D8-4062-ABE7-74D6069CEDE7}"/>
+                    <a16:creationId xmlns:a16="http://schemas.microsoft.com/office/drawing/2014/main" id="{F81A6E6E-B7AA-4E41-B5E7-1BBA774DDA4D}"/>
                   </a:ext>
                 </a:extLst>
               </p:cNvPr>
-              <p:cNvGrpSpPr/>
+              <p:cNvSpPr txBox="1"/>
               <p:nvPr/>
-            </p:nvGrpSpPr>
-            <p:grpSpPr>
+            </p:nvSpPr>
+            <p:spPr>
               <a:xfrm>
-                <a:off x="7785436" y="6929759"/>
-                <a:ext cx="6304170" cy="2888297"/>
-                <a:chOff x="2999721" y="6003842"/>
-                <a:chExt cx="6304170" cy="2888297"/>
+                <a:off x="5061498" y="6056535"/>
+                <a:ext cx="2180615" cy="369332"/>
               </a:xfrm>
-            </p:grpSpPr>
-            <p:sp>
-              <p:nvSpPr>
-                <p:cNvPr id="119" name="Rectangle: Rounded Corners 118">
-                  <a:extLst>
-                    <a:ext uri="{FF2B5EF4-FFF2-40B4-BE49-F238E27FC236}">
-                      <a16:creationId xmlns:a16="http://schemas.microsoft.com/office/drawing/2014/main" id="{C24ADC0B-44D9-4738-8B52-E1E118D69121}"/>
-                    </a:ext>
-                  </a:extLst>
-                </p:cNvPr>
-                <p:cNvSpPr/>
-                <p:nvPr/>
-              </p:nvSpPr>
-              <p:spPr>
-                <a:xfrm>
-                  <a:off x="2999721" y="6003842"/>
-                  <a:ext cx="6304170" cy="2888297"/>
-                </a:xfrm>
-                <a:prstGeom prst="roundRect">
-                  <a:avLst/>
-                </a:prstGeom>
-                <a:noFill/>
-                <a:ln w="28575">
-                  <a:solidFill>
-                    <a:schemeClr val="tx1"/>
-                  </a:solidFill>
-                </a:ln>
-              </p:spPr>
-              <p:style>
-                <a:lnRef idx="2">
-                  <a:schemeClr val="accent1">
-                    <a:shade val="50000"/>
-                  </a:schemeClr>
-                </a:lnRef>
-                <a:fillRef idx="1">
-                  <a:schemeClr val="accent1"/>
-                </a:fillRef>
-                <a:effectRef idx="0">
-                  <a:schemeClr val="accent1"/>
-                </a:effectRef>
-                <a:fontRef idx="minor">
-                  <a:schemeClr val="lt1"/>
-                </a:fontRef>
-              </p:style>
-              <p:txBody>
-                <a:bodyPr rtlCol="0" anchor="ctr"/>
-                <a:lstStyle/>
-                <a:p>
-                  <a:pPr algn="ctr"/>
-                  <a:endParaRPr lang="en-US"/>
-                </a:p>
-              </p:txBody>
-            </p:sp>
-            <p:cxnSp>
-              <p:nvCxnSpPr>
-                <p:cNvPr id="120" name="Straight Connector 119">
-                  <a:extLst>
-                    <a:ext uri="{FF2B5EF4-FFF2-40B4-BE49-F238E27FC236}">
-                      <a16:creationId xmlns:a16="http://schemas.microsoft.com/office/drawing/2014/main" id="{2A4A01EF-ED53-414E-82D9-4A5D0C70AEE8}"/>
-                    </a:ext>
-                  </a:extLst>
-                </p:cNvPr>
-                <p:cNvCxnSpPr>
-                  <a:cxnSpLocks/>
-                </p:cNvCxnSpPr>
-                <p:nvPr/>
-              </p:nvCxnSpPr>
-              <p:spPr>
-                <a:xfrm flipV="1">
-                  <a:off x="3060681" y="6448543"/>
-                  <a:ext cx="6182250" cy="7744"/>
-                </a:xfrm>
-                <a:prstGeom prst="line">
-                  <a:avLst/>
-                </a:prstGeom>
-                <a:ln w="12700"/>
-              </p:spPr>
-              <p:style>
-                <a:lnRef idx="1">
-                  <a:schemeClr val="dk1"/>
-                </a:lnRef>
-                <a:fillRef idx="0">
-                  <a:schemeClr val="dk1"/>
-                </a:fillRef>
-                <a:effectRef idx="0">
-                  <a:schemeClr val="dk1"/>
-                </a:effectRef>
-                <a:fontRef idx="minor">
-                  <a:schemeClr val="tx1"/>
-                </a:fontRef>
-              </p:style>
-            </p:cxnSp>
-            <p:sp>
-              <p:nvSpPr>
-                <p:cNvPr id="121" name="TextBox 120">
-                  <a:extLst>
-                    <a:ext uri="{FF2B5EF4-FFF2-40B4-BE49-F238E27FC236}">
-                      <a16:creationId xmlns:a16="http://schemas.microsoft.com/office/drawing/2014/main" id="{F81A6E6E-B7AA-4E41-B5E7-1BBA774DDA4D}"/>
-                    </a:ext>
-                  </a:extLst>
-                </p:cNvPr>
-                <p:cNvSpPr txBox="1"/>
-                <p:nvPr/>
-              </p:nvSpPr>
-              <p:spPr>
-                <a:xfrm>
-                  <a:off x="5061498" y="6056535"/>
-                  <a:ext cx="2180615" cy="369332"/>
-                </a:xfrm>
-                <a:prstGeom prst="rect">
-                  <a:avLst/>
-                </a:prstGeom>
-                <a:noFill/>
-              </p:spPr>
-              <p:txBody>
-                <a:bodyPr wrap="square" rtlCol="0">
-                  <a:spAutoFit/>
-                </a:bodyPr>
-                <a:lstStyle/>
-                <a:p>
-                  <a:r>
-                    <a:rPr lang="en-US" dirty="0"/>
-                    <a:t>Gene vs. Gene Mode</a:t>
-                  </a:r>
-                </a:p>
-              </p:txBody>
-            </p:sp>
-            <p:sp>
-              <p:nvSpPr>
-                <p:cNvPr id="122" name="TextBox 121">
-                  <a:extLst>
-                    <a:ext uri="{FF2B5EF4-FFF2-40B4-BE49-F238E27FC236}">
-                      <a16:creationId xmlns:a16="http://schemas.microsoft.com/office/drawing/2014/main" id="{E8052125-96F3-4DD6-9B26-F24C17B21623}"/>
-                    </a:ext>
-                  </a:extLst>
-                </p:cNvPr>
-                <p:cNvSpPr txBox="1"/>
-                <p:nvPr/>
-              </p:nvSpPr>
-              <p:spPr>
-                <a:xfrm>
-                  <a:off x="3060681" y="6585616"/>
-                  <a:ext cx="6182250" cy="369332"/>
-                </a:xfrm>
-                <a:prstGeom prst="rect">
-                  <a:avLst/>
-                </a:prstGeom>
-                <a:noFill/>
-              </p:spPr>
-              <p:txBody>
-                <a:bodyPr wrap="square" rtlCol="0">
-                  <a:spAutoFit/>
-                </a:bodyPr>
-                <a:lstStyle/>
-                <a:p>
-                  <a:r>
-                    <a:rPr lang="en-US" dirty="0"/>
-                    <a:t>“ATM vs HMOX1”, “ATM (brain-normal vs. brain-cancer)” …</a:t>
-                  </a:r>
-                </a:p>
-              </p:txBody>
-            </p:sp>
-            <p:cxnSp>
-              <p:nvCxnSpPr>
-                <p:cNvPr id="123" name="Straight Connector 122">
-                  <a:extLst>
-                    <a:ext uri="{FF2B5EF4-FFF2-40B4-BE49-F238E27FC236}">
-                      <a16:creationId xmlns:a16="http://schemas.microsoft.com/office/drawing/2014/main" id="{BE4BC511-5D1F-4FB5-AB83-F4709C1B60CA}"/>
-                    </a:ext>
-                  </a:extLst>
-                </p:cNvPr>
-                <p:cNvCxnSpPr>
-                  <a:cxnSpLocks/>
-                </p:cNvCxnSpPr>
-                <p:nvPr/>
-              </p:nvCxnSpPr>
-              <p:spPr>
-                <a:xfrm flipV="1">
-                  <a:off x="3006697" y="7028838"/>
-                  <a:ext cx="6297194" cy="858"/>
-                </a:xfrm>
-                <a:prstGeom prst="line">
-                  <a:avLst/>
-                </a:prstGeom>
-                <a:ln w="12700"/>
-              </p:spPr>
-              <p:style>
-                <a:lnRef idx="1">
-                  <a:schemeClr val="dk1"/>
-                </a:lnRef>
-                <a:fillRef idx="0">
-                  <a:schemeClr val="dk1"/>
-                </a:fillRef>
-                <a:effectRef idx="0">
-                  <a:schemeClr val="dk1"/>
-                </a:effectRef>
-                <a:fontRef idx="minor">
-                  <a:schemeClr val="tx1"/>
-                </a:fontRef>
-              </p:style>
-            </p:cxnSp>
-          </p:grpSp>
-        </p:grpSp>
-        <p:cxnSp>
-          <p:nvCxnSpPr>
-            <p:cNvPr id="141" name="Straight Arrow Connector 140">
-              <a:extLst>
-                <a:ext uri="{FF2B5EF4-FFF2-40B4-BE49-F238E27FC236}">
-                  <a16:creationId xmlns:a16="http://schemas.microsoft.com/office/drawing/2014/main" id="{4C7FDA43-B6EB-4D4D-9921-76DC5B0C73BA}"/>
-                </a:ext>
-              </a:extLst>
-            </p:cNvPr>
-            <p:cNvCxnSpPr>
-              <a:cxnSpLocks/>
-              <a:endCxn id="28" idx="3"/>
-            </p:cNvCxnSpPr>
-            <p:nvPr/>
-          </p:nvCxnSpPr>
-          <p:spPr>
-            <a:xfrm flipH="1">
-              <a:off x="2155132" y="3808392"/>
-              <a:ext cx="1695788" cy="0"/>
-            </a:xfrm>
-            <a:prstGeom prst="straightConnector1">
-              <a:avLst/>
-            </a:prstGeom>
-            <a:ln w="28575">
-              <a:tailEnd type="triangle"/>
-            </a:ln>
-          </p:spPr>
-          <p:style>
-            <a:lnRef idx="1">
-              <a:schemeClr val="dk1"/>
-            </a:lnRef>
-            <a:fillRef idx="0">
-              <a:schemeClr val="dk1"/>
-            </a:fillRef>
-            <a:effectRef idx="0">
-              <a:schemeClr val="dk1"/>
-            </a:effectRef>
-            <a:fontRef idx="minor">
-              <a:schemeClr val="tx1"/>
-            </a:fontRef>
-          </p:style>
-        </p:cxnSp>
-        <p:cxnSp>
-          <p:nvCxnSpPr>
-            <p:cNvPr id="143" name="Straight Arrow Connector 142">
-              <a:extLst>
-                <a:ext uri="{FF2B5EF4-FFF2-40B4-BE49-F238E27FC236}">
-                  <a16:creationId xmlns:a16="http://schemas.microsoft.com/office/drawing/2014/main" id="{10E7F4BB-579A-4C04-AD87-DEF0C7B39B76}"/>
-                </a:ext>
-              </a:extLst>
-            </p:cNvPr>
-            <p:cNvCxnSpPr>
-              <a:cxnSpLocks/>
-              <a:endCxn id="32" idx="1"/>
-            </p:cNvCxnSpPr>
-            <p:nvPr/>
-          </p:nvCxnSpPr>
-          <p:spPr>
-            <a:xfrm flipV="1">
-              <a:off x="8336931" y="3803428"/>
-              <a:ext cx="1699936" cy="4964"/>
-            </a:xfrm>
-            <a:prstGeom prst="straightConnector1">
-              <a:avLst/>
-            </a:prstGeom>
-            <a:ln w="28575">
-              <a:tailEnd type="triangle"/>
-            </a:ln>
-          </p:spPr>
-          <p:style>
-            <a:lnRef idx="1">
-              <a:schemeClr val="dk1"/>
-            </a:lnRef>
-            <a:fillRef idx="0">
-              <a:schemeClr val="dk1"/>
-            </a:fillRef>
-            <a:effectRef idx="0">
-              <a:schemeClr val="dk1"/>
-            </a:effectRef>
-            <a:fontRef idx="minor">
-              <a:schemeClr val="tx1"/>
-            </a:fontRef>
-          </p:style>
-        </p:cxnSp>
-        <p:sp>
-          <p:nvSpPr>
-            <p:cNvPr id="24" name="Rectangle 23">
-              <a:extLst>
-                <a:ext uri="{FF2B5EF4-FFF2-40B4-BE49-F238E27FC236}">
-                  <a16:creationId xmlns:a16="http://schemas.microsoft.com/office/drawing/2014/main" id="{8B8A8503-C7D6-4AB8-BFA4-EC3530DE4535}"/>
-                </a:ext>
-              </a:extLst>
-            </p:cNvPr>
-            <p:cNvSpPr/>
-            <p:nvPr/>
-          </p:nvSpPr>
-          <p:spPr>
-            <a:xfrm>
-              <a:off x="3850921" y="2438838"/>
-              <a:ext cx="4484598" cy="2741154"/>
-            </a:xfrm>
-            <a:prstGeom prst="rect">
-              <a:avLst/>
-            </a:prstGeom>
-            <a:solidFill>
-              <a:srgbClr val="1C0444"/>
-            </a:solidFill>
-            <a:effectLst>
-              <a:glow rad="101600">
-                <a:schemeClr val="accent2">
-                  <a:satMod val="175000"/>
-                  <a:alpha val="40000"/>
-                </a:schemeClr>
-              </a:glow>
-            </a:effectLst>
-          </p:spPr>
-          <p:style>
-            <a:lnRef idx="2">
-              <a:schemeClr val="accent1">
-                <a:shade val="50000"/>
-              </a:schemeClr>
-            </a:lnRef>
-            <a:fillRef idx="1">
-              <a:schemeClr val="accent1"/>
-            </a:fillRef>
-            <a:effectRef idx="0">
-              <a:schemeClr val="accent1"/>
-            </a:effectRef>
-            <a:fontRef idx="minor">
-              <a:schemeClr val="lt1"/>
-            </a:fontRef>
-          </p:style>
-          <p:txBody>
-            <a:bodyPr rtlCol="0" anchor="ctr"/>
-            <a:lstStyle/>
-            <a:p>
-              <a:pPr algn="ctr"/>
-              <a:endParaRPr lang="en-US" dirty="0"/>
-            </a:p>
-          </p:txBody>
-        </p:sp>
-        <p:sp>
-          <p:nvSpPr>
-            <p:cNvPr id="25" name="TextBox 24">
-              <a:extLst>
-                <a:ext uri="{FF2B5EF4-FFF2-40B4-BE49-F238E27FC236}">
-                  <a16:creationId xmlns:a16="http://schemas.microsoft.com/office/drawing/2014/main" id="{FFAC7B7B-BBD1-454B-9E91-6B69B410BB4F}"/>
-                </a:ext>
-              </a:extLst>
-            </p:cNvPr>
-            <p:cNvSpPr txBox="1"/>
-            <p:nvPr/>
-          </p:nvSpPr>
-          <p:spPr>
-            <a:xfrm>
-              <a:off x="4056412" y="4601174"/>
-              <a:ext cx="4112389" cy="584775"/>
-            </a:xfrm>
-            <a:prstGeom prst="rect">
-              <a:avLst/>
-            </a:prstGeom>
-            <a:noFill/>
-          </p:spPr>
-          <p:txBody>
-            <a:bodyPr wrap="square" rtlCol="0">
-              <a:spAutoFit/>
-            </a:bodyPr>
-            <a:lstStyle/>
-            <a:p>
-              <a:r>
-                <a:rPr lang="en-US" sz="3200" dirty="0">
-                  <a:solidFill>
-                    <a:schemeClr val="bg1"/>
-                  </a:solidFill>
-                  <a:latin typeface="Aharoni" panose="02010803020104030203" pitchFamily="2" charset="-79"/>
-                  <a:cs typeface="Aharoni" panose="02010803020104030203" pitchFamily="2" charset="-79"/>
-                </a:rPr>
-                <a:t>correlationAnalyzeR</a:t>
-              </a:r>
-            </a:p>
-          </p:txBody>
-        </p:sp>
-        <p:pic>
-          <p:nvPicPr>
-            <p:cNvPr id="27" name="Picture 26">
-              <a:extLst>
-                <a:ext uri="{FF2B5EF4-FFF2-40B4-BE49-F238E27FC236}">
-                  <a16:creationId xmlns:a16="http://schemas.microsoft.com/office/drawing/2014/main" id="{7FD2366A-2C5E-4AF2-9ABC-9D19026E60C1}"/>
-                </a:ext>
-              </a:extLst>
-            </p:cNvPr>
-            <p:cNvPicPr>
-              <a:picLocks noChangeAspect="1"/>
-            </p:cNvPicPr>
-            <p:nvPr/>
-          </p:nvPicPr>
-          <p:blipFill>
-            <a:blip r:embed="rId3">
-              <a:extLst>
-                <a:ext uri="{28A0092B-C50C-407E-A947-70E740481C1C}">
-                  <a14:useLocalDpi xmlns:a14="http://schemas.microsoft.com/office/drawing/2010/main" val="0"/>
-                </a:ext>
-              </a:extLst>
-            </a:blip>
-            <a:stretch>
-              <a:fillRect/>
-            </a:stretch>
-          </p:blipFill>
-          <p:spPr>
-            <a:xfrm>
-              <a:off x="5051596" y="2531195"/>
-              <a:ext cx="2081382" cy="2081382"/>
-            </a:xfrm>
-            <a:prstGeom prst="rect">
-              <a:avLst/>
-            </a:prstGeom>
-          </p:spPr>
-        </p:pic>
-        <p:grpSp>
-          <p:nvGrpSpPr>
-            <p:cNvPr id="62" name="Group 61">
-              <a:extLst>
-                <a:ext uri="{FF2B5EF4-FFF2-40B4-BE49-F238E27FC236}">
-                  <a16:creationId xmlns:a16="http://schemas.microsoft.com/office/drawing/2014/main" id="{844190F7-4022-4E5B-A6FB-57F9F3ACFFE4}"/>
-                </a:ext>
-              </a:extLst>
-            </p:cNvPr>
-            <p:cNvGrpSpPr/>
-            <p:nvPr/>
-          </p:nvGrpSpPr>
-          <p:grpSpPr>
-            <a:xfrm flipH="1">
-              <a:off x="-1633110" y="5185949"/>
-              <a:ext cx="7745717" cy="4216689"/>
-              <a:chOff x="6343889" y="5601367"/>
-              <a:chExt cx="7745717" cy="4216689"/>
-            </a:xfrm>
-          </p:grpSpPr>
+              <a:prstGeom prst="rect">
+                <a:avLst/>
+              </a:prstGeom>
+              <a:noFill/>
+            </p:spPr>
+            <p:txBody>
+              <a:bodyPr wrap="square" rtlCol="0">
+                <a:spAutoFit/>
+              </a:bodyPr>
+              <a:lstStyle/>
+              <a:p>
+                <a:r>
+                  <a:rPr lang="en-US" dirty="0"/>
+                  <a:t>Gene vs. Gene Mode</a:t>
+                </a:r>
+              </a:p>
+            </p:txBody>
+          </p:sp>
+          <p:sp>
+            <p:nvSpPr>
+              <p:cNvPr id="122" name="TextBox 121">
+                <a:extLst>
+                  <a:ext uri="{FF2B5EF4-FFF2-40B4-BE49-F238E27FC236}">
+                    <a16:creationId xmlns:a16="http://schemas.microsoft.com/office/drawing/2014/main" id="{E8052125-96F3-4DD6-9B26-F24C17B21623}"/>
+                  </a:ext>
+                </a:extLst>
+              </p:cNvPr>
+              <p:cNvSpPr txBox="1"/>
+              <p:nvPr/>
+            </p:nvSpPr>
+            <p:spPr>
+              <a:xfrm>
+                <a:off x="3060681" y="6585616"/>
+                <a:ext cx="6182250" cy="369332"/>
+              </a:xfrm>
+              <a:prstGeom prst="rect">
+                <a:avLst/>
+              </a:prstGeom>
+              <a:noFill/>
+            </p:spPr>
+            <p:txBody>
+              <a:bodyPr wrap="square" rtlCol="0">
+                <a:spAutoFit/>
+              </a:bodyPr>
+              <a:lstStyle/>
+              <a:p>
+                <a:r>
+                  <a:rPr lang="en-US" dirty="0"/>
+                  <a:t>“ATM vs HMOX1”, “ATM (brain-normal vs. brain-cancer)” …</a:t>
+                </a:r>
+              </a:p>
+            </p:txBody>
+          </p:sp>
           <p:cxnSp>
             <p:nvCxnSpPr>
-              <p:cNvPr id="63" name="Straight Arrow Connector 62">
+              <p:cNvPr id="123" name="Straight Connector 122">
                 <a:extLst>
                   <a:ext uri="{FF2B5EF4-FFF2-40B4-BE49-F238E27FC236}">
-                    <a16:creationId xmlns:a16="http://schemas.microsoft.com/office/drawing/2014/main" id="{C2972362-F502-436C-A4F4-88C048307D06}"/>
+                    <a16:creationId xmlns:a16="http://schemas.microsoft.com/office/drawing/2014/main" id="{BE4BC511-5D1F-4FB5-AB83-F4709C1B60CA}"/>
                   </a:ext>
                 </a:extLst>
               </p:cNvPr>
               <p:cNvCxnSpPr>
                 <a:cxnSpLocks/>
-                <a:stCxn id="25" idx="2"/>
-                <a:endCxn id="65" idx="0"/>
               </p:cNvCxnSpPr>
               <p:nvPr/>
             </p:nvCxnSpPr>
             <p:spPr>
-              <a:xfrm>
-                <a:off x="6343889" y="5601367"/>
-                <a:ext cx="4593632" cy="1328392"/>
+              <a:xfrm flipV="1">
+                <a:off x="3006697" y="7028838"/>
+                <a:ext cx="6297194" cy="858"/>
               </a:xfrm>
-              <a:prstGeom prst="straightConnector1">
+              <a:prstGeom prst="line">
                 <a:avLst/>
               </a:prstGeom>
-              <a:ln w="28575">
-                <a:tailEnd type="triangle"/>
-              </a:ln>
+              <a:ln w="12700"/>
             </p:spPr>
             <p:style>
               <a:lnRef idx="1">
@@ -4820,545 +4907,437 @@
               </a:fontRef>
             </p:style>
           </p:cxnSp>
-          <p:grpSp>
-            <p:nvGrpSpPr>
-              <p:cNvPr id="64" name="Group 63">
-                <a:extLst>
-                  <a:ext uri="{FF2B5EF4-FFF2-40B4-BE49-F238E27FC236}">
-                    <a16:creationId xmlns:a16="http://schemas.microsoft.com/office/drawing/2014/main" id="{2557AA46-FFDB-4FCB-B22A-D5CC019E8BB6}"/>
-                  </a:ext>
-                </a:extLst>
-              </p:cNvPr>
-              <p:cNvGrpSpPr/>
-              <p:nvPr/>
-            </p:nvGrpSpPr>
-            <p:grpSpPr>
-              <a:xfrm>
-                <a:off x="7785436" y="6929759"/>
-                <a:ext cx="6304170" cy="2888297"/>
-                <a:chOff x="2999721" y="6003842"/>
-                <a:chExt cx="6304170" cy="2888297"/>
-              </a:xfrm>
-            </p:grpSpPr>
-            <p:sp>
-              <p:nvSpPr>
-                <p:cNvPr id="65" name="Rectangle: Rounded Corners 64">
-                  <a:extLst>
-                    <a:ext uri="{FF2B5EF4-FFF2-40B4-BE49-F238E27FC236}">
-                      <a16:creationId xmlns:a16="http://schemas.microsoft.com/office/drawing/2014/main" id="{6F8D46A7-490D-4FB1-8820-CA69A29D332E}"/>
-                    </a:ext>
-                  </a:extLst>
-                </p:cNvPr>
-                <p:cNvSpPr/>
-                <p:nvPr/>
-              </p:nvSpPr>
-              <p:spPr>
-                <a:xfrm>
-                  <a:off x="2999721" y="6003842"/>
-                  <a:ext cx="6304170" cy="2888297"/>
-                </a:xfrm>
-                <a:prstGeom prst="roundRect">
-                  <a:avLst/>
-                </a:prstGeom>
-                <a:noFill/>
-                <a:ln w="28575">
-                  <a:solidFill>
-                    <a:schemeClr val="tx1"/>
-                  </a:solidFill>
-                </a:ln>
-              </p:spPr>
-              <p:style>
-                <a:lnRef idx="2">
-                  <a:schemeClr val="accent1">
-                    <a:shade val="50000"/>
-                  </a:schemeClr>
-                </a:lnRef>
-                <a:fillRef idx="1">
-                  <a:schemeClr val="accent1"/>
-                </a:fillRef>
-                <a:effectRef idx="0">
-                  <a:schemeClr val="accent1"/>
-                </a:effectRef>
-                <a:fontRef idx="minor">
-                  <a:schemeClr val="lt1"/>
-                </a:fontRef>
-              </p:style>
-              <p:txBody>
-                <a:bodyPr rtlCol="0" anchor="ctr"/>
-                <a:lstStyle/>
-                <a:p>
-                  <a:pPr algn="ctr"/>
-                  <a:endParaRPr lang="en-US"/>
-                </a:p>
-              </p:txBody>
-            </p:sp>
-            <p:cxnSp>
-              <p:nvCxnSpPr>
-                <p:cNvPr id="66" name="Straight Connector 65">
-                  <a:extLst>
-                    <a:ext uri="{FF2B5EF4-FFF2-40B4-BE49-F238E27FC236}">
-                      <a16:creationId xmlns:a16="http://schemas.microsoft.com/office/drawing/2014/main" id="{661D465D-701A-49EB-B4DB-3DF337DD8953}"/>
-                    </a:ext>
-                  </a:extLst>
-                </p:cNvPr>
-                <p:cNvCxnSpPr>
-                  <a:cxnSpLocks/>
-                </p:cNvCxnSpPr>
-                <p:nvPr/>
-              </p:nvCxnSpPr>
-              <p:spPr>
-                <a:xfrm flipV="1">
-                  <a:off x="3060681" y="6448543"/>
-                  <a:ext cx="6182250" cy="7744"/>
-                </a:xfrm>
-                <a:prstGeom prst="line">
-                  <a:avLst/>
-                </a:prstGeom>
-                <a:ln w="12700"/>
-              </p:spPr>
-              <p:style>
-                <a:lnRef idx="1">
-                  <a:schemeClr val="dk1"/>
-                </a:lnRef>
-                <a:fillRef idx="0">
-                  <a:schemeClr val="dk1"/>
-                </a:fillRef>
-                <a:effectRef idx="0">
-                  <a:schemeClr val="dk1"/>
-                </a:effectRef>
-                <a:fontRef idx="minor">
-                  <a:schemeClr val="tx1"/>
-                </a:fontRef>
-              </p:style>
-            </p:cxnSp>
-            <p:sp>
-              <p:nvSpPr>
-                <p:cNvPr id="67" name="TextBox 66">
-                  <a:extLst>
-                    <a:ext uri="{FF2B5EF4-FFF2-40B4-BE49-F238E27FC236}">
-                      <a16:creationId xmlns:a16="http://schemas.microsoft.com/office/drawing/2014/main" id="{B29BEB78-0048-4136-B0F4-98F10F4167E3}"/>
-                    </a:ext>
-                  </a:extLst>
-                </p:cNvPr>
-                <p:cNvSpPr txBox="1"/>
-                <p:nvPr/>
-              </p:nvSpPr>
-              <p:spPr>
-                <a:xfrm>
-                  <a:off x="5329616" y="6045233"/>
-                  <a:ext cx="1651357" cy="369332"/>
-                </a:xfrm>
-                <a:prstGeom prst="rect">
-                  <a:avLst/>
-                </a:prstGeom>
-                <a:noFill/>
-              </p:spPr>
-              <p:txBody>
-                <a:bodyPr wrap="square" rtlCol="0">
-                  <a:spAutoFit/>
-                </a:bodyPr>
-                <a:lstStyle/>
-                <a:p>
-                  <a:r>
-                    <a:rPr lang="en-US" dirty="0"/>
-                    <a:t>Topology Mode</a:t>
-                  </a:r>
-                </a:p>
-              </p:txBody>
-            </p:sp>
-            <p:sp>
-              <p:nvSpPr>
-                <p:cNvPr id="69" name="TextBox 68">
-                  <a:extLst>
-                    <a:ext uri="{FF2B5EF4-FFF2-40B4-BE49-F238E27FC236}">
-                      <a16:creationId xmlns:a16="http://schemas.microsoft.com/office/drawing/2014/main" id="{1744F5A3-9D5A-4E54-A7B6-E135D4077376}"/>
-                    </a:ext>
-                  </a:extLst>
-                </p:cNvPr>
-                <p:cNvSpPr txBox="1"/>
-                <p:nvPr/>
-              </p:nvSpPr>
-              <p:spPr>
-                <a:xfrm>
-                  <a:off x="3060681" y="6585616"/>
-                  <a:ext cx="6182250" cy="369332"/>
-                </a:xfrm>
-                <a:prstGeom prst="rect">
-                  <a:avLst/>
-                </a:prstGeom>
-                <a:noFill/>
-              </p:spPr>
-              <p:txBody>
-                <a:bodyPr wrap="square" rtlCol="0">
-                  <a:spAutoFit/>
-                </a:bodyPr>
-                <a:lstStyle/>
-                <a:p>
-                  <a:r>
-                    <a:rPr lang="en-US" dirty="0"/>
-                    <a:t>“ATM, BRCA1, EZH2 …” or “BIOCARTA_PROTEASOME_PATHWAY” </a:t>
-                  </a:r>
-                </a:p>
-              </p:txBody>
-            </p:sp>
-            <p:cxnSp>
-              <p:nvCxnSpPr>
-                <p:cNvPr id="71" name="Straight Connector 70">
-                  <a:extLst>
-                    <a:ext uri="{FF2B5EF4-FFF2-40B4-BE49-F238E27FC236}">
-                      <a16:creationId xmlns:a16="http://schemas.microsoft.com/office/drawing/2014/main" id="{328F3765-7C2C-41F0-BBD8-A03BC11944DB}"/>
-                    </a:ext>
-                  </a:extLst>
-                </p:cNvPr>
-                <p:cNvCxnSpPr>
-                  <a:cxnSpLocks/>
-                </p:cNvCxnSpPr>
-                <p:nvPr/>
-              </p:nvCxnSpPr>
-              <p:spPr>
-                <a:xfrm flipV="1">
-                  <a:off x="3006697" y="7028838"/>
-                  <a:ext cx="6297194" cy="858"/>
-                </a:xfrm>
-                <a:prstGeom prst="line">
-                  <a:avLst/>
-                </a:prstGeom>
-                <a:ln w="12700"/>
-              </p:spPr>
-              <p:style>
-                <a:lnRef idx="1">
-                  <a:schemeClr val="dk1"/>
-                </a:lnRef>
-                <a:fillRef idx="0">
-                  <a:schemeClr val="dk1"/>
-                </a:fillRef>
-                <a:effectRef idx="0">
-                  <a:schemeClr val="dk1"/>
-                </a:effectRef>
-                <a:fontRef idx="minor">
-                  <a:schemeClr val="tx1"/>
-                </a:fontRef>
-              </p:style>
-            </p:cxnSp>
-            <p:pic>
-              <p:nvPicPr>
-                <p:cNvPr id="73" name="Picture 72" descr="A picture containing sky&#10;&#10;Description automatically generated">
-                  <a:extLst>
-                    <a:ext uri="{FF2B5EF4-FFF2-40B4-BE49-F238E27FC236}">
-                      <a16:creationId xmlns:a16="http://schemas.microsoft.com/office/drawing/2014/main" id="{F569C89F-BECA-453D-9E6B-63FEBC85E444}"/>
-                    </a:ext>
-                  </a:extLst>
-                </p:cNvPr>
-                <p:cNvPicPr>
-                  <a:picLocks noChangeAspect="1"/>
-                </p:cNvPicPr>
-                <p:nvPr/>
-              </p:nvPicPr>
-              <p:blipFill rotWithShape="1">
-                <a:blip r:embed="rId4">
-                  <a:extLst>
-                    <a:ext uri="{28A0092B-C50C-407E-A947-70E740481C1C}">
-                      <a14:useLocalDpi xmlns:a14="http://schemas.microsoft.com/office/drawing/2010/main" val="0"/>
-                    </a:ext>
-                  </a:extLst>
-                </a:blip>
-                <a:srcRect t="7780" r="10961"/>
-                <a:stretch/>
-              </p:blipFill>
-              <p:spPr>
-                <a:xfrm>
-                  <a:off x="3147878" y="7215088"/>
-                  <a:ext cx="1631824" cy="1309551"/>
-                </a:xfrm>
-                <a:prstGeom prst="rect">
-                  <a:avLst/>
-                </a:prstGeom>
-              </p:spPr>
-            </p:pic>
-            <p:pic>
-              <p:nvPicPr>
-                <p:cNvPr id="74" name="Picture 73">
-                  <a:extLst>
-                    <a:ext uri="{FF2B5EF4-FFF2-40B4-BE49-F238E27FC236}">
-                      <a16:creationId xmlns:a16="http://schemas.microsoft.com/office/drawing/2014/main" id="{4D6CA198-D834-4CA0-947B-D07DEB980DD3}"/>
-                    </a:ext>
-                  </a:extLst>
-                </p:cNvPr>
-                <p:cNvPicPr>
-                  <a:picLocks noChangeAspect="1"/>
-                </p:cNvPicPr>
-                <p:nvPr/>
-              </p:nvPicPr>
-              <p:blipFill rotWithShape="1">
-                <a:blip r:embed="rId5">
-                  <a:extLst>
-                    <a:ext uri="{28A0092B-C50C-407E-A947-70E740481C1C}">
-                      <a14:useLocalDpi xmlns:a14="http://schemas.microsoft.com/office/drawing/2010/main" val="0"/>
-                    </a:ext>
-                  </a:extLst>
-                </a:blip>
-                <a:srcRect l="29040" r="9806"/>
-                <a:stretch/>
-              </p:blipFill>
-              <p:spPr>
-                <a:xfrm>
-                  <a:off x="5198645" y="7212514"/>
-                  <a:ext cx="1937849" cy="1306977"/>
-                </a:xfrm>
-                <a:prstGeom prst="rect">
-                  <a:avLst/>
-                </a:prstGeom>
-              </p:spPr>
-            </p:pic>
-            <p:pic>
-              <p:nvPicPr>
-                <p:cNvPr id="75" name="Picture 74" descr="A screenshot of a cell phone&#10;&#10;Description automatically generated">
-                  <a:extLst>
-                    <a:ext uri="{FF2B5EF4-FFF2-40B4-BE49-F238E27FC236}">
-                      <a16:creationId xmlns:a16="http://schemas.microsoft.com/office/drawing/2014/main" id="{BABF96CD-6170-404A-864B-0D653633D8CB}"/>
-                    </a:ext>
-                  </a:extLst>
-                </p:cNvPr>
-                <p:cNvPicPr>
-                  <a:picLocks noChangeAspect="1"/>
-                </p:cNvPicPr>
-                <p:nvPr/>
-              </p:nvPicPr>
-              <p:blipFill rotWithShape="1">
-                <a:blip r:embed="rId6">
-                  <a:extLst>
-                    <a:ext uri="{28A0092B-C50C-407E-A947-70E740481C1C}">
-                      <a14:useLocalDpi xmlns:a14="http://schemas.microsoft.com/office/drawing/2010/main" val="0"/>
-                    </a:ext>
-                  </a:extLst>
-                </a:blip>
-                <a:srcRect l="19237" t="4418" r="8189"/>
-                <a:stretch/>
-              </p:blipFill>
-              <p:spPr>
-                <a:xfrm>
-                  <a:off x="7516487" y="7215088"/>
-                  <a:ext cx="1654612" cy="1304403"/>
-                </a:xfrm>
-                <a:prstGeom prst="rect">
-                  <a:avLst/>
-                </a:prstGeom>
-              </p:spPr>
-            </p:pic>
-          </p:grpSp>
         </p:grpSp>
-        <p:pic>
-          <p:nvPicPr>
-            <p:cNvPr id="1026" name="Picture 2">
-              <a:extLst>
-                <a:ext uri="{FF2B5EF4-FFF2-40B4-BE49-F238E27FC236}">
-                  <a16:creationId xmlns:a16="http://schemas.microsoft.com/office/drawing/2014/main" id="{32829B9A-DB77-427A-B4E4-7A15532A3BE8}"/>
-                </a:ext>
-              </a:extLst>
-            </p:cNvPr>
-            <p:cNvPicPr>
-              <a:picLocks noChangeAspect="1" noChangeArrowheads="1"/>
-            </p:cNvPicPr>
-            <p:nvPr/>
-          </p:nvPicPr>
-          <p:blipFill rotWithShape="1">
-            <a:blip r:embed="rId7">
-              <a:extLst>
-                <a:ext uri="{28A0092B-C50C-407E-A947-70E740481C1C}">
-                  <a14:useLocalDpi xmlns:a14="http://schemas.microsoft.com/office/drawing/2010/main" val="0"/>
-                </a:ext>
-              </a:extLst>
-            </a:blip>
-            <a:srcRect t="6899"/>
-            <a:stretch/>
-          </p:blipFill>
-          <p:spPr bwMode="auto">
-            <a:xfrm>
-              <a:off x="8063077" y="7723053"/>
-              <a:ext cx="2156348" cy="1386927"/>
-            </a:xfrm>
-            <a:prstGeom prst="rect">
-              <a:avLst/>
-            </a:prstGeom>
-            <a:noFill/>
-            <a:extLst>
-              <a:ext uri="{909E8E84-426E-40DD-AFC4-6F175D3DCCD1}">
-                <a14:hiddenFill xmlns:a14="http://schemas.microsoft.com/office/drawing/2010/main">
-                  <a:solidFill>
-                    <a:srgbClr val="FFFFFF"/>
-                  </a:solidFill>
-                </a14:hiddenFill>
-              </a:ext>
-            </a:extLst>
-          </p:spPr>
-        </p:pic>
-        <p:pic>
-          <p:nvPicPr>
-            <p:cNvPr id="1030" name="Picture 6">
-              <a:extLst>
-                <a:ext uri="{FF2B5EF4-FFF2-40B4-BE49-F238E27FC236}">
-                  <a16:creationId xmlns:a16="http://schemas.microsoft.com/office/drawing/2014/main" id="{BD5F854F-7E36-4E7F-A148-568082D41154}"/>
-                </a:ext>
-              </a:extLst>
-            </p:cNvPr>
-            <p:cNvPicPr>
-              <a:picLocks noChangeAspect="1" noChangeArrowheads="1"/>
-            </p:cNvPicPr>
-            <p:nvPr/>
-          </p:nvPicPr>
-          <p:blipFill>
-            <a:blip r:embed="rId8">
-              <a:extLst>
-                <a:ext uri="{28A0092B-C50C-407E-A947-70E740481C1C}">
-                  <a14:useLocalDpi xmlns:a14="http://schemas.microsoft.com/office/drawing/2010/main" val="0"/>
-                </a:ext>
-              </a:extLst>
-            </a:blip>
-            <a:srcRect/>
-            <a:stretch>
-              <a:fillRect/>
-            </a:stretch>
-          </p:blipFill>
-          <p:spPr bwMode="auto">
-            <a:xfrm>
-              <a:off x="10739156" y="7723053"/>
-              <a:ext cx="2705343" cy="1383807"/>
-            </a:xfrm>
-            <a:prstGeom prst="rect">
-              <a:avLst/>
-            </a:prstGeom>
-            <a:noFill/>
-            <a:extLst>
-              <a:ext uri="{909E8E84-426E-40DD-AFC4-6F175D3DCCD1}">
-                <a14:hiddenFill xmlns:a14="http://schemas.microsoft.com/office/drawing/2010/main">
-                  <a:solidFill>
-                    <a:srgbClr val="FFFFFF"/>
-                  </a:solidFill>
-                </a14:hiddenFill>
-              </a:ext>
-            </a:extLst>
-          </p:spPr>
-        </p:pic>
-        <p:pic>
-          <p:nvPicPr>
-            <p:cNvPr id="14" name="Picture 13" descr="A picture containing bird&#10;&#10;Description automatically generated">
-              <a:extLst>
-                <a:ext uri="{FF2B5EF4-FFF2-40B4-BE49-F238E27FC236}">
-                  <a16:creationId xmlns:a16="http://schemas.microsoft.com/office/drawing/2014/main" id="{BA96E789-F0D3-445C-ADFE-ACCD237D25DE}"/>
-                </a:ext>
-              </a:extLst>
-            </p:cNvPr>
-            <p:cNvPicPr>
-              <a:picLocks noChangeAspect="1"/>
-            </p:cNvPicPr>
-            <p:nvPr/>
-          </p:nvPicPr>
-          <p:blipFill>
-            <a:blip r:embed="rId9">
-              <a:extLst>
-                <a:ext uri="{28A0092B-C50C-407E-A947-70E740481C1C}">
-                  <a14:useLocalDpi xmlns:a14="http://schemas.microsoft.com/office/drawing/2010/main" val="0"/>
-                </a:ext>
-              </a:extLst>
-            </a:blip>
-            <a:stretch>
-              <a:fillRect/>
-            </a:stretch>
-          </p:blipFill>
-          <p:spPr>
-            <a:xfrm>
-              <a:off x="10508439" y="4258138"/>
-              <a:ext cx="2345756" cy="1407454"/>
-            </a:xfrm>
-            <a:prstGeom prst="rect">
-              <a:avLst/>
-            </a:prstGeom>
-          </p:spPr>
-        </p:pic>
-        <p:pic>
-          <p:nvPicPr>
-            <p:cNvPr id="17" name="Picture 16" descr="A screenshot of a cell phone&#10;&#10;Description automatically generated">
-              <a:extLst>
-                <a:ext uri="{FF2B5EF4-FFF2-40B4-BE49-F238E27FC236}">
-                  <a16:creationId xmlns:a16="http://schemas.microsoft.com/office/drawing/2014/main" id="{E88FB32E-6E41-4CD6-A384-BF8BA385333A}"/>
-                </a:ext>
-              </a:extLst>
-            </p:cNvPr>
-            <p:cNvPicPr>
-              <a:picLocks noChangeAspect="1"/>
-            </p:cNvPicPr>
-            <p:nvPr/>
-          </p:nvPicPr>
-          <p:blipFill>
-            <a:blip r:embed="rId10">
-              <a:extLst>
-                <a:ext uri="{28A0092B-C50C-407E-A947-70E740481C1C}">
-                  <a14:useLocalDpi xmlns:a14="http://schemas.microsoft.com/office/drawing/2010/main" val="0"/>
-                </a:ext>
-              </a:extLst>
-            </a:blip>
-            <a:stretch>
-              <a:fillRect/>
-            </a:stretch>
-          </p:blipFill>
-          <p:spPr>
-            <a:xfrm>
-              <a:off x="10607310" y="2785932"/>
-              <a:ext cx="2246885" cy="1348131"/>
-            </a:xfrm>
-            <a:prstGeom prst="rect">
-              <a:avLst/>
-            </a:prstGeom>
-          </p:spPr>
-        </p:pic>
-        <p:pic>
-          <p:nvPicPr>
-            <p:cNvPr id="1032" name="Picture 8">
-              <a:extLst>
-                <a:ext uri="{FF2B5EF4-FFF2-40B4-BE49-F238E27FC236}">
-                  <a16:creationId xmlns:a16="http://schemas.microsoft.com/office/drawing/2014/main" id="{547314C0-8A07-48D5-9BCF-93ACEF4ED0C2}"/>
-                </a:ext>
-              </a:extLst>
-            </p:cNvPr>
-            <p:cNvPicPr>
-              <a:picLocks noChangeAspect="1" noChangeArrowheads="1"/>
-            </p:cNvPicPr>
-            <p:nvPr/>
-          </p:nvPicPr>
-          <p:blipFill>
-            <a:blip r:embed="rId11">
-              <a:extLst>
-                <a:ext uri="{28A0092B-C50C-407E-A947-70E740481C1C}">
-                  <a14:useLocalDpi xmlns:a14="http://schemas.microsoft.com/office/drawing/2010/main" val="0"/>
-                </a:ext>
-              </a:extLst>
-            </a:blip>
-            <a:srcRect/>
-            <a:stretch>
-              <a:fillRect/>
-            </a:stretch>
-          </p:blipFill>
-          <p:spPr bwMode="auto">
-            <a:xfrm>
-              <a:off x="-662042" y="4179783"/>
-              <a:ext cx="2286612" cy="1411489"/>
-            </a:xfrm>
-            <a:prstGeom prst="rect">
-              <a:avLst/>
-            </a:prstGeom>
-            <a:noFill/>
-            <a:extLst>
-              <a:ext uri="{909E8E84-426E-40DD-AFC4-6F175D3DCCD1}">
-                <a14:hiddenFill xmlns:a14="http://schemas.microsoft.com/office/drawing/2010/main">
-                  <a:solidFill>
-                    <a:srgbClr val="FFFFFF"/>
-                  </a:solidFill>
-                </a14:hiddenFill>
-              </a:ext>
-            </a:extLst>
-          </p:spPr>
-        </p:pic>
       </p:grpSp>
+      <p:cxnSp>
+        <p:nvCxnSpPr>
+          <p:cNvPr id="141" name="Straight Arrow Connector 140">
+            <a:extLst>
+              <a:ext uri="{FF2B5EF4-FFF2-40B4-BE49-F238E27FC236}">
+                <a16:creationId xmlns:a16="http://schemas.microsoft.com/office/drawing/2014/main" id="{4C7FDA43-B6EB-4D4D-9921-76DC5B0C73BA}"/>
+              </a:ext>
+            </a:extLst>
+          </p:cNvPr>
+          <p:cNvCxnSpPr>
+            <a:cxnSpLocks/>
+            <a:endCxn id="28" idx="3"/>
+          </p:cNvCxnSpPr>
+          <p:nvPr/>
+        </p:nvCxnSpPr>
+        <p:spPr>
+          <a:xfrm flipH="1">
+            <a:off x="2155132" y="3808392"/>
+            <a:ext cx="1695788" cy="0"/>
+          </a:xfrm>
+          <a:prstGeom prst="straightConnector1">
+            <a:avLst/>
+          </a:prstGeom>
+          <a:ln w="28575">
+            <a:tailEnd type="triangle"/>
+          </a:ln>
+        </p:spPr>
+        <p:style>
+          <a:lnRef idx="1">
+            <a:schemeClr val="dk1"/>
+          </a:lnRef>
+          <a:fillRef idx="0">
+            <a:schemeClr val="dk1"/>
+          </a:fillRef>
+          <a:effectRef idx="0">
+            <a:schemeClr val="dk1"/>
+          </a:effectRef>
+          <a:fontRef idx="minor">
+            <a:schemeClr val="tx1"/>
+          </a:fontRef>
+        </p:style>
+      </p:cxnSp>
+      <p:cxnSp>
+        <p:nvCxnSpPr>
+          <p:cNvPr id="143" name="Straight Arrow Connector 142">
+            <a:extLst>
+              <a:ext uri="{FF2B5EF4-FFF2-40B4-BE49-F238E27FC236}">
+                <a16:creationId xmlns:a16="http://schemas.microsoft.com/office/drawing/2014/main" id="{10E7F4BB-579A-4C04-AD87-DEF0C7B39B76}"/>
+              </a:ext>
+            </a:extLst>
+          </p:cNvPr>
+          <p:cNvCxnSpPr>
+            <a:cxnSpLocks/>
+            <a:endCxn id="32" idx="1"/>
+          </p:cNvCxnSpPr>
+          <p:nvPr/>
+        </p:nvCxnSpPr>
+        <p:spPr>
+          <a:xfrm flipV="1">
+            <a:off x="8336931" y="3803428"/>
+            <a:ext cx="1699936" cy="4964"/>
+          </a:xfrm>
+          <a:prstGeom prst="straightConnector1">
+            <a:avLst/>
+          </a:prstGeom>
+          <a:ln w="28575">
+            <a:tailEnd type="triangle"/>
+          </a:ln>
+        </p:spPr>
+        <p:style>
+          <a:lnRef idx="1">
+            <a:schemeClr val="dk1"/>
+          </a:lnRef>
+          <a:fillRef idx="0">
+            <a:schemeClr val="dk1"/>
+          </a:fillRef>
+          <a:effectRef idx="0">
+            <a:schemeClr val="dk1"/>
+          </a:effectRef>
+          <a:fontRef idx="minor">
+            <a:schemeClr val="tx1"/>
+          </a:fontRef>
+        </p:style>
+      </p:cxnSp>
+      <p:sp>
+        <p:nvSpPr>
+          <p:cNvPr id="24" name="Rectangle 23">
+            <a:extLst>
+              <a:ext uri="{FF2B5EF4-FFF2-40B4-BE49-F238E27FC236}">
+                <a16:creationId xmlns:a16="http://schemas.microsoft.com/office/drawing/2014/main" id="{8B8A8503-C7D6-4AB8-BFA4-EC3530DE4535}"/>
+              </a:ext>
+            </a:extLst>
+          </p:cNvPr>
+          <p:cNvSpPr/>
+          <p:nvPr/>
+        </p:nvSpPr>
+        <p:spPr>
+          <a:xfrm>
+            <a:off x="3850921" y="2438838"/>
+            <a:ext cx="4484598" cy="2741154"/>
+          </a:xfrm>
+          <a:prstGeom prst="rect">
+            <a:avLst/>
+          </a:prstGeom>
+          <a:solidFill>
+            <a:srgbClr val="1C0444"/>
+          </a:solidFill>
+          <a:effectLst>
+            <a:glow rad="101600">
+              <a:schemeClr val="accent2">
+                <a:satMod val="175000"/>
+                <a:alpha val="40000"/>
+              </a:schemeClr>
+            </a:glow>
+          </a:effectLst>
+        </p:spPr>
+        <p:style>
+          <a:lnRef idx="2">
+            <a:schemeClr val="accent1">
+              <a:shade val="50000"/>
+            </a:schemeClr>
+          </a:lnRef>
+          <a:fillRef idx="1">
+            <a:schemeClr val="accent1"/>
+          </a:fillRef>
+          <a:effectRef idx="0">
+            <a:schemeClr val="accent1"/>
+          </a:effectRef>
+          <a:fontRef idx="minor">
+            <a:schemeClr val="lt1"/>
+          </a:fontRef>
+        </p:style>
+        <p:txBody>
+          <a:bodyPr rtlCol="0" anchor="ctr"/>
+          <a:lstStyle/>
+          <a:p>
+            <a:pPr algn="ctr"/>
+            <a:endParaRPr lang="en-US" dirty="0"/>
+          </a:p>
+        </p:txBody>
+      </p:sp>
+      <p:sp>
+        <p:nvSpPr>
+          <p:cNvPr id="25" name="TextBox 24">
+            <a:extLst>
+              <a:ext uri="{FF2B5EF4-FFF2-40B4-BE49-F238E27FC236}">
+                <a16:creationId xmlns:a16="http://schemas.microsoft.com/office/drawing/2014/main" id="{FFAC7B7B-BBD1-454B-9E91-6B69B410BB4F}"/>
+              </a:ext>
+            </a:extLst>
+          </p:cNvPr>
+          <p:cNvSpPr txBox="1"/>
+          <p:nvPr/>
+        </p:nvSpPr>
+        <p:spPr>
+          <a:xfrm>
+            <a:off x="4056412" y="4601174"/>
+            <a:ext cx="4112389" cy="584775"/>
+          </a:xfrm>
+          <a:prstGeom prst="rect">
+            <a:avLst/>
+          </a:prstGeom>
+          <a:noFill/>
+        </p:spPr>
+        <p:txBody>
+          <a:bodyPr wrap="square" rtlCol="0">
+            <a:spAutoFit/>
+          </a:bodyPr>
+          <a:lstStyle/>
+          <a:p>
+            <a:r>
+              <a:rPr lang="en-US" sz="3200" dirty="0">
+                <a:solidFill>
+                  <a:schemeClr val="bg1"/>
+                </a:solidFill>
+                <a:latin typeface="Aharoni" panose="02010803020104030203" pitchFamily="2" charset="-79"/>
+                <a:cs typeface="Aharoni" panose="02010803020104030203" pitchFamily="2" charset="-79"/>
+              </a:rPr>
+              <a:t>correlationAnalyzeR</a:t>
+            </a:r>
+          </a:p>
+        </p:txBody>
+      </p:sp>
+      <p:pic>
+        <p:nvPicPr>
+          <p:cNvPr id="27" name="Picture 26">
+            <a:extLst>
+              <a:ext uri="{FF2B5EF4-FFF2-40B4-BE49-F238E27FC236}">
+                <a16:creationId xmlns:a16="http://schemas.microsoft.com/office/drawing/2014/main" id="{7FD2366A-2C5E-4AF2-9ABC-9D19026E60C1}"/>
+              </a:ext>
+            </a:extLst>
+          </p:cNvPr>
+          <p:cNvPicPr>
+            <a:picLocks noChangeAspect="1"/>
+          </p:cNvPicPr>
+          <p:nvPr/>
+        </p:nvPicPr>
+        <p:blipFill>
+          <a:blip r:embed="rId6">
+            <a:extLst>
+              <a:ext uri="{28A0092B-C50C-407E-A947-70E740481C1C}">
+                <a14:useLocalDpi xmlns:a14="http://schemas.microsoft.com/office/drawing/2010/main" val="0"/>
+              </a:ext>
+            </a:extLst>
+          </a:blip>
+          <a:stretch>
+            <a:fillRect/>
+          </a:stretch>
+        </p:blipFill>
+        <p:spPr>
+          <a:xfrm>
+            <a:off x="5051596" y="2531195"/>
+            <a:ext cx="2081382" cy="2081382"/>
+          </a:xfrm>
+          <a:prstGeom prst="rect">
+            <a:avLst/>
+          </a:prstGeom>
+        </p:spPr>
+      </p:pic>
+      <p:pic>
+        <p:nvPicPr>
+          <p:cNvPr id="1026" name="Picture 2">
+            <a:extLst>
+              <a:ext uri="{FF2B5EF4-FFF2-40B4-BE49-F238E27FC236}">
+                <a16:creationId xmlns:a16="http://schemas.microsoft.com/office/drawing/2014/main" id="{32829B9A-DB77-427A-B4E4-7A15532A3BE8}"/>
+              </a:ext>
+            </a:extLst>
+          </p:cNvPr>
+          <p:cNvPicPr>
+            <a:picLocks noChangeAspect="1" noChangeArrowheads="1"/>
+          </p:cNvPicPr>
+          <p:nvPr/>
+        </p:nvPicPr>
+        <p:blipFill rotWithShape="1">
+          <a:blip r:embed="rId7">
+            <a:extLst>
+              <a:ext uri="{28A0092B-C50C-407E-A947-70E740481C1C}">
+                <a14:useLocalDpi xmlns:a14="http://schemas.microsoft.com/office/drawing/2010/main" val="0"/>
+              </a:ext>
+            </a:extLst>
+          </a:blip>
+          <a:srcRect t="6899"/>
+          <a:stretch/>
+        </p:blipFill>
+        <p:spPr bwMode="auto">
+          <a:xfrm>
+            <a:off x="8063077" y="7723053"/>
+            <a:ext cx="2156348" cy="1386927"/>
+          </a:xfrm>
+          <a:prstGeom prst="rect">
+            <a:avLst/>
+          </a:prstGeom>
+          <a:noFill/>
+          <a:extLst>
+            <a:ext uri="{909E8E84-426E-40DD-AFC4-6F175D3DCCD1}">
+              <a14:hiddenFill xmlns:a14="http://schemas.microsoft.com/office/drawing/2010/main">
+                <a:solidFill>
+                  <a:srgbClr val="FFFFFF"/>
+                </a:solidFill>
+              </a14:hiddenFill>
+            </a:ext>
+          </a:extLst>
+        </p:spPr>
+      </p:pic>
+      <p:pic>
+        <p:nvPicPr>
+          <p:cNvPr id="1030" name="Picture 6">
+            <a:extLst>
+              <a:ext uri="{FF2B5EF4-FFF2-40B4-BE49-F238E27FC236}">
+                <a16:creationId xmlns:a16="http://schemas.microsoft.com/office/drawing/2014/main" id="{BD5F854F-7E36-4E7F-A148-568082D41154}"/>
+              </a:ext>
+            </a:extLst>
+          </p:cNvPr>
+          <p:cNvPicPr>
+            <a:picLocks noChangeAspect="1" noChangeArrowheads="1"/>
+          </p:cNvPicPr>
+          <p:nvPr/>
+        </p:nvPicPr>
+        <p:blipFill>
+          <a:blip r:embed="rId8">
+            <a:extLst>
+              <a:ext uri="{28A0092B-C50C-407E-A947-70E740481C1C}">
+                <a14:useLocalDpi xmlns:a14="http://schemas.microsoft.com/office/drawing/2010/main" val="0"/>
+              </a:ext>
+            </a:extLst>
+          </a:blip>
+          <a:srcRect/>
+          <a:stretch>
+            <a:fillRect/>
+          </a:stretch>
+        </p:blipFill>
+        <p:spPr bwMode="auto">
+          <a:xfrm>
+            <a:off x="10739156" y="7723053"/>
+            <a:ext cx="2705343" cy="1383807"/>
+          </a:xfrm>
+          <a:prstGeom prst="rect">
+            <a:avLst/>
+          </a:prstGeom>
+          <a:noFill/>
+          <a:extLst>
+            <a:ext uri="{909E8E84-426E-40DD-AFC4-6F175D3DCCD1}">
+              <a14:hiddenFill xmlns:a14="http://schemas.microsoft.com/office/drawing/2010/main">
+                <a:solidFill>
+                  <a:srgbClr val="FFFFFF"/>
+                </a:solidFill>
+              </a14:hiddenFill>
+            </a:ext>
+          </a:extLst>
+        </p:spPr>
+      </p:pic>
+      <p:pic>
+        <p:nvPicPr>
+          <p:cNvPr id="14" name="Picture 13" descr="A picture containing bird&#10;&#10;Description automatically generated">
+            <a:extLst>
+              <a:ext uri="{FF2B5EF4-FFF2-40B4-BE49-F238E27FC236}">
+                <a16:creationId xmlns:a16="http://schemas.microsoft.com/office/drawing/2014/main" id="{BA96E789-F0D3-445C-ADFE-ACCD237D25DE}"/>
+              </a:ext>
+            </a:extLst>
+          </p:cNvPr>
+          <p:cNvPicPr>
+            <a:picLocks noChangeAspect="1"/>
+          </p:cNvPicPr>
+          <p:nvPr/>
+        </p:nvPicPr>
+        <p:blipFill>
+          <a:blip r:embed="rId9">
+            <a:extLst>
+              <a:ext uri="{28A0092B-C50C-407E-A947-70E740481C1C}">
+                <a14:useLocalDpi xmlns:a14="http://schemas.microsoft.com/office/drawing/2010/main" val="0"/>
+              </a:ext>
+            </a:extLst>
+          </a:blip>
+          <a:stretch>
+            <a:fillRect/>
+          </a:stretch>
+        </p:blipFill>
+        <p:spPr>
+          <a:xfrm>
+            <a:off x="10508439" y="4258138"/>
+            <a:ext cx="2345756" cy="1407454"/>
+          </a:xfrm>
+          <a:prstGeom prst="rect">
+            <a:avLst/>
+          </a:prstGeom>
+        </p:spPr>
+      </p:pic>
+      <p:pic>
+        <p:nvPicPr>
+          <p:cNvPr id="17" name="Picture 16" descr="A screenshot of a cell phone&#10;&#10;Description automatically generated">
+            <a:extLst>
+              <a:ext uri="{FF2B5EF4-FFF2-40B4-BE49-F238E27FC236}">
+                <a16:creationId xmlns:a16="http://schemas.microsoft.com/office/drawing/2014/main" id="{E88FB32E-6E41-4CD6-A384-BF8BA385333A}"/>
+              </a:ext>
+            </a:extLst>
+          </p:cNvPr>
+          <p:cNvPicPr>
+            <a:picLocks noChangeAspect="1"/>
+          </p:cNvPicPr>
+          <p:nvPr/>
+        </p:nvPicPr>
+        <p:blipFill>
+          <a:blip r:embed="rId10">
+            <a:extLst>
+              <a:ext uri="{28A0092B-C50C-407E-A947-70E740481C1C}">
+                <a14:useLocalDpi xmlns:a14="http://schemas.microsoft.com/office/drawing/2010/main" val="0"/>
+              </a:ext>
+            </a:extLst>
+          </a:blip>
+          <a:stretch>
+            <a:fillRect/>
+          </a:stretch>
+        </p:blipFill>
+        <p:spPr>
+          <a:xfrm>
+            <a:off x="10607310" y="2785932"/>
+            <a:ext cx="2246885" cy="1348131"/>
+          </a:xfrm>
+          <a:prstGeom prst="rect">
+            <a:avLst/>
+          </a:prstGeom>
+        </p:spPr>
+      </p:pic>
+      <p:pic>
+        <p:nvPicPr>
+          <p:cNvPr id="1032" name="Picture 8">
+            <a:extLst>
+              <a:ext uri="{FF2B5EF4-FFF2-40B4-BE49-F238E27FC236}">
+                <a16:creationId xmlns:a16="http://schemas.microsoft.com/office/drawing/2014/main" id="{547314C0-8A07-48D5-9BCF-93ACEF4ED0C2}"/>
+              </a:ext>
+            </a:extLst>
+          </p:cNvPr>
+          <p:cNvPicPr>
+            <a:picLocks noChangeAspect="1" noChangeArrowheads="1"/>
+          </p:cNvPicPr>
+          <p:nvPr/>
+        </p:nvPicPr>
+        <p:blipFill>
+          <a:blip r:embed="rId11">
+            <a:extLst>
+              <a:ext uri="{28A0092B-C50C-407E-A947-70E740481C1C}">
+                <a14:useLocalDpi xmlns:a14="http://schemas.microsoft.com/office/drawing/2010/main" val="0"/>
+              </a:ext>
+            </a:extLst>
+          </a:blip>
+          <a:srcRect/>
+          <a:stretch>
+            <a:fillRect/>
+          </a:stretch>
+        </p:blipFill>
+        <p:spPr bwMode="auto">
+          <a:xfrm>
+            <a:off x="-662042" y="4179783"/>
+            <a:ext cx="2286612" cy="1411489"/>
+          </a:xfrm>
+          <a:prstGeom prst="rect">
+            <a:avLst/>
+          </a:prstGeom>
+          <a:noFill/>
+          <a:extLst>
+            <a:ext uri="{909E8E84-426E-40DD-AFC4-6F175D3DCCD1}">
+              <a14:hiddenFill xmlns:a14="http://schemas.microsoft.com/office/drawing/2010/main">
+                <a:solidFill>
+                  <a:srgbClr val="FFFFFF"/>
+                </a:solidFill>
+              </a14:hiddenFill>
+            </a:ext>
+          </a:extLst>
+        </p:spPr>
+      </p:pic>
     </p:spTree>
     <p:extLst>
       <p:ext uri="{BB962C8B-B14F-4D97-AF65-F5344CB8AC3E}">

</xml_diff>